<commit_message>
Customising Addaptive Control block_8
</commit_message>
<xml_diff>
--- a/0_Docs_dir/3_General/Отчёт руководителям 12.07.2020.pptx
+++ b/0_Docs_dir/3_General/Отчёт руководителям 12.07.2020.pptx
@@ -5,18 +5,19 @@
     <p:sldMasterId id="2147483648" r:id="rId1"/>
   </p:sldMasterIdLst>
   <p:notesMasterIdLst>
-    <p:notesMasterId r:id="rId11"/>
+    <p:notesMasterId r:id="rId12"/>
   </p:notesMasterIdLst>
   <p:sldIdLst>
     <p:sldId id="256" r:id="rId2"/>
     <p:sldId id="271" r:id="rId3"/>
     <p:sldId id="261" r:id="rId4"/>
     <p:sldId id="274" r:id="rId5"/>
-    <p:sldId id="272" r:id="rId6"/>
-    <p:sldId id="273" r:id="rId7"/>
-    <p:sldId id="269" r:id="rId8"/>
-    <p:sldId id="275" r:id="rId9"/>
-    <p:sldId id="268" r:id="rId10"/>
+    <p:sldId id="273" r:id="rId6"/>
+    <p:sldId id="269" r:id="rId7"/>
+    <p:sldId id="275" r:id="rId8"/>
+    <p:sldId id="276" r:id="rId9"/>
+    <p:sldId id="272" r:id="rId10"/>
+    <p:sldId id="268" r:id="rId11"/>
   </p:sldIdLst>
   <p:sldSz cx="12192000" cy="6858000"/>
   <p:notesSz cx="6858000" cy="9144000"/>
@@ -205,7 +206,7 @@
           <a:p>
             <a:fld id="{E08BA5C7-0DF6-4BB3-8D80-C09E800CF8CB}" type="datetimeFigureOut">
               <a:rPr lang="ru-RU" smtClean="0"/>
-              <a:t>13.07.2020</a:t>
+              <a:t>14.07.2020</a:t>
             </a:fld>
             <a:endParaRPr lang="ru-RU"/>
           </a:p>
@@ -790,7 +791,7 @@
           <a:p>
             <a:fld id="{A2425CCF-BF91-44B3-BCB8-30DCB1C53B10}" type="slidenum">
               <a:rPr lang="ru-RU" smtClean="0"/>
-              <a:t>7</a:t>
+              <a:t>6</a:t>
             </a:fld>
             <a:endParaRPr lang="ru-RU"/>
           </a:p>
@@ -874,7 +875,7 @@
           <a:p>
             <a:fld id="{A2425CCF-BF91-44B3-BCB8-30DCB1C53B10}" type="slidenum">
               <a:rPr lang="ru-RU" smtClean="0"/>
-              <a:t>8</a:t>
+              <a:t>7</a:t>
             </a:fld>
             <a:endParaRPr lang="ru-RU"/>
           </a:p>
@@ -961,7 +962,7 @@
           <a:p>
             <a:fld id="{A2425CCF-BF91-44B3-BCB8-30DCB1C53B10}" type="slidenum">
               <a:rPr lang="ru-RU" smtClean="0"/>
-              <a:t>9</a:t>
+              <a:t>10</a:t>
             </a:fld>
             <a:endParaRPr lang="ru-RU"/>
           </a:p>
@@ -1111,7 +1112,7 @@
           <a:p>
             <a:fld id="{817AFE9C-9D88-408D-88B4-E7A081487440}" type="datetimeFigureOut">
               <a:rPr lang="ru-RU" smtClean="0"/>
-              <a:t>13.07.2020</a:t>
+              <a:t>14.07.2020</a:t>
             </a:fld>
             <a:endParaRPr lang="ru-RU"/>
           </a:p>
@@ -1281,7 +1282,7 @@
           <a:p>
             <a:fld id="{817AFE9C-9D88-408D-88B4-E7A081487440}" type="datetimeFigureOut">
               <a:rPr lang="ru-RU" smtClean="0"/>
-              <a:t>13.07.2020</a:t>
+              <a:t>14.07.2020</a:t>
             </a:fld>
             <a:endParaRPr lang="ru-RU"/>
           </a:p>
@@ -1461,7 +1462,7 @@
           <a:p>
             <a:fld id="{817AFE9C-9D88-408D-88B4-E7A081487440}" type="datetimeFigureOut">
               <a:rPr lang="ru-RU" smtClean="0"/>
-              <a:t>13.07.2020</a:t>
+              <a:t>14.07.2020</a:t>
             </a:fld>
             <a:endParaRPr lang="ru-RU"/>
           </a:p>
@@ -1631,7 +1632,7 @@
           <a:p>
             <a:fld id="{817AFE9C-9D88-408D-88B4-E7A081487440}" type="datetimeFigureOut">
               <a:rPr lang="ru-RU" smtClean="0"/>
-              <a:t>13.07.2020</a:t>
+              <a:t>14.07.2020</a:t>
             </a:fld>
             <a:endParaRPr lang="ru-RU"/>
           </a:p>
@@ -1877,7 +1878,7 @@
           <a:p>
             <a:fld id="{817AFE9C-9D88-408D-88B4-E7A081487440}" type="datetimeFigureOut">
               <a:rPr lang="ru-RU" smtClean="0"/>
-              <a:t>13.07.2020</a:t>
+              <a:t>14.07.2020</a:t>
             </a:fld>
             <a:endParaRPr lang="ru-RU"/>
           </a:p>
@@ -2109,7 +2110,7 @@
           <a:p>
             <a:fld id="{817AFE9C-9D88-408D-88B4-E7A081487440}" type="datetimeFigureOut">
               <a:rPr lang="ru-RU" smtClean="0"/>
-              <a:t>13.07.2020</a:t>
+              <a:t>14.07.2020</a:t>
             </a:fld>
             <a:endParaRPr lang="ru-RU"/>
           </a:p>
@@ -2476,7 +2477,7 @@
           <a:p>
             <a:fld id="{817AFE9C-9D88-408D-88B4-E7A081487440}" type="datetimeFigureOut">
               <a:rPr lang="ru-RU" smtClean="0"/>
-              <a:t>13.07.2020</a:t>
+              <a:t>14.07.2020</a:t>
             </a:fld>
             <a:endParaRPr lang="ru-RU"/>
           </a:p>
@@ -2594,7 +2595,7 @@
           <a:p>
             <a:fld id="{817AFE9C-9D88-408D-88B4-E7A081487440}" type="datetimeFigureOut">
               <a:rPr lang="ru-RU" smtClean="0"/>
-              <a:t>13.07.2020</a:t>
+              <a:t>14.07.2020</a:t>
             </a:fld>
             <a:endParaRPr lang="ru-RU"/>
           </a:p>
@@ -2689,7 +2690,7 @@
           <a:p>
             <a:fld id="{817AFE9C-9D88-408D-88B4-E7A081487440}" type="datetimeFigureOut">
               <a:rPr lang="ru-RU" smtClean="0"/>
-              <a:t>13.07.2020</a:t>
+              <a:t>14.07.2020</a:t>
             </a:fld>
             <a:endParaRPr lang="ru-RU"/>
           </a:p>
@@ -2966,7 +2967,7 @@
           <a:p>
             <a:fld id="{817AFE9C-9D88-408D-88B4-E7A081487440}" type="datetimeFigureOut">
               <a:rPr lang="ru-RU" smtClean="0"/>
-              <a:t>13.07.2020</a:t>
+              <a:t>14.07.2020</a:t>
             </a:fld>
             <a:endParaRPr lang="ru-RU"/>
           </a:p>
@@ -3219,7 +3220,7 @@
           <a:p>
             <a:fld id="{817AFE9C-9D88-408D-88B4-E7A081487440}" type="datetimeFigureOut">
               <a:rPr lang="ru-RU" smtClean="0"/>
-              <a:t>13.07.2020</a:t>
+              <a:t>14.07.2020</a:t>
             </a:fld>
             <a:endParaRPr lang="ru-RU"/>
           </a:p>
@@ -3432,7 +3433,7 @@
           <a:p>
             <a:fld id="{817AFE9C-9D88-408D-88B4-E7A081487440}" type="datetimeFigureOut">
               <a:rPr lang="ru-RU" smtClean="0"/>
-              <a:t>13.07.2020</a:t>
+              <a:t>14.07.2020</a:t>
             </a:fld>
             <a:endParaRPr lang="ru-RU"/>
           </a:p>
@@ -4184,6 +4185,1229 @@
 </p:sld>
 </file>
 
+<file path=ppt/slides/slide10.xml><?xml version="1.0" encoding="utf-8"?>
+<p:sld xmlns:a="http://schemas.openxmlformats.org/drawingml/2006/main" xmlns:r="http://schemas.openxmlformats.org/officeDocument/2006/relationships" xmlns:p="http://schemas.openxmlformats.org/presentationml/2006/main">
+  <p:cSld>
+    <p:spTree>
+      <p:nvGrpSpPr>
+        <p:cNvPr id="1" name=""/>
+        <p:cNvGrpSpPr/>
+        <p:nvPr/>
+      </p:nvGrpSpPr>
+      <p:grpSpPr>
+        <a:xfrm>
+          <a:off x="0" y="0"/>
+          <a:ext cx="0" cy="0"/>
+          <a:chOff x="0" y="0"/>
+          <a:chExt cx="0" cy="0"/>
+        </a:xfrm>
+      </p:grpSpPr>
+      <p:pic>
+        <p:nvPicPr>
+          <p:cNvPr id="2" name="Рисунок 1"/>
+          <p:cNvPicPr>
+            <a:picLocks noChangeAspect="1"/>
+          </p:cNvPicPr>
+          <p:nvPr/>
+        </p:nvPicPr>
+        <p:blipFill rotWithShape="1">
+          <a:blip r:embed="rId3"/>
+          <a:srcRect b="453"/>
+          <a:stretch/>
+        </p:blipFill>
+        <p:spPr>
+          <a:xfrm>
+            <a:off x="175237" y="0"/>
+            <a:ext cx="5745525" cy="6826928"/>
+          </a:xfrm>
+          <a:prstGeom prst="rect">
+            <a:avLst/>
+          </a:prstGeom>
+        </p:spPr>
+      </p:pic>
+      <p:pic>
+        <p:nvPicPr>
+          <p:cNvPr id="3" name="Рисунок 2"/>
+          <p:cNvPicPr>
+            <a:picLocks noChangeAspect="1"/>
+          </p:cNvPicPr>
+          <p:nvPr/>
+        </p:nvPicPr>
+        <p:blipFill>
+          <a:blip r:embed="rId4">
+            <a:extLst>
+              <a:ext uri="{28A0092B-C50C-407E-A947-70E740481C1C}">
+                <a14:useLocalDpi xmlns:a14="http://schemas.microsoft.com/office/drawing/2010/main" val="0"/>
+              </a:ext>
+            </a:extLst>
+          </a:blip>
+          <a:stretch>
+            <a:fillRect/>
+          </a:stretch>
+        </p:blipFill>
+        <p:spPr>
+          <a:xfrm>
+            <a:off x="6439692" y="0"/>
+            <a:ext cx="5752308" cy="6858000"/>
+          </a:xfrm>
+          <a:prstGeom prst="rect">
+            <a:avLst/>
+          </a:prstGeom>
+        </p:spPr>
+      </p:pic>
+      <p:sp>
+        <p:nvSpPr>
+          <p:cNvPr id="26" name="Прямоугольник 25"/>
+          <p:cNvSpPr/>
+          <p:nvPr/>
+        </p:nvSpPr>
+        <p:spPr>
+          <a:xfrm>
+            <a:off x="7241641" y="879995"/>
+            <a:ext cx="3012068" cy="1261884"/>
+          </a:xfrm>
+          <a:prstGeom prst="rect">
+            <a:avLst/>
+          </a:prstGeom>
+        </p:spPr>
+        <p:txBody>
+          <a:bodyPr wrap="square">
+            <a:spAutoFit/>
+          </a:bodyPr>
+          <a:lstStyle/>
+          <a:p>
+            <a:pPr indent="182880" algn="ctr">
+              <a:lnSpc>
+                <a:spcPct val="95000"/>
+              </a:lnSpc>
+              <a:spcAft>
+                <a:spcPts val="600"/>
+              </a:spcAft>
+              <a:tabLst>
+                <a:tab pos="182880" algn="l"/>
+              </a:tabLst>
+            </a:pPr>
+            <a:r>
+              <a:rPr lang="ru-RU" sz="1600" dirty="0" smtClean="0">
+                <a:solidFill>
+                  <a:schemeClr val="accent2">
+                    <a:lumMod val="75000"/>
+                  </a:schemeClr>
+                </a:solidFill>
+                <a:latin typeface="Times New Roman" panose="02020603050405020304" pitchFamily="18" charset="0"/>
+                <a:cs typeface="Times New Roman" panose="02020603050405020304" pitchFamily="18" charset="0"/>
+              </a:rPr>
+              <a:t>Возмущение в установившемся режиме по температуре стенок испарителя.</a:t>
+            </a:r>
+            <a:br>
+              <a:rPr lang="ru-RU" sz="1600" dirty="0" smtClean="0">
+                <a:solidFill>
+                  <a:schemeClr val="accent2">
+                    <a:lumMod val="75000"/>
+                  </a:schemeClr>
+                </a:solidFill>
+                <a:latin typeface="Times New Roman" panose="02020603050405020304" pitchFamily="18" charset="0"/>
+                <a:cs typeface="Times New Roman" panose="02020603050405020304" pitchFamily="18" charset="0"/>
+              </a:rPr>
+            </a:br>
+            <a:r>
+              <a:rPr lang="ru-RU" sz="1600" dirty="0" smtClean="0">
+                <a:solidFill>
+                  <a:schemeClr val="accent2">
+                    <a:lumMod val="75000"/>
+                  </a:schemeClr>
+                </a:solidFill>
+                <a:latin typeface="Times New Roman" panose="02020603050405020304" pitchFamily="18" charset="0"/>
+                <a:cs typeface="Times New Roman" panose="02020603050405020304" pitchFamily="18" charset="0"/>
+              </a:rPr>
+              <a:t>Отработка ПИ-регулятора без сигнальной адаптации.</a:t>
+            </a:r>
+          </a:p>
+        </p:txBody>
+      </p:sp>
+      <p:cxnSp>
+        <p:nvCxnSpPr>
+          <p:cNvPr id="6" name="Прямая со стрелкой 5"/>
+          <p:cNvCxnSpPr/>
+          <p:nvPr/>
+        </p:nvCxnSpPr>
+        <p:spPr>
+          <a:xfrm flipH="1" flipV="1">
+            <a:off x="887768" y="399496"/>
+            <a:ext cx="1335668" cy="601531"/>
+          </a:xfrm>
+          <a:prstGeom prst="straightConnector1">
+            <a:avLst/>
+          </a:prstGeom>
+          <a:ln w="31750">
+            <a:solidFill>
+              <a:schemeClr val="accent2">
+                <a:lumMod val="75000"/>
+              </a:schemeClr>
+            </a:solidFill>
+            <a:tailEnd type="triangle"/>
+          </a:ln>
+          <a:effectLst>
+            <a:glow rad="63500">
+              <a:schemeClr val="accent1">
+                <a:satMod val="175000"/>
+                <a:alpha val="40000"/>
+              </a:schemeClr>
+            </a:glow>
+          </a:effectLst>
+        </p:spPr>
+        <p:style>
+          <a:lnRef idx="1">
+            <a:schemeClr val="accent1"/>
+          </a:lnRef>
+          <a:fillRef idx="0">
+            <a:schemeClr val="accent1"/>
+          </a:fillRef>
+          <a:effectRef idx="0">
+            <a:schemeClr val="accent1"/>
+          </a:effectRef>
+          <a:fontRef idx="minor">
+            <a:schemeClr val="tx1"/>
+          </a:fontRef>
+        </p:style>
+      </p:cxnSp>
+      <p:cxnSp>
+        <p:nvCxnSpPr>
+          <p:cNvPr id="22" name="Прямая со стрелкой 21"/>
+          <p:cNvCxnSpPr/>
+          <p:nvPr/>
+        </p:nvCxnSpPr>
+        <p:spPr>
+          <a:xfrm flipH="1">
+            <a:off x="887768" y="1212783"/>
+            <a:ext cx="1335668" cy="375385"/>
+          </a:xfrm>
+          <a:prstGeom prst="straightConnector1">
+            <a:avLst/>
+          </a:prstGeom>
+          <a:ln w="31750">
+            <a:solidFill>
+              <a:schemeClr val="accent2">
+                <a:lumMod val="75000"/>
+              </a:schemeClr>
+            </a:solidFill>
+            <a:tailEnd type="triangle"/>
+          </a:ln>
+          <a:effectLst>
+            <a:glow rad="63500">
+              <a:schemeClr val="accent1">
+                <a:satMod val="175000"/>
+                <a:alpha val="40000"/>
+              </a:schemeClr>
+            </a:glow>
+          </a:effectLst>
+        </p:spPr>
+        <p:style>
+          <a:lnRef idx="1">
+            <a:schemeClr val="accent1"/>
+          </a:lnRef>
+          <a:fillRef idx="0">
+            <a:schemeClr val="accent1"/>
+          </a:fillRef>
+          <a:effectRef idx="0">
+            <a:schemeClr val="accent1"/>
+          </a:effectRef>
+          <a:fontRef idx="minor">
+            <a:schemeClr val="tx1"/>
+          </a:fontRef>
+        </p:style>
+      </p:cxnSp>
+      <p:cxnSp>
+        <p:nvCxnSpPr>
+          <p:cNvPr id="25" name="Прямая со стрелкой 24"/>
+          <p:cNvCxnSpPr/>
+          <p:nvPr/>
+        </p:nvCxnSpPr>
+        <p:spPr>
+          <a:xfrm flipH="1" flipV="1">
+            <a:off x="3696103" y="879995"/>
+            <a:ext cx="885522" cy="332293"/>
+          </a:xfrm>
+          <a:prstGeom prst="straightConnector1">
+            <a:avLst/>
+          </a:prstGeom>
+          <a:ln w="31750">
+            <a:solidFill>
+              <a:schemeClr val="accent2">
+                <a:lumMod val="75000"/>
+              </a:schemeClr>
+            </a:solidFill>
+            <a:tailEnd type="triangle"/>
+          </a:ln>
+          <a:effectLst>
+            <a:glow rad="63500">
+              <a:schemeClr val="accent1">
+                <a:satMod val="175000"/>
+                <a:alpha val="40000"/>
+              </a:schemeClr>
+            </a:glow>
+          </a:effectLst>
+        </p:spPr>
+        <p:style>
+          <a:lnRef idx="1">
+            <a:schemeClr val="accent1"/>
+          </a:lnRef>
+          <a:fillRef idx="0">
+            <a:schemeClr val="accent1"/>
+          </a:fillRef>
+          <a:effectRef idx="0">
+            <a:schemeClr val="accent1"/>
+          </a:effectRef>
+          <a:fontRef idx="minor">
+            <a:schemeClr val="tx1"/>
+          </a:fontRef>
+        </p:style>
+      </p:cxnSp>
+      <p:cxnSp>
+        <p:nvCxnSpPr>
+          <p:cNvPr id="29" name="Прямая со стрелкой 28"/>
+          <p:cNvCxnSpPr/>
+          <p:nvPr/>
+        </p:nvCxnSpPr>
+        <p:spPr>
+          <a:xfrm flipH="1">
+            <a:off x="3782729" y="539015"/>
+            <a:ext cx="798896" cy="161246"/>
+          </a:xfrm>
+          <a:prstGeom prst="straightConnector1">
+            <a:avLst/>
+          </a:prstGeom>
+          <a:ln w="31750">
+            <a:solidFill>
+              <a:schemeClr val="accent2">
+                <a:lumMod val="75000"/>
+              </a:schemeClr>
+            </a:solidFill>
+            <a:tailEnd type="triangle"/>
+          </a:ln>
+          <a:effectLst>
+            <a:glow rad="63500">
+              <a:schemeClr val="accent1">
+                <a:satMod val="175000"/>
+                <a:alpha val="40000"/>
+              </a:schemeClr>
+            </a:glow>
+          </a:effectLst>
+        </p:spPr>
+        <p:style>
+          <a:lnRef idx="1">
+            <a:schemeClr val="accent1"/>
+          </a:lnRef>
+          <a:fillRef idx="0">
+            <a:schemeClr val="accent1"/>
+          </a:fillRef>
+          <a:effectRef idx="0">
+            <a:schemeClr val="accent1"/>
+          </a:effectRef>
+          <a:fontRef idx="minor">
+            <a:schemeClr val="tx1"/>
+          </a:fontRef>
+        </p:style>
+      </p:cxnSp>
+      <p:cxnSp>
+        <p:nvCxnSpPr>
+          <p:cNvPr id="34" name="Прямая со стрелкой 33"/>
+          <p:cNvCxnSpPr/>
+          <p:nvPr/>
+        </p:nvCxnSpPr>
+        <p:spPr>
+          <a:xfrm>
+            <a:off x="3047999" y="2627697"/>
+            <a:ext cx="612326" cy="385805"/>
+          </a:xfrm>
+          <a:prstGeom prst="straightConnector1">
+            <a:avLst/>
+          </a:prstGeom>
+          <a:ln w="31750">
+            <a:solidFill>
+              <a:schemeClr val="accent2">
+                <a:lumMod val="75000"/>
+              </a:schemeClr>
+            </a:solidFill>
+            <a:tailEnd type="triangle"/>
+          </a:ln>
+          <a:effectLst>
+            <a:glow rad="63500">
+              <a:schemeClr val="accent1">
+                <a:satMod val="175000"/>
+                <a:alpha val="40000"/>
+              </a:schemeClr>
+            </a:glow>
+          </a:effectLst>
+        </p:spPr>
+        <p:style>
+          <a:lnRef idx="1">
+            <a:schemeClr val="accent1"/>
+          </a:lnRef>
+          <a:fillRef idx="0">
+            <a:schemeClr val="accent1"/>
+          </a:fillRef>
+          <a:effectRef idx="0">
+            <a:schemeClr val="accent1"/>
+          </a:effectRef>
+          <a:fontRef idx="minor">
+            <a:schemeClr val="tx1"/>
+          </a:fontRef>
+        </p:style>
+      </p:cxnSp>
+      <p:cxnSp>
+        <p:nvCxnSpPr>
+          <p:cNvPr id="35" name="Прямая со стрелкой 34"/>
+          <p:cNvCxnSpPr/>
+          <p:nvPr/>
+        </p:nvCxnSpPr>
+        <p:spPr>
+          <a:xfrm flipV="1">
+            <a:off x="3005297" y="1832870"/>
+            <a:ext cx="2769861" cy="259413"/>
+          </a:xfrm>
+          <a:prstGeom prst="straightConnector1">
+            <a:avLst/>
+          </a:prstGeom>
+          <a:ln w="31750">
+            <a:solidFill>
+              <a:schemeClr val="accent2">
+                <a:lumMod val="75000"/>
+              </a:schemeClr>
+            </a:solidFill>
+            <a:tailEnd type="triangle"/>
+          </a:ln>
+          <a:effectLst>
+            <a:glow rad="63500">
+              <a:schemeClr val="accent1">
+                <a:satMod val="175000"/>
+                <a:alpha val="40000"/>
+              </a:schemeClr>
+            </a:glow>
+          </a:effectLst>
+        </p:spPr>
+        <p:style>
+          <a:lnRef idx="1">
+            <a:schemeClr val="accent1"/>
+          </a:lnRef>
+          <a:fillRef idx="0">
+            <a:schemeClr val="accent1"/>
+          </a:fillRef>
+          <a:effectRef idx="0">
+            <a:schemeClr val="accent1"/>
+          </a:effectRef>
+          <a:fontRef idx="minor">
+            <a:schemeClr val="tx1"/>
+          </a:fontRef>
+        </p:style>
+      </p:cxnSp>
+      <p:cxnSp>
+        <p:nvCxnSpPr>
+          <p:cNvPr id="39" name="Прямая со стрелкой 38"/>
+          <p:cNvCxnSpPr/>
+          <p:nvPr/>
+        </p:nvCxnSpPr>
+        <p:spPr>
+          <a:xfrm flipV="1">
+            <a:off x="3047999" y="3429000"/>
+            <a:ext cx="534815" cy="292573"/>
+          </a:xfrm>
+          <a:prstGeom prst="straightConnector1">
+            <a:avLst/>
+          </a:prstGeom>
+          <a:ln w="31750">
+            <a:solidFill>
+              <a:schemeClr val="accent2">
+                <a:lumMod val="75000"/>
+              </a:schemeClr>
+            </a:solidFill>
+            <a:tailEnd type="triangle"/>
+          </a:ln>
+          <a:effectLst>
+            <a:glow rad="63500">
+              <a:schemeClr val="accent1">
+                <a:satMod val="175000"/>
+                <a:alpha val="40000"/>
+              </a:schemeClr>
+            </a:glow>
+          </a:effectLst>
+        </p:spPr>
+        <p:style>
+          <a:lnRef idx="1">
+            <a:schemeClr val="accent1"/>
+          </a:lnRef>
+          <a:fillRef idx="0">
+            <a:schemeClr val="accent1"/>
+          </a:fillRef>
+          <a:effectRef idx="0">
+            <a:schemeClr val="accent1"/>
+          </a:effectRef>
+          <a:fontRef idx="minor">
+            <a:schemeClr val="tx1"/>
+          </a:fontRef>
+        </p:style>
+      </p:cxnSp>
+      <p:cxnSp>
+        <p:nvCxnSpPr>
+          <p:cNvPr id="40" name="Прямая со стрелкой 39"/>
+          <p:cNvCxnSpPr/>
+          <p:nvPr/>
+        </p:nvCxnSpPr>
+        <p:spPr>
+          <a:xfrm>
+            <a:off x="3047999" y="4243562"/>
+            <a:ext cx="2727159" cy="212935"/>
+          </a:xfrm>
+          <a:prstGeom prst="straightConnector1">
+            <a:avLst/>
+          </a:prstGeom>
+          <a:ln w="31750">
+            <a:solidFill>
+              <a:schemeClr val="accent2">
+                <a:lumMod val="75000"/>
+              </a:schemeClr>
+            </a:solidFill>
+            <a:tailEnd type="triangle"/>
+          </a:ln>
+          <a:effectLst>
+            <a:glow rad="63500">
+              <a:schemeClr val="accent1">
+                <a:satMod val="175000"/>
+                <a:alpha val="40000"/>
+              </a:schemeClr>
+            </a:glow>
+          </a:effectLst>
+        </p:spPr>
+        <p:style>
+          <a:lnRef idx="1">
+            <a:schemeClr val="accent1"/>
+          </a:lnRef>
+          <a:fillRef idx="0">
+            <a:schemeClr val="accent1"/>
+          </a:fillRef>
+          <a:effectRef idx="0">
+            <a:schemeClr val="accent1"/>
+          </a:effectRef>
+          <a:fontRef idx="minor">
+            <a:schemeClr val="tx1"/>
+          </a:fontRef>
+        </p:style>
+      </p:cxnSp>
+      <p:sp>
+        <p:nvSpPr>
+          <p:cNvPr id="45" name="Прямоугольник 44"/>
+          <p:cNvSpPr/>
+          <p:nvPr/>
+        </p:nvSpPr>
+        <p:spPr>
+          <a:xfrm>
+            <a:off x="645202" y="5115985"/>
+            <a:ext cx="3071615" cy="911019"/>
+          </a:xfrm>
+          <a:prstGeom prst="rect">
+            <a:avLst/>
+          </a:prstGeom>
+        </p:spPr>
+        <p:txBody>
+          <a:bodyPr wrap="square">
+            <a:spAutoFit/>
+          </a:bodyPr>
+          <a:lstStyle/>
+          <a:p>
+            <a:pPr indent="182880" algn="ctr">
+              <a:lnSpc>
+                <a:spcPct val="95000"/>
+              </a:lnSpc>
+              <a:spcAft>
+                <a:spcPts val="600"/>
+              </a:spcAft>
+              <a:tabLst>
+                <a:tab pos="182880" algn="l"/>
+              </a:tabLst>
+            </a:pPr>
+            <a:r>
+              <a:rPr lang="ru-RU" sz="1400" dirty="0" smtClean="0">
+                <a:solidFill>
+                  <a:schemeClr val="accent2">
+                    <a:lumMod val="75000"/>
+                  </a:schemeClr>
+                </a:solidFill>
+                <a:latin typeface="Times New Roman" panose="02020603050405020304" pitchFamily="18" charset="0"/>
+                <a:cs typeface="Times New Roman" panose="02020603050405020304" pitchFamily="18" charset="0"/>
+              </a:rPr>
+              <a:t>Если бы был регулятор не по одной пространственной точки, а по всем четырём, то скорее всего регулирование было бы </a:t>
+            </a:r>
+            <a:r>
+              <a:rPr lang="ru-RU" sz="1400" dirty="0" err="1" smtClean="0">
+                <a:solidFill>
+                  <a:schemeClr val="accent2">
+                    <a:lumMod val="75000"/>
+                  </a:schemeClr>
+                </a:solidFill>
+                <a:latin typeface="Times New Roman" panose="02020603050405020304" pitchFamily="18" charset="0"/>
+                <a:cs typeface="Times New Roman" panose="02020603050405020304" pitchFamily="18" charset="0"/>
+              </a:rPr>
+              <a:t>плавнее</a:t>
+            </a:r>
+            <a:r>
+              <a:rPr lang="ru-RU" sz="1400" dirty="0" smtClean="0">
+                <a:solidFill>
+                  <a:schemeClr val="accent2">
+                    <a:lumMod val="75000"/>
+                  </a:schemeClr>
+                </a:solidFill>
+                <a:latin typeface="Times New Roman" panose="02020603050405020304" pitchFamily="18" charset="0"/>
+                <a:cs typeface="Times New Roman" panose="02020603050405020304" pitchFamily="18" charset="0"/>
+              </a:rPr>
+              <a:t>...</a:t>
+            </a:r>
+          </a:p>
+        </p:txBody>
+      </p:sp>
+      <p:sp>
+        <p:nvSpPr>
+          <p:cNvPr id="47" name="Прямоугольник 46"/>
+          <p:cNvSpPr/>
+          <p:nvPr/>
+        </p:nvSpPr>
+        <p:spPr>
+          <a:xfrm>
+            <a:off x="10149316" y="3748130"/>
+            <a:ext cx="2042684" cy="2190460"/>
+          </a:xfrm>
+          <a:prstGeom prst="rect">
+            <a:avLst/>
+          </a:prstGeom>
+        </p:spPr>
+        <p:txBody>
+          <a:bodyPr wrap="square">
+            <a:spAutoFit/>
+          </a:bodyPr>
+          <a:lstStyle/>
+          <a:p>
+            <a:pPr indent="182880" algn="ctr">
+              <a:lnSpc>
+                <a:spcPct val="95000"/>
+              </a:lnSpc>
+              <a:spcAft>
+                <a:spcPts val="600"/>
+              </a:spcAft>
+              <a:tabLst>
+                <a:tab pos="182880" algn="l"/>
+              </a:tabLst>
+            </a:pPr>
+            <a:r>
+              <a:rPr lang="ru-RU" sz="1400" dirty="0" smtClean="0">
+                <a:solidFill>
+                  <a:schemeClr val="accent2">
+                    <a:lumMod val="75000"/>
+                  </a:schemeClr>
+                </a:solidFill>
+                <a:latin typeface="Times New Roman" panose="02020603050405020304" pitchFamily="18" charset="0"/>
+                <a:cs typeface="Times New Roman" panose="02020603050405020304" pitchFamily="18" charset="0"/>
+              </a:rPr>
+              <a:t>Обычно газовые горелки (бутановые) имеют температуру горения газов от 800 до 2000 градусов. Отсюда вопрос: почему система явно настроена на </a:t>
+            </a:r>
+            <a:r>
+              <a:rPr lang="ru-RU" sz="1400" dirty="0">
+                <a:solidFill>
+                  <a:schemeClr val="accent2">
+                    <a:lumMod val="75000"/>
+                  </a:schemeClr>
+                </a:solidFill>
+                <a:latin typeface="Times New Roman" panose="02020603050405020304" pitchFamily="18" charset="0"/>
+                <a:cs typeface="Times New Roman" panose="02020603050405020304" pitchFamily="18" charset="0"/>
+              </a:rPr>
+              <a:t>температуру горения газов </a:t>
+            </a:r>
+            <a:r>
+              <a:rPr lang="ru-RU" sz="1400" dirty="0" smtClean="0">
+                <a:solidFill>
+                  <a:schemeClr val="accent2">
+                    <a:lumMod val="75000"/>
+                  </a:schemeClr>
+                </a:solidFill>
+                <a:latin typeface="Times New Roman" panose="02020603050405020304" pitchFamily="18" charset="0"/>
+                <a:cs typeface="Times New Roman" panose="02020603050405020304" pitchFamily="18" charset="0"/>
+              </a:rPr>
+              <a:t>не больше 550 градусов? </a:t>
+            </a:r>
+          </a:p>
+        </p:txBody>
+      </p:sp>
+      <p:sp>
+        <p:nvSpPr>
+          <p:cNvPr id="49" name="Прямоугольник 48"/>
+          <p:cNvSpPr/>
+          <p:nvPr/>
+        </p:nvSpPr>
+        <p:spPr>
+          <a:xfrm>
+            <a:off x="2089626" y="809901"/>
+            <a:ext cx="1324456" cy="297004"/>
+          </a:xfrm>
+          <a:prstGeom prst="rect">
+            <a:avLst/>
+          </a:prstGeom>
+        </p:spPr>
+        <p:txBody>
+          <a:bodyPr wrap="square">
+            <a:spAutoFit/>
+          </a:bodyPr>
+          <a:lstStyle/>
+          <a:p>
+            <a:pPr indent="182880">
+              <a:lnSpc>
+                <a:spcPct val="95000"/>
+              </a:lnSpc>
+              <a:spcAft>
+                <a:spcPts val="600"/>
+              </a:spcAft>
+              <a:tabLst>
+                <a:tab pos="182880" algn="l"/>
+              </a:tabLst>
+            </a:pPr>
+            <a:r>
+              <a:rPr lang="ru-RU" sz="1400" dirty="0" smtClean="0">
+                <a:solidFill>
+                  <a:schemeClr val="accent2">
+                    <a:lumMod val="75000"/>
+                  </a:schemeClr>
+                </a:solidFill>
+                <a:latin typeface="Times New Roman" panose="02020603050405020304" pitchFamily="18" charset="0"/>
+                <a:cs typeface="Times New Roman" panose="02020603050405020304" pitchFamily="18" charset="0"/>
+              </a:rPr>
+              <a:t>160.3777</a:t>
+            </a:r>
+          </a:p>
+        </p:txBody>
+      </p:sp>
+      <p:sp>
+        <p:nvSpPr>
+          <p:cNvPr id="50" name="Прямоугольник 49"/>
+          <p:cNvSpPr/>
+          <p:nvPr/>
+        </p:nvSpPr>
+        <p:spPr>
+          <a:xfrm>
+            <a:off x="2080531" y="1127456"/>
+            <a:ext cx="1324456" cy="297004"/>
+          </a:xfrm>
+          <a:prstGeom prst="rect">
+            <a:avLst/>
+          </a:prstGeom>
+        </p:spPr>
+        <p:txBody>
+          <a:bodyPr wrap="square">
+            <a:spAutoFit/>
+          </a:bodyPr>
+          <a:lstStyle/>
+          <a:p>
+            <a:pPr indent="182880">
+              <a:lnSpc>
+                <a:spcPct val="95000"/>
+              </a:lnSpc>
+              <a:spcAft>
+                <a:spcPts val="600"/>
+              </a:spcAft>
+              <a:tabLst>
+                <a:tab pos="182880" algn="l"/>
+              </a:tabLst>
+            </a:pPr>
+            <a:r>
+              <a:rPr lang="ru-RU" sz="1400" dirty="0" smtClean="0">
+                <a:solidFill>
+                  <a:schemeClr val="accent2">
+                    <a:lumMod val="75000"/>
+                  </a:schemeClr>
+                </a:solidFill>
+                <a:latin typeface="Times New Roman" panose="02020603050405020304" pitchFamily="18" charset="0"/>
+                <a:cs typeface="Times New Roman" panose="02020603050405020304" pitchFamily="18" charset="0"/>
+              </a:rPr>
+              <a:t>159.1571</a:t>
+            </a:r>
+          </a:p>
+        </p:txBody>
+      </p:sp>
+      <p:sp>
+        <p:nvSpPr>
+          <p:cNvPr id="51" name="Прямоугольник 50"/>
+          <p:cNvSpPr/>
+          <p:nvPr/>
+        </p:nvSpPr>
+        <p:spPr>
+          <a:xfrm>
+            <a:off x="4438327" y="368690"/>
+            <a:ext cx="1324456" cy="297004"/>
+          </a:xfrm>
+          <a:prstGeom prst="rect">
+            <a:avLst/>
+          </a:prstGeom>
+        </p:spPr>
+        <p:txBody>
+          <a:bodyPr wrap="square">
+            <a:spAutoFit/>
+          </a:bodyPr>
+          <a:lstStyle/>
+          <a:p>
+            <a:pPr indent="182880">
+              <a:lnSpc>
+                <a:spcPct val="95000"/>
+              </a:lnSpc>
+              <a:spcAft>
+                <a:spcPts val="600"/>
+              </a:spcAft>
+              <a:tabLst>
+                <a:tab pos="182880" algn="l"/>
+              </a:tabLst>
+            </a:pPr>
+            <a:r>
+              <a:rPr lang="ru-RU" sz="1400" dirty="0" smtClean="0">
+                <a:solidFill>
+                  <a:schemeClr val="accent2">
+                    <a:lumMod val="75000"/>
+                  </a:schemeClr>
+                </a:solidFill>
+                <a:latin typeface="Times New Roman" panose="02020603050405020304" pitchFamily="18" charset="0"/>
+                <a:cs typeface="Times New Roman" panose="02020603050405020304" pitchFamily="18" charset="0"/>
+              </a:rPr>
+              <a:t>160.0104</a:t>
+            </a:r>
+          </a:p>
+        </p:txBody>
+      </p:sp>
+      <p:sp>
+        <p:nvSpPr>
+          <p:cNvPr id="52" name="Прямоугольник 51"/>
+          <p:cNvSpPr/>
+          <p:nvPr/>
+        </p:nvSpPr>
+        <p:spPr>
+          <a:xfrm>
+            <a:off x="4438327" y="1063029"/>
+            <a:ext cx="1324456" cy="297004"/>
+          </a:xfrm>
+          <a:prstGeom prst="rect">
+            <a:avLst/>
+          </a:prstGeom>
+        </p:spPr>
+        <p:txBody>
+          <a:bodyPr wrap="square">
+            <a:spAutoFit/>
+          </a:bodyPr>
+          <a:lstStyle/>
+          <a:p>
+            <a:pPr indent="182880">
+              <a:lnSpc>
+                <a:spcPct val="95000"/>
+              </a:lnSpc>
+              <a:spcAft>
+                <a:spcPts val="600"/>
+              </a:spcAft>
+              <a:tabLst>
+                <a:tab pos="182880" algn="l"/>
+              </a:tabLst>
+            </a:pPr>
+            <a:r>
+              <a:rPr lang="ru-RU" sz="1400" dirty="0" smtClean="0">
+                <a:solidFill>
+                  <a:schemeClr val="accent2">
+                    <a:lumMod val="75000"/>
+                  </a:schemeClr>
+                </a:solidFill>
+                <a:latin typeface="Times New Roman" panose="02020603050405020304" pitchFamily="18" charset="0"/>
+                <a:cs typeface="Times New Roman" panose="02020603050405020304" pitchFamily="18" charset="0"/>
+              </a:rPr>
+              <a:t>159.9098</a:t>
+            </a:r>
+          </a:p>
+        </p:txBody>
+      </p:sp>
+      <p:sp>
+        <p:nvSpPr>
+          <p:cNvPr id="53" name="Прямоугольник 52"/>
+          <p:cNvSpPr/>
+          <p:nvPr/>
+        </p:nvSpPr>
+        <p:spPr>
+          <a:xfrm>
+            <a:off x="2080531" y="2398574"/>
+            <a:ext cx="1324456" cy="297004"/>
+          </a:xfrm>
+          <a:prstGeom prst="rect">
+            <a:avLst/>
+          </a:prstGeom>
+        </p:spPr>
+        <p:txBody>
+          <a:bodyPr wrap="square">
+            <a:spAutoFit/>
+          </a:bodyPr>
+          <a:lstStyle/>
+          <a:p>
+            <a:pPr indent="182880">
+              <a:lnSpc>
+                <a:spcPct val="95000"/>
+              </a:lnSpc>
+              <a:spcAft>
+                <a:spcPts val="600"/>
+              </a:spcAft>
+              <a:tabLst>
+                <a:tab pos="182880" algn="l"/>
+              </a:tabLst>
+            </a:pPr>
+            <a:r>
+              <a:rPr lang="ru-RU" sz="1400" dirty="0" smtClean="0">
+                <a:solidFill>
+                  <a:schemeClr val="accent2">
+                    <a:lumMod val="75000"/>
+                  </a:schemeClr>
+                </a:solidFill>
+                <a:latin typeface="Times New Roman" panose="02020603050405020304" pitchFamily="18" charset="0"/>
+                <a:cs typeface="Times New Roman" panose="02020603050405020304" pitchFamily="18" charset="0"/>
+              </a:rPr>
+              <a:t>0.2652</a:t>
+            </a:r>
+          </a:p>
+        </p:txBody>
+      </p:sp>
+      <p:sp>
+        <p:nvSpPr>
+          <p:cNvPr id="54" name="Прямоугольник 53"/>
+          <p:cNvSpPr/>
+          <p:nvPr/>
+        </p:nvSpPr>
+        <p:spPr>
+          <a:xfrm>
+            <a:off x="2072974" y="1930288"/>
+            <a:ext cx="932323" cy="297004"/>
+          </a:xfrm>
+          <a:prstGeom prst="rect">
+            <a:avLst/>
+          </a:prstGeom>
+        </p:spPr>
+        <p:txBody>
+          <a:bodyPr wrap="square">
+            <a:spAutoFit/>
+          </a:bodyPr>
+          <a:lstStyle/>
+          <a:p>
+            <a:pPr indent="182880">
+              <a:lnSpc>
+                <a:spcPct val="95000"/>
+              </a:lnSpc>
+              <a:spcAft>
+                <a:spcPts val="600"/>
+              </a:spcAft>
+              <a:tabLst>
+                <a:tab pos="182880" algn="l"/>
+              </a:tabLst>
+            </a:pPr>
+            <a:r>
+              <a:rPr lang="ru-RU" sz="1400" dirty="0" smtClean="0">
+                <a:solidFill>
+                  <a:schemeClr val="accent2">
+                    <a:lumMod val="75000"/>
+                  </a:schemeClr>
+                </a:solidFill>
+                <a:latin typeface="Times New Roman" panose="02020603050405020304" pitchFamily="18" charset="0"/>
+                <a:cs typeface="Times New Roman" panose="02020603050405020304" pitchFamily="18" charset="0"/>
+              </a:rPr>
+              <a:t>0.5539</a:t>
+            </a:r>
+          </a:p>
+        </p:txBody>
+      </p:sp>
+      <p:cxnSp>
+        <p:nvCxnSpPr>
+          <p:cNvPr id="56" name="Прямая со стрелкой 55"/>
+          <p:cNvCxnSpPr>
+            <a:stCxn id="54" idx="1"/>
+          </p:cNvCxnSpPr>
+          <p:nvPr/>
+        </p:nvCxnSpPr>
+        <p:spPr>
+          <a:xfrm flipH="1" flipV="1">
+            <a:off x="798990" y="1850783"/>
+            <a:ext cx="1273984" cy="228007"/>
+          </a:xfrm>
+          <a:prstGeom prst="straightConnector1">
+            <a:avLst/>
+          </a:prstGeom>
+          <a:ln w="31750">
+            <a:solidFill>
+              <a:schemeClr val="accent2">
+                <a:lumMod val="75000"/>
+              </a:schemeClr>
+            </a:solidFill>
+            <a:tailEnd type="triangle"/>
+          </a:ln>
+          <a:effectLst>
+            <a:glow rad="63500">
+              <a:schemeClr val="accent1">
+                <a:satMod val="175000"/>
+                <a:alpha val="40000"/>
+              </a:schemeClr>
+            </a:glow>
+          </a:effectLst>
+        </p:spPr>
+        <p:style>
+          <a:lnRef idx="1">
+            <a:schemeClr val="accent1"/>
+          </a:lnRef>
+          <a:fillRef idx="0">
+            <a:schemeClr val="accent1"/>
+          </a:fillRef>
+          <a:effectRef idx="0">
+            <a:schemeClr val="accent1"/>
+          </a:effectRef>
+          <a:fontRef idx="minor">
+            <a:schemeClr val="tx1"/>
+          </a:fontRef>
+        </p:style>
+      </p:cxnSp>
+      <p:sp>
+        <p:nvSpPr>
+          <p:cNvPr id="62" name="Прямоугольник 61"/>
+          <p:cNvSpPr/>
+          <p:nvPr/>
+        </p:nvSpPr>
+        <p:spPr>
+          <a:xfrm>
+            <a:off x="2072975" y="3588921"/>
+            <a:ext cx="1051965" cy="297004"/>
+          </a:xfrm>
+          <a:prstGeom prst="rect">
+            <a:avLst/>
+          </a:prstGeom>
+        </p:spPr>
+        <p:txBody>
+          <a:bodyPr wrap="square">
+            <a:spAutoFit/>
+          </a:bodyPr>
+          <a:lstStyle/>
+          <a:p>
+            <a:pPr indent="182880">
+              <a:lnSpc>
+                <a:spcPct val="95000"/>
+              </a:lnSpc>
+              <a:spcAft>
+                <a:spcPts val="600"/>
+              </a:spcAft>
+              <a:tabLst>
+                <a:tab pos="182880" algn="l"/>
+              </a:tabLst>
+            </a:pPr>
+            <a:r>
+              <a:rPr lang="ru-RU" sz="1400" dirty="0" smtClean="0">
+                <a:solidFill>
+                  <a:schemeClr val="accent2">
+                    <a:lumMod val="75000"/>
+                  </a:schemeClr>
+                </a:solidFill>
+                <a:latin typeface="Times New Roman" panose="02020603050405020304" pitchFamily="18" charset="0"/>
+                <a:cs typeface="Times New Roman" panose="02020603050405020304" pitchFamily="18" charset="0"/>
+              </a:rPr>
+              <a:t>53.1982</a:t>
+            </a:r>
+          </a:p>
+        </p:txBody>
+      </p:sp>
+      <p:sp>
+        <p:nvSpPr>
+          <p:cNvPr id="63" name="Прямоугольник 62"/>
+          <p:cNvSpPr/>
+          <p:nvPr/>
+        </p:nvSpPr>
+        <p:spPr>
+          <a:xfrm>
+            <a:off x="2072974" y="4079988"/>
+            <a:ext cx="1051965" cy="297004"/>
+          </a:xfrm>
+          <a:prstGeom prst="rect">
+            <a:avLst/>
+          </a:prstGeom>
+        </p:spPr>
+        <p:txBody>
+          <a:bodyPr wrap="square">
+            <a:spAutoFit/>
+          </a:bodyPr>
+          <a:lstStyle/>
+          <a:p>
+            <a:pPr indent="182880">
+              <a:lnSpc>
+                <a:spcPct val="95000"/>
+              </a:lnSpc>
+              <a:spcAft>
+                <a:spcPts val="600"/>
+              </a:spcAft>
+              <a:tabLst>
+                <a:tab pos="182880" algn="l"/>
+              </a:tabLst>
+            </a:pPr>
+            <a:r>
+              <a:rPr lang="ru-RU" sz="1400" dirty="0" smtClean="0">
+                <a:solidFill>
+                  <a:schemeClr val="accent2">
+                    <a:lumMod val="75000"/>
+                  </a:schemeClr>
+                </a:solidFill>
+                <a:latin typeface="Times New Roman" panose="02020603050405020304" pitchFamily="18" charset="0"/>
+                <a:cs typeface="Times New Roman" panose="02020603050405020304" pitchFamily="18" charset="0"/>
+              </a:rPr>
+              <a:t>50.4799</a:t>
+            </a:r>
+          </a:p>
+        </p:txBody>
+      </p:sp>
+      <p:cxnSp>
+        <p:nvCxnSpPr>
+          <p:cNvPr id="65" name="Прямая со стрелкой 64"/>
+          <p:cNvCxnSpPr/>
+          <p:nvPr/>
+        </p:nvCxnSpPr>
+        <p:spPr>
+          <a:xfrm flipH="1">
+            <a:off x="798990" y="4243562"/>
+            <a:ext cx="1424446" cy="184666"/>
+          </a:xfrm>
+          <a:prstGeom prst="straightConnector1">
+            <a:avLst/>
+          </a:prstGeom>
+          <a:ln w="31750">
+            <a:solidFill>
+              <a:schemeClr val="accent2">
+                <a:lumMod val="75000"/>
+              </a:schemeClr>
+            </a:solidFill>
+            <a:tailEnd type="triangle"/>
+          </a:ln>
+          <a:effectLst>
+            <a:glow rad="63500">
+              <a:schemeClr val="accent1">
+                <a:satMod val="175000"/>
+                <a:alpha val="40000"/>
+              </a:schemeClr>
+            </a:glow>
+          </a:effectLst>
+        </p:spPr>
+        <p:style>
+          <a:lnRef idx="1">
+            <a:schemeClr val="accent1"/>
+          </a:lnRef>
+          <a:fillRef idx="0">
+            <a:schemeClr val="accent1"/>
+          </a:fillRef>
+          <a:effectRef idx="0">
+            <a:schemeClr val="accent1"/>
+          </a:effectRef>
+          <a:fontRef idx="minor">
+            <a:schemeClr val="tx1"/>
+          </a:fontRef>
+        </p:style>
+      </p:cxnSp>
+      <p:sp>
+        <p:nvSpPr>
+          <p:cNvPr id="73" name="Прямоугольник 72"/>
+          <p:cNvSpPr/>
+          <p:nvPr/>
+        </p:nvSpPr>
+        <p:spPr>
+          <a:xfrm>
+            <a:off x="7398998" y="3637118"/>
+            <a:ext cx="2789051" cy="1934376"/>
+          </a:xfrm>
+          <a:prstGeom prst="rect">
+            <a:avLst/>
+          </a:prstGeom>
+        </p:spPr>
+        <p:txBody>
+          <a:bodyPr wrap="square">
+            <a:spAutoFit/>
+          </a:bodyPr>
+          <a:lstStyle/>
+          <a:p>
+            <a:pPr indent="182880" algn="ctr">
+              <a:lnSpc>
+                <a:spcPct val="95000"/>
+              </a:lnSpc>
+              <a:spcAft>
+                <a:spcPts val="600"/>
+              </a:spcAft>
+              <a:tabLst>
+                <a:tab pos="182880" algn="l"/>
+              </a:tabLst>
+            </a:pPr>
+            <a:r>
+              <a:rPr lang="ru-RU" sz="1400" dirty="0">
+                <a:solidFill>
+                  <a:schemeClr val="accent2">
+                    <a:lumMod val="75000"/>
+                  </a:schemeClr>
+                </a:solidFill>
+                <a:latin typeface="Times New Roman" panose="02020603050405020304" pitchFamily="18" charset="0"/>
+                <a:cs typeface="Times New Roman" panose="02020603050405020304" pitchFamily="18" charset="0"/>
+              </a:rPr>
+              <a:t>Р</a:t>
+            </a:r>
+            <a:r>
+              <a:rPr lang="ru-RU" sz="1400" dirty="0" smtClean="0">
+                <a:solidFill>
+                  <a:schemeClr val="accent2">
+                    <a:lumMod val="75000"/>
+                  </a:schemeClr>
+                </a:solidFill>
+                <a:latin typeface="Times New Roman" panose="02020603050405020304" pitchFamily="18" charset="0"/>
+                <a:cs typeface="Times New Roman" panose="02020603050405020304" pitchFamily="18" charset="0"/>
+              </a:rPr>
+              <a:t>егулятор отработал возмущение, но т.к. изменились «свойства» системы, то «теперь» нормальная температура дымовых газов равна 40 градусам, что достаточно </a:t>
+            </a:r>
+            <a:r>
+              <a:rPr lang="ru-RU" sz="1400" dirty="0" err="1" smtClean="0">
+                <a:solidFill>
+                  <a:schemeClr val="accent2">
+                    <a:lumMod val="75000"/>
+                  </a:schemeClr>
+                </a:solidFill>
+                <a:latin typeface="Times New Roman" panose="02020603050405020304" pitchFamily="18" charset="0"/>
+                <a:cs typeface="Times New Roman" panose="02020603050405020304" pitchFamily="18" charset="0"/>
+              </a:rPr>
+              <a:t>нефизично</a:t>
+            </a:r>
+            <a:r>
+              <a:rPr lang="ru-RU" sz="1400" dirty="0" smtClean="0">
+                <a:solidFill>
+                  <a:schemeClr val="accent2">
+                    <a:lumMod val="75000"/>
+                  </a:schemeClr>
+                </a:solidFill>
+                <a:latin typeface="Times New Roman" panose="02020603050405020304" pitchFamily="18" charset="0"/>
+                <a:cs typeface="Times New Roman" panose="02020603050405020304" pitchFamily="18" charset="0"/>
+              </a:rPr>
+              <a:t>, ведь даже температура огня от спички равна 350 градусам.</a:t>
+            </a:r>
+          </a:p>
+        </p:txBody>
+      </p:sp>
+    </p:spTree>
+    <p:extLst>
+      <p:ext uri="{BB962C8B-B14F-4D97-AF65-F5344CB8AC3E}">
+        <p14:creationId xmlns:p14="http://schemas.microsoft.com/office/powerpoint/2010/main" val="2134853185"/>
+      </p:ext>
+    </p:extLst>
+  </p:cSld>
+  <p:clrMapOvr>
+    <a:masterClrMapping/>
+  </p:clrMapOvr>
+  <p:timing>
+    <p:tnLst>
+      <p:par>
+        <p:cTn id="1" dur="indefinite" restart="never" nodeType="tmRoot"/>
+      </p:par>
+    </p:tnLst>
+  </p:timing>
+</p:sld>
+</file>
+
 <file path=ppt/slides/slide2.xml><?xml version="1.0" encoding="utf-8"?>
 <p:sld xmlns:a="http://schemas.openxmlformats.org/drawingml/2006/main" xmlns:r="http://schemas.openxmlformats.org/officeDocument/2006/relationships" xmlns:p="http://schemas.openxmlformats.org/presentationml/2006/main">
   <p:cSld>
@@ -4825,10 +6049,6 @@
               </a:rPr>
               <a:t>Испаритель (Теплообменник)</a:t>
             </a:r>
-            <a:endParaRPr lang="ru-RU" sz="3200" dirty="0" smtClean="0">
-              <a:latin typeface="Times New Roman" panose="02020603050405020304" pitchFamily="18" charset="0"/>
-              <a:cs typeface="Times New Roman" panose="02020603050405020304" pitchFamily="18" charset="0"/>
-            </a:endParaRPr>
           </a:p>
         </p:txBody>
       </p:sp>
@@ -5637,19 +6857,8 @@
                 <a:latin typeface="Times New Roman" panose="02020603050405020304" pitchFamily="18" charset="0"/>
                 <a:cs typeface="Times New Roman" panose="02020603050405020304" pitchFamily="18" charset="0"/>
               </a:rPr>
-              <a:t>испарител</a:t>
-            </a:r>
-            <a:r>
-              <a:rPr lang="ru-RU" sz="3200" dirty="0" smtClean="0">
-                <a:latin typeface="Times New Roman" panose="02020603050405020304" pitchFamily="18" charset="0"/>
-                <a:cs typeface="Times New Roman" panose="02020603050405020304" pitchFamily="18" charset="0"/>
-              </a:rPr>
-              <a:t>я</a:t>
-            </a:r>
-            <a:endParaRPr lang="ru-RU" sz="3200" dirty="0" smtClean="0">
-              <a:latin typeface="Times New Roman" panose="02020603050405020304" pitchFamily="18" charset="0"/>
-              <a:cs typeface="Times New Roman" panose="02020603050405020304" pitchFamily="18" charset="0"/>
-            </a:endParaRPr>
+              <a:t>испарителя</a:t>
+            </a:r>
           </a:p>
         </p:txBody>
       </p:sp>
@@ -6845,30 +8054,6 @@
           <a:chExt cx="0" cy="0"/>
         </a:xfrm>
       </p:grpSpPr>
-      <p:pic>
-        <p:nvPicPr>
-          <p:cNvPr id="4" name="Рисунок 3"/>
-          <p:cNvPicPr>
-            <a:picLocks noChangeAspect="1"/>
-          </p:cNvPicPr>
-          <p:nvPr/>
-        </p:nvPicPr>
-        <p:blipFill>
-          <a:blip r:embed="rId2"/>
-          <a:stretch>
-            <a:fillRect/>
-          </a:stretch>
-        </p:blipFill>
-        <p:spPr>
-          <a:xfrm>
-            <a:off x="64734" y="1452756"/>
-            <a:ext cx="7727432" cy="3866891"/>
-          </a:xfrm>
-          <a:prstGeom prst="rect">
-            <a:avLst/>
-          </a:prstGeom>
-        </p:spPr>
-      </p:pic>
       <p:sp>
         <p:nvSpPr>
           <p:cNvPr id="5" name="Прямоугольник 4"/>
@@ -6877,8 +8062,8 @@
         </p:nvSpPr>
         <p:spPr>
           <a:xfrm>
-            <a:off x="3813133" y="323408"/>
-            <a:ext cx="4620745" cy="560153"/>
+            <a:off x="2006354" y="314531"/>
+            <a:ext cx="7918881" cy="560153"/>
           </a:xfrm>
           <a:prstGeom prst="rect">
             <a:avLst/>
@@ -6906,88 +8091,8 @@
                 <a:latin typeface="Times New Roman" panose="02020603050405020304" pitchFamily="18" charset="0"/>
                 <a:cs typeface="Times New Roman" panose="02020603050405020304" pitchFamily="18" charset="0"/>
               </a:rPr>
-              <a:t>Сигнальная адаптация</a:t>
-            </a:r>
-            <a:endParaRPr lang="ru-RU" sz="3200" dirty="0" smtClean="0">
-              <a:latin typeface="Times New Roman" panose="02020603050405020304" pitchFamily="18" charset="0"/>
-              <a:cs typeface="Times New Roman" panose="02020603050405020304" pitchFamily="18" charset="0"/>
-            </a:endParaRPr>
-          </a:p>
-        </p:txBody>
-      </p:sp>
-    </p:spTree>
-    <p:extLst>
-      <p:ext uri="{BB962C8B-B14F-4D97-AF65-F5344CB8AC3E}">
-        <p14:creationId xmlns:p14="http://schemas.microsoft.com/office/powerpoint/2010/main" val="1168005888"/>
-      </p:ext>
-    </p:extLst>
-  </p:cSld>
-  <p:clrMapOvr>
-    <a:masterClrMapping/>
-  </p:clrMapOvr>
-</p:sld>
-</file>
-
-<file path=ppt/slides/slide6.xml><?xml version="1.0" encoding="utf-8"?>
-<p:sld xmlns:a="http://schemas.openxmlformats.org/drawingml/2006/main" xmlns:r="http://schemas.openxmlformats.org/officeDocument/2006/relationships" xmlns:p="http://schemas.openxmlformats.org/presentationml/2006/main">
-  <p:cSld>
-    <p:spTree>
-      <p:nvGrpSpPr>
-        <p:cNvPr id="1" name=""/>
-        <p:cNvGrpSpPr/>
-        <p:nvPr/>
-      </p:nvGrpSpPr>
-      <p:grpSpPr>
-        <a:xfrm>
-          <a:off x="0" y="0"/>
-          <a:ext cx="0" cy="0"/>
-          <a:chOff x="0" y="0"/>
-          <a:chExt cx="0" cy="0"/>
-        </a:xfrm>
-      </p:grpSpPr>
-      <p:sp>
-        <p:nvSpPr>
-          <p:cNvPr id="5" name="Прямоугольник 4"/>
-          <p:cNvSpPr/>
-          <p:nvPr/>
-        </p:nvSpPr>
-        <p:spPr>
-          <a:xfrm>
-            <a:off x="2006354" y="314531"/>
-            <a:ext cx="7918881" cy="560153"/>
-          </a:xfrm>
-          <a:prstGeom prst="rect">
-            <a:avLst/>
-          </a:prstGeom>
-        </p:spPr>
-        <p:txBody>
-          <a:bodyPr wrap="square">
-            <a:spAutoFit/>
-          </a:bodyPr>
-          <a:lstStyle/>
-          <a:p>
-            <a:pPr indent="182880" algn="ctr">
-              <a:lnSpc>
-                <a:spcPct val="95000"/>
-              </a:lnSpc>
-              <a:spcAft>
-                <a:spcPts val="600"/>
-              </a:spcAft>
-              <a:tabLst>
-                <a:tab pos="182880" algn="l"/>
-              </a:tabLst>
-            </a:pPr>
-            <a:r>
-              <a:rPr lang="ru-RU" sz="3200" dirty="0" smtClean="0">
-                <a:latin typeface="Times New Roman" panose="02020603050405020304" pitchFamily="18" charset="0"/>
-                <a:cs typeface="Times New Roman" panose="02020603050405020304" pitchFamily="18" charset="0"/>
-              </a:rPr>
               <a:t>Реализация исполнительного механизма</a:t>
             </a:r>
-            <a:endParaRPr lang="ru-RU" sz="3200" dirty="0" smtClean="0">
-              <a:latin typeface="Times New Roman" panose="02020603050405020304" pitchFamily="18" charset="0"/>
-              <a:cs typeface="Times New Roman" panose="02020603050405020304" pitchFamily="18" charset="0"/>
-            </a:endParaRPr>
           </a:p>
         </p:txBody>
       </p:sp>
@@ -7015,6 +8120,163 @@
           </a:prstGeom>
         </p:spPr>
       </p:pic>
+      <p:sp>
+        <p:nvSpPr>
+          <p:cNvPr id="4" name="TextBox 3"/>
+          <p:cNvSpPr txBox="1"/>
+          <p:nvPr/>
+        </p:nvSpPr>
+        <p:spPr>
+          <a:xfrm>
+            <a:off x="2538812" y="3998697"/>
+            <a:ext cx="7822462" cy="1077218"/>
+          </a:xfrm>
+          <a:prstGeom prst="rect">
+            <a:avLst/>
+          </a:prstGeom>
+          <a:noFill/>
+        </p:spPr>
+        <p:txBody>
+          <a:bodyPr wrap="none" rtlCol="0">
+            <a:spAutoFit/>
+          </a:bodyPr>
+          <a:lstStyle/>
+          <a:p>
+            <a:r>
+              <a:rPr lang="ru-RU" sz="1600" dirty="0" smtClean="0">
+                <a:solidFill>
+                  <a:schemeClr val="accent6"/>
+                </a:solidFill>
+                <a:latin typeface="Times New Roman" panose="02020603050405020304" pitchFamily="18" charset="0"/>
+                <a:cs typeface="Times New Roman" panose="02020603050405020304" pitchFamily="18" charset="0"/>
+              </a:rPr>
+              <a:t>Реализовано:</a:t>
+            </a:r>
+          </a:p>
+          <a:p>
+            <a:pPr marL="285750" indent="-285750">
+              <a:buFont typeface="Arial" panose="020B0604020202020204" pitchFamily="34" charset="0"/>
+              <a:buChar char="•"/>
+            </a:pPr>
+            <a:r>
+              <a:rPr lang="ru-RU" sz="1600" dirty="0" smtClean="0">
+                <a:solidFill>
+                  <a:schemeClr val="accent6"/>
+                </a:solidFill>
+                <a:latin typeface="Times New Roman" panose="02020603050405020304" pitchFamily="18" charset="0"/>
+                <a:cs typeface="Times New Roman" panose="02020603050405020304" pitchFamily="18" charset="0"/>
+              </a:rPr>
+              <a:t>ограничение в 5 %/сек. на скорость возрастания температуры</a:t>
+            </a:r>
+            <a:r>
+              <a:rPr lang="en-US" sz="1600" dirty="0" smtClean="0">
+                <a:solidFill>
+                  <a:schemeClr val="accent6"/>
+                </a:solidFill>
+                <a:latin typeface="Times New Roman" panose="02020603050405020304" pitchFamily="18" charset="0"/>
+                <a:cs typeface="Times New Roman" panose="02020603050405020304" pitchFamily="18" charset="0"/>
+              </a:rPr>
+              <a:t>;</a:t>
+            </a:r>
+            <a:endParaRPr lang="ru-RU" sz="1600" dirty="0" smtClean="0">
+              <a:solidFill>
+                <a:schemeClr val="accent6"/>
+              </a:solidFill>
+              <a:latin typeface="Times New Roman" panose="02020603050405020304" pitchFamily="18" charset="0"/>
+              <a:cs typeface="Times New Roman" panose="02020603050405020304" pitchFamily="18" charset="0"/>
+            </a:endParaRPr>
+          </a:p>
+          <a:p>
+            <a:pPr marL="285750" indent="-285750">
+              <a:buFont typeface="Arial" panose="020B0604020202020204" pitchFamily="34" charset="0"/>
+              <a:buChar char="•"/>
+            </a:pPr>
+            <a:r>
+              <a:rPr lang="ru-RU" sz="1600" dirty="0" smtClean="0">
+                <a:solidFill>
+                  <a:schemeClr val="accent6"/>
+                </a:solidFill>
+                <a:latin typeface="Times New Roman" panose="02020603050405020304" pitchFamily="18" charset="0"/>
+                <a:cs typeface="Times New Roman" panose="02020603050405020304" pitchFamily="18" charset="0"/>
+              </a:rPr>
+              <a:t>линейный преобразователь из процентов в градусы с верхним и нижним пределом</a:t>
+            </a:r>
+            <a:r>
+              <a:rPr lang="en-US" sz="1600" dirty="0" smtClean="0">
+                <a:solidFill>
+                  <a:schemeClr val="accent6"/>
+                </a:solidFill>
+                <a:latin typeface="Times New Roman" panose="02020603050405020304" pitchFamily="18" charset="0"/>
+                <a:cs typeface="Times New Roman" panose="02020603050405020304" pitchFamily="18" charset="0"/>
+              </a:rPr>
+              <a:t>;</a:t>
+            </a:r>
+            <a:r>
+              <a:rPr lang="ru-RU" sz="1600" dirty="0" smtClean="0">
+                <a:solidFill>
+                  <a:schemeClr val="accent6"/>
+                </a:solidFill>
+                <a:latin typeface="Times New Roman" panose="02020603050405020304" pitchFamily="18" charset="0"/>
+                <a:cs typeface="Times New Roman" panose="02020603050405020304" pitchFamily="18" charset="0"/>
+              </a:rPr>
+              <a:t> </a:t>
+            </a:r>
+          </a:p>
+          <a:p>
+            <a:pPr marL="285750" indent="-285750">
+              <a:buFont typeface="Arial" panose="020B0604020202020204" pitchFamily="34" charset="0"/>
+              <a:buChar char="•"/>
+            </a:pPr>
+            <a:r>
+              <a:rPr lang="ru-RU" sz="1600" dirty="0" smtClean="0">
+                <a:solidFill>
+                  <a:schemeClr val="accent6"/>
+                </a:solidFill>
+                <a:latin typeface="Times New Roman" panose="02020603050405020304" pitchFamily="18" charset="0"/>
+                <a:cs typeface="Times New Roman" panose="02020603050405020304" pitchFamily="18" charset="0"/>
+              </a:rPr>
+              <a:t>и задержка по времени</a:t>
+            </a:r>
+            <a:r>
+              <a:rPr lang="en-US" sz="1600" dirty="0" smtClean="0">
+                <a:solidFill>
+                  <a:schemeClr val="accent6"/>
+                </a:solidFill>
+                <a:latin typeface="Times New Roman" panose="02020603050405020304" pitchFamily="18" charset="0"/>
+                <a:cs typeface="Times New Roman" panose="02020603050405020304" pitchFamily="18" charset="0"/>
+              </a:rPr>
+              <a:t> (1 </a:t>
+            </a:r>
+            <a:r>
+              <a:rPr lang="ru-RU" sz="1600" dirty="0" smtClean="0">
+                <a:solidFill>
+                  <a:schemeClr val="accent6"/>
+                </a:solidFill>
+                <a:latin typeface="Times New Roman" panose="02020603050405020304" pitchFamily="18" charset="0"/>
+                <a:cs typeface="Times New Roman" panose="02020603050405020304" pitchFamily="18" charset="0"/>
+              </a:rPr>
+              <a:t>сек.</a:t>
+            </a:r>
+            <a:r>
+              <a:rPr lang="en-US" sz="1600" dirty="0" smtClean="0">
+                <a:solidFill>
+                  <a:schemeClr val="accent6"/>
+                </a:solidFill>
+                <a:latin typeface="Times New Roman" panose="02020603050405020304" pitchFamily="18" charset="0"/>
+                <a:cs typeface="Times New Roman" panose="02020603050405020304" pitchFamily="18" charset="0"/>
+              </a:rPr>
+              <a:t>).</a:t>
+            </a:r>
+            <a:endParaRPr lang="ru-RU" sz="1600" dirty="0">
+              <a:solidFill>
+                <a:schemeClr val="accent6"/>
+              </a:solidFill>
+              <a:latin typeface="Times New Roman" panose="02020603050405020304" pitchFamily="18" charset="0"/>
+              <a:cs typeface="Times New Roman" panose="02020603050405020304" pitchFamily="18" charset="0"/>
+            </a:endParaRPr>
+          </a:p>
+        </p:txBody>
+      </p:sp>
     </p:spTree>
     <p:extLst>
       <p:ext uri="{BB962C8B-B14F-4D97-AF65-F5344CB8AC3E}">
@@ -7028,7 +8290,7 @@
 </p:sld>
 </file>
 
-<file path=ppt/slides/slide7.xml><?xml version="1.0" encoding="utf-8"?>
+<file path=ppt/slides/slide6.xml><?xml version="1.0" encoding="utf-8"?>
 <p:sld xmlns:a="http://schemas.openxmlformats.org/drawingml/2006/main" xmlns:r="http://schemas.openxmlformats.org/officeDocument/2006/relationships" xmlns:p="http://schemas.openxmlformats.org/presentationml/2006/main">
   <p:cSld>
     <p:spTree>
@@ -7148,6 +8410,89 @@
     <p:extLst>
       <p:ext uri="{BB962C8B-B14F-4D97-AF65-F5344CB8AC3E}">
         <p14:creationId xmlns:p14="http://schemas.microsoft.com/office/powerpoint/2010/main" val="3023639435"/>
+      </p:ext>
+    </p:extLst>
+  </p:cSld>
+  <p:clrMapOvr>
+    <a:masterClrMapping/>
+  </p:clrMapOvr>
+  <p:timing>
+    <p:tnLst>
+      <p:par>
+        <p:cTn id="1" dur="indefinite" restart="never" nodeType="tmRoot"/>
+      </p:par>
+    </p:tnLst>
+  </p:timing>
+</p:sld>
+</file>
+
+<file path=ppt/slides/slide7.xml><?xml version="1.0" encoding="utf-8"?>
+<p:sld xmlns:a="http://schemas.openxmlformats.org/drawingml/2006/main" xmlns:r="http://schemas.openxmlformats.org/officeDocument/2006/relationships" xmlns:p="http://schemas.openxmlformats.org/presentationml/2006/main">
+  <p:cSld>
+    <p:spTree>
+      <p:nvGrpSpPr>
+        <p:cNvPr id="1" name=""/>
+        <p:cNvGrpSpPr/>
+        <p:nvPr/>
+      </p:nvGrpSpPr>
+      <p:grpSpPr>
+        <a:xfrm>
+          <a:off x="0" y="0"/>
+          <a:ext cx="0" cy="0"/>
+          <a:chOff x="0" y="0"/>
+          <a:chExt cx="0" cy="0"/>
+        </a:xfrm>
+      </p:grpSpPr>
+      <p:pic>
+        <p:nvPicPr>
+          <p:cNvPr id="2" name="Рисунок 1"/>
+          <p:cNvPicPr>
+            <a:picLocks noChangeAspect="1"/>
+          </p:cNvPicPr>
+          <p:nvPr/>
+        </p:nvPicPr>
+        <p:blipFill rotWithShape="1">
+          <a:blip r:embed="rId3"/>
+          <a:srcRect l="-1" r="554" b="453"/>
+          <a:stretch/>
+        </p:blipFill>
+        <p:spPr>
+          <a:xfrm>
+            <a:off x="221941" y="31072"/>
+            <a:ext cx="5726097" cy="6826928"/>
+          </a:xfrm>
+          <a:prstGeom prst="rect">
+            <a:avLst/>
+          </a:prstGeom>
+        </p:spPr>
+      </p:pic>
+      <p:pic>
+        <p:nvPicPr>
+          <p:cNvPr id="3" name="Рисунок 2"/>
+          <p:cNvPicPr>
+            <a:picLocks noChangeAspect="1"/>
+          </p:cNvPicPr>
+          <p:nvPr/>
+        </p:nvPicPr>
+        <p:blipFill rotWithShape="1">
+          <a:blip r:embed="rId4"/>
+          <a:srcRect r="513"/>
+          <a:stretch/>
+        </p:blipFill>
+        <p:spPr>
+          <a:xfrm>
+            <a:off x="6134243" y="0"/>
+            <a:ext cx="5735202" cy="6858000"/>
+          </a:xfrm>
+          <a:prstGeom prst="rect">
+            <a:avLst/>
+          </a:prstGeom>
+        </p:spPr>
+      </p:pic>
+    </p:spTree>
+    <p:extLst>
+      <p:ext uri="{BB962C8B-B14F-4D97-AF65-F5344CB8AC3E}">
+        <p14:creationId xmlns:p14="http://schemas.microsoft.com/office/powerpoint/2010/main" val="154839219"/>
       </p:ext>
     </p:extLst>
   </p:cSld>
@@ -7181,69 +8526,62 @@
           <a:chExt cx="0" cy="0"/>
         </a:xfrm>
       </p:grpSpPr>
-      <p:pic>
-        <p:nvPicPr>
-          <p:cNvPr id="2" name="Рисунок 1"/>
-          <p:cNvPicPr>
-            <a:picLocks noChangeAspect="1"/>
-          </p:cNvPicPr>
+      <p:sp>
+        <p:nvSpPr>
+          <p:cNvPr id="5" name="Прямоугольник 4"/>
+          <p:cNvSpPr/>
           <p:nvPr/>
-        </p:nvPicPr>
-        <p:blipFill rotWithShape="1">
-          <a:blip r:embed="rId3"/>
-          <a:srcRect l="-1" r="554" b="453"/>
-          <a:stretch/>
-        </p:blipFill>
-        <p:spPr>
-          <a:xfrm>
-            <a:off x="221941" y="31072"/>
-            <a:ext cx="5726097" cy="6826928"/>
+        </p:nvSpPr>
+        <p:spPr>
+          <a:xfrm>
+            <a:off x="2006354" y="314531"/>
+            <a:ext cx="7918881" cy="1027974"/>
           </a:xfrm>
           <a:prstGeom prst="rect">
             <a:avLst/>
           </a:prstGeom>
         </p:spPr>
-      </p:pic>
-      <p:pic>
-        <p:nvPicPr>
-          <p:cNvPr id="3" name="Рисунок 2"/>
-          <p:cNvPicPr>
-            <a:picLocks noChangeAspect="1"/>
-          </p:cNvPicPr>
-          <p:nvPr/>
-        </p:nvPicPr>
-        <p:blipFill rotWithShape="1">
-          <a:blip r:embed="rId4"/>
-          <a:srcRect r="513"/>
-          <a:stretch/>
-        </p:blipFill>
-        <p:spPr>
-          <a:xfrm>
-            <a:off x="6134243" y="0"/>
-            <a:ext cx="5735202" cy="6858000"/>
-          </a:xfrm>
-          <a:prstGeom prst="rect">
-            <a:avLst/>
-          </a:prstGeom>
-        </p:spPr>
-      </p:pic>
+        <p:txBody>
+          <a:bodyPr wrap="square">
+            <a:spAutoFit/>
+          </a:bodyPr>
+          <a:lstStyle/>
+          <a:p>
+            <a:pPr indent="182880" algn="ctr">
+              <a:lnSpc>
+                <a:spcPct val="95000"/>
+              </a:lnSpc>
+              <a:spcAft>
+                <a:spcPts val="600"/>
+              </a:spcAft>
+              <a:tabLst>
+                <a:tab pos="182880" algn="l"/>
+              </a:tabLst>
+            </a:pPr>
+            <a:r>
+              <a:rPr lang="ru-RU" sz="3200" dirty="0" smtClean="0">
+                <a:latin typeface="Times New Roman" panose="02020603050405020304" pitchFamily="18" charset="0"/>
+                <a:cs typeface="Times New Roman" panose="02020603050405020304" pitchFamily="18" charset="0"/>
+              </a:rPr>
+              <a:t>Попытка реализации модального регулирования</a:t>
+            </a:r>
+            <a:endParaRPr lang="ru-RU" sz="3200" dirty="0" smtClean="0">
+              <a:latin typeface="Times New Roman" panose="02020603050405020304" pitchFamily="18" charset="0"/>
+              <a:cs typeface="Times New Roman" panose="02020603050405020304" pitchFamily="18" charset="0"/>
+            </a:endParaRPr>
+          </a:p>
+        </p:txBody>
+      </p:sp>
     </p:spTree>
     <p:extLst>
       <p:ext uri="{BB962C8B-B14F-4D97-AF65-F5344CB8AC3E}">
-        <p14:creationId xmlns:p14="http://schemas.microsoft.com/office/powerpoint/2010/main" val="154839219"/>
+        <p14:creationId xmlns:p14="http://schemas.microsoft.com/office/powerpoint/2010/main" val="969054842"/>
       </p:ext>
     </p:extLst>
   </p:cSld>
   <p:clrMapOvr>
     <a:masterClrMapping/>
   </p:clrMapOvr>
-  <p:timing>
-    <p:tnLst>
-      <p:par>
-        <p:cTn id="1" dur="indefinite" restart="never" nodeType="tmRoot"/>
-      </p:par>
-    </p:tnLst>
-  </p:timing>
 </p:sld>
 </file>
 
@@ -7266,51 +8604,22 @@
       </p:grpSpPr>
       <p:pic>
         <p:nvPicPr>
-          <p:cNvPr id="2" name="Рисунок 1"/>
-          <p:cNvPicPr>
-            <a:picLocks noChangeAspect="1"/>
-          </p:cNvPicPr>
-          <p:nvPr/>
-        </p:nvPicPr>
-        <p:blipFill rotWithShape="1">
-          <a:blip r:embed="rId3"/>
-          <a:srcRect b="453"/>
-          <a:stretch/>
-        </p:blipFill>
-        <p:spPr>
-          <a:xfrm>
-            <a:off x="175237" y="0"/>
-            <a:ext cx="5745525" cy="6826928"/>
-          </a:xfrm>
-          <a:prstGeom prst="rect">
-            <a:avLst/>
-          </a:prstGeom>
-        </p:spPr>
-      </p:pic>
-      <p:pic>
-        <p:nvPicPr>
-          <p:cNvPr id="3" name="Рисунок 2"/>
+          <p:cNvPr id="4" name="Рисунок 3"/>
           <p:cNvPicPr>
             <a:picLocks noChangeAspect="1"/>
           </p:cNvPicPr>
           <p:nvPr/>
         </p:nvPicPr>
         <p:blipFill>
-          <a:blip r:embed="rId4">
-            <a:extLst>
-              <a:ext uri="{28A0092B-C50C-407E-A947-70E740481C1C}">
-                <a14:useLocalDpi xmlns:a14="http://schemas.microsoft.com/office/drawing/2010/main" val="0"/>
-              </a:ext>
-            </a:extLst>
-          </a:blip>
+          <a:blip r:embed="rId2"/>
           <a:stretch>
             <a:fillRect/>
           </a:stretch>
         </p:blipFill>
         <p:spPr>
           <a:xfrm>
-            <a:off x="6439692" y="0"/>
-            <a:ext cx="5752308" cy="6858000"/>
+            <a:off x="2259789" y="671521"/>
+            <a:ext cx="7727432" cy="3866891"/>
           </a:xfrm>
           <a:prstGeom prst="rect">
             <a:avLst/>
@@ -7319,14 +8628,14 @@
       </p:pic>
       <p:sp>
         <p:nvSpPr>
-          <p:cNvPr id="26" name="Прямоугольник 25"/>
+          <p:cNvPr id="5" name="Прямоугольник 4"/>
           <p:cNvSpPr/>
           <p:nvPr/>
         </p:nvSpPr>
         <p:spPr>
           <a:xfrm>
-            <a:off x="7241641" y="879995"/>
-            <a:ext cx="3012068" cy="1261884"/>
+            <a:off x="3813133" y="323408"/>
+            <a:ext cx="4620745" cy="560153"/>
           </a:xfrm>
           <a:prstGeom prst="rect">
             <a:avLst/>
@@ -7350,23 +8659,51 @@
               </a:tabLst>
             </a:pPr>
             <a:r>
-              <a:rPr lang="ru-RU" sz="1600" dirty="0" smtClean="0">
-                <a:solidFill>
-                  <a:schemeClr val="accent2">
-                    <a:lumMod val="75000"/>
-                  </a:schemeClr>
-                </a:solidFill>
+              <a:rPr lang="ru-RU" sz="3200" dirty="0" smtClean="0">
                 <a:latin typeface="Times New Roman" panose="02020603050405020304" pitchFamily="18" charset="0"/>
                 <a:cs typeface="Times New Roman" panose="02020603050405020304" pitchFamily="18" charset="0"/>
               </a:rPr>
-              <a:t>Возмущение в установившемся режиме по температуре стенок испарителя.</a:t>
+              <a:t>Сигнальная адаптация</a:t>
+            </a:r>
+          </a:p>
+        </p:txBody>
+      </p:sp>
+      <p:sp>
+        <p:nvSpPr>
+          <p:cNvPr id="6" name="TextBox 5"/>
+          <p:cNvSpPr txBox="1"/>
+          <p:nvPr/>
+        </p:nvSpPr>
+        <p:spPr>
+          <a:xfrm>
+            <a:off x="221943" y="4549676"/>
+            <a:ext cx="12137584" cy="2308324"/>
+          </a:xfrm>
+          <a:prstGeom prst="rect">
+            <a:avLst/>
+          </a:prstGeom>
+          <a:noFill/>
+        </p:spPr>
+        <p:txBody>
+          <a:bodyPr wrap="square" rtlCol="0">
+            <a:spAutoFit/>
+          </a:bodyPr>
+          <a:lstStyle/>
+          <a:p>
+            <a:r>
+              <a:rPr lang="ru-RU" sz="1600" dirty="0" smtClean="0">
+                <a:solidFill>
+                  <a:schemeClr val="accent6"/>
+                </a:solidFill>
+                <a:latin typeface="Times New Roman" panose="02020603050405020304" pitchFamily="18" charset="0"/>
+                <a:cs typeface="Times New Roman" panose="02020603050405020304" pitchFamily="18" charset="0"/>
+              </a:rPr>
+              <a:t>Разработка адаптивного регулятора для компенсации внешнего возмущения по температуре стенок, является не целесообразна по причине абсурдности компенсации, которое может привести к ЧП.</a:t>
             </a:r>
             <a:br>
               <a:rPr lang="ru-RU" sz="1600" dirty="0" smtClean="0">
                 <a:solidFill>
-                  <a:schemeClr val="accent2">
-                    <a:lumMod val="75000"/>
-                  </a:schemeClr>
+                  <a:schemeClr val="accent6"/>
                 </a:solidFill>
                 <a:latin typeface="Times New Roman" panose="02020603050405020304" pitchFamily="18" charset="0"/>
                 <a:cs typeface="Times New Roman" panose="02020603050405020304" pitchFamily="18" charset="0"/>
@@ -7375,20 +8712,75 @@
             <a:r>
               <a:rPr lang="ru-RU" sz="1600" dirty="0" smtClean="0">
                 <a:solidFill>
-                  <a:schemeClr val="accent2">
-                    <a:lumMod val="75000"/>
-                  </a:schemeClr>
+                  <a:schemeClr val="accent6"/>
                 </a:solidFill>
                 <a:latin typeface="Times New Roman" panose="02020603050405020304" pitchFamily="18" charset="0"/>
                 <a:cs typeface="Times New Roman" panose="02020603050405020304" pitchFamily="18" charset="0"/>
               </a:rPr>
-              <a:t>Отработка ПИ-регулятора без сигнальной адаптации.</a:t>
-            </a:r>
+              <a:t/>
+            </a:r>
+            <a:br>
+              <a:rPr lang="ru-RU" sz="1600" dirty="0" smtClean="0">
+                <a:solidFill>
+                  <a:schemeClr val="accent6"/>
+                </a:solidFill>
+                <a:latin typeface="Times New Roman" panose="02020603050405020304" pitchFamily="18" charset="0"/>
+                <a:cs typeface="Times New Roman" panose="02020603050405020304" pitchFamily="18" charset="0"/>
+              </a:rPr>
+            </a:br>
+            <a:r>
+              <a:rPr lang="ru-RU" sz="1600" dirty="0" smtClean="0">
+                <a:solidFill>
+                  <a:schemeClr val="accent6"/>
+                </a:solidFill>
+                <a:latin typeface="Times New Roman" panose="02020603050405020304" pitchFamily="18" charset="0"/>
+                <a:cs typeface="Times New Roman" panose="02020603050405020304" pitchFamily="18" charset="0"/>
+              </a:rPr>
+              <a:t>Если и стоит регулировать данное явление, то только в формате перевода всей системы «АВО-РК-Испаритель» в режим отключения от остальной системы.</a:t>
+            </a:r>
+            <a:br>
+              <a:rPr lang="ru-RU" sz="1600" dirty="0" smtClean="0">
+                <a:solidFill>
+                  <a:schemeClr val="accent6"/>
+                </a:solidFill>
+                <a:latin typeface="Times New Roman" panose="02020603050405020304" pitchFamily="18" charset="0"/>
+                <a:cs typeface="Times New Roman" panose="02020603050405020304" pitchFamily="18" charset="0"/>
+              </a:rPr>
+            </a:br>
+            <a:r>
+              <a:rPr lang="ru-RU" sz="1600" dirty="0" smtClean="0">
+                <a:solidFill>
+                  <a:schemeClr val="accent6"/>
+                </a:solidFill>
+                <a:latin typeface="Times New Roman" panose="02020603050405020304" pitchFamily="18" charset="0"/>
+                <a:cs typeface="Times New Roman" panose="02020603050405020304" pitchFamily="18" charset="0"/>
+              </a:rPr>
+              <a:t/>
+            </a:r>
+            <a:br>
+              <a:rPr lang="ru-RU" sz="1600" dirty="0" smtClean="0">
+                <a:solidFill>
+                  <a:schemeClr val="accent6"/>
+                </a:solidFill>
+                <a:latin typeface="Times New Roman" panose="02020603050405020304" pitchFamily="18" charset="0"/>
+                <a:cs typeface="Times New Roman" panose="02020603050405020304" pitchFamily="18" charset="0"/>
+              </a:rPr>
+            </a:br>
+            <a:r>
+              <a:rPr lang="ru-RU" sz="1600" dirty="0" smtClean="0">
+                <a:solidFill>
+                  <a:schemeClr val="accent6"/>
+                </a:solidFill>
+                <a:latin typeface="Times New Roman" panose="02020603050405020304" pitchFamily="18" charset="0"/>
+                <a:cs typeface="Times New Roman" panose="02020603050405020304" pitchFamily="18" charset="0"/>
+              </a:rPr>
+              <a:t>В связи с этим, единственными внешними возмущениями оказываемыми на систему остаются температура жидкости и концентрация влаги в жидкости в исходной смеси.</a:t>
+            </a:r>
+          </a:p>
+          <a:p>
             <a:endParaRPr lang="ru-RU" sz="1600" dirty="0" smtClean="0">
               <a:solidFill>
-                <a:schemeClr val="accent2">
-                  <a:lumMod val="75000"/>
-                </a:schemeClr>
+                <a:schemeClr val="accent6"/>
               </a:solidFill>
               <a:latin typeface="Times New Roman" panose="02020603050405020304" pitchFamily="18" charset="0"/>
               <a:cs typeface="Times New Roman" panose="02020603050405020304" pitchFamily="18" charset="0"/>
@@ -7396,1209 +8788,16 @@
           </a:p>
         </p:txBody>
       </p:sp>
-      <p:cxnSp>
-        <p:nvCxnSpPr>
-          <p:cNvPr id="6" name="Прямая со стрелкой 5"/>
-          <p:cNvCxnSpPr/>
-          <p:nvPr/>
-        </p:nvCxnSpPr>
-        <p:spPr>
-          <a:xfrm flipH="1" flipV="1">
-            <a:off x="887768" y="399496"/>
-            <a:ext cx="1335668" cy="601531"/>
-          </a:xfrm>
-          <a:prstGeom prst="straightConnector1">
-            <a:avLst/>
-          </a:prstGeom>
-          <a:ln w="31750">
-            <a:solidFill>
-              <a:schemeClr val="accent2">
-                <a:lumMod val="75000"/>
-              </a:schemeClr>
-            </a:solidFill>
-            <a:tailEnd type="triangle"/>
-          </a:ln>
-          <a:effectLst>
-            <a:glow rad="63500">
-              <a:schemeClr val="accent1">
-                <a:satMod val="175000"/>
-                <a:alpha val="40000"/>
-              </a:schemeClr>
-            </a:glow>
-          </a:effectLst>
-        </p:spPr>
-        <p:style>
-          <a:lnRef idx="1">
-            <a:schemeClr val="accent1"/>
-          </a:lnRef>
-          <a:fillRef idx="0">
-            <a:schemeClr val="accent1"/>
-          </a:fillRef>
-          <a:effectRef idx="0">
-            <a:schemeClr val="accent1"/>
-          </a:effectRef>
-          <a:fontRef idx="minor">
-            <a:schemeClr val="tx1"/>
-          </a:fontRef>
-        </p:style>
-      </p:cxnSp>
-      <p:cxnSp>
-        <p:nvCxnSpPr>
-          <p:cNvPr id="22" name="Прямая со стрелкой 21"/>
-          <p:cNvCxnSpPr/>
-          <p:nvPr/>
-        </p:nvCxnSpPr>
-        <p:spPr>
-          <a:xfrm flipH="1">
-            <a:off x="887768" y="1212783"/>
-            <a:ext cx="1335668" cy="375385"/>
-          </a:xfrm>
-          <a:prstGeom prst="straightConnector1">
-            <a:avLst/>
-          </a:prstGeom>
-          <a:ln w="31750">
-            <a:solidFill>
-              <a:schemeClr val="accent2">
-                <a:lumMod val="75000"/>
-              </a:schemeClr>
-            </a:solidFill>
-            <a:tailEnd type="triangle"/>
-          </a:ln>
-          <a:effectLst>
-            <a:glow rad="63500">
-              <a:schemeClr val="accent1">
-                <a:satMod val="175000"/>
-                <a:alpha val="40000"/>
-              </a:schemeClr>
-            </a:glow>
-          </a:effectLst>
-        </p:spPr>
-        <p:style>
-          <a:lnRef idx="1">
-            <a:schemeClr val="accent1"/>
-          </a:lnRef>
-          <a:fillRef idx="0">
-            <a:schemeClr val="accent1"/>
-          </a:fillRef>
-          <a:effectRef idx="0">
-            <a:schemeClr val="accent1"/>
-          </a:effectRef>
-          <a:fontRef idx="minor">
-            <a:schemeClr val="tx1"/>
-          </a:fontRef>
-        </p:style>
-      </p:cxnSp>
-      <p:cxnSp>
-        <p:nvCxnSpPr>
-          <p:cNvPr id="25" name="Прямая со стрелкой 24"/>
-          <p:cNvCxnSpPr/>
-          <p:nvPr/>
-        </p:nvCxnSpPr>
-        <p:spPr>
-          <a:xfrm flipH="1" flipV="1">
-            <a:off x="3696103" y="879995"/>
-            <a:ext cx="885522" cy="332293"/>
-          </a:xfrm>
-          <a:prstGeom prst="straightConnector1">
-            <a:avLst/>
-          </a:prstGeom>
-          <a:ln w="31750">
-            <a:solidFill>
-              <a:schemeClr val="accent2">
-                <a:lumMod val="75000"/>
-              </a:schemeClr>
-            </a:solidFill>
-            <a:tailEnd type="triangle"/>
-          </a:ln>
-          <a:effectLst>
-            <a:glow rad="63500">
-              <a:schemeClr val="accent1">
-                <a:satMod val="175000"/>
-                <a:alpha val="40000"/>
-              </a:schemeClr>
-            </a:glow>
-          </a:effectLst>
-        </p:spPr>
-        <p:style>
-          <a:lnRef idx="1">
-            <a:schemeClr val="accent1"/>
-          </a:lnRef>
-          <a:fillRef idx="0">
-            <a:schemeClr val="accent1"/>
-          </a:fillRef>
-          <a:effectRef idx="0">
-            <a:schemeClr val="accent1"/>
-          </a:effectRef>
-          <a:fontRef idx="minor">
-            <a:schemeClr val="tx1"/>
-          </a:fontRef>
-        </p:style>
-      </p:cxnSp>
-      <p:cxnSp>
-        <p:nvCxnSpPr>
-          <p:cNvPr id="29" name="Прямая со стрелкой 28"/>
-          <p:cNvCxnSpPr/>
-          <p:nvPr/>
-        </p:nvCxnSpPr>
-        <p:spPr>
-          <a:xfrm flipH="1">
-            <a:off x="3782729" y="539015"/>
-            <a:ext cx="798896" cy="161246"/>
-          </a:xfrm>
-          <a:prstGeom prst="straightConnector1">
-            <a:avLst/>
-          </a:prstGeom>
-          <a:ln w="31750">
-            <a:solidFill>
-              <a:schemeClr val="accent2">
-                <a:lumMod val="75000"/>
-              </a:schemeClr>
-            </a:solidFill>
-            <a:tailEnd type="triangle"/>
-          </a:ln>
-          <a:effectLst>
-            <a:glow rad="63500">
-              <a:schemeClr val="accent1">
-                <a:satMod val="175000"/>
-                <a:alpha val="40000"/>
-              </a:schemeClr>
-            </a:glow>
-          </a:effectLst>
-        </p:spPr>
-        <p:style>
-          <a:lnRef idx="1">
-            <a:schemeClr val="accent1"/>
-          </a:lnRef>
-          <a:fillRef idx="0">
-            <a:schemeClr val="accent1"/>
-          </a:fillRef>
-          <a:effectRef idx="0">
-            <a:schemeClr val="accent1"/>
-          </a:effectRef>
-          <a:fontRef idx="minor">
-            <a:schemeClr val="tx1"/>
-          </a:fontRef>
-        </p:style>
-      </p:cxnSp>
-      <p:cxnSp>
-        <p:nvCxnSpPr>
-          <p:cNvPr id="34" name="Прямая со стрелкой 33"/>
-          <p:cNvCxnSpPr/>
-          <p:nvPr/>
-        </p:nvCxnSpPr>
-        <p:spPr>
-          <a:xfrm>
-            <a:off x="3047999" y="2627697"/>
-            <a:ext cx="612326" cy="385805"/>
-          </a:xfrm>
-          <a:prstGeom prst="straightConnector1">
-            <a:avLst/>
-          </a:prstGeom>
-          <a:ln w="31750">
-            <a:solidFill>
-              <a:schemeClr val="accent2">
-                <a:lumMod val="75000"/>
-              </a:schemeClr>
-            </a:solidFill>
-            <a:tailEnd type="triangle"/>
-          </a:ln>
-          <a:effectLst>
-            <a:glow rad="63500">
-              <a:schemeClr val="accent1">
-                <a:satMod val="175000"/>
-                <a:alpha val="40000"/>
-              </a:schemeClr>
-            </a:glow>
-          </a:effectLst>
-        </p:spPr>
-        <p:style>
-          <a:lnRef idx="1">
-            <a:schemeClr val="accent1"/>
-          </a:lnRef>
-          <a:fillRef idx="0">
-            <a:schemeClr val="accent1"/>
-          </a:fillRef>
-          <a:effectRef idx="0">
-            <a:schemeClr val="accent1"/>
-          </a:effectRef>
-          <a:fontRef idx="minor">
-            <a:schemeClr val="tx1"/>
-          </a:fontRef>
-        </p:style>
-      </p:cxnSp>
-      <p:cxnSp>
-        <p:nvCxnSpPr>
-          <p:cNvPr id="35" name="Прямая со стрелкой 34"/>
-          <p:cNvCxnSpPr/>
-          <p:nvPr/>
-        </p:nvCxnSpPr>
-        <p:spPr>
-          <a:xfrm flipV="1">
-            <a:off x="3005297" y="1832870"/>
-            <a:ext cx="2769861" cy="259413"/>
-          </a:xfrm>
-          <a:prstGeom prst="straightConnector1">
-            <a:avLst/>
-          </a:prstGeom>
-          <a:ln w="31750">
-            <a:solidFill>
-              <a:schemeClr val="accent2">
-                <a:lumMod val="75000"/>
-              </a:schemeClr>
-            </a:solidFill>
-            <a:tailEnd type="triangle"/>
-          </a:ln>
-          <a:effectLst>
-            <a:glow rad="63500">
-              <a:schemeClr val="accent1">
-                <a:satMod val="175000"/>
-                <a:alpha val="40000"/>
-              </a:schemeClr>
-            </a:glow>
-          </a:effectLst>
-        </p:spPr>
-        <p:style>
-          <a:lnRef idx="1">
-            <a:schemeClr val="accent1"/>
-          </a:lnRef>
-          <a:fillRef idx="0">
-            <a:schemeClr val="accent1"/>
-          </a:fillRef>
-          <a:effectRef idx="0">
-            <a:schemeClr val="accent1"/>
-          </a:effectRef>
-          <a:fontRef idx="minor">
-            <a:schemeClr val="tx1"/>
-          </a:fontRef>
-        </p:style>
-      </p:cxnSp>
-      <p:cxnSp>
-        <p:nvCxnSpPr>
-          <p:cNvPr id="39" name="Прямая со стрелкой 38"/>
-          <p:cNvCxnSpPr/>
-          <p:nvPr/>
-        </p:nvCxnSpPr>
-        <p:spPr>
-          <a:xfrm flipV="1">
-            <a:off x="3047999" y="3429000"/>
-            <a:ext cx="534815" cy="292573"/>
-          </a:xfrm>
-          <a:prstGeom prst="straightConnector1">
-            <a:avLst/>
-          </a:prstGeom>
-          <a:ln w="31750">
-            <a:solidFill>
-              <a:schemeClr val="accent2">
-                <a:lumMod val="75000"/>
-              </a:schemeClr>
-            </a:solidFill>
-            <a:tailEnd type="triangle"/>
-          </a:ln>
-          <a:effectLst>
-            <a:glow rad="63500">
-              <a:schemeClr val="accent1">
-                <a:satMod val="175000"/>
-                <a:alpha val="40000"/>
-              </a:schemeClr>
-            </a:glow>
-          </a:effectLst>
-        </p:spPr>
-        <p:style>
-          <a:lnRef idx="1">
-            <a:schemeClr val="accent1"/>
-          </a:lnRef>
-          <a:fillRef idx="0">
-            <a:schemeClr val="accent1"/>
-          </a:fillRef>
-          <a:effectRef idx="0">
-            <a:schemeClr val="accent1"/>
-          </a:effectRef>
-          <a:fontRef idx="minor">
-            <a:schemeClr val="tx1"/>
-          </a:fontRef>
-        </p:style>
-      </p:cxnSp>
-      <p:cxnSp>
-        <p:nvCxnSpPr>
-          <p:cNvPr id="40" name="Прямая со стрелкой 39"/>
-          <p:cNvCxnSpPr/>
-          <p:nvPr/>
-        </p:nvCxnSpPr>
-        <p:spPr>
-          <a:xfrm>
-            <a:off x="3047999" y="4243562"/>
-            <a:ext cx="2727159" cy="212935"/>
-          </a:xfrm>
-          <a:prstGeom prst="straightConnector1">
-            <a:avLst/>
-          </a:prstGeom>
-          <a:ln w="31750">
-            <a:solidFill>
-              <a:schemeClr val="accent2">
-                <a:lumMod val="75000"/>
-              </a:schemeClr>
-            </a:solidFill>
-            <a:tailEnd type="triangle"/>
-          </a:ln>
-          <a:effectLst>
-            <a:glow rad="63500">
-              <a:schemeClr val="accent1">
-                <a:satMod val="175000"/>
-                <a:alpha val="40000"/>
-              </a:schemeClr>
-            </a:glow>
-          </a:effectLst>
-        </p:spPr>
-        <p:style>
-          <a:lnRef idx="1">
-            <a:schemeClr val="accent1"/>
-          </a:lnRef>
-          <a:fillRef idx="0">
-            <a:schemeClr val="accent1"/>
-          </a:fillRef>
-          <a:effectRef idx="0">
-            <a:schemeClr val="accent1"/>
-          </a:effectRef>
-          <a:fontRef idx="minor">
-            <a:schemeClr val="tx1"/>
-          </a:fontRef>
-        </p:style>
-      </p:cxnSp>
-      <p:sp>
-        <p:nvSpPr>
-          <p:cNvPr id="45" name="Прямоугольник 44"/>
-          <p:cNvSpPr/>
-          <p:nvPr/>
-        </p:nvSpPr>
-        <p:spPr>
-          <a:xfrm>
-            <a:off x="645202" y="5115985"/>
-            <a:ext cx="3071615" cy="911019"/>
-          </a:xfrm>
-          <a:prstGeom prst="rect">
-            <a:avLst/>
-          </a:prstGeom>
-        </p:spPr>
-        <p:txBody>
-          <a:bodyPr wrap="square">
-            <a:spAutoFit/>
-          </a:bodyPr>
-          <a:lstStyle/>
-          <a:p>
-            <a:pPr indent="182880" algn="ctr">
-              <a:lnSpc>
-                <a:spcPct val="95000"/>
-              </a:lnSpc>
-              <a:spcAft>
-                <a:spcPts val="600"/>
-              </a:spcAft>
-              <a:tabLst>
-                <a:tab pos="182880" algn="l"/>
-              </a:tabLst>
-            </a:pPr>
-            <a:r>
-              <a:rPr lang="ru-RU" sz="1400" dirty="0" smtClean="0">
-                <a:solidFill>
-                  <a:schemeClr val="accent2">
-                    <a:lumMod val="75000"/>
-                  </a:schemeClr>
-                </a:solidFill>
-                <a:latin typeface="Times New Roman" panose="02020603050405020304" pitchFamily="18" charset="0"/>
-                <a:cs typeface="Times New Roman" panose="02020603050405020304" pitchFamily="18" charset="0"/>
-              </a:rPr>
-              <a:t>Если бы был регулятор не по одной пространственной точки, а по всем четырём, то скорее всего регулирование было бы </a:t>
-            </a:r>
-            <a:r>
-              <a:rPr lang="ru-RU" sz="1400" dirty="0" err="1" smtClean="0">
-                <a:solidFill>
-                  <a:schemeClr val="accent2">
-                    <a:lumMod val="75000"/>
-                  </a:schemeClr>
-                </a:solidFill>
-                <a:latin typeface="Times New Roman" panose="02020603050405020304" pitchFamily="18" charset="0"/>
-                <a:cs typeface="Times New Roman" panose="02020603050405020304" pitchFamily="18" charset="0"/>
-              </a:rPr>
-              <a:t>плавнее</a:t>
-            </a:r>
-            <a:r>
-              <a:rPr lang="ru-RU" sz="1400" dirty="0" smtClean="0">
-                <a:solidFill>
-                  <a:schemeClr val="accent2">
-                    <a:lumMod val="75000"/>
-                  </a:schemeClr>
-                </a:solidFill>
-                <a:latin typeface="Times New Roman" panose="02020603050405020304" pitchFamily="18" charset="0"/>
-                <a:cs typeface="Times New Roman" panose="02020603050405020304" pitchFamily="18" charset="0"/>
-              </a:rPr>
-              <a:t>...</a:t>
-            </a:r>
-            <a:endParaRPr lang="ru-RU" sz="1400" dirty="0" smtClean="0">
-              <a:solidFill>
-                <a:schemeClr val="accent2">
-                  <a:lumMod val="75000"/>
-                </a:schemeClr>
-              </a:solidFill>
-              <a:latin typeface="Times New Roman" panose="02020603050405020304" pitchFamily="18" charset="0"/>
-              <a:cs typeface="Times New Roman" panose="02020603050405020304" pitchFamily="18" charset="0"/>
-            </a:endParaRPr>
-          </a:p>
-        </p:txBody>
-      </p:sp>
-      <p:sp>
-        <p:nvSpPr>
-          <p:cNvPr id="47" name="Прямоугольник 46"/>
-          <p:cNvSpPr/>
-          <p:nvPr/>
-        </p:nvSpPr>
-        <p:spPr>
-          <a:xfrm>
-            <a:off x="10149316" y="3748130"/>
-            <a:ext cx="2042684" cy="2190460"/>
-          </a:xfrm>
-          <a:prstGeom prst="rect">
-            <a:avLst/>
-          </a:prstGeom>
-        </p:spPr>
-        <p:txBody>
-          <a:bodyPr wrap="square">
-            <a:spAutoFit/>
-          </a:bodyPr>
-          <a:lstStyle/>
-          <a:p>
-            <a:pPr indent="182880" algn="ctr">
-              <a:lnSpc>
-                <a:spcPct val="95000"/>
-              </a:lnSpc>
-              <a:spcAft>
-                <a:spcPts val="600"/>
-              </a:spcAft>
-              <a:tabLst>
-                <a:tab pos="182880" algn="l"/>
-              </a:tabLst>
-            </a:pPr>
-            <a:r>
-              <a:rPr lang="ru-RU" sz="1400" dirty="0" smtClean="0">
-                <a:solidFill>
-                  <a:schemeClr val="accent2">
-                    <a:lumMod val="75000"/>
-                  </a:schemeClr>
-                </a:solidFill>
-                <a:latin typeface="Times New Roman" panose="02020603050405020304" pitchFamily="18" charset="0"/>
-                <a:cs typeface="Times New Roman" panose="02020603050405020304" pitchFamily="18" charset="0"/>
-              </a:rPr>
-              <a:t>Обычно газовые горелки (бутановые) имеют температуру горения газов от 800 до 2000 градусов. Отсюда вопрос: почему система явно настроена на </a:t>
-            </a:r>
-            <a:r>
-              <a:rPr lang="ru-RU" sz="1400" dirty="0">
-                <a:solidFill>
-                  <a:schemeClr val="accent2">
-                    <a:lumMod val="75000"/>
-                  </a:schemeClr>
-                </a:solidFill>
-                <a:latin typeface="Times New Roman" panose="02020603050405020304" pitchFamily="18" charset="0"/>
-                <a:cs typeface="Times New Roman" panose="02020603050405020304" pitchFamily="18" charset="0"/>
-              </a:rPr>
-              <a:t>температуру горения газов </a:t>
-            </a:r>
-            <a:r>
-              <a:rPr lang="ru-RU" sz="1400" dirty="0" smtClean="0">
-                <a:solidFill>
-                  <a:schemeClr val="accent2">
-                    <a:lumMod val="75000"/>
-                  </a:schemeClr>
-                </a:solidFill>
-                <a:latin typeface="Times New Roman" panose="02020603050405020304" pitchFamily="18" charset="0"/>
-                <a:cs typeface="Times New Roman" panose="02020603050405020304" pitchFamily="18" charset="0"/>
-              </a:rPr>
-              <a:t>не больше 550 градусов? </a:t>
-            </a:r>
-            <a:endParaRPr lang="ru-RU" sz="1400" dirty="0" smtClean="0">
-              <a:solidFill>
-                <a:schemeClr val="accent2">
-                  <a:lumMod val="75000"/>
-                </a:schemeClr>
-              </a:solidFill>
-              <a:latin typeface="Times New Roman" panose="02020603050405020304" pitchFamily="18" charset="0"/>
-              <a:cs typeface="Times New Roman" panose="02020603050405020304" pitchFamily="18" charset="0"/>
-            </a:endParaRPr>
-          </a:p>
-        </p:txBody>
-      </p:sp>
-      <p:sp>
-        <p:nvSpPr>
-          <p:cNvPr id="49" name="Прямоугольник 48"/>
-          <p:cNvSpPr/>
-          <p:nvPr/>
-        </p:nvSpPr>
-        <p:spPr>
-          <a:xfrm>
-            <a:off x="2089626" y="809901"/>
-            <a:ext cx="1324456" cy="297004"/>
-          </a:xfrm>
-          <a:prstGeom prst="rect">
-            <a:avLst/>
-          </a:prstGeom>
-        </p:spPr>
-        <p:txBody>
-          <a:bodyPr wrap="square">
-            <a:spAutoFit/>
-          </a:bodyPr>
-          <a:lstStyle/>
-          <a:p>
-            <a:pPr indent="182880">
-              <a:lnSpc>
-                <a:spcPct val="95000"/>
-              </a:lnSpc>
-              <a:spcAft>
-                <a:spcPts val="600"/>
-              </a:spcAft>
-              <a:tabLst>
-                <a:tab pos="182880" algn="l"/>
-              </a:tabLst>
-            </a:pPr>
-            <a:r>
-              <a:rPr lang="ru-RU" sz="1400" dirty="0" smtClean="0">
-                <a:solidFill>
-                  <a:schemeClr val="accent2">
-                    <a:lumMod val="75000"/>
-                  </a:schemeClr>
-                </a:solidFill>
-                <a:latin typeface="Times New Roman" panose="02020603050405020304" pitchFamily="18" charset="0"/>
-                <a:cs typeface="Times New Roman" panose="02020603050405020304" pitchFamily="18" charset="0"/>
-              </a:rPr>
-              <a:t>160.3777</a:t>
-            </a:r>
-            <a:endParaRPr lang="ru-RU" sz="1400" dirty="0" smtClean="0">
-              <a:solidFill>
-                <a:schemeClr val="accent2">
-                  <a:lumMod val="75000"/>
-                </a:schemeClr>
-              </a:solidFill>
-              <a:latin typeface="Times New Roman" panose="02020603050405020304" pitchFamily="18" charset="0"/>
-              <a:cs typeface="Times New Roman" panose="02020603050405020304" pitchFamily="18" charset="0"/>
-            </a:endParaRPr>
-          </a:p>
-        </p:txBody>
-      </p:sp>
-      <p:sp>
-        <p:nvSpPr>
-          <p:cNvPr id="50" name="Прямоугольник 49"/>
-          <p:cNvSpPr/>
-          <p:nvPr/>
-        </p:nvSpPr>
-        <p:spPr>
-          <a:xfrm>
-            <a:off x="2080531" y="1127456"/>
-            <a:ext cx="1324456" cy="297004"/>
-          </a:xfrm>
-          <a:prstGeom prst="rect">
-            <a:avLst/>
-          </a:prstGeom>
-        </p:spPr>
-        <p:txBody>
-          <a:bodyPr wrap="square">
-            <a:spAutoFit/>
-          </a:bodyPr>
-          <a:lstStyle/>
-          <a:p>
-            <a:pPr indent="182880">
-              <a:lnSpc>
-                <a:spcPct val="95000"/>
-              </a:lnSpc>
-              <a:spcAft>
-                <a:spcPts val="600"/>
-              </a:spcAft>
-              <a:tabLst>
-                <a:tab pos="182880" algn="l"/>
-              </a:tabLst>
-            </a:pPr>
-            <a:r>
-              <a:rPr lang="ru-RU" sz="1400" dirty="0" smtClean="0">
-                <a:solidFill>
-                  <a:schemeClr val="accent2">
-                    <a:lumMod val="75000"/>
-                  </a:schemeClr>
-                </a:solidFill>
-                <a:latin typeface="Times New Roman" panose="02020603050405020304" pitchFamily="18" charset="0"/>
-                <a:cs typeface="Times New Roman" panose="02020603050405020304" pitchFamily="18" charset="0"/>
-              </a:rPr>
-              <a:t>159.1571</a:t>
-            </a:r>
-            <a:endParaRPr lang="ru-RU" sz="1400" dirty="0" smtClean="0">
-              <a:solidFill>
-                <a:schemeClr val="accent2">
-                  <a:lumMod val="75000"/>
-                </a:schemeClr>
-              </a:solidFill>
-              <a:latin typeface="Times New Roman" panose="02020603050405020304" pitchFamily="18" charset="0"/>
-              <a:cs typeface="Times New Roman" panose="02020603050405020304" pitchFamily="18" charset="0"/>
-            </a:endParaRPr>
-          </a:p>
-        </p:txBody>
-      </p:sp>
-      <p:sp>
-        <p:nvSpPr>
-          <p:cNvPr id="51" name="Прямоугольник 50"/>
-          <p:cNvSpPr/>
-          <p:nvPr/>
-        </p:nvSpPr>
-        <p:spPr>
-          <a:xfrm>
-            <a:off x="4438327" y="368690"/>
-            <a:ext cx="1324456" cy="297004"/>
-          </a:xfrm>
-          <a:prstGeom prst="rect">
-            <a:avLst/>
-          </a:prstGeom>
-        </p:spPr>
-        <p:txBody>
-          <a:bodyPr wrap="square">
-            <a:spAutoFit/>
-          </a:bodyPr>
-          <a:lstStyle/>
-          <a:p>
-            <a:pPr indent="182880">
-              <a:lnSpc>
-                <a:spcPct val="95000"/>
-              </a:lnSpc>
-              <a:spcAft>
-                <a:spcPts val="600"/>
-              </a:spcAft>
-              <a:tabLst>
-                <a:tab pos="182880" algn="l"/>
-              </a:tabLst>
-            </a:pPr>
-            <a:r>
-              <a:rPr lang="ru-RU" sz="1400" dirty="0" smtClean="0">
-                <a:solidFill>
-                  <a:schemeClr val="accent2">
-                    <a:lumMod val="75000"/>
-                  </a:schemeClr>
-                </a:solidFill>
-                <a:latin typeface="Times New Roman" panose="02020603050405020304" pitchFamily="18" charset="0"/>
-                <a:cs typeface="Times New Roman" panose="02020603050405020304" pitchFamily="18" charset="0"/>
-              </a:rPr>
-              <a:t>160.0104</a:t>
-            </a:r>
-            <a:endParaRPr lang="ru-RU" sz="1400" dirty="0" smtClean="0">
-              <a:solidFill>
-                <a:schemeClr val="accent2">
-                  <a:lumMod val="75000"/>
-                </a:schemeClr>
-              </a:solidFill>
-              <a:latin typeface="Times New Roman" panose="02020603050405020304" pitchFamily="18" charset="0"/>
-              <a:cs typeface="Times New Roman" panose="02020603050405020304" pitchFamily="18" charset="0"/>
-            </a:endParaRPr>
-          </a:p>
-        </p:txBody>
-      </p:sp>
-      <p:sp>
-        <p:nvSpPr>
-          <p:cNvPr id="52" name="Прямоугольник 51"/>
-          <p:cNvSpPr/>
-          <p:nvPr/>
-        </p:nvSpPr>
-        <p:spPr>
-          <a:xfrm>
-            <a:off x="4438327" y="1063029"/>
-            <a:ext cx="1324456" cy="297004"/>
-          </a:xfrm>
-          <a:prstGeom prst="rect">
-            <a:avLst/>
-          </a:prstGeom>
-        </p:spPr>
-        <p:txBody>
-          <a:bodyPr wrap="square">
-            <a:spAutoFit/>
-          </a:bodyPr>
-          <a:lstStyle/>
-          <a:p>
-            <a:pPr indent="182880">
-              <a:lnSpc>
-                <a:spcPct val="95000"/>
-              </a:lnSpc>
-              <a:spcAft>
-                <a:spcPts val="600"/>
-              </a:spcAft>
-              <a:tabLst>
-                <a:tab pos="182880" algn="l"/>
-              </a:tabLst>
-            </a:pPr>
-            <a:r>
-              <a:rPr lang="ru-RU" sz="1400" dirty="0" smtClean="0">
-                <a:solidFill>
-                  <a:schemeClr val="accent2">
-                    <a:lumMod val="75000"/>
-                  </a:schemeClr>
-                </a:solidFill>
-                <a:latin typeface="Times New Roman" panose="02020603050405020304" pitchFamily="18" charset="0"/>
-                <a:cs typeface="Times New Roman" panose="02020603050405020304" pitchFamily="18" charset="0"/>
-              </a:rPr>
-              <a:t>159.9098</a:t>
-            </a:r>
-            <a:endParaRPr lang="ru-RU" sz="1400" dirty="0" smtClean="0">
-              <a:solidFill>
-                <a:schemeClr val="accent2">
-                  <a:lumMod val="75000"/>
-                </a:schemeClr>
-              </a:solidFill>
-              <a:latin typeface="Times New Roman" panose="02020603050405020304" pitchFamily="18" charset="0"/>
-              <a:cs typeface="Times New Roman" panose="02020603050405020304" pitchFamily="18" charset="0"/>
-            </a:endParaRPr>
-          </a:p>
-        </p:txBody>
-      </p:sp>
-      <p:sp>
-        <p:nvSpPr>
-          <p:cNvPr id="53" name="Прямоугольник 52"/>
-          <p:cNvSpPr/>
-          <p:nvPr/>
-        </p:nvSpPr>
-        <p:spPr>
-          <a:xfrm>
-            <a:off x="2080531" y="2398574"/>
-            <a:ext cx="1324456" cy="297004"/>
-          </a:xfrm>
-          <a:prstGeom prst="rect">
-            <a:avLst/>
-          </a:prstGeom>
-        </p:spPr>
-        <p:txBody>
-          <a:bodyPr wrap="square">
-            <a:spAutoFit/>
-          </a:bodyPr>
-          <a:lstStyle/>
-          <a:p>
-            <a:pPr indent="182880">
-              <a:lnSpc>
-                <a:spcPct val="95000"/>
-              </a:lnSpc>
-              <a:spcAft>
-                <a:spcPts val="600"/>
-              </a:spcAft>
-              <a:tabLst>
-                <a:tab pos="182880" algn="l"/>
-              </a:tabLst>
-            </a:pPr>
-            <a:r>
-              <a:rPr lang="ru-RU" sz="1400" dirty="0" smtClean="0">
-                <a:solidFill>
-                  <a:schemeClr val="accent2">
-                    <a:lumMod val="75000"/>
-                  </a:schemeClr>
-                </a:solidFill>
-                <a:latin typeface="Times New Roman" panose="02020603050405020304" pitchFamily="18" charset="0"/>
-                <a:cs typeface="Times New Roman" panose="02020603050405020304" pitchFamily="18" charset="0"/>
-              </a:rPr>
-              <a:t>0</a:t>
-            </a:r>
-            <a:r>
-              <a:rPr lang="ru-RU" sz="1400" dirty="0" smtClean="0">
-                <a:solidFill>
-                  <a:schemeClr val="accent2">
-                    <a:lumMod val="75000"/>
-                  </a:schemeClr>
-                </a:solidFill>
-                <a:latin typeface="Times New Roman" panose="02020603050405020304" pitchFamily="18" charset="0"/>
-                <a:cs typeface="Times New Roman" panose="02020603050405020304" pitchFamily="18" charset="0"/>
-              </a:rPr>
-              <a:t>.2652</a:t>
-            </a:r>
-            <a:endParaRPr lang="ru-RU" sz="1400" dirty="0" smtClean="0">
-              <a:solidFill>
-                <a:schemeClr val="accent2">
-                  <a:lumMod val="75000"/>
-                </a:schemeClr>
-              </a:solidFill>
-              <a:latin typeface="Times New Roman" panose="02020603050405020304" pitchFamily="18" charset="0"/>
-              <a:cs typeface="Times New Roman" panose="02020603050405020304" pitchFamily="18" charset="0"/>
-            </a:endParaRPr>
-          </a:p>
-        </p:txBody>
-      </p:sp>
-      <p:sp>
-        <p:nvSpPr>
-          <p:cNvPr id="54" name="Прямоугольник 53"/>
-          <p:cNvSpPr/>
-          <p:nvPr/>
-        </p:nvSpPr>
-        <p:spPr>
-          <a:xfrm>
-            <a:off x="2072974" y="1930288"/>
-            <a:ext cx="932323" cy="297004"/>
-          </a:xfrm>
-          <a:prstGeom prst="rect">
-            <a:avLst/>
-          </a:prstGeom>
-        </p:spPr>
-        <p:txBody>
-          <a:bodyPr wrap="square">
-            <a:spAutoFit/>
-          </a:bodyPr>
-          <a:lstStyle/>
-          <a:p>
-            <a:pPr indent="182880">
-              <a:lnSpc>
-                <a:spcPct val="95000"/>
-              </a:lnSpc>
-              <a:spcAft>
-                <a:spcPts val="600"/>
-              </a:spcAft>
-              <a:tabLst>
-                <a:tab pos="182880" algn="l"/>
-              </a:tabLst>
-            </a:pPr>
-            <a:r>
-              <a:rPr lang="ru-RU" sz="1400" dirty="0" smtClean="0">
-                <a:solidFill>
-                  <a:schemeClr val="accent2">
-                    <a:lumMod val="75000"/>
-                  </a:schemeClr>
-                </a:solidFill>
-                <a:latin typeface="Times New Roman" panose="02020603050405020304" pitchFamily="18" charset="0"/>
-                <a:cs typeface="Times New Roman" panose="02020603050405020304" pitchFamily="18" charset="0"/>
-              </a:rPr>
-              <a:t>0</a:t>
-            </a:r>
-            <a:r>
-              <a:rPr lang="ru-RU" sz="1400" dirty="0" smtClean="0">
-                <a:solidFill>
-                  <a:schemeClr val="accent2">
-                    <a:lumMod val="75000"/>
-                  </a:schemeClr>
-                </a:solidFill>
-                <a:latin typeface="Times New Roman" panose="02020603050405020304" pitchFamily="18" charset="0"/>
-                <a:cs typeface="Times New Roman" panose="02020603050405020304" pitchFamily="18" charset="0"/>
-              </a:rPr>
-              <a:t>.5539</a:t>
-            </a:r>
-            <a:endParaRPr lang="ru-RU" sz="1400" dirty="0" smtClean="0">
-              <a:solidFill>
-                <a:schemeClr val="accent2">
-                  <a:lumMod val="75000"/>
-                </a:schemeClr>
-              </a:solidFill>
-              <a:latin typeface="Times New Roman" panose="02020603050405020304" pitchFamily="18" charset="0"/>
-              <a:cs typeface="Times New Roman" panose="02020603050405020304" pitchFamily="18" charset="0"/>
-            </a:endParaRPr>
-          </a:p>
-        </p:txBody>
-      </p:sp>
-      <p:cxnSp>
-        <p:nvCxnSpPr>
-          <p:cNvPr id="56" name="Прямая со стрелкой 55"/>
-          <p:cNvCxnSpPr>
-            <a:stCxn id="54" idx="1"/>
-          </p:cNvCxnSpPr>
-          <p:nvPr/>
-        </p:nvCxnSpPr>
-        <p:spPr>
-          <a:xfrm flipH="1" flipV="1">
-            <a:off x="798990" y="1850783"/>
-            <a:ext cx="1273984" cy="228007"/>
-          </a:xfrm>
-          <a:prstGeom prst="straightConnector1">
-            <a:avLst/>
-          </a:prstGeom>
-          <a:ln w="31750">
-            <a:solidFill>
-              <a:schemeClr val="accent2">
-                <a:lumMod val="75000"/>
-              </a:schemeClr>
-            </a:solidFill>
-            <a:tailEnd type="triangle"/>
-          </a:ln>
-          <a:effectLst>
-            <a:glow rad="63500">
-              <a:schemeClr val="accent1">
-                <a:satMod val="175000"/>
-                <a:alpha val="40000"/>
-              </a:schemeClr>
-            </a:glow>
-          </a:effectLst>
-        </p:spPr>
-        <p:style>
-          <a:lnRef idx="1">
-            <a:schemeClr val="accent1"/>
-          </a:lnRef>
-          <a:fillRef idx="0">
-            <a:schemeClr val="accent1"/>
-          </a:fillRef>
-          <a:effectRef idx="0">
-            <a:schemeClr val="accent1"/>
-          </a:effectRef>
-          <a:fontRef idx="minor">
-            <a:schemeClr val="tx1"/>
-          </a:fontRef>
-        </p:style>
-      </p:cxnSp>
-      <p:sp>
-        <p:nvSpPr>
-          <p:cNvPr id="62" name="Прямоугольник 61"/>
-          <p:cNvSpPr/>
-          <p:nvPr/>
-        </p:nvSpPr>
-        <p:spPr>
-          <a:xfrm>
-            <a:off x="2072975" y="3588921"/>
-            <a:ext cx="1051965" cy="297004"/>
-          </a:xfrm>
-          <a:prstGeom prst="rect">
-            <a:avLst/>
-          </a:prstGeom>
-        </p:spPr>
-        <p:txBody>
-          <a:bodyPr wrap="square">
-            <a:spAutoFit/>
-          </a:bodyPr>
-          <a:lstStyle/>
-          <a:p>
-            <a:pPr indent="182880">
-              <a:lnSpc>
-                <a:spcPct val="95000"/>
-              </a:lnSpc>
-              <a:spcAft>
-                <a:spcPts val="600"/>
-              </a:spcAft>
-              <a:tabLst>
-                <a:tab pos="182880" algn="l"/>
-              </a:tabLst>
-            </a:pPr>
-            <a:r>
-              <a:rPr lang="ru-RU" sz="1400" dirty="0" smtClean="0">
-                <a:solidFill>
-                  <a:schemeClr val="accent2">
-                    <a:lumMod val="75000"/>
-                  </a:schemeClr>
-                </a:solidFill>
-                <a:latin typeface="Times New Roman" panose="02020603050405020304" pitchFamily="18" charset="0"/>
-                <a:cs typeface="Times New Roman" panose="02020603050405020304" pitchFamily="18" charset="0"/>
-              </a:rPr>
-              <a:t>53.1982</a:t>
-            </a:r>
-            <a:endParaRPr lang="ru-RU" sz="1400" dirty="0" smtClean="0">
-              <a:solidFill>
-                <a:schemeClr val="accent2">
-                  <a:lumMod val="75000"/>
-                </a:schemeClr>
-              </a:solidFill>
-              <a:latin typeface="Times New Roman" panose="02020603050405020304" pitchFamily="18" charset="0"/>
-              <a:cs typeface="Times New Roman" panose="02020603050405020304" pitchFamily="18" charset="0"/>
-            </a:endParaRPr>
-          </a:p>
-        </p:txBody>
-      </p:sp>
-      <p:sp>
-        <p:nvSpPr>
-          <p:cNvPr id="63" name="Прямоугольник 62"/>
-          <p:cNvSpPr/>
-          <p:nvPr/>
-        </p:nvSpPr>
-        <p:spPr>
-          <a:xfrm>
-            <a:off x="2072974" y="4079988"/>
-            <a:ext cx="1051965" cy="297004"/>
-          </a:xfrm>
-          <a:prstGeom prst="rect">
-            <a:avLst/>
-          </a:prstGeom>
-        </p:spPr>
-        <p:txBody>
-          <a:bodyPr wrap="square">
-            <a:spAutoFit/>
-          </a:bodyPr>
-          <a:lstStyle/>
-          <a:p>
-            <a:pPr indent="182880">
-              <a:lnSpc>
-                <a:spcPct val="95000"/>
-              </a:lnSpc>
-              <a:spcAft>
-                <a:spcPts val="600"/>
-              </a:spcAft>
-              <a:tabLst>
-                <a:tab pos="182880" algn="l"/>
-              </a:tabLst>
-            </a:pPr>
-            <a:r>
-              <a:rPr lang="ru-RU" sz="1400" dirty="0" smtClean="0">
-                <a:solidFill>
-                  <a:schemeClr val="accent2">
-                    <a:lumMod val="75000"/>
-                  </a:schemeClr>
-                </a:solidFill>
-                <a:latin typeface="Times New Roman" panose="02020603050405020304" pitchFamily="18" charset="0"/>
-                <a:cs typeface="Times New Roman" panose="02020603050405020304" pitchFamily="18" charset="0"/>
-              </a:rPr>
-              <a:t>50.4799</a:t>
-            </a:r>
-            <a:endParaRPr lang="ru-RU" sz="1400" dirty="0" smtClean="0">
-              <a:solidFill>
-                <a:schemeClr val="accent2">
-                  <a:lumMod val="75000"/>
-                </a:schemeClr>
-              </a:solidFill>
-              <a:latin typeface="Times New Roman" panose="02020603050405020304" pitchFamily="18" charset="0"/>
-              <a:cs typeface="Times New Roman" panose="02020603050405020304" pitchFamily="18" charset="0"/>
-            </a:endParaRPr>
-          </a:p>
-        </p:txBody>
-      </p:sp>
-      <p:cxnSp>
-        <p:nvCxnSpPr>
-          <p:cNvPr id="65" name="Прямая со стрелкой 64"/>
-          <p:cNvCxnSpPr/>
-          <p:nvPr/>
-        </p:nvCxnSpPr>
-        <p:spPr>
-          <a:xfrm flipH="1">
-            <a:off x="798990" y="4243562"/>
-            <a:ext cx="1424446" cy="184666"/>
-          </a:xfrm>
-          <a:prstGeom prst="straightConnector1">
-            <a:avLst/>
-          </a:prstGeom>
-          <a:ln w="31750">
-            <a:solidFill>
-              <a:schemeClr val="accent2">
-                <a:lumMod val="75000"/>
-              </a:schemeClr>
-            </a:solidFill>
-            <a:tailEnd type="triangle"/>
-          </a:ln>
-          <a:effectLst>
-            <a:glow rad="63500">
-              <a:schemeClr val="accent1">
-                <a:satMod val="175000"/>
-                <a:alpha val="40000"/>
-              </a:schemeClr>
-            </a:glow>
-          </a:effectLst>
-        </p:spPr>
-        <p:style>
-          <a:lnRef idx="1">
-            <a:schemeClr val="accent1"/>
-          </a:lnRef>
-          <a:fillRef idx="0">
-            <a:schemeClr val="accent1"/>
-          </a:fillRef>
-          <a:effectRef idx="0">
-            <a:schemeClr val="accent1"/>
-          </a:effectRef>
-          <a:fontRef idx="minor">
-            <a:schemeClr val="tx1"/>
-          </a:fontRef>
-        </p:style>
-      </p:cxnSp>
-      <p:sp>
-        <p:nvSpPr>
-          <p:cNvPr id="73" name="Прямоугольник 72"/>
-          <p:cNvSpPr/>
-          <p:nvPr/>
-        </p:nvSpPr>
-        <p:spPr>
-          <a:xfrm>
-            <a:off x="7398998" y="3637118"/>
-            <a:ext cx="2789051" cy="1934376"/>
-          </a:xfrm>
-          <a:prstGeom prst="rect">
-            <a:avLst/>
-          </a:prstGeom>
-        </p:spPr>
-        <p:txBody>
-          <a:bodyPr wrap="square">
-            <a:spAutoFit/>
-          </a:bodyPr>
-          <a:lstStyle/>
-          <a:p>
-            <a:pPr indent="182880" algn="ctr">
-              <a:lnSpc>
-                <a:spcPct val="95000"/>
-              </a:lnSpc>
-              <a:spcAft>
-                <a:spcPts val="600"/>
-              </a:spcAft>
-              <a:tabLst>
-                <a:tab pos="182880" algn="l"/>
-              </a:tabLst>
-            </a:pPr>
-            <a:r>
-              <a:rPr lang="ru-RU" sz="1400" dirty="0">
-                <a:solidFill>
-                  <a:schemeClr val="accent2">
-                    <a:lumMod val="75000"/>
-                  </a:schemeClr>
-                </a:solidFill>
-                <a:latin typeface="Times New Roman" panose="02020603050405020304" pitchFamily="18" charset="0"/>
-                <a:cs typeface="Times New Roman" panose="02020603050405020304" pitchFamily="18" charset="0"/>
-              </a:rPr>
-              <a:t>Р</a:t>
-            </a:r>
-            <a:r>
-              <a:rPr lang="ru-RU" sz="1400" dirty="0" smtClean="0">
-                <a:solidFill>
-                  <a:schemeClr val="accent2">
-                    <a:lumMod val="75000"/>
-                  </a:schemeClr>
-                </a:solidFill>
-                <a:latin typeface="Times New Roman" panose="02020603050405020304" pitchFamily="18" charset="0"/>
-                <a:cs typeface="Times New Roman" panose="02020603050405020304" pitchFamily="18" charset="0"/>
-              </a:rPr>
-              <a:t>егулятор отработал возмущение, но т.к. изменились «свойства» системы, то «теперь» нормальная температура дымовых газов равна 40 градусам, что достаточно </a:t>
-            </a:r>
-            <a:r>
-              <a:rPr lang="ru-RU" sz="1400" dirty="0" err="1" smtClean="0">
-                <a:solidFill>
-                  <a:schemeClr val="accent2">
-                    <a:lumMod val="75000"/>
-                  </a:schemeClr>
-                </a:solidFill>
-                <a:latin typeface="Times New Roman" panose="02020603050405020304" pitchFamily="18" charset="0"/>
-                <a:cs typeface="Times New Roman" panose="02020603050405020304" pitchFamily="18" charset="0"/>
-              </a:rPr>
-              <a:t>нефизично</a:t>
-            </a:r>
-            <a:r>
-              <a:rPr lang="ru-RU" sz="1400" dirty="0" smtClean="0">
-                <a:solidFill>
-                  <a:schemeClr val="accent2">
-                    <a:lumMod val="75000"/>
-                  </a:schemeClr>
-                </a:solidFill>
-                <a:latin typeface="Times New Roman" panose="02020603050405020304" pitchFamily="18" charset="0"/>
-                <a:cs typeface="Times New Roman" panose="02020603050405020304" pitchFamily="18" charset="0"/>
-              </a:rPr>
-              <a:t>, ведь даже температура огня от спички равна 350 градусам.</a:t>
-            </a:r>
-            <a:endParaRPr lang="ru-RU" sz="1400" dirty="0" smtClean="0">
-              <a:solidFill>
-                <a:schemeClr val="accent2">
-                  <a:lumMod val="75000"/>
-                </a:schemeClr>
-              </a:solidFill>
-              <a:latin typeface="Times New Roman" panose="02020603050405020304" pitchFamily="18" charset="0"/>
-              <a:cs typeface="Times New Roman" panose="02020603050405020304" pitchFamily="18" charset="0"/>
-            </a:endParaRPr>
-          </a:p>
-        </p:txBody>
-      </p:sp>
     </p:spTree>
     <p:extLst>
       <p:ext uri="{BB962C8B-B14F-4D97-AF65-F5344CB8AC3E}">
-        <p14:creationId xmlns:p14="http://schemas.microsoft.com/office/powerpoint/2010/main" val="2134853185"/>
+        <p14:creationId xmlns:p14="http://schemas.microsoft.com/office/powerpoint/2010/main" val="1168005888"/>
       </p:ext>
     </p:extLst>
   </p:cSld>
   <p:clrMapOvr>
     <a:masterClrMapping/>
   </p:clrMapOvr>
-  <p:timing>
-    <p:tnLst>
-      <p:par>
-        <p:cTn id="1" dur="indefinite" restart="never" nodeType="tmRoot"/>
-      </p:par>
-    </p:tnLst>
-  </p:timing>
 </p:sld>
 </file>
 

</xml_diff>

<commit_message>
Customising Addaptive Control block_9
</commit_message>
<xml_diff>
--- a/0_Docs_dir/3_General/Отчёт руководителям 12.07.2020.pptx
+++ b/0_Docs_dir/3_General/Отчёт руководителям 12.07.2020.pptx
@@ -5,7 +5,7 @@
     <p:sldMasterId id="2147483648" r:id="rId1"/>
   </p:sldMasterIdLst>
   <p:notesMasterIdLst>
-    <p:notesMasterId r:id="rId12"/>
+    <p:notesMasterId r:id="rId15"/>
   </p:notesMasterIdLst>
   <p:sldIdLst>
     <p:sldId id="256" r:id="rId2"/>
@@ -17,7 +17,10 @@
     <p:sldId id="275" r:id="rId8"/>
     <p:sldId id="276" r:id="rId9"/>
     <p:sldId id="272" r:id="rId10"/>
-    <p:sldId id="268" r:id="rId11"/>
+    <p:sldId id="277" r:id="rId11"/>
+    <p:sldId id="278" r:id="rId12"/>
+    <p:sldId id="279" r:id="rId13"/>
+    <p:sldId id="268" r:id="rId14"/>
   </p:sldIdLst>
   <p:sldSz cx="12192000" cy="6858000"/>
   <p:notesSz cx="6858000" cy="9144000"/>
@@ -206,7 +209,7 @@
           <a:p>
             <a:fld id="{E08BA5C7-0DF6-4BB3-8D80-C09E800CF8CB}" type="datetimeFigureOut">
               <a:rPr lang="ru-RU" smtClean="0"/>
-              <a:t>14.07.2020</a:t>
+              <a:t>16.07.2020</a:t>
             </a:fld>
             <a:endParaRPr lang="ru-RU"/>
           </a:p>
@@ -962,7 +965,7 @@
           <a:p>
             <a:fld id="{A2425CCF-BF91-44B3-BCB8-30DCB1C53B10}" type="slidenum">
               <a:rPr lang="ru-RU" smtClean="0"/>
-              <a:t>10</a:t>
+              <a:t>13</a:t>
             </a:fld>
             <a:endParaRPr lang="ru-RU"/>
           </a:p>
@@ -1112,7 +1115,7 @@
           <a:p>
             <a:fld id="{817AFE9C-9D88-408D-88B4-E7A081487440}" type="datetimeFigureOut">
               <a:rPr lang="ru-RU" smtClean="0"/>
-              <a:t>14.07.2020</a:t>
+              <a:t>16.07.2020</a:t>
             </a:fld>
             <a:endParaRPr lang="ru-RU"/>
           </a:p>
@@ -1282,7 +1285,7 @@
           <a:p>
             <a:fld id="{817AFE9C-9D88-408D-88B4-E7A081487440}" type="datetimeFigureOut">
               <a:rPr lang="ru-RU" smtClean="0"/>
-              <a:t>14.07.2020</a:t>
+              <a:t>16.07.2020</a:t>
             </a:fld>
             <a:endParaRPr lang="ru-RU"/>
           </a:p>
@@ -1462,7 +1465,7 @@
           <a:p>
             <a:fld id="{817AFE9C-9D88-408D-88B4-E7A081487440}" type="datetimeFigureOut">
               <a:rPr lang="ru-RU" smtClean="0"/>
-              <a:t>14.07.2020</a:t>
+              <a:t>16.07.2020</a:t>
             </a:fld>
             <a:endParaRPr lang="ru-RU"/>
           </a:p>
@@ -1632,7 +1635,7 @@
           <a:p>
             <a:fld id="{817AFE9C-9D88-408D-88B4-E7A081487440}" type="datetimeFigureOut">
               <a:rPr lang="ru-RU" smtClean="0"/>
-              <a:t>14.07.2020</a:t>
+              <a:t>16.07.2020</a:t>
             </a:fld>
             <a:endParaRPr lang="ru-RU"/>
           </a:p>
@@ -1878,7 +1881,7 @@
           <a:p>
             <a:fld id="{817AFE9C-9D88-408D-88B4-E7A081487440}" type="datetimeFigureOut">
               <a:rPr lang="ru-RU" smtClean="0"/>
-              <a:t>14.07.2020</a:t>
+              <a:t>16.07.2020</a:t>
             </a:fld>
             <a:endParaRPr lang="ru-RU"/>
           </a:p>
@@ -2110,7 +2113,7 @@
           <a:p>
             <a:fld id="{817AFE9C-9D88-408D-88B4-E7A081487440}" type="datetimeFigureOut">
               <a:rPr lang="ru-RU" smtClean="0"/>
-              <a:t>14.07.2020</a:t>
+              <a:t>16.07.2020</a:t>
             </a:fld>
             <a:endParaRPr lang="ru-RU"/>
           </a:p>
@@ -2477,7 +2480,7 @@
           <a:p>
             <a:fld id="{817AFE9C-9D88-408D-88B4-E7A081487440}" type="datetimeFigureOut">
               <a:rPr lang="ru-RU" smtClean="0"/>
-              <a:t>14.07.2020</a:t>
+              <a:t>16.07.2020</a:t>
             </a:fld>
             <a:endParaRPr lang="ru-RU"/>
           </a:p>
@@ -2595,7 +2598,7 @@
           <a:p>
             <a:fld id="{817AFE9C-9D88-408D-88B4-E7A081487440}" type="datetimeFigureOut">
               <a:rPr lang="ru-RU" smtClean="0"/>
-              <a:t>14.07.2020</a:t>
+              <a:t>16.07.2020</a:t>
             </a:fld>
             <a:endParaRPr lang="ru-RU"/>
           </a:p>
@@ -2690,7 +2693,7 @@
           <a:p>
             <a:fld id="{817AFE9C-9D88-408D-88B4-E7A081487440}" type="datetimeFigureOut">
               <a:rPr lang="ru-RU" smtClean="0"/>
-              <a:t>14.07.2020</a:t>
+              <a:t>16.07.2020</a:t>
             </a:fld>
             <a:endParaRPr lang="ru-RU"/>
           </a:p>
@@ -2967,7 +2970,7 @@
           <a:p>
             <a:fld id="{817AFE9C-9D88-408D-88B4-E7A081487440}" type="datetimeFigureOut">
               <a:rPr lang="ru-RU" smtClean="0"/>
-              <a:t>14.07.2020</a:t>
+              <a:t>16.07.2020</a:t>
             </a:fld>
             <a:endParaRPr lang="ru-RU"/>
           </a:p>
@@ -3220,7 +3223,7 @@
           <a:p>
             <a:fld id="{817AFE9C-9D88-408D-88B4-E7A081487440}" type="datetimeFigureOut">
               <a:rPr lang="ru-RU" smtClean="0"/>
-              <a:t>14.07.2020</a:t>
+              <a:t>16.07.2020</a:t>
             </a:fld>
             <a:endParaRPr lang="ru-RU"/>
           </a:p>
@@ -3433,7 +3436,7 @@
           <a:p>
             <a:fld id="{817AFE9C-9D88-408D-88B4-E7A081487440}" type="datetimeFigureOut">
               <a:rPr lang="ru-RU" smtClean="0"/>
-              <a:t>14.07.2020</a:t>
+              <a:t>16.07.2020</a:t>
             </a:fld>
             <a:endParaRPr lang="ru-RU"/>
           </a:p>
@@ -4204,6 +4207,2117 @@
       </p:grpSpPr>
       <p:pic>
         <p:nvPicPr>
+          <p:cNvPr id="3" name="Рисунок 2"/>
+          <p:cNvPicPr>
+            <a:picLocks noChangeAspect="1"/>
+          </p:cNvPicPr>
+          <p:nvPr/>
+        </p:nvPicPr>
+        <p:blipFill rotWithShape="1">
+          <a:blip r:embed="rId2"/>
+          <a:srcRect b="453"/>
+          <a:stretch/>
+        </p:blipFill>
+        <p:spPr>
+          <a:xfrm>
+            <a:off x="257452" y="0"/>
+            <a:ext cx="4688633" cy="6826928"/>
+          </a:xfrm>
+          <a:prstGeom prst="rect">
+            <a:avLst/>
+          </a:prstGeom>
+        </p:spPr>
+      </p:pic>
+      <p:pic>
+        <p:nvPicPr>
+          <p:cNvPr id="4" name="Рисунок 3"/>
+          <p:cNvPicPr>
+            <a:picLocks noChangeAspect="1"/>
+          </p:cNvPicPr>
+          <p:nvPr/>
+        </p:nvPicPr>
+        <p:blipFill rotWithShape="1">
+          <a:blip r:embed="rId3"/>
+          <a:srcRect b="323"/>
+          <a:stretch/>
+        </p:blipFill>
+        <p:spPr>
+          <a:xfrm>
+            <a:off x="5462008" y="22194"/>
+            <a:ext cx="6321620" cy="6835806"/>
+          </a:xfrm>
+          <a:prstGeom prst="rect">
+            <a:avLst/>
+          </a:prstGeom>
+        </p:spPr>
+      </p:pic>
+      <p:sp>
+        <p:nvSpPr>
+          <p:cNvPr id="9" name="Прямоугольник 8"/>
+          <p:cNvSpPr/>
+          <p:nvPr/>
+        </p:nvSpPr>
+        <p:spPr>
+          <a:xfrm>
+            <a:off x="2767377" y="1513325"/>
+            <a:ext cx="2690367" cy="1408078"/>
+          </a:xfrm>
+          <a:prstGeom prst="rect">
+            <a:avLst/>
+          </a:prstGeom>
+        </p:spPr>
+        <p:txBody>
+          <a:bodyPr wrap="square">
+            <a:spAutoFit/>
+          </a:bodyPr>
+          <a:lstStyle/>
+          <a:p>
+            <a:pPr indent="182880" algn="ctr">
+              <a:lnSpc>
+                <a:spcPct val="95000"/>
+              </a:lnSpc>
+              <a:spcAft>
+                <a:spcPts val="600"/>
+              </a:spcAft>
+              <a:tabLst>
+                <a:tab pos="182880" algn="l"/>
+              </a:tabLst>
+            </a:pPr>
+            <a:r>
+              <a:rPr lang="ru-RU" dirty="0" smtClean="0">
+                <a:solidFill>
+                  <a:schemeClr val="accent2">
+                    <a:lumMod val="75000"/>
+                  </a:schemeClr>
+                </a:solidFill>
+                <a:latin typeface="Times New Roman" panose="02020603050405020304" pitchFamily="18" charset="0"/>
+                <a:cs typeface="Times New Roman" panose="02020603050405020304" pitchFamily="18" charset="0"/>
+              </a:rPr>
+              <a:t>Результаты компенсации внешнего </a:t>
+            </a:r>
+            <a:r>
+              <a:rPr lang="ru-RU" dirty="0">
+                <a:solidFill>
+                  <a:schemeClr val="accent2">
+                    <a:lumMod val="75000"/>
+                  </a:schemeClr>
+                </a:solidFill>
+                <a:latin typeface="Times New Roman" panose="02020603050405020304" pitchFamily="18" charset="0"/>
+                <a:cs typeface="Times New Roman" panose="02020603050405020304" pitchFamily="18" charset="0"/>
+              </a:rPr>
+              <a:t>возмущениями по температуре жидкости (+/-10 градусов</a:t>
+            </a:r>
+            <a:r>
+              <a:rPr lang="ru-RU" dirty="0" smtClean="0">
+                <a:solidFill>
+                  <a:schemeClr val="accent2">
+                    <a:lumMod val="75000"/>
+                  </a:schemeClr>
+                </a:solidFill>
+                <a:latin typeface="Times New Roman" panose="02020603050405020304" pitchFamily="18" charset="0"/>
+                <a:cs typeface="Times New Roman" panose="02020603050405020304" pitchFamily="18" charset="0"/>
+              </a:rPr>
+              <a:t>)</a:t>
+            </a:r>
+            <a:endParaRPr lang="ru-RU" sz="2400" dirty="0" smtClean="0">
+              <a:solidFill>
+                <a:schemeClr val="accent2">
+                  <a:lumMod val="75000"/>
+                </a:schemeClr>
+              </a:solidFill>
+              <a:latin typeface="Times New Roman" panose="02020603050405020304" pitchFamily="18" charset="0"/>
+              <a:cs typeface="Times New Roman" panose="02020603050405020304" pitchFamily="18" charset="0"/>
+            </a:endParaRPr>
+          </a:p>
+        </p:txBody>
+      </p:sp>
+      <p:sp>
+        <p:nvSpPr>
+          <p:cNvPr id="10" name="TextBox 9"/>
+          <p:cNvSpPr txBox="1"/>
+          <p:nvPr/>
+        </p:nvSpPr>
+        <p:spPr>
+          <a:xfrm>
+            <a:off x="6267636" y="624508"/>
+            <a:ext cx="5515992" cy="1815882"/>
+          </a:xfrm>
+          <a:prstGeom prst="rect">
+            <a:avLst/>
+          </a:prstGeom>
+          <a:noFill/>
+        </p:spPr>
+        <p:txBody>
+          <a:bodyPr wrap="square" rtlCol="0">
+            <a:spAutoFit/>
+          </a:bodyPr>
+          <a:lstStyle/>
+          <a:p>
+            <a:r>
+              <a:rPr lang="ru-RU" sz="1600" dirty="0" smtClean="0">
+                <a:solidFill>
+                  <a:schemeClr val="accent2">
+                    <a:lumMod val="75000"/>
+                  </a:schemeClr>
+                </a:solidFill>
+                <a:latin typeface="Times New Roman" panose="02020603050405020304" pitchFamily="18" charset="0"/>
+                <a:cs typeface="Times New Roman" panose="02020603050405020304" pitchFamily="18" charset="0"/>
+              </a:rPr>
+              <a:t>Представленные результаты показывают, что регулирование по температуре жидкости отлично справляется с задачей стабилизации.</a:t>
+            </a:r>
+            <a:br>
+              <a:rPr lang="ru-RU" sz="1600" dirty="0" smtClean="0">
+                <a:solidFill>
+                  <a:schemeClr val="accent2">
+                    <a:lumMod val="75000"/>
+                  </a:schemeClr>
+                </a:solidFill>
+                <a:latin typeface="Times New Roman" panose="02020603050405020304" pitchFamily="18" charset="0"/>
+                <a:cs typeface="Times New Roman" panose="02020603050405020304" pitchFamily="18" charset="0"/>
+              </a:rPr>
+            </a:br>
+            <a:r>
+              <a:rPr lang="ru-RU" sz="1600" dirty="0" smtClean="0">
+                <a:solidFill>
+                  <a:schemeClr val="accent2">
+                    <a:lumMod val="75000"/>
+                  </a:schemeClr>
+                </a:solidFill>
+                <a:latin typeface="Times New Roman" panose="02020603050405020304" pitchFamily="18" charset="0"/>
+                <a:cs typeface="Times New Roman" panose="02020603050405020304" pitchFamily="18" charset="0"/>
+              </a:rPr>
+              <a:t>Но т.к. регулирования по другим переменным не было реализовано, то видим некоторые отклонения.</a:t>
+            </a:r>
+            <a:br>
+              <a:rPr lang="ru-RU" sz="1600" dirty="0" smtClean="0">
+                <a:solidFill>
+                  <a:schemeClr val="accent2">
+                    <a:lumMod val="75000"/>
+                  </a:schemeClr>
+                </a:solidFill>
+                <a:latin typeface="Times New Roman" panose="02020603050405020304" pitchFamily="18" charset="0"/>
+                <a:cs typeface="Times New Roman" panose="02020603050405020304" pitchFamily="18" charset="0"/>
+              </a:rPr>
+            </a:br>
+            <a:r>
+              <a:rPr lang="ru-RU" sz="1600" dirty="0" smtClean="0">
+                <a:solidFill>
+                  <a:schemeClr val="accent2">
+                    <a:lumMod val="75000"/>
+                  </a:schemeClr>
+                </a:solidFill>
+                <a:latin typeface="Times New Roman" panose="02020603050405020304" pitchFamily="18" charset="0"/>
+                <a:cs typeface="Times New Roman" panose="02020603050405020304" pitchFamily="18" charset="0"/>
+              </a:rPr>
+              <a:t>Существенные ли эти отклонения? Мне кажется, что нет. Везде в пределах нормы. </a:t>
+            </a:r>
+            <a:endParaRPr lang="ru-RU" sz="1600" dirty="0" smtClean="0">
+              <a:solidFill>
+                <a:schemeClr val="accent2">
+                  <a:lumMod val="75000"/>
+                </a:schemeClr>
+              </a:solidFill>
+              <a:latin typeface="Times New Roman" panose="02020603050405020304" pitchFamily="18" charset="0"/>
+              <a:cs typeface="Times New Roman" panose="02020603050405020304" pitchFamily="18" charset="0"/>
+            </a:endParaRPr>
+          </a:p>
+        </p:txBody>
+      </p:sp>
+      <p:sp>
+        <p:nvSpPr>
+          <p:cNvPr id="12" name="Прямоугольник 11"/>
+          <p:cNvSpPr/>
+          <p:nvPr/>
+        </p:nvSpPr>
+        <p:spPr>
+          <a:xfrm>
+            <a:off x="1335341" y="989307"/>
+            <a:ext cx="1541024" cy="297004"/>
+          </a:xfrm>
+          <a:prstGeom prst="rect">
+            <a:avLst/>
+          </a:prstGeom>
+        </p:spPr>
+        <p:txBody>
+          <a:bodyPr wrap="square">
+            <a:spAutoFit/>
+          </a:bodyPr>
+          <a:lstStyle/>
+          <a:p>
+            <a:pPr indent="182880">
+              <a:lnSpc>
+                <a:spcPct val="95000"/>
+              </a:lnSpc>
+              <a:spcAft>
+                <a:spcPts val="600"/>
+              </a:spcAft>
+              <a:tabLst>
+                <a:tab pos="182880" algn="l"/>
+              </a:tabLst>
+            </a:pPr>
+            <a:r>
+              <a:rPr lang="ru-RU" sz="1400" dirty="0" smtClean="0">
+                <a:solidFill>
+                  <a:schemeClr val="accent2">
+                    <a:lumMod val="75000"/>
+                  </a:schemeClr>
+                </a:solidFill>
+                <a:latin typeface="Times New Roman" panose="02020603050405020304" pitchFamily="18" charset="0"/>
+                <a:cs typeface="Times New Roman" panose="02020603050405020304" pitchFamily="18" charset="0"/>
+                <a:sym typeface="Symbol" panose="05050102010706020507" pitchFamily="18" charset="2"/>
+              </a:rPr>
+              <a:t></a:t>
+            </a:r>
+            <a:r>
+              <a:rPr lang="en-US" sz="1400" dirty="0" smtClean="0">
+                <a:solidFill>
+                  <a:schemeClr val="accent2">
+                    <a:lumMod val="75000"/>
+                  </a:schemeClr>
+                </a:solidFill>
+                <a:latin typeface="Times New Roman" panose="02020603050405020304" pitchFamily="18" charset="0"/>
+                <a:cs typeface="Times New Roman" panose="02020603050405020304" pitchFamily="18" charset="0"/>
+                <a:sym typeface="Symbol" panose="05050102010706020507" pitchFamily="18" charset="2"/>
+              </a:rPr>
+              <a:t>  7 </a:t>
+            </a:r>
+            <a:r>
+              <a:rPr lang="ru-RU" sz="1400" dirty="0" smtClean="0">
+                <a:solidFill>
+                  <a:schemeClr val="accent2">
+                    <a:lumMod val="75000"/>
+                  </a:schemeClr>
+                </a:solidFill>
+                <a:latin typeface="Times New Roman" panose="02020603050405020304" pitchFamily="18" charset="0"/>
+                <a:cs typeface="Times New Roman" panose="02020603050405020304" pitchFamily="18" charset="0"/>
+                <a:sym typeface="Symbol" panose="05050102010706020507" pitchFamily="18" charset="2"/>
+              </a:rPr>
+              <a:t>градусов</a:t>
+            </a:r>
+            <a:endParaRPr lang="ru-RU" sz="1400" dirty="0" smtClean="0">
+              <a:solidFill>
+                <a:schemeClr val="accent2">
+                  <a:lumMod val="75000"/>
+                </a:schemeClr>
+              </a:solidFill>
+              <a:latin typeface="Times New Roman" panose="02020603050405020304" pitchFamily="18" charset="0"/>
+              <a:cs typeface="Times New Roman" panose="02020603050405020304" pitchFamily="18" charset="0"/>
+            </a:endParaRPr>
+          </a:p>
+        </p:txBody>
+      </p:sp>
+      <p:sp>
+        <p:nvSpPr>
+          <p:cNvPr id="13" name="Прямоугольник 12"/>
+          <p:cNvSpPr/>
+          <p:nvPr/>
+        </p:nvSpPr>
+        <p:spPr>
+          <a:xfrm>
+            <a:off x="1318196" y="3759615"/>
+            <a:ext cx="1541024" cy="297004"/>
+          </a:xfrm>
+          <a:prstGeom prst="rect">
+            <a:avLst/>
+          </a:prstGeom>
+        </p:spPr>
+        <p:txBody>
+          <a:bodyPr wrap="square">
+            <a:spAutoFit/>
+          </a:bodyPr>
+          <a:lstStyle/>
+          <a:p>
+            <a:pPr indent="182880">
+              <a:lnSpc>
+                <a:spcPct val="95000"/>
+              </a:lnSpc>
+              <a:spcAft>
+                <a:spcPts val="600"/>
+              </a:spcAft>
+              <a:tabLst>
+                <a:tab pos="182880" algn="l"/>
+              </a:tabLst>
+            </a:pPr>
+            <a:r>
+              <a:rPr lang="ru-RU" sz="1400" dirty="0" smtClean="0">
+                <a:solidFill>
+                  <a:schemeClr val="accent2">
+                    <a:lumMod val="75000"/>
+                  </a:schemeClr>
+                </a:solidFill>
+                <a:latin typeface="Times New Roman" panose="02020603050405020304" pitchFamily="18" charset="0"/>
+                <a:cs typeface="Times New Roman" panose="02020603050405020304" pitchFamily="18" charset="0"/>
+                <a:sym typeface="Symbol" panose="05050102010706020507" pitchFamily="18" charset="2"/>
+              </a:rPr>
+              <a:t></a:t>
+            </a:r>
+            <a:r>
+              <a:rPr lang="en-US" sz="1400" dirty="0" smtClean="0">
+                <a:solidFill>
+                  <a:schemeClr val="accent2">
+                    <a:lumMod val="75000"/>
+                  </a:schemeClr>
+                </a:solidFill>
+                <a:latin typeface="Times New Roman" panose="02020603050405020304" pitchFamily="18" charset="0"/>
+                <a:cs typeface="Times New Roman" panose="02020603050405020304" pitchFamily="18" charset="0"/>
+                <a:sym typeface="Symbol" panose="05050102010706020507" pitchFamily="18" charset="2"/>
+              </a:rPr>
+              <a:t>  </a:t>
+            </a:r>
+            <a:r>
+              <a:rPr lang="ru-RU" sz="1400" dirty="0" smtClean="0">
+                <a:solidFill>
+                  <a:schemeClr val="accent2">
+                    <a:lumMod val="75000"/>
+                  </a:schemeClr>
+                </a:solidFill>
+                <a:latin typeface="Times New Roman" panose="02020603050405020304" pitchFamily="18" charset="0"/>
+                <a:cs typeface="Times New Roman" panose="02020603050405020304" pitchFamily="18" charset="0"/>
+                <a:sym typeface="Symbol" panose="05050102010706020507" pitchFamily="18" charset="2"/>
+              </a:rPr>
+              <a:t>4</a:t>
+            </a:r>
+            <a:r>
+              <a:rPr lang="en-US" sz="1400" dirty="0" smtClean="0">
+                <a:solidFill>
+                  <a:schemeClr val="accent2">
+                    <a:lumMod val="75000"/>
+                  </a:schemeClr>
+                </a:solidFill>
+                <a:latin typeface="Times New Roman" panose="02020603050405020304" pitchFamily="18" charset="0"/>
+                <a:cs typeface="Times New Roman" panose="02020603050405020304" pitchFamily="18" charset="0"/>
+                <a:sym typeface="Symbol" panose="05050102010706020507" pitchFamily="18" charset="2"/>
+              </a:rPr>
+              <a:t> </a:t>
+            </a:r>
+            <a:r>
+              <a:rPr lang="ru-RU" sz="1400" dirty="0" smtClean="0">
+                <a:solidFill>
+                  <a:schemeClr val="accent2">
+                    <a:lumMod val="75000"/>
+                  </a:schemeClr>
+                </a:solidFill>
+                <a:latin typeface="Times New Roman" panose="02020603050405020304" pitchFamily="18" charset="0"/>
+                <a:cs typeface="Times New Roman" panose="02020603050405020304" pitchFamily="18" charset="0"/>
+                <a:sym typeface="Symbol" panose="05050102010706020507" pitchFamily="18" charset="2"/>
+              </a:rPr>
+              <a:t>градуса</a:t>
+            </a:r>
+            <a:endParaRPr lang="ru-RU" sz="1400" dirty="0" smtClean="0">
+              <a:solidFill>
+                <a:schemeClr val="accent2">
+                  <a:lumMod val="75000"/>
+                </a:schemeClr>
+              </a:solidFill>
+              <a:latin typeface="Times New Roman" panose="02020603050405020304" pitchFamily="18" charset="0"/>
+              <a:cs typeface="Times New Roman" panose="02020603050405020304" pitchFamily="18" charset="0"/>
+            </a:endParaRPr>
+          </a:p>
+        </p:txBody>
+      </p:sp>
+      <p:sp>
+        <p:nvSpPr>
+          <p:cNvPr id="14" name="Прямоугольник 13"/>
+          <p:cNvSpPr/>
+          <p:nvPr/>
+        </p:nvSpPr>
+        <p:spPr>
+          <a:xfrm>
+            <a:off x="7081793" y="5243665"/>
+            <a:ext cx="1653833" cy="297004"/>
+          </a:xfrm>
+          <a:prstGeom prst="rect">
+            <a:avLst/>
+          </a:prstGeom>
+        </p:spPr>
+        <p:txBody>
+          <a:bodyPr wrap="square">
+            <a:spAutoFit/>
+          </a:bodyPr>
+          <a:lstStyle/>
+          <a:p>
+            <a:pPr indent="182880">
+              <a:lnSpc>
+                <a:spcPct val="95000"/>
+              </a:lnSpc>
+              <a:spcAft>
+                <a:spcPts val="600"/>
+              </a:spcAft>
+              <a:tabLst>
+                <a:tab pos="182880" algn="l"/>
+              </a:tabLst>
+            </a:pPr>
+            <a:r>
+              <a:rPr lang="ru-RU" sz="1400" dirty="0" smtClean="0">
+                <a:solidFill>
+                  <a:schemeClr val="accent2">
+                    <a:lumMod val="75000"/>
+                  </a:schemeClr>
+                </a:solidFill>
+                <a:latin typeface="Times New Roman" panose="02020603050405020304" pitchFamily="18" charset="0"/>
+                <a:cs typeface="Times New Roman" panose="02020603050405020304" pitchFamily="18" charset="0"/>
+                <a:sym typeface="Symbol" panose="05050102010706020507" pitchFamily="18" charset="2"/>
+              </a:rPr>
+              <a:t></a:t>
+            </a:r>
+            <a:r>
+              <a:rPr lang="en-US" sz="1400" dirty="0" smtClean="0">
+                <a:solidFill>
+                  <a:schemeClr val="accent2">
+                    <a:lumMod val="75000"/>
+                  </a:schemeClr>
+                </a:solidFill>
+                <a:latin typeface="Times New Roman" panose="02020603050405020304" pitchFamily="18" charset="0"/>
+                <a:cs typeface="Times New Roman" panose="02020603050405020304" pitchFamily="18" charset="0"/>
+                <a:sym typeface="Symbol" panose="05050102010706020507" pitchFamily="18" charset="2"/>
+              </a:rPr>
+              <a:t>  </a:t>
+            </a:r>
+            <a:r>
+              <a:rPr lang="ru-RU" sz="1400" dirty="0">
+                <a:solidFill>
+                  <a:schemeClr val="accent2">
+                    <a:lumMod val="75000"/>
+                  </a:schemeClr>
+                </a:solidFill>
+                <a:latin typeface="Times New Roman" panose="02020603050405020304" pitchFamily="18" charset="0"/>
+                <a:cs typeface="Times New Roman" panose="02020603050405020304" pitchFamily="18" charset="0"/>
+                <a:sym typeface="Symbol" panose="05050102010706020507" pitchFamily="18" charset="2"/>
+              </a:rPr>
+              <a:t>2</a:t>
+            </a:r>
+            <a:r>
+              <a:rPr lang="ru-RU" sz="1400" dirty="0" smtClean="0">
+                <a:solidFill>
+                  <a:schemeClr val="accent2">
+                    <a:lumMod val="75000"/>
+                  </a:schemeClr>
+                </a:solidFill>
+                <a:latin typeface="Times New Roman" panose="02020603050405020304" pitchFamily="18" charset="0"/>
+                <a:cs typeface="Times New Roman" panose="02020603050405020304" pitchFamily="18" charset="0"/>
+                <a:sym typeface="Symbol" panose="05050102010706020507" pitchFamily="18" charset="2"/>
+              </a:rPr>
+              <a:t>.5</a:t>
+            </a:r>
+            <a:r>
+              <a:rPr lang="en-US" sz="1400" dirty="0" smtClean="0">
+                <a:solidFill>
+                  <a:schemeClr val="accent2">
+                    <a:lumMod val="75000"/>
+                  </a:schemeClr>
+                </a:solidFill>
+                <a:latin typeface="Times New Roman" panose="02020603050405020304" pitchFamily="18" charset="0"/>
+                <a:cs typeface="Times New Roman" panose="02020603050405020304" pitchFamily="18" charset="0"/>
+                <a:sym typeface="Symbol" panose="05050102010706020507" pitchFamily="18" charset="2"/>
+              </a:rPr>
+              <a:t> </a:t>
+            </a:r>
+            <a:r>
+              <a:rPr lang="ru-RU" sz="1400" dirty="0" smtClean="0">
+                <a:solidFill>
+                  <a:schemeClr val="accent2">
+                    <a:lumMod val="75000"/>
+                  </a:schemeClr>
+                </a:solidFill>
+                <a:latin typeface="Times New Roman" panose="02020603050405020304" pitchFamily="18" charset="0"/>
+                <a:cs typeface="Times New Roman" panose="02020603050405020304" pitchFamily="18" charset="0"/>
+                <a:sym typeface="Symbol" panose="05050102010706020507" pitchFamily="18" charset="2"/>
+              </a:rPr>
+              <a:t>градуса</a:t>
+            </a:r>
+            <a:endParaRPr lang="ru-RU" sz="1400" dirty="0" smtClean="0">
+              <a:solidFill>
+                <a:schemeClr val="accent2">
+                  <a:lumMod val="75000"/>
+                </a:schemeClr>
+              </a:solidFill>
+              <a:latin typeface="Times New Roman" panose="02020603050405020304" pitchFamily="18" charset="0"/>
+              <a:cs typeface="Times New Roman" panose="02020603050405020304" pitchFamily="18" charset="0"/>
+            </a:endParaRPr>
+          </a:p>
+        </p:txBody>
+      </p:sp>
+      <p:sp>
+        <p:nvSpPr>
+          <p:cNvPr id="15" name="Прямоугольник 14"/>
+          <p:cNvSpPr/>
+          <p:nvPr/>
+        </p:nvSpPr>
+        <p:spPr>
+          <a:xfrm>
+            <a:off x="7081792" y="3462611"/>
+            <a:ext cx="1653833" cy="297004"/>
+          </a:xfrm>
+          <a:prstGeom prst="rect">
+            <a:avLst/>
+          </a:prstGeom>
+        </p:spPr>
+        <p:txBody>
+          <a:bodyPr wrap="square">
+            <a:spAutoFit/>
+          </a:bodyPr>
+          <a:lstStyle/>
+          <a:p>
+            <a:pPr indent="182880">
+              <a:lnSpc>
+                <a:spcPct val="95000"/>
+              </a:lnSpc>
+              <a:spcAft>
+                <a:spcPts val="600"/>
+              </a:spcAft>
+              <a:tabLst>
+                <a:tab pos="182880" algn="l"/>
+              </a:tabLst>
+            </a:pPr>
+            <a:r>
+              <a:rPr lang="ru-RU" sz="1400" dirty="0" smtClean="0">
+                <a:solidFill>
+                  <a:schemeClr val="accent2">
+                    <a:lumMod val="75000"/>
+                  </a:schemeClr>
+                </a:solidFill>
+                <a:latin typeface="Times New Roman" panose="02020603050405020304" pitchFamily="18" charset="0"/>
+                <a:cs typeface="Times New Roman" panose="02020603050405020304" pitchFamily="18" charset="0"/>
+                <a:sym typeface="Symbol" panose="05050102010706020507" pitchFamily="18" charset="2"/>
+              </a:rPr>
+              <a:t></a:t>
+            </a:r>
+            <a:r>
+              <a:rPr lang="en-US" sz="1400" dirty="0" smtClean="0">
+                <a:solidFill>
+                  <a:schemeClr val="accent2">
+                    <a:lumMod val="75000"/>
+                  </a:schemeClr>
+                </a:solidFill>
+                <a:latin typeface="Times New Roman" panose="02020603050405020304" pitchFamily="18" charset="0"/>
+                <a:cs typeface="Times New Roman" panose="02020603050405020304" pitchFamily="18" charset="0"/>
+                <a:sym typeface="Symbol" panose="05050102010706020507" pitchFamily="18" charset="2"/>
+              </a:rPr>
+              <a:t>  </a:t>
+            </a:r>
+            <a:r>
+              <a:rPr lang="ru-RU" sz="1400" dirty="0" smtClean="0">
+                <a:solidFill>
+                  <a:schemeClr val="accent2">
+                    <a:lumMod val="75000"/>
+                  </a:schemeClr>
+                </a:solidFill>
+                <a:latin typeface="Times New Roman" panose="02020603050405020304" pitchFamily="18" charset="0"/>
+                <a:cs typeface="Times New Roman" panose="02020603050405020304" pitchFamily="18" charset="0"/>
+                <a:sym typeface="Symbol" panose="05050102010706020507" pitchFamily="18" charset="2"/>
+              </a:rPr>
+              <a:t>0.5</a:t>
+            </a:r>
+            <a:r>
+              <a:rPr lang="en-US" sz="1400" dirty="0" smtClean="0">
+                <a:solidFill>
+                  <a:schemeClr val="accent2">
+                    <a:lumMod val="75000"/>
+                  </a:schemeClr>
+                </a:solidFill>
+                <a:latin typeface="Times New Roman" panose="02020603050405020304" pitchFamily="18" charset="0"/>
+                <a:cs typeface="Times New Roman" panose="02020603050405020304" pitchFamily="18" charset="0"/>
+                <a:sym typeface="Symbol" panose="05050102010706020507" pitchFamily="18" charset="2"/>
+              </a:rPr>
+              <a:t> </a:t>
+            </a:r>
+            <a:r>
+              <a:rPr lang="ru-RU" sz="1400" dirty="0" smtClean="0">
+                <a:solidFill>
+                  <a:schemeClr val="accent2">
+                    <a:lumMod val="75000"/>
+                  </a:schemeClr>
+                </a:solidFill>
+                <a:latin typeface="Times New Roman" panose="02020603050405020304" pitchFamily="18" charset="0"/>
+                <a:cs typeface="Times New Roman" panose="02020603050405020304" pitchFamily="18" charset="0"/>
+                <a:sym typeface="Symbol" panose="05050102010706020507" pitchFamily="18" charset="2"/>
+              </a:rPr>
+              <a:t>градуса</a:t>
+            </a:r>
+            <a:endParaRPr lang="ru-RU" sz="1400" dirty="0" smtClean="0">
+              <a:solidFill>
+                <a:schemeClr val="accent2">
+                  <a:lumMod val="75000"/>
+                </a:schemeClr>
+              </a:solidFill>
+              <a:latin typeface="Times New Roman" panose="02020603050405020304" pitchFamily="18" charset="0"/>
+              <a:cs typeface="Times New Roman" panose="02020603050405020304" pitchFamily="18" charset="0"/>
+            </a:endParaRPr>
+          </a:p>
+        </p:txBody>
+      </p:sp>
+      <p:sp>
+        <p:nvSpPr>
+          <p:cNvPr id="16" name="Прямоугольник 15"/>
+          <p:cNvSpPr/>
+          <p:nvPr/>
+        </p:nvSpPr>
+        <p:spPr>
+          <a:xfrm>
+            <a:off x="1222532" y="2374461"/>
+            <a:ext cx="1733732" cy="297004"/>
+          </a:xfrm>
+          <a:prstGeom prst="rect">
+            <a:avLst/>
+          </a:prstGeom>
+        </p:spPr>
+        <p:txBody>
+          <a:bodyPr wrap="square">
+            <a:spAutoFit/>
+          </a:bodyPr>
+          <a:lstStyle/>
+          <a:p>
+            <a:pPr indent="182880">
+              <a:lnSpc>
+                <a:spcPct val="95000"/>
+              </a:lnSpc>
+              <a:spcAft>
+                <a:spcPts val="600"/>
+              </a:spcAft>
+              <a:tabLst>
+                <a:tab pos="182880" algn="l"/>
+              </a:tabLst>
+            </a:pPr>
+            <a:r>
+              <a:rPr lang="ru-RU" sz="1400" dirty="0" smtClean="0">
+                <a:solidFill>
+                  <a:schemeClr val="accent2">
+                    <a:lumMod val="75000"/>
+                  </a:schemeClr>
+                </a:solidFill>
+                <a:latin typeface="Times New Roman" panose="02020603050405020304" pitchFamily="18" charset="0"/>
+                <a:cs typeface="Times New Roman" panose="02020603050405020304" pitchFamily="18" charset="0"/>
+                <a:sym typeface="Symbol" panose="05050102010706020507" pitchFamily="18" charset="2"/>
+              </a:rPr>
+              <a:t></a:t>
+            </a:r>
+            <a:r>
+              <a:rPr lang="en-US" sz="1400" dirty="0" smtClean="0">
+                <a:solidFill>
+                  <a:schemeClr val="accent2">
+                    <a:lumMod val="75000"/>
+                  </a:schemeClr>
+                </a:solidFill>
+                <a:latin typeface="Times New Roman" panose="02020603050405020304" pitchFamily="18" charset="0"/>
+                <a:cs typeface="Times New Roman" panose="02020603050405020304" pitchFamily="18" charset="0"/>
+                <a:sym typeface="Symbol" panose="05050102010706020507" pitchFamily="18" charset="2"/>
+              </a:rPr>
+              <a:t>  </a:t>
+            </a:r>
+            <a:r>
+              <a:rPr lang="ru-RU" sz="1400" dirty="0" smtClean="0">
+                <a:solidFill>
+                  <a:schemeClr val="accent2">
+                    <a:lumMod val="75000"/>
+                  </a:schemeClr>
+                </a:solidFill>
+                <a:latin typeface="Times New Roman" panose="02020603050405020304" pitchFamily="18" charset="0"/>
+                <a:cs typeface="Times New Roman" panose="02020603050405020304" pitchFamily="18" charset="0"/>
+                <a:sym typeface="Symbol" panose="05050102010706020507" pitchFamily="18" charset="2"/>
+              </a:rPr>
+              <a:t>0</a:t>
+            </a:r>
+            <a:r>
+              <a:rPr lang="ru-RU" sz="1400" dirty="0" smtClean="0">
+                <a:solidFill>
+                  <a:schemeClr val="accent2">
+                    <a:lumMod val="75000"/>
+                  </a:schemeClr>
+                </a:solidFill>
+                <a:latin typeface="Times New Roman" panose="02020603050405020304" pitchFamily="18" charset="0"/>
+                <a:cs typeface="Times New Roman" panose="02020603050405020304" pitchFamily="18" charset="0"/>
+                <a:sym typeface="Symbol" panose="05050102010706020507" pitchFamily="18" charset="2"/>
+              </a:rPr>
+              <a:t>.03</a:t>
+            </a:r>
+            <a:r>
+              <a:rPr lang="en-US" sz="1400" dirty="0" smtClean="0">
+                <a:solidFill>
+                  <a:schemeClr val="accent2">
+                    <a:lumMod val="75000"/>
+                  </a:schemeClr>
+                </a:solidFill>
+                <a:latin typeface="Times New Roman" panose="02020603050405020304" pitchFamily="18" charset="0"/>
+                <a:cs typeface="Times New Roman" panose="02020603050405020304" pitchFamily="18" charset="0"/>
+                <a:sym typeface="Symbol" panose="05050102010706020507" pitchFamily="18" charset="2"/>
+              </a:rPr>
+              <a:t> </a:t>
+            </a:r>
+            <a:r>
+              <a:rPr lang="ru-RU" sz="1400" dirty="0" smtClean="0">
+                <a:solidFill>
+                  <a:schemeClr val="accent2">
+                    <a:lumMod val="75000"/>
+                  </a:schemeClr>
+                </a:solidFill>
+                <a:latin typeface="Times New Roman" panose="02020603050405020304" pitchFamily="18" charset="0"/>
+                <a:cs typeface="Times New Roman" panose="02020603050405020304" pitchFamily="18" charset="0"/>
+                <a:sym typeface="Symbol" panose="05050102010706020507" pitchFamily="18" charset="2"/>
+              </a:rPr>
+              <a:t>градуса</a:t>
+            </a:r>
+            <a:endParaRPr lang="ru-RU" sz="1400" dirty="0" smtClean="0">
+              <a:solidFill>
+                <a:schemeClr val="accent2">
+                  <a:lumMod val="75000"/>
+                </a:schemeClr>
+              </a:solidFill>
+              <a:latin typeface="Times New Roman" panose="02020603050405020304" pitchFamily="18" charset="0"/>
+              <a:cs typeface="Times New Roman" panose="02020603050405020304" pitchFamily="18" charset="0"/>
+            </a:endParaRPr>
+          </a:p>
+        </p:txBody>
+      </p:sp>
+      <p:sp>
+        <p:nvSpPr>
+          <p:cNvPr id="17" name="Прямоугольник 16"/>
+          <p:cNvSpPr/>
+          <p:nvPr/>
+        </p:nvSpPr>
+        <p:spPr>
+          <a:xfrm>
+            <a:off x="1222532" y="5045926"/>
+            <a:ext cx="1653833" cy="297004"/>
+          </a:xfrm>
+          <a:prstGeom prst="rect">
+            <a:avLst/>
+          </a:prstGeom>
+        </p:spPr>
+        <p:txBody>
+          <a:bodyPr wrap="square">
+            <a:spAutoFit/>
+          </a:bodyPr>
+          <a:lstStyle/>
+          <a:p>
+            <a:pPr indent="182880">
+              <a:lnSpc>
+                <a:spcPct val="95000"/>
+              </a:lnSpc>
+              <a:spcAft>
+                <a:spcPts val="600"/>
+              </a:spcAft>
+              <a:tabLst>
+                <a:tab pos="182880" algn="l"/>
+              </a:tabLst>
+            </a:pPr>
+            <a:r>
+              <a:rPr lang="ru-RU" sz="1400" dirty="0" smtClean="0">
+                <a:solidFill>
+                  <a:schemeClr val="accent2">
+                    <a:lumMod val="75000"/>
+                  </a:schemeClr>
+                </a:solidFill>
+                <a:latin typeface="Times New Roman" panose="02020603050405020304" pitchFamily="18" charset="0"/>
+                <a:cs typeface="Times New Roman" panose="02020603050405020304" pitchFamily="18" charset="0"/>
+                <a:sym typeface="Symbol" panose="05050102010706020507" pitchFamily="18" charset="2"/>
+              </a:rPr>
+              <a:t></a:t>
+            </a:r>
+            <a:r>
+              <a:rPr lang="en-US" sz="1400" dirty="0" smtClean="0">
+                <a:solidFill>
+                  <a:schemeClr val="accent2">
+                    <a:lumMod val="75000"/>
+                  </a:schemeClr>
+                </a:solidFill>
+                <a:latin typeface="Times New Roman" panose="02020603050405020304" pitchFamily="18" charset="0"/>
+                <a:cs typeface="Times New Roman" panose="02020603050405020304" pitchFamily="18" charset="0"/>
+                <a:sym typeface="Symbol" panose="05050102010706020507" pitchFamily="18" charset="2"/>
+              </a:rPr>
+              <a:t>  </a:t>
+            </a:r>
+            <a:r>
+              <a:rPr lang="ru-RU" sz="1400" dirty="0" smtClean="0">
+                <a:solidFill>
+                  <a:schemeClr val="accent2">
+                    <a:lumMod val="75000"/>
+                  </a:schemeClr>
+                </a:solidFill>
+                <a:latin typeface="Times New Roman" panose="02020603050405020304" pitchFamily="18" charset="0"/>
+                <a:cs typeface="Times New Roman" panose="02020603050405020304" pitchFamily="18" charset="0"/>
+                <a:sym typeface="Symbol" panose="05050102010706020507" pitchFamily="18" charset="2"/>
+              </a:rPr>
+              <a:t>0.5</a:t>
+            </a:r>
+            <a:r>
+              <a:rPr lang="en-US" sz="1400" dirty="0" smtClean="0">
+                <a:solidFill>
+                  <a:schemeClr val="accent2">
+                    <a:lumMod val="75000"/>
+                  </a:schemeClr>
+                </a:solidFill>
+                <a:latin typeface="Times New Roman" panose="02020603050405020304" pitchFamily="18" charset="0"/>
+                <a:cs typeface="Times New Roman" panose="02020603050405020304" pitchFamily="18" charset="0"/>
+                <a:sym typeface="Symbol" panose="05050102010706020507" pitchFamily="18" charset="2"/>
+              </a:rPr>
+              <a:t> </a:t>
+            </a:r>
+            <a:r>
+              <a:rPr lang="ru-RU" sz="1400" dirty="0" smtClean="0">
+                <a:solidFill>
+                  <a:schemeClr val="accent2">
+                    <a:lumMod val="75000"/>
+                  </a:schemeClr>
+                </a:solidFill>
+                <a:latin typeface="Times New Roman" panose="02020603050405020304" pitchFamily="18" charset="0"/>
+                <a:cs typeface="Times New Roman" panose="02020603050405020304" pitchFamily="18" charset="0"/>
+                <a:sym typeface="Symbol" panose="05050102010706020507" pitchFamily="18" charset="2"/>
+              </a:rPr>
+              <a:t>градуса</a:t>
+            </a:r>
+            <a:endParaRPr lang="ru-RU" sz="1400" dirty="0" smtClean="0">
+              <a:solidFill>
+                <a:schemeClr val="accent2">
+                  <a:lumMod val="75000"/>
+                </a:schemeClr>
+              </a:solidFill>
+              <a:latin typeface="Times New Roman" panose="02020603050405020304" pitchFamily="18" charset="0"/>
+              <a:cs typeface="Times New Roman" panose="02020603050405020304" pitchFamily="18" charset="0"/>
+            </a:endParaRPr>
+          </a:p>
+        </p:txBody>
+      </p:sp>
+      <p:sp>
+        <p:nvSpPr>
+          <p:cNvPr id="18" name="Прямоугольник 17"/>
+          <p:cNvSpPr/>
+          <p:nvPr/>
+        </p:nvSpPr>
+        <p:spPr>
+          <a:xfrm>
+            <a:off x="7081791" y="2572084"/>
+            <a:ext cx="1653833" cy="297004"/>
+          </a:xfrm>
+          <a:prstGeom prst="rect">
+            <a:avLst/>
+          </a:prstGeom>
+        </p:spPr>
+        <p:txBody>
+          <a:bodyPr wrap="square">
+            <a:spAutoFit/>
+          </a:bodyPr>
+          <a:lstStyle/>
+          <a:p>
+            <a:pPr indent="182880">
+              <a:lnSpc>
+                <a:spcPct val="95000"/>
+              </a:lnSpc>
+              <a:spcAft>
+                <a:spcPts val="600"/>
+              </a:spcAft>
+              <a:tabLst>
+                <a:tab pos="182880" algn="l"/>
+              </a:tabLst>
+            </a:pPr>
+            <a:r>
+              <a:rPr lang="ru-RU" sz="1400" dirty="0" smtClean="0">
+                <a:solidFill>
+                  <a:schemeClr val="accent2">
+                    <a:lumMod val="75000"/>
+                  </a:schemeClr>
+                </a:solidFill>
+                <a:latin typeface="Times New Roman" panose="02020603050405020304" pitchFamily="18" charset="0"/>
+                <a:cs typeface="Times New Roman" panose="02020603050405020304" pitchFamily="18" charset="0"/>
+                <a:sym typeface="Symbol" panose="05050102010706020507" pitchFamily="18" charset="2"/>
+              </a:rPr>
+              <a:t></a:t>
+            </a:r>
+            <a:r>
+              <a:rPr lang="en-US" sz="1400" dirty="0" smtClean="0">
+                <a:solidFill>
+                  <a:schemeClr val="accent2">
+                    <a:lumMod val="75000"/>
+                  </a:schemeClr>
+                </a:solidFill>
+                <a:latin typeface="Times New Roman" panose="02020603050405020304" pitchFamily="18" charset="0"/>
+                <a:cs typeface="Times New Roman" panose="02020603050405020304" pitchFamily="18" charset="0"/>
+                <a:sym typeface="Symbol" panose="05050102010706020507" pitchFamily="18" charset="2"/>
+              </a:rPr>
+              <a:t>  </a:t>
+            </a:r>
+            <a:r>
+              <a:rPr lang="ru-RU" sz="1400" dirty="0" smtClean="0">
+                <a:solidFill>
+                  <a:schemeClr val="accent2">
+                    <a:lumMod val="75000"/>
+                  </a:schemeClr>
+                </a:solidFill>
+                <a:latin typeface="Times New Roman" panose="02020603050405020304" pitchFamily="18" charset="0"/>
+                <a:cs typeface="Times New Roman" panose="02020603050405020304" pitchFamily="18" charset="0"/>
+                <a:sym typeface="Symbol" panose="05050102010706020507" pitchFamily="18" charset="2"/>
+              </a:rPr>
+              <a:t>0.02</a:t>
+            </a:r>
+            <a:r>
+              <a:rPr lang="en-US" sz="1400" dirty="0" smtClean="0">
+                <a:solidFill>
+                  <a:schemeClr val="accent2">
+                    <a:lumMod val="75000"/>
+                  </a:schemeClr>
+                </a:solidFill>
+                <a:latin typeface="Times New Roman" panose="02020603050405020304" pitchFamily="18" charset="0"/>
+                <a:cs typeface="Times New Roman" panose="02020603050405020304" pitchFamily="18" charset="0"/>
+                <a:sym typeface="Symbol" panose="05050102010706020507" pitchFamily="18" charset="2"/>
+              </a:rPr>
+              <a:t> </a:t>
+            </a:r>
+            <a:r>
+              <a:rPr lang="ru-RU" sz="1400" dirty="0" smtClean="0">
+                <a:solidFill>
+                  <a:schemeClr val="accent2">
+                    <a:lumMod val="75000"/>
+                  </a:schemeClr>
+                </a:solidFill>
+                <a:latin typeface="Times New Roman" panose="02020603050405020304" pitchFamily="18" charset="0"/>
+                <a:cs typeface="Times New Roman" panose="02020603050405020304" pitchFamily="18" charset="0"/>
+                <a:sym typeface="Symbol" panose="05050102010706020507" pitchFamily="18" charset="2"/>
+              </a:rPr>
+              <a:t>градуса</a:t>
+            </a:r>
+            <a:endParaRPr lang="ru-RU" sz="1400" dirty="0" smtClean="0">
+              <a:solidFill>
+                <a:schemeClr val="accent2">
+                  <a:lumMod val="75000"/>
+                </a:schemeClr>
+              </a:solidFill>
+              <a:latin typeface="Times New Roman" panose="02020603050405020304" pitchFamily="18" charset="0"/>
+              <a:cs typeface="Times New Roman" panose="02020603050405020304" pitchFamily="18" charset="0"/>
+            </a:endParaRPr>
+          </a:p>
+        </p:txBody>
+      </p:sp>
+    </p:spTree>
+    <p:extLst>
+      <p:ext uri="{BB962C8B-B14F-4D97-AF65-F5344CB8AC3E}">
+        <p14:creationId xmlns:p14="http://schemas.microsoft.com/office/powerpoint/2010/main" val="2206169730"/>
+      </p:ext>
+    </p:extLst>
+  </p:cSld>
+  <p:clrMapOvr>
+    <a:masterClrMapping/>
+  </p:clrMapOvr>
+</p:sld>
+</file>
+
+<file path=ppt/slides/slide11.xml><?xml version="1.0" encoding="utf-8"?>
+<p:sld xmlns:a="http://schemas.openxmlformats.org/drawingml/2006/main" xmlns:r="http://schemas.openxmlformats.org/officeDocument/2006/relationships" xmlns:p="http://schemas.openxmlformats.org/presentationml/2006/main">
+  <p:cSld>
+    <p:spTree>
+      <p:nvGrpSpPr>
+        <p:cNvPr id="1" name=""/>
+        <p:cNvGrpSpPr/>
+        <p:nvPr/>
+      </p:nvGrpSpPr>
+      <p:grpSpPr>
+        <a:xfrm>
+          <a:off x="0" y="0"/>
+          <a:ext cx="0" cy="0"/>
+          <a:chOff x="0" y="0"/>
+          <a:chExt cx="0" cy="0"/>
+        </a:xfrm>
+      </p:grpSpPr>
+      <p:pic>
+        <p:nvPicPr>
+          <p:cNvPr id="5" name="Рисунок 4"/>
+          <p:cNvPicPr>
+            <a:picLocks noChangeAspect="1"/>
+          </p:cNvPicPr>
+          <p:nvPr/>
+        </p:nvPicPr>
+        <p:blipFill>
+          <a:blip r:embed="rId2"/>
+          <a:stretch>
+            <a:fillRect/>
+          </a:stretch>
+        </p:blipFill>
+        <p:spPr>
+          <a:xfrm>
+            <a:off x="5567735" y="0"/>
+            <a:ext cx="6335778" cy="6858000"/>
+          </a:xfrm>
+          <a:prstGeom prst="rect">
+            <a:avLst/>
+          </a:prstGeom>
+        </p:spPr>
+      </p:pic>
+      <p:pic>
+        <p:nvPicPr>
+          <p:cNvPr id="2" name="Рисунок 1"/>
+          <p:cNvPicPr>
+            <a:picLocks noChangeAspect="1"/>
+          </p:cNvPicPr>
+          <p:nvPr/>
+        </p:nvPicPr>
+        <p:blipFill>
+          <a:blip r:embed="rId3"/>
+          <a:stretch>
+            <a:fillRect/>
+          </a:stretch>
+        </p:blipFill>
+        <p:spPr>
+          <a:xfrm>
+            <a:off x="195489" y="11097"/>
+            <a:ext cx="4730461" cy="6858000"/>
+          </a:xfrm>
+          <a:prstGeom prst="rect">
+            <a:avLst/>
+          </a:prstGeom>
+        </p:spPr>
+      </p:pic>
+      <p:sp>
+        <p:nvSpPr>
+          <p:cNvPr id="9" name="Прямоугольник 8"/>
+          <p:cNvSpPr/>
+          <p:nvPr/>
+        </p:nvSpPr>
+        <p:spPr>
+          <a:xfrm>
+            <a:off x="2470370" y="989307"/>
+            <a:ext cx="3237971" cy="1144929"/>
+          </a:xfrm>
+          <a:prstGeom prst="rect">
+            <a:avLst/>
+          </a:prstGeom>
+        </p:spPr>
+        <p:txBody>
+          <a:bodyPr wrap="square">
+            <a:spAutoFit/>
+          </a:bodyPr>
+          <a:lstStyle/>
+          <a:p>
+            <a:pPr indent="182880" algn="ctr">
+              <a:lnSpc>
+                <a:spcPct val="95000"/>
+              </a:lnSpc>
+              <a:spcAft>
+                <a:spcPts val="600"/>
+              </a:spcAft>
+              <a:tabLst>
+                <a:tab pos="182880" algn="l"/>
+              </a:tabLst>
+            </a:pPr>
+            <a:r>
+              <a:rPr lang="ru-RU" dirty="0" smtClean="0">
+                <a:solidFill>
+                  <a:schemeClr val="accent2">
+                    <a:lumMod val="75000"/>
+                  </a:schemeClr>
+                </a:solidFill>
+                <a:latin typeface="Times New Roman" panose="02020603050405020304" pitchFamily="18" charset="0"/>
+                <a:cs typeface="Times New Roman" panose="02020603050405020304" pitchFamily="18" charset="0"/>
+              </a:rPr>
+              <a:t>Результаты компенсации </a:t>
+            </a:r>
+            <a:r>
+              <a:rPr lang="ru-RU" dirty="0">
+                <a:solidFill>
+                  <a:schemeClr val="accent2">
+                    <a:lumMod val="75000"/>
+                  </a:schemeClr>
+                </a:solidFill>
+                <a:latin typeface="Times New Roman" panose="02020603050405020304" pitchFamily="18" charset="0"/>
+                <a:cs typeface="Times New Roman" panose="02020603050405020304" pitchFamily="18" charset="0"/>
+              </a:rPr>
+              <a:t>внешнего возмущениями по </a:t>
+            </a:r>
+            <a:r>
+              <a:rPr lang="ru-RU" dirty="0" smtClean="0">
+                <a:solidFill>
+                  <a:schemeClr val="accent2">
+                    <a:lumMod val="75000"/>
+                  </a:schemeClr>
+                </a:solidFill>
+                <a:latin typeface="Times New Roman" panose="02020603050405020304" pitchFamily="18" charset="0"/>
+                <a:cs typeface="Times New Roman" panose="02020603050405020304" pitchFamily="18" charset="0"/>
+              </a:rPr>
+              <a:t>концентрации влаги в жидкости </a:t>
+            </a:r>
+            <a:r>
+              <a:rPr lang="ru-RU" dirty="0">
+                <a:solidFill>
+                  <a:schemeClr val="accent2">
+                    <a:lumMod val="75000"/>
+                  </a:schemeClr>
+                </a:solidFill>
+                <a:latin typeface="Times New Roman" panose="02020603050405020304" pitchFamily="18" charset="0"/>
+                <a:cs typeface="Times New Roman" panose="02020603050405020304" pitchFamily="18" charset="0"/>
+              </a:rPr>
+              <a:t>(+/-</a:t>
+            </a:r>
+            <a:r>
+              <a:rPr lang="ru-RU" dirty="0" smtClean="0">
+                <a:solidFill>
+                  <a:schemeClr val="accent2">
+                    <a:lumMod val="75000"/>
+                  </a:schemeClr>
+                </a:solidFill>
+                <a:latin typeface="Times New Roman" panose="02020603050405020304" pitchFamily="18" charset="0"/>
+                <a:cs typeface="Times New Roman" panose="02020603050405020304" pitchFamily="18" charset="0"/>
+              </a:rPr>
+              <a:t>1.5 %)</a:t>
+            </a:r>
+            <a:endParaRPr lang="ru-RU" dirty="0">
+              <a:solidFill>
+                <a:schemeClr val="accent2">
+                  <a:lumMod val="75000"/>
+                </a:schemeClr>
+              </a:solidFill>
+              <a:latin typeface="Times New Roman" panose="02020603050405020304" pitchFamily="18" charset="0"/>
+              <a:cs typeface="Times New Roman" panose="02020603050405020304" pitchFamily="18" charset="0"/>
+            </a:endParaRPr>
+          </a:p>
+        </p:txBody>
+      </p:sp>
+      <p:sp>
+        <p:nvSpPr>
+          <p:cNvPr id="10" name="TextBox 9"/>
+          <p:cNvSpPr txBox="1"/>
+          <p:nvPr/>
+        </p:nvSpPr>
+        <p:spPr>
+          <a:xfrm>
+            <a:off x="6267636" y="624508"/>
+            <a:ext cx="5515992" cy="338554"/>
+          </a:xfrm>
+          <a:prstGeom prst="rect">
+            <a:avLst/>
+          </a:prstGeom>
+          <a:noFill/>
+        </p:spPr>
+        <p:txBody>
+          <a:bodyPr wrap="square" rtlCol="0">
+            <a:spAutoFit/>
+          </a:bodyPr>
+          <a:lstStyle/>
+          <a:p>
+            <a:r>
+              <a:rPr lang="ru-RU" sz="1600" dirty="0" smtClean="0">
+                <a:solidFill>
+                  <a:schemeClr val="accent2">
+                    <a:lumMod val="75000"/>
+                  </a:schemeClr>
+                </a:solidFill>
+                <a:latin typeface="Times New Roman" panose="02020603050405020304" pitchFamily="18" charset="0"/>
+                <a:cs typeface="Times New Roman" panose="02020603050405020304" pitchFamily="18" charset="0"/>
+              </a:rPr>
+              <a:t>Представленные результаты показывают, что …….</a:t>
+            </a:r>
+            <a:endParaRPr lang="ru-RU" sz="1600" dirty="0" smtClean="0">
+              <a:solidFill>
+                <a:schemeClr val="accent2">
+                  <a:lumMod val="75000"/>
+                </a:schemeClr>
+              </a:solidFill>
+              <a:latin typeface="Times New Roman" panose="02020603050405020304" pitchFamily="18" charset="0"/>
+              <a:cs typeface="Times New Roman" panose="02020603050405020304" pitchFamily="18" charset="0"/>
+            </a:endParaRPr>
+          </a:p>
+        </p:txBody>
+      </p:sp>
+      <p:sp>
+        <p:nvSpPr>
+          <p:cNvPr id="12" name="Прямоугольник 11"/>
+          <p:cNvSpPr/>
+          <p:nvPr/>
+        </p:nvSpPr>
+        <p:spPr>
+          <a:xfrm>
+            <a:off x="1335341" y="989307"/>
+            <a:ext cx="1541024" cy="297004"/>
+          </a:xfrm>
+          <a:prstGeom prst="rect">
+            <a:avLst/>
+          </a:prstGeom>
+        </p:spPr>
+        <p:txBody>
+          <a:bodyPr wrap="square">
+            <a:spAutoFit/>
+          </a:bodyPr>
+          <a:lstStyle/>
+          <a:p>
+            <a:pPr indent="182880">
+              <a:lnSpc>
+                <a:spcPct val="95000"/>
+              </a:lnSpc>
+              <a:spcAft>
+                <a:spcPts val="600"/>
+              </a:spcAft>
+              <a:tabLst>
+                <a:tab pos="182880" algn="l"/>
+              </a:tabLst>
+            </a:pPr>
+            <a:r>
+              <a:rPr lang="ru-RU" sz="1400" dirty="0" smtClean="0">
+                <a:solidFill>
+                  <a:schemeClr val="accent2">
+                    <a:lumMod val="75000"/>
+                  </a:schemeClr>
+                </a:solidFill>
+                <a:latin typeface="Times New Roman" panose="02020603050405020304" pitchFamily="18" charset="0"/>
+                <a:cs typeface="Times New Roman" panose="02020603050405020304" pitchFamily="18" charset="0"/>
+                <a:sym typeface="Symbol" panose="05050102010706020507" pitchFamily="18" charset="2"/>
+              </a:rPr>
+              <a:t></a:t>
+            </a:r>
+            <a:r>
+              <a:rPr lang="en-US" sz="1400" dirty="0" smtClean="0">
+                <a:solidFill>
+                  <a:schemeClr val="accent2">
+                    <a:lumMod val="75000"/>
+                  </a:schemeClr>
+                </a:solidFill>
+                <a:latin typeface="Times New Roman" panose="02020603050405020304" pitchFamily="18" charset="0"/>
+                <a:cs typeface="Times New Roman" panose="02020603050405020304" pitchFamily="18" charset="0"/>
+                <a:sym typeface="Symbol" panose="05050102010706020507" pitchFamily="18" charset="2"/>
+              </a:rPr>
+              <a:t>  </a:t>
+            </a:r>
+            <a:r>
+              <a:rPr lang="ru-RU" sz="1400" dirty="0" smtClean="0">
+                <a:solidFill>
+                  <a:schemeClr val="accent2">
+                    <a:lumMod val="75000"/>
+                  </a:schemeClr>
+                </a:solidFill>
+                <a:latin typeface="Times New Roman" panose="02020603050405020304" pitchFamily="18" charset="0"/>
+                <a:cs typeface="Times New Roman" panose="02020603050405020304" pitchFamily="18" charset="0"/>
+                <a:sym typeface="Symbol" panose="05050102010706020507" pitchFamily="18" charset="2"/>
+              </a:rPr>
+              <a:t>0</a:t>
+            </a:r>
+            <a:r>
+              <a:rPr lang="en-US" sz="1400" dirty="0" smtClean="0">
+                <a:solidFill>
+                  <a:schemeClr val="accent2">
+                    <a:lumMod val="75000"/>
+                  </a:schemeClr>
+                </a:solidFill>
+                <a:latin typeface="Times New Roman" panose="02020603050405020304" pitchFamily="18" charset="0"/>
+                <a:cs typeface="Times New Roman" panose="02020603050405020304" pitchFamily="18" charset="0"/>
+                <a:sym typeface="Symbol" panose="05050102010706020507" pitchFamily="18" charset="2"/>
+              </a:rPr>
+              <a:t> </a:t>
+            </a:r>
+            <a:r>
+              <a:rPr lang="ru-RU" sz="1400" dirty="0" smtClean="0">
+                <a:solidFill>
+                  <a:schemeClr val="accent2">
+                    <a:lumMod val="75000"/>
+                  </a:schemeClr>
+                </a:solidFill>
+                <a:latin typeface="Times New Roman" panose="02020603050405020304" pitchFamily="18" charset="0"/>
+                <a:cs typeface="Times New Roman" panose="02020603050405020304" pitchFamily="18" charset="0"/>
+                <a:sym typeface="Symbol" panose="05050102010706020507" pitchFamily="18" charset="2"/>
+              </a:rPr>
+              <a:t>градуса</a:t>
+            </a:r>
+            <a:endParaRPr lang="ru-RU" sz="1400" dirty="0" smtClean="0">
+              <a:solidFill>
+                <a:schemeClr val="accent2">
+                  <a:lumMod val="75000"/>
+                </a:schemeClr>
+              </a:solidFill>
+              <a:latin typeface="Times New Roman" panose="02020603050405020304" pitchFamily="18" charset="0"/>
+              <a:cs typeface="Times New Roman" panose="02020603050405020304" pitchFamily="18" charset="0"/>
+            </a:endParaRPr>
+          </a:p>
+        </p:txBody>
+      </p:sp>
+      <p:sp>
+        <p:nvSpPr>
+          <p:cNvPr id="13" name="Прямоугольник 12"/>
+          <p:cNvSpPr/>
+          <p:nvPr/>
+        </p:nvSpPr>
+        <p:spPr>
+          <a:xfrm>
+            <a:off x="1318196" y="3759615"/>
+            <a:ext cx="1541024" cy="297004"/>
+          </a:xfrm>
+          <a:prstGeom prst="rect">
+            <a:avLst/>
+          </a:prstGeom>
+        </p:spPr>
+        <p:txBody>
+          <a:bodyPr wrap="square">
+            <a:spAutoFit/>
+          </a:bodyPr>
+          <a:lstStyle/>
+          <a:p>
+            <a:pPr indent="182880">
+              <a:lnSpc>
+                <a:spcPct val="95000"/>
+              </a:lnSpc>
+              <a:spcAft>
+                <a:spcPts val="600"/>
+              </a:spcAft>
+              <a:tabLst>
+                <a:tab pos="182880" algn="l"/>
+              </a:tabLst>
+            </a:pPr>
+            <a:r>
+              <a:rPr lang="ru-RU" sz="1400" dirty="0" smtClean="0">
+                <a:solidFill>
+                  <a:schemeClr val="accent2">
+                    <a:lumMod val="75000"/>
+                  </a:schemeClr>
+                </a:solidFill>
+                <a:latin typeface="Times New Roman" panose="02020603050405020304" pitchFamily="18" charset="0"/>
+                <a:cs typeface="Times New Roman" panose="02020603050405020304" pitchFamily="18" charset="0"/>
+                <a:sym typeface="Symbol" panose="05050102010706020507" pitchFamily="18" charset="2"/>
+              </a:rPr>
+              <a:t></a:t>
+            </a:r>
+            <a:r>
+              <a:rPr lang="en-US" sz="1400" dirty="0" smtClean="0">
+                <a:solidFill>
+                  <a:schemeClr val="accent2">
+                    <a:lumMod val="75000"/>
+                  </a:schemeClr>
+                </a:solidFill>
+                <a:latin typeface="Times New Roman" panose="02020603050405020304" pitchFamily="18" charset="0"/>
+                <a:cs typeface="Times New Roman" panose="02020603050405020304" pitchFamily="18" charset="0"/>
+                <a:sym typeface="Symbol" panose="05050102010706020507" pitchFamily="18" charset="2"/>
+              </a:rPr>
+              <a:t>  </a:t>
+            </a:r>
+            <a:r>
+              <a:rPr lang="ru-RU" sz="1400" dirty="0" smtClean="0">
+                <a:solidFill>
+                  <a:schemeClr val="accent2">
+                    <a:lumMod val="75000"/>
+                  </a:schemeClr>
+                </a:solidFill>
+                <a:latin typeface="Times New Roman" panose="02020603050405020304" pitchFamily="18" charset="0"/>
+                <a:cs typeface="Times New Roman" panose="02020603050405020304" pitchFamily="18" charset="0"/>
+                <a:sym typeface="Symbol" panose="05050102010706020507" pitchFamily="18" charset="2"/>
+              </a:rPr>
+              <a:t>0</a:t>
+            </a:r>
+            <a:r>
+              <a:rPr lang="en-US" sz="1400" dirty="0" smtClean="0">
+                <a:solidFill>
+                  <a:schemeClr val="accent2">
+                    <a:lumMod val="75000"/>
+                  </a:schemeClr>
+                </a:solidFill>
+                <a:latin typeface="Times New Roman" panose="02020603050405020304" pitchFamily="18" charset="0"/>
+                <a:cs typeface="Times New Roman" panose="02020603050405020304" pitchFamily="18" charset="0"/>
+                <a:sym typeface="Symbol" panose="05050102010706020507" pitchFamily="18" charset="2"/>
+              </a:rPr>
+              <a:t> </a:t>
+            </a:r>
+            <a:r>
+              <a:rPr lang="ru-RU" sz="1400" dirty="0" smtClean="0">
+                <a:solidFill>
+                  <a:schemeClr val="accent2">
+                    <a:lumMod val="75000"/>
+                  </a:schemeClr>
+                </a:solidFill>
+                <a:latin typeface="Times New Roman" panose="02020603050405020304" pitchFamily="18" charset="0"/>
+                <a:cs typeface="Times New Roman" panose="02020603050405020304" pitchFamily="18" charset="0"/>
+                <a:sym typeface="Symbol" panose="05050102010706020507" pitchFamily="18" charset="2"/>
+              </a:rPr>
+              <a:t>градуса</a:t>
+            </a:r>
+            <a:endParaRPr lang="ru-RU" sz="1400" dirty="0" smtClean="0">
+              <a:solidFill>
+                <a:schemeClr val="accent2">
+                  <a:lumMod val="75000"/>
+                </a:schemeClr>
+              </a:solidFill>
+              <a:latin typeface="Times New Roman" panose="02020603050405020304" pitchFamily="18" charset="0"/>
+              <a:cs typeface="Times New Roman" panose="02020603050405020304" pitchFamily="18" charset="0"/>
+            </a:endParaRPr>
+          </a:p>
+        </p:txBody>
+      </p:sp>
+      <p:sp>
+        <p:nvSpPr>
+          <p:cNvPr id="14" name="Прямоугольник 13"/>
+          <p:cNvSpPr/>
+          <p:nvPr/>
+        </p:nvSpPr>
+        <p:spPr>
+          <a:xfrm>
+            <a:off x="7081793" y="5243665"/>
+            <a:ext cx="1653833" cy="297004"/>
+          </a:xfrm>
+          <a:prstGeom prst="rect">
+            <a:avLst/>
+          </a:prstGeom>
+        </p:spPr>
+        <p:txBody>
+          <a:bodyPr wrap="square">
+            <a:spAutoFit/>
+          </a:bodyPr>
+          <a:lstStyle/>
+          <a:p>
+            <a:pPr indent="182880">
+              <a:lnSpc>
+                <a:spcPct val="95000"/>
+              </a:lnSpc>
+              <a:spcAft>
+                <a:spcPts val="600"/>
+              </a:spcAft>
+              <a:tabLst>
+                <a:tab pos="182880" algn="l"/>
+              </a:tabLst>
+            </a:pPr>
+            <a:r>
+              <a:rPr lang="ru-RU" sz="1400" dirty="0" smtClean="0">
+                <a:solidFill>
+                  <a:schemeClr val="accent2">
+                    <a:lumMod val="75000"/>
+                  </a:schemeClr>
+                </a:solidFill>
+                <a:latin typeface="Times New Roman" panose="02020603050405020304" pitchFamily="18" charset="0"/>
+                <a:cs typeface="Times New Roman" panose="02020603050405020304" pitchFamily="18" charset="0"/>
+                <a:sym typeface="Symbol" panose="05050102010706020507" pitchFamily="18" charset="2"/>
+              </a:rPr>
+              <a:t></a:t>
+            </a:r>
+            <a:r>
+              <a:rPr lang="en-US" sz="1400" dirty="0" smtClean="0">
+                <a:solidFill>
+                  <a:schemeClr val="accent2">
+                    <a:lumMod val="75000"/>
+                  </a:schemeClr>
+                </a:solidFill>
+                <a:latin typeface="Times New Roman" panose="02020603050405020304" pitchFamily="18" charset="0"/>
+                <a:cs typeface="Times New Roman" panose="02020603050405020304" pitchFamily="18" charset="0"/>
+                <a:sym typeface="Symbol" panose="05050102010706020507" pitchFamily="18" charset="2"/>
+              </a:rPr>
+              <a:t>  </a:t>
+            </a:r>
+            <a:r>
+              <a:rPr lang="ru-RU" sz="1400" dirty="0" smtClean="0">
+                <a:solidFill>
+                  <a:schemeClr val="accent2">
+                    <a:lumMod val="75000"/>
+                  </a:schemeClr>
+                </a:solidFill>
+                <a:latin typeface="Times New Roman" panose="02020603050405020304" pitchFamily="18" charset="0"/>
+                <a:cs typeface="Times New Roman" panose="02020603050405020304" pitchFamily="18" charset="0"/>
+                <a:sym typeface="Symbol" panose="05050102010706020507" pitchFamily="18" charset="2"/>
+              </a:rPr>
+              <a:t>0</a:t>
+            </a:r>
+            <a:r>
+              <a:rPr lang="en-US" sz="1400" dirty="0" smtClean="0">
+                <a:solidFill>
+                  <a:schemeClr val="accent2">
+                    <a:lumMod val="75000"/>
+                  </a:schemeClr>
+                </a:solidFill>
+                <a:latin typeface="Times New Roman" panose="02020603050405020304" pitchFamily="18" charset="0"/>
+                <a:cs typeface="Times New Roman" panose="02020603050405020304" pitchFamily="18" charset="0"/>
+                <a:sym typeface="Symbol" panose="05050102010706020507" pitchFamily="18" charset="2"/>
+              </a:rPr>
+              <a:t> </a:t>
+            </a:r>
+            <a:r>
+              <a:rPr lang="ru-RU" sz="1400" dirty="0" smtClean="0">
+                <a:solidFill>
+                  <a:schemeClr val="accent2">
+                    <a:lumMod val="75000"/>
+                  </a:schemeClr>
+                </a:solidFill>
+                <a:latin typeface="Times New Roman" panose="02020603050405020304" pitchFamily="18" charset="0"/>
+                <a:cs typeface="Times New Roman" panose="02020603050405020304" pitchFamily="18" charset="0"/>
+                <a:sym typeface="Symbol" panose="05050102010706020507" pitchFamily="18" charset="2"/>
+              </a:rPr>
+              <a:t>градуса</a:t>
+            </a:r>
+            <a:endParaRPr lang="ru-RU" sz="1400" dirty="0" smtClean="0">
+              <a:solidFill>
+                <a:schemeClr val="accent2">
+                  <a:lumMod val="75000"/>
+                </a:schemeClr>
+              </a:solidFill>
+              <a:latin typeface="Times New Roman" panose="02020603050405020304" pitchFamily="18" charset="0"/>
+              <a:cs typeface="Times New Roman" panose="02020603050405020304" pitchFamily="18" charset="0"/>
+            </a:endParaRPr>
+          </a:p>
+        </p:txBody>
+      </p:sp>
+      <p:sp>
+        <p:nvSpPr>
+          <p:cNvPr id="15" name="Прямоугольник 14"/>
+          <p:cNvSpPr/>
+          <p:nvPr/>
+        </p:nvSpPr>
+        <p:spPr>
+          <a:xfrm>
+            <a:off x="7081792" y="3462611"/>
+            <a:ext cx="1653833" cy="297004"/>
+          </a:xfrm>
+          <a:prstGeom prst="rect">
+            <a:avLst/>
+          </a:prstGeom>
+        </p:spPr>
+        <p:txBody>
+          <a:bodyPr wrap="square">
+            <a:spAutoFit/>
+          </a:bodyPr>
+          <a:lstStyle/>
+          <a:p>
+            <a:pPr indent="182880">
+              <a:lnSpc>
+                <a:spcPct val="95000"/>
+              </a:lnSpc>
+              <a:spcAft>
+                <a:spcPts val="600"/>
+              </a:spcAft>
+              <a:tabLst>
+                <a:tab pos="182880" algn="l"/>
+              </a:tabLst>
+            </a:pPr>
+            <a:r>
+              <a:rPr lang="ru-RU" sz="1400" dirty="0" smtClean="0">
+                <a:solidFill>
+                  <a:schemeClr val="accent2">
+                    <a:lumMod val="75000"/>
+                  </a:schemeClr>
+                </a:solidFill>
+                <a:latin typeface="Times New Roman" panose="02020603050405020304" pitchFamily="18" charset="0"/>
+                <a:cs typeface="Times New Roman" panose="02020603050405020304" pitchFamily="18" charset="0"/>
+                <a:sym typeface="Symbol" panose="05050102010706020507" pitchFamily="18" charset="2"/>
+              </a:rPr>
+              <a:t></a:t>
+            </a:r>
+            <a:r>
+              <a:rPr lang="en-US" sz="1400" dirty="0" smtClean="0">
+                <a:solidFill>
+                  <a:schemeClr val="accent2">
+                    <a:lumMod val="75000"/>
+                  </a:schemeClr>
+                </a:solidFill>
+                <a:latin typeface="Times New Roman" panose="02020603050405020304" pitchFamily="18" charset="0"/>
+                <a:cs typeface="Times New Roman" panose="02020603050405020304" pitchFamily="18" charset="0"/>
+                <a:sym typeface="Symbol" panose="05050102010706020507" pitchFamily="18" charset="2"/>
+              </a:rPr>
+              <a:t>  </a:t>
+            </a:r>
+            <a:r>
+              <a:rPr lang="ru-RU" sz="1400" dirty="0" smtClean="0">
+                <a:solidFill>
+                  <a:schemeClr val="accent2">
+                    <a:lumMod val="75000"/>
+                  </a:schemeClr>
+                </a:solidFill>
+                <a:latin typeface="Times New Roman" panose="02020603050405020304" pitchFamily="18" charset="0"/>
+                <a:cs typeface="Times New Roman" panose="02020603050405020304" pitchFamily="18" charset="0"/>
+                <a:sym typeface="Symbol" panose="05050102010706020507" pitchFamily="18" charset="2"/>
+              </a:rPr>
+              <a:t>0</a:t>
+            </a:r>
+            <a:r>
+              <a:rPr lang="en-US" sz="1400" dirty="0" smtClean="0">
+                <a:solidFill>
+                  <a:schemeClr val="accent2">
+                    <a:lumMod val="75000"/>
+                  </a:schemeClr>
+                </a:solidFill>
+                <a:latin typeface="Times New Roman" panose="02020603050405020304" pitchFamily="18" charset="0"/>
+                <a:cs typeface="Times New Roman" panose="02020603050405020304" pitchFamily="18" charset="0"/>
+                <a:sym typeface="Symbol" panose="05050102010706020507" pitchFamily="18" charset="2"/>
+              </a:rPr>
+              <a:t> </a:t>
+            </a:r>
+            <a:r>
+              <a:rPr lang="ru-RU" sz="1400" dirty="0" smtClean="0">
+                <a:solidFill>
+                  <a:schemeClr val="accent2">
+                    <a:lumMod val="75000"/>
+                  </a:schemeClr>
+                </a:solidFill>
+                <a:latin typeface="Times New Roman" panose="02020603050405020304" pitchFamily="18" charset="0"/>
+                <a:cs typeface="Times New Roman" panose="02020603050405020304" pitchFamily="18" charset="0"/>
+                <a:sym typeface="Symbol" panose="05050102010706020507" pitchFamily="18" charset="2"/>
+              </a:rPr>
+              <a:t>градуса</a:t>
+            </a:r>
+            <a:endParaRPr lang="ru-RU" sz="1400" dirty="0" smtClean="0">
+              <a:solidFill>
+                <a:schemeClr val="accent2">
+                  <a:lumMod val="75000"/>
+                </a:schemeClr>
+              </a:solidFill>
+              <a:latin typeface="Times New Roman" panose="02020603050405020304" pitchFamily="18" charset="0"/>
+              <a:cs typeface="Times New Roman" panose="02020603050405020304" pitchFamily="18" charset="0"/>
+            </a:endParaRPr>
+          </a:p>
+        </p:txBody>
+      </p:sp>
+      <p:sp>
+        <p:nvSpPr>
+          <p:cNvPr id="16" name="Прямоугольник 15"/>
+          <p:cNvSpPr/>
+          <p:nvPr/>
+        </p:nvSpPr>
+        <p:spPr>
+          <a:xfrm>
+            <a:off x="1222532" y="2374461"/>
+            <a:ext cx="1733732" cy="297004"/>
+          </a:xfrm>
+          <a:prstGeom prst="rect">
+            <a:avLst/>
+          </a:prstGeom>
+        </p:spPr>
+        <p:txBody>
+          <a:bodyPr wrap="square">
+            <a:spAutoFit/>
+          </a:bodyPr>
+          <a:lstStyle/>
+          <a:p>
+            <a:pPr indent="182880">
+              <a:lnSpc>
+                <a:spcPct val="95000"/>
+              </a:lnSpc>
+              <a:spcAft>
+                <a:spcPts val="600"/>
+              </a:spcAft>
+              <a:tabLst>
+                <a:tab pos="182880" algn="l"/>
+              </a:tabLst>
+            </a:pPr>
+            <a:r>
+              <a:rPr lang="ru-RU" sz="1400" dirty="0" smtClean="0">
+                <a:solidFill>
+                  <a:schemeClr val="accent2">
+                    <a:lumMod val="75000"/>
+                  </a:schemeClr>
+                </a:solidFill>
+                <a:latin typeface="Times New Roman" panose="02020603050405020304" pitchFamily="18" charset="0"/>
+                <a:cs typeface="Times New Roman" panose="02020603050405020304" pitchFamily="18" charset="0"/>
+                <a:sym typeface="Symbol" panose="05050102010706020507" pitchFamily="18" charset="2"/>
+              </a:rPr>
+              <a:t></a:t>
+            </a:r>
+            <a:r>
+              <a:rPr lang="en-US" sz="1400" dirty="0" smtClean="0">
+                <a:solidFill>
+                  <a:schemeClr val="accent2">
+                    <a:lumMod val="75000"/>
+                  </a:schemeClr>
+                </a:solidFill>
+                <a:latin typeface="Times New Roman" panose="02020603050405020304" pitchFamily="18" charset="0"/>
+                <a:cs typeface="Times New Roman" panose="02020603050405020304" pitchFamily="18" charset="0"/>
+                <a:sym typeface="Symbol" panose="05050102010706020507" pitchFamily="18" charset="2"/>
+              </a:rPr>
+              <a:t>  </a:t>
+            </a:r>
+            <a:r>
+              <a:rPr lang="ru-RU" sz="1400" dirty="0" smtClean="0">
+                <a:solidFill>
+                  <a:schemeClr val="accent2">
+                    <a:lumMod val="75000"/>
+                  </a:schemeClr>
+                </a:solidFill>
+                <a:latin typeface="Times New Roman" panose="02020603050405020304" pitchFamily="18" charset="0"/>
+                <a:cs typeface="Times New Roman" panose="02020603050405020304" pitchFamily="18" charset="0"/>
+                <a:sym typeface="Symbol" panose="05050102010706020507" pitchFamily="18" charset="2"/>
+              </a:rPr>
+              <a:t>0</a:t>
+            </a:r>
+            <a:r>
+              <a:rPr lang="ru-RU" sz="1400" dirty="0" smtClean="0">
+                <a:solidFill>
+                  <a:schemeClr val="accent2">
+                    <a:lumMod val="75000"/>
+                  </a:schemeClr>
+                </a:solidFill>
+                <a:latin typeface="Times New Roman" panose="02020603050405020304" pitchFamily="18" charset="0"/>
+                <a:cs typeface="Times New Roman" panose="02020603050405020304" pitchFamily="18" charset="0"/>
+                <a:sym typeface="Symbol" panose="05050102010706020507" pitchFamily="18" charset="2"/>
+              </a:rPr>
+              <a:t>.03</a:t>
+            </a:r>
+            <a:r>
+              <a:rPr lang="en-US" sz="1400" dirty="0" smtClean="0">
+                <a:solidFill>
+                  <a:schemeClr val="accent2">
+                    <a:lumMod val="75000"/>
+                  </a:schemeClr>
+                </a:solidFill>
+                <a:latin typeface="Times New Roman" panose="02020603050405020304" pitchFamily="18" charset="0"/>
+                <a:cs typeface="Times New Roman" panose="02020603050405020304" pitchFamily="18" charset="0"/>
+                <a:sym typeface="Symbol" panose="05050102010706020507" pitchFamily="18" charset="2"/>
+              </a:rPr>
+              <a:t> </a:t>
+            </a:r>
+            <a:r>
+              <a:rPr lang="ru-RU" sz="1400" dirty="0" smtClean="0">
+                <a:solidFill>
+                  <a:schemeClr val="accent2">
+                    <a:lumMod val="75000"/>
+                  </a:schemeClr>
+                </a:solidFill>
+                <a:latin typeface="Times New Roman" panose="02020603050405020304" pitchFamily="18" charset="0"/>
+                <a:cs typeface="Times New Roman" panose="02020603050405020304" pitchFamily="18" charset="0"/>
+                <a:sym typeface="Symbol" panose="05050102010706020507" pitchFamily="18" charset="2"/>
+              </a:rPr>
+              <a:t>градуса</a:t>
+            </a:r>
+            <a:endParaRPr lang="ru-RU" sz="1400" dirty="0" smtClean="0">
+              <a:solidFill>
+                <a:schemeClr val="accent2">
+                  <a:lumMod val="75000"/>
+                </a:schemeClr>
+              </a:solidFill>
+              <a:latin typeface="Times New Roman" panose="02020603050405020304" pitchFamily="18" charset="0"/>
+              <a:cs typeface="Times New Roman" panose="02020603050405020304" pitchFamily="18" charset="0"/>
+            </a:endParaRPr>
+          </a:p>
+        </p:txBody>
+      </p:sp>
+      <p:sp>
+        <p:nvSpPr>
+          <p:cNvPr id="17" name="Прямоугольник 16"/>
+          <p:cNvSpPr/>
+          <p:nvPr/>
+        </p:nvSpPr>
+        <p:spPr>
+          <a:xfrm>
+            <a:off x="1222532" y="5045926"/>
+            <a:ext cx="1653833" cy="297004"/>
+          </a:xfrm>
+          <a:prstGeom prst="rect">
+            <a:avLst/>
+          </a:prstGeom>
+        </p:spPr>
+        <p:txBody>
+          <a:bodyPr wrap="square">
+            <a:spAutoFit/>
+          </a:bodyPr>
+          <a:lstStyle/>
+          <a:p>
+            <a:pPr indent="182880">
+              <a:lnSpc>
+                <a:spcPct val="95000"/>
+              </a:lnSpc>
+              <a:spcAft>
+                <a:spcPts val="600"/>
+              </a:spcAft>
+              <a:tabLst>
+                <a:tab pos="182880" algn="l"/>
+              </a:tabLst>
+            </a:pPr>
+            <a:r>
+              <a:rPr lang="ru-RU" sz="1400" dirty="0" smtClean="0">
+                <a:solidFill>
+                  <a:schemeClr val="accent2">
+                    <a:lumMod val="75000"/>
+                  </a:schemeClr>
+                </a:solidFill>
+                <a:latin typeface="Times New Roman" panose="02020603050405020304" pitchFamily="18" charset="0"/>
+                <a:cs typeface="Times New Roman" panose="02020603050405020304" pitchFamily="18" charset="0"/>
+                <a:sym typeface="Symbol" panose="05050102010706020507" pitchFamily="18" charset="2"/>
+              </a:rPr>
+              <a:t></a:t>
+            </a:r>
+            <a:r>
+              <a:rPr lang="en-US" sz="1400" dirty="0" smtClean="0">
+                <a:solidFill>
+                  <a:schemeClr val="accent2">
+                    <a:lumMod val="75000"/>
+                  </a:schemeClr>
+                </a:solidFill>
+                <a:latin typeface="Times New Roman" panose="02020603050405020304" pitchFamily="18" charset="0"/>
+                <a:cs typeface="Times New Roman" panose="02020603050405020304" pitchFamily="18" charset="0"/>
+                <a:sym typeface="Symbol" panose="05050102010706020507" pitchFamily="18" charset="2"/>
+              </a:rPr>
+              <a:t>  </a:t>
+            </a:r>
+            <a:r>
+              <a:rPr lang="ru-RU" sz="1400" dirty="0" smtClean="0">
+                <a:solidFill>
+                  <a:schemeClr val="accent2">
+                    <a:lumMod val="75000"/>
+                  </a:schemeClr>
+                </a:solidFill>
+                <a:latin typeface="Times New Roman" panose="02020603050405020304" pitchFamily="18" charset="0"/>
+                <a:cs typeface="Times New Roman" panose="02020603050405020304" pitchFamily="18" charset="0"/>
+                <a:sym typeface="Symbol" panose="05050102010706020507" pitchFamily="18" charset="2"/>
+              </a:rPr>
+              <a:t>0</a:t>
+            </a:r>
+            <a:r>
+              <a:rPr lang="en-US" sz="1400" dirty="0" smtClean="0">
+                <a:solidFill>
+                  <a:schemeClr val="accent2">
+                    <a:lumMod val="75000"/>
+                  </a:schemeClr>
+                </a:solidFill>
+                <a:latin typeface="Times New Roman" panose="02020603050405020304" pitchFamily="18" charset="0"/>
+                <a:cs typeface="Times New Roman" panose="02020603050405020304" pitchFamily="18" charset="0"/>
+                <a:sym typeface="Symbol" panose="05050102010706020507" pitchFamily="18" charset="2"/>
+              </a:rPr>
+              <a:t> </a:t>
+            </a:r>
+            <a:r>
+              <a:rPr lang="ru-RU" sz="1400" dirty="0" smtClean="0">
+                <a:solidFill>
+                  <a:schemeClr val="accent2">
+                    <a:lumMod val="75000"/>
+                  </a:schemeClr>
+                </a:solidFill>
+                <a:latin typeface="Times New Roman" panose="02020603050405020304" pitchFamily="18" charset="0"/>
+                <a:cs typeface="Times New Roman" panose="02020603050405020304" pitchFamily="18" charset="0"/>
+                <a:sym typeface="Symbol" panose="05050102010706020507" pitchFamily="18" charset="2"/>
+              </a:rPr>
+              <a:t>градуса</a:t>
+            </a:r>
+            <a:endParaRPr lang="ru-RU" sz="1400" dirty="0" smtClean="0">
+              <a:solidFill>
+                <a:schemeClr val="accent2">
+                  <a:lumMod val="75000"/>
+                </a:schemeClr>
+              </a:solidFill>
+              <a:latin typeface="Times New Roman" panose="02020603050405020304" pitchFamily="18" charset="0"/>
+              <a:cs typeface="Times New Roman" panose="02020603050405020304" pitchFamily="18" charset="0"/>
+            </a:endParaRPr>
+          </a:p>
+        </p:txBody>
+      </p:sp>
+      <p:sp>
+        <p:nvSpPr>
+          <p:cNvPr id="18" name="Прямоугольник 17"/>
+          <p:cNvSpPr/>
+          <p:nvPr/>
+        </p:nvSpPr>
+        <p:spPr>
+          <a:xfrm>
+            <a:off x="7081791" y="2572084"/>
+            <a:ext cx="1653833" cy="297004"/>
+          </a:xfrm>
+          <a:prstGeom prst="rect">
+            <a:avLst/>
+          </a:prstGeom>
+        </p:spPr>
+        <p:txBody>
+          <a:bodyPr wrap="square">
+            <a:spAutoFit/>
+          </a:bodyPr>
+          <a:lstStyle/>
+          <a:p>
+            <a:pPr indent="182880">
+              <a:lnSpc>
+                <a:spcPct val="95000"/>
+              </a:lnSpc>
+              <a:spcAft>
+                <a:spcPts val="600"/>
+              </a:spcAft>
+              <a:tabLst>
+                <a:tab pos="182880" algn="l"/>
+              </a:tabLst>
+            </a:pPr>
+            <a:r>
+              <a:rPr lang="ru-RU" sz="1400" dirty="0" smtClean="0">
+                <a:solidFill>
+                  <a:schemeClr val="accent2">
+                    <a:lumMod val="75000"/>
+                  </a:schemeClr>
+                </a:solidFill>
+                <a:latin typeface="Times New Roman" panose="02020603050405020304" pitchFamily="18" charset="0"/>
+                <a:cs typeface="Times New Roman" panose="02020603050405020304" pitchFamily="18" charset="0"/>
+                <a:sym typeface="Symbol" panose="05050102010706020507" pitchFamily="18" charset="2"/>
+              </a:rPr>
+              <a:t></a:t>
+            </a:r>
+            <a:r>
+              <a:rPr lang="en-US" sz="1400" dirty="0" smtClean="0">
+                <a:solidFill>
+                  <a:schemeClr val="accent2">
+                    <a:lumMod val="75000"/>
+                  </a:schemeClr>
+                </a:solidFill>
+                <a:latin typeface="Times New Roman" panose="02020603050405020304" pitchFamily="18" charset="0"/>
+                <a:cs typeface="Times New Roman" panose="02020603050405020304" pitchFamily="18" charset="0"/>
+                <a:sym typeface="Symbol" panose="05050102010706020507" pitchFamily="18" charset="2"/>
+              </a:rPr>
+              <a:t>  </a:t>
+            </a:r>
+            <a:r>
+              <a:rPr lang="ru-RU" sz="1400" dirty="0" smtClean="0">
+                <a:solidFill>
+                  <a:schemeClr val="accent2">
+                    <a:lumMod val="75000"/>
+                  </a:schemeClr>
+                </a:solidFill>
+                <a:latin typeface="Times New Roman" panose="02020603050405020304" pitchFamily="18" charset="0"/>
+                <a:cs typeface="Times New Roman" panose="02020603050405020304" pitchFamily="18" charset="0"/>
+                <a:sym typeface="Symbol" panose="05050102010706020507" pitchFamily="18" charset="2"/>
+              </a:rPr>
+              <a:t>0.02</a:t>
+            </a:r>
+            <a:r>
+              <a:rPr lang="en-US" sz="1400" dirty="0" smtClean="0">
+                <a:solidFill>
+                  <a:schemeClr val="accent2">
+                    <a:lumMod val="75000"/>
+                  </a:schemeClr>
+                </a:solidFill>
+                <a:latin typeface="Times New Roman" panose="02020603050405020304" pitchFamily="18" charset="0"/>
+                <a:cs typeface="Times New Roman" panose="02020603050405020304" pitchFamily="18" charset="0"/>
+                <a:sym typeface="Symbol" panose="05050102010706020507" pitchFamily="18" charset="2"/>
+              </a:rPr>
+              <a:t> </a:t>
+            </a:r>
+            <a:r>
+              <a:rPr lang="ru-RU" sz="1400" dirty="0" smtClean="0">
+                <a:solidFill>
+                  <a:schemeClr val="accent2">
+                    <a:lumMod val="75000"/>
+                  </a:schemeClr>
+                </a:solidFill>
+                <a:latin typeface="Times New Roman" panose="02020603050405020304" pitchFamily="18" charset="0"/>
+                <a:cs typeface="Times New Roman" panose="02020603050405020304" pitchFamily="18" charset="0"/>
+                <a:sym typeface="Symbol" panose="05050102010706020507" pitchFamily="18" charset="2"/>
+              </a:rPr>
+              <a:t>градуса</a:t>
+            </a:r>
+            <a:endParaRPr lang="ru-RU" sz="1400" dirty="0" smtClean="0">
+              <a:solidFill>
+                <a:schemeClr val="accent2">
+                  <a:lumMod val="75000"/>
+                </a:schemeClr>
+              </a:solidFill>
+              <a:latin typeface="Times New Roman" panose="02020603050405020304" pitchFamily="18" charset="0"/>
+              <a:cs typeface="Times New Roman" panose="02020603050405020304" pitchFamily="18" charset="0"/>
+            </a:endParaRPr>
+          </a:p>
+        </p:txBody>
+      </p:sp>
+    </p:spTree>
+    <p:extLst>
+      <p:ext uri="{BB962C8B-B14F-4D97-AF65-F5344CB8AC3E}">
+        <p14:creationId xmlns:p14="http://schemas.microsoft.com/office/powerpoint/2010/main" val="2035342914"/>
+      </p:ext>
+    </p:extLst>
+  </p:cSld>
+  <p:clrMapOvr>
+    <a:masterClrMapping/>
+  </p:clrMapOvr>
+</p:sld>
+</file>
+
+<file path=ppt/slides/slide12.xml><?xml version="1.0" encoding="utf-8"?>
+<p:sld xmlns:a="http://schemas.openxmlformats.org/drawingml/2006/main" xmlns:r="http://schemas.openxmlformats.org/officeDocument/2006/relationships" xmlns:p="http://schemas.openxmlformats.org/presentationml/2006/main">
+  <p:cSld>
+    <p:spTree>
+      <p:nvGrpSpPr>
+        <p:cNvPr id="1" name=""/>
+        <p:cNvGrpSpPr/>
+        <p:nvPr/>
+      </p:nvGrpSpPr>
+      <p:grpSpPr>
+        <a:xfrm>
+          <a:off x="0" y="0"/>
+          <a:ext cx="0" cy="0"/>
+          <a:chOff x="0" y="0"/>
+          <a:chExt cx="0" cy="0"/>
+        </a:xfrm>
+      </p:grpSpPr>
+      <p:sp>
+        <p:nvSpPr>
+          <p:cNvPr id="5" name="Прямоугольник 4"/>
+          <p:cNvSpPr/>
+          <p:nvPr/>
+        </p:nvSpPr>
+        <p:spPr>
+          <a:xfrm>
+            <a:off x="772357" y="414820"/>
+            <a:ext cx="11132598" cy="2040559"/>
+          </a:xfrm>
+          <a:prstGeom prst="rect">
+            <a:avLst/>
+          </a:prstGeom>
+        </p:spPr>
+        <p:txBody>
+          <a:bodyPr wrap="square">
+            <a:spAutoFit/>
+          </a:bodyPr>
+          <a:lstStyle/>
+          <a:p>
+            <a:pPr indent="182880" algn="ctr">
+              <a:lnSpc>
+                <a:spcPct val="95000"/>
+              </a:lnSpc>
+              <a:spcAft>
+                <a:spcPts val="600"/>
+              </a:spcAft>
+              <a:tabLst>
+                <a:tab pos="182880" algn="l"/>
+              </a:tabLst>
+            </a:pPr>
+            <a:r>
+              <a:rPr lang="ru-RU" sz="3200" dirty="0" smtClean="0">
+                <a:latin typeface="Times New Roman" panose="02020603050405020304" pitchFamily="18" charset="0"/>
+                <a:cs typeface="Times New Roman" panose="02020603050405020304" pitchFamily="18" charset="0"/>
+              </a:rPr>
+              <a:t>Компенсация параметрической неопределённости (внутреннее изменение рабочего давления и изменение атмосферного давления)</a:t>
+            </a:r>
+          </a:p>
+          <a:p>
+            <a:pPr indent="182880" algn="ctr">
+              <a:lnSpc>
+                <a:spcPct val="95000"/>
+              </a:lnSpc>
+              <a:spcAft>
+                <a:spcPts val="600"/>
+              </a:spcAft>
+              <a:tabLst>
+                <a:tab pos="182880" algn="l"/>
+              </a:tabLst>
+            </a:pPr>
+            <a:r>
+              <a:rPr lang="ru-RU" sz="3200" dirty="0" smtClean="0">
+                <a:latin typeface="Times New Roman" panose="02020603050405020304" pitchFamily="18" charset="0"/>
+                <a:cs typeface="Times New Roman" panose="02020603050405020304" pitchFamily="18" charset="0"/>
+              </a:rPr>
+              <a:t>(работа ПИ-регулятора)</a:t>
+            </a:r>
+            <a:endParaRPr lang="ru-RU" sz="3200" dirty="0" smtClean="0">
+              <a:latin typeface="Times New Roman" panose="02020603050405020304" pitchFamily="18" charset="0"/>
+              <a:cs typeface="Times New Roman" panose="02020603050405020304" pitchFamily="18" charset="0"/>
+            </a:endParaRPr>
+          </a:p>
+        </p:txBody>
+      </p:sp>
+    </p:spTree>
+    <p:extLst>
+      <p:ext uri="{BB962C8B-B14F-4D97-AF65-F5344CB8AC3E}">
+        <p14:creationId xmlns:p14="http://schemas.microsoft.com/office/powerpoint/2010/main" val="1545285824"/>
+      </p:ext>
+    </p:extLst>
+  </p:cSld>
+  <p:clrMapOvr>
+    <a:masterClrMapping/>
+  </p:clrMapOvr>
+</p:sld>
+</file>
+
+<file path=ppt/slides/slide13.xml><?xml version="1.0" encoding="utf-8"?>
+<p:sld xmlns:a="http://schemas.openxmlformats.org/drawingml/2006/main" xmlns:r="http://schemas.openxmlformats.org/officeDocument/2006/relationships" xmlns:p="http://schemas.openxmlformats.org/presentationml/2006/main">
+  <p:cSld>
+    <p:spTree>
+      <p:nvGrpSpPr>
+        <p:cNvPr id="1" name=""/>
+        <p:cNvGrpSpPr/>
+        <p:nvPr/>
+      </p:nvGrpSpPr>
+      <p:grpSpPr>
+        <a:xfrm>
+          <a:off x="0" y="0"/>
+          <a:ext cx="0" cy="0"/>
+          <a:chOff x="0" y="0"/>
+          <a:chExt cx="0" cy="0"/>
+        </a:xfrm>
+      </p:grpSpPr>
+      <p:pic>
+        <p:nvPicPr>
           <p:cNvPr id="2" name="Рисунок 1"/>
           <p:cNvPicPr>
             <a:picLocks noChangeAspect="1"/>
@@ -4263,7 +6377,7 @@
         </p:nvSpPr>
         <p:spPr>
           <a:xfrm>
-            <a:off x="7241641" y="879995"/>
+            <a:off x="1133804" y="1093059"/>
             <a:ext cx="3012068" cy="1261884"/>
           </a:xfrm>
           <a:prstGeom prst="rect">
@@ -4325,374 +6439,6 @@
           </a:p>
         </p:txBody>
       </p:sp>
-      <p:cxnSp>
-        <p:nvCxnSpPr>
-          <p:cNvPr id="6" name="Прямая со стрелкой 5"/>
-          <p:cNvCxnSpPr/>
-          <p:nvPr/>
-        </p:nvCxnSpPr>
-        <p:spPr>
-          <a:xfrm flipH="1" flipV="1">
-            <a:off x="887768" y="399496"/>
-            <a:ext cx="1335668" cy="601531"/>
-          </a:xfrm>
-          <a:prstGeom prst="straightConnector1">
-            <a:avLst/>
-          </a:prstGeom>
-          <a:ln w="31750">
-            <a:solidFill>
-              <a:schemeClr val="accent2">
-                <a:lumMod val="75000"/>
-              </a:schemeClr>
-            </a:solidFill>
-            <a:tailEnd type="triangle"/>
-          </a:ln>
-          <a:effectLst>
-            <a:glow rad="63500">
-              <a:schemeClr val="accent1">
-                <a:satMod val="175000"/>
-                <a:alpha val="40000"/>
-              </a:schemeClr>
-            </a:glow>
-          </a:effectLst>
-        </p:spPr>
-        <p:style>
-          <a:lnRef idx="1">
-            <a:schemeClr val="accent1"/>
-          </a:lnRef>
-          <a:fillRef idx="0">
-            <a:schemeClr val="accent1"/>
-          </a:fillRef>
-          <a:effectRef idx="0">
-            <a:schemeClr val="accent1"/>
-          </a:effectRef>
-          <a:fontRef idx="minor">
-            <a:schemeClr val="tx1"/>
-          </a:fontRef>
-        </p:style>
-      </p:cxnSp>
-      <p:cxnSp>
-        <p:nvCxnSpPr>
-          <p:cNvPr id="22" name="Прямая со стрелкой 21"/>
-          <p:cNvCxnSpPr/>
-          <p:nvPr/>
-        </p:nvCxnSpPr>
-        <p:spPr>
-          <a:xfrm flipH="1">
-            <a:off x="887768" y="1212783"/>
-            <a:ext cx="1335668" cy="375385"/>
-          </a:xfrm>
-          <a:prstGeom prst="straightConnector1">
-            <a:avLst/>
-          </a:prstGeom>
-          <a:ln w="31750">
-            <a:solidFill>
-              <a:schemeClr val="accent2">
-                <a:lumMod val="75000"/>
-              </a:schemeClr>
-            </a:solidFill>
-            <a:tailEnd type="triangle"/>
-          </a:ln>
-          <a:effectLst>
-            <a:glow rad="63500">
-              <a:schemeClr val="accent1">
-                <a:satMod val="175000"/>
-                <a:alpha val="40000"/>
-              </a:schemeClr>
-            </a:glow>
-          </a:effectLst>
-        </p:spPr>
-        <p:style>
-          <a:lnRef idx="1">
-            <a:schemeClr val="accent1"/>
-          </a:lnRef>
-          <a:fillRef idx="0">
-            <a:schemeClr val="accent1"/>
-          </a:fillRef>
-          <a:effectRef idx="0">
-            <a:schemeClr val="accent1"/>
-          </a:effectRef>
-          <a:fontRef idx="minor">
-            <a:schemeClr val="tx1"/>
-          </a:fontRef>
-        </p:style>
-      </p:cxnSp>
-      <p:cxnSp>
-        <p:nvCxnSpPr>
-          <p:cNvPr id="25" name="Прямая со стрелкой 24"/>
-          <p:cNvCxnSpPr/>
-          <p:nvPr/>
-        </p:nvCxnSpPr>
-        <p:spPr>
-          <a:xfrm flipH="1" flipV="1">
-            <a:off x="3696103" y="879995"/>
-            <a:ext cx="885522" cy="332293"/>
-          </a:xfrm>
-          <a:prstGeom prst="straightConnector1">
-            <a:avLst/>
-          </a:prstGeom>
-          <a:ln w="31750">
-            <a:solidFill>
-              <a:schemeClr val="accent2">
-                <a:lumMod val="75000"/>
-              </a:schemeClr>
-            </a:solidFill>
-            <a:tailEnd type="triangle"/>
-          </a:ln>
-          <a:effectLst>
-            <a:glow rad="63500">
-              <a:schemeClr val="accent1">
-                <a:satMod val="175000"/>
-                <a:alpha val="40000"/>
-              </a:schemeClr>
-            </a:glow>
-          </a:effectLst>
-        </p:spPr>
-        <p:style>
-          <a:lnRef idx="1">
-            <a:schemeClr val="accent1"/>
-          </a:lnRef>
-          <a:fillRef idx="0">
-            <a:schemeClr val="accent1"/>
-          </a:fillRef>
-          <a:effectRef idx="0">
-            <a:schemeClr val="accent1"/>
-          </a:effectRef>
-          <a:fontRef idx="minor">
-            <a:schemeClr val="tx1"/>
-          </a:fontRef>
-        </p:style>
-      </p:cxnSp>
-      <p:cxnSp>
-        <p:nvCxnSpPr>
-          <p:cNvPr id="29" name="Прямая со стрелкой 28"/>
-          <p:cNvCxnSpPr/>
-          <p:nvPr/>
-        </p:nvCxnSpPr>
-        <p:spPr>
-          <a:xfrm flipH="1">
-            <a:off x="3782729" y="539015"/>
-            <a:ext cx="798896" cy="161246"/>
-          </a:xfrm>
-          <a:prstGeom prst="straightConnector1">
-            <a:avLst/>
-          </a:prstGeom>
-          <a:ln w="31750">
-            <a:solidFill>
-              <a:schemeClr val="accent2">
-                <a:lumMod val="75000"/>
-              </a:schemeClr>
-            </a:solidFill>
-            <a:tailEnd type="triangle"/>
-          </a:ln>
-          <a:effectLst>
-            <a:glow rad="63500">
-              <a:schemeClr val="accent1">
-                <a:satMod val="175000"/>
-                <a:alpha val="40000"/>
-              </a:schemeClr>
-            </a:glow>
-          </a:effectLst>
-        </p:spPr>
-        <p:style>
-          <a:lnRef idx="1">
-            <a:schemeClr val="accent1"/>
-          </a:lnRef>
-          <a:fillRef idx="0">
-            <a:schemeClr val="accent1"/>
-          </a:fillRef>
-          <a:effectRef idx="0">
-            <a:schemeClr val="accent1"/>
-          </a:effectRef>
-          <a:fontRef idx="minor">
-            <a:schemeClr val="tx1"/>
-          </a:fontRef>
-        </p:style>
-      </p:cxnSp>
-      <p:cxnSp>
-        <p:nvCxnSpPr>
-          <p:cNvPr id="34" name="Прямая со стрелкой 33"/>
-          <p:cNvCxnSpPr/>
-          <p:nvPr/>
-        </p:nvCxnSpPr>
-        <p:spPr>
-          <a:xfrm>
-            <a:off x="3047999" y="2627697"/>
-            <a:ext cx="612326" cy="385805"/>
-          </a:xfrm>
-          <a:prstGeom prst="straightConnector1">
-            <a:avLst/>
-          </a:prstGeom>
-          <a:ln w="31750">
-            <a:solidFill>
-              <a:schemeClr val="accent2">
-                <a:lumMod val="75000"/>
-              </a:schemeClr>
-            </a:solidFill>
-            <a:tailEnd type="triangle"/>
-          </a:ln>
-          <a:effectLst>
-            <a:glow rad="63500">
-              <a:schemeClr val="accent1">
-                <a:satMod val="175000"/>
-                <a:alpha val="40000"/>
-              </a:schemeClr>
-            </a:glow>
-          </a:effectLst>
-        </p:spPr>
-        <p:style>
-          <a:lnRef idx="1">
-            <a:schemeClr val="accent1"/>
-          </a:lnRef>
-          <a:fillRef idx="0">
-            <a:schemeClr val="accent1"/>
-          </a:fillRef>
-          <a:effectRef idx="0">
-            <a:schemeClr val="accent1"/>
-          </a:effectRef>
-          <a:fontRef idx="minor">
-            <a:schemeClr val="tx1"/>
-          </a:fontRef>
-        </p:style>
-      </p:cxnSp>
-      <p:cxnSp>
-        <p:nvCxnSpPr>
-          <p:cNvPr id="35" name="Прямая со стрелкой 34"/>
-          <p:cNvCxnSpPr/>
-          <p:nvPr/>
-        </p:nvCxnSpPr>
-        <p:spPr>
-          <a:xfrm flipV="1">
-            <a:off x="3005297" y="1832870"/>
-            <a:ext cx="2769861" cy="259413"/>
-          </a:xfrm>
-          <a:prstGeom prst="straightConnector1">
-            <a:avLst/>
-          </a:prstGeom>
-          <a:ln w="31750">
-            <a:solidFill>
-              <a:schemeClr val="accent2">
-                <a:lumMod val="75000"/>
-              </a:schemeClr>
-            </a:solidFill>
-            <a:tailEnd type="triangle"/>
-          </a:ln>
-          <a:effectLst>
-            <a:glow rad="63500">
-              <a:schemeClr val="accent1">
-                <a:satMod val="175000"/>
-                <a:alpha val="40000"/>
-              </a:schemeClr>
-            </a:glow>
-          </a:effectLst>
-        </p:spPr>
-        <p:style>
-          <a:lnRef idx="1">
-            <a:schemeClr val="accent1"/>
-          </a:lnRef>
-          <a:fillRef idx="0">
-            <a:schemeClr val="accent1"/>
-          </a:fillRef>
-          <a:effectRef idx="0">
-            <a:schemeClr val="accent1"/>
-          </a:effectRef>
-          <a:fontRef idx="minor">
-            <a:schemeClr val="tx1"/>
-          </a:fontRef>
-        </p:style>
-      </p:cxnSp>
-      <p:cxnSp>
-        <p:nvCxnSpPr>
-          <p:cNvPr id="39" name="Прямая со стрелкой 38"/>
-          <p:cNvCxnSpPr/>
-          <p:nvPr/>
-        </p:nvCxnSpPr>
-        <p:spPr>
-          <a:xfrm flipV="1">
-            <a:off x="3047999" y="3429000"/>
-            <a:ext cx="534815" cy="292573"/>
-          </a:xfrm>
-          <a:prstGeom prst="straightConnector1">
-            <a:avLst/>
-          </a:prstGeom>
-          <a:ln w="31750">
-            <a:solidFill>
-              <a:schemeClr val="accent2">
-                <a:lumMod val="75000"/>
-              </a:schemeClr>
-            </a:solidFill>
-            <a:tailEnd type="triangle"/>
-          </a:ln>
-          <a:effectLst>
-            <a:glow rad="63500">
-              <a:schemeClr val="accent1">
-                <a:satMod val="175000"/>
-                <a:alpha val="40000"/>
-              </a:schemeClr>
-            </a:glow>
-          </a:effectLst>
-        </p:spPr>
-        <p:style>
-          <a:lnRef idx="1">
-            <a:schemeClr val="accent1"/>
-          </a:lnRef>
-          <a:fillRef idx="0">
-            <a:schemeClr val="accent1"/>
-          </a:fillRef>
-          <a:effectRef idx="0">
-            <a:schemeClr val="accent1"/>
-          </a:effectRef>
-          <a:fontRef idx="minor">
-            <a:schemeClr val="tx1"/>
-          </a:fontRef>
-        </p:style>
-      </p:cxnSp>
-      <p:cxnSp>
-        <p:nvCxnSpPr>
-          <p:cNvPr id="40" name="Прямая со стрелкой 39"/>
-          <p:cNvCxnSpPr/>
-          <p:nvPr/>
-        </p:nvCxnSpPr>
-        <p:spPr>
-          <a:xfrm>
-            <a:off x="3047999" y="4243562"/>
-            <a:ext cx="2727159" cy="212935"/>
-          </a:xfrm>
-          <a:prstGeom prst="straightConnector1">
-            <a:avLst/>
-          </a:prstGeom>
-          <a:ln w="31750">
-            <a:solidFill>
-              <a:schemeClr val="accent2">
-                <a:lumMod val="75000"/>
-              </a:schemeClr>
-            </a:solidFill>
-            <a:tailEnd type="triangle"/>
-          </a:ln>
-          <a:effectLst>
-            <a:glow rad="63500">
-              <a:schemeClr val="accent1">
-                <a:satMod val="175000"/>
-                <a:alpha val="40000"/>
-              </a:schemeClr>
-            </a:glow>
-          </a:effectLst>
-        </p:spPr>
-        <p:style>
-          <a:lnRef idx="1">
-            <a:schemeClr val="accent1"/>
-          </a:lnRef>
-          <a:fillRef idx="0">
-            <a:schemeClr val="accent1"/>
-          </a:fillRef>
-          <a:effectRef idx="0">
-            <a:schemeClr val="accent1"/>
-          </a:effectRef>
-          <a:fontRef idx="minor">
-            <a:schemeClr val="tx1"/>
-          </a:fontRef>
-        </p:style>
-      </p:cxnSp>
       <p:sp>
         <p:nvSpPr>
           <p:cNvPr id="45" name="Прямоугольник 44"/>
@@ -4835,476 +6581,6 @@
           </a:p>
         </p:txBody>
       </p:sp>
-      <p:sp>
-        <p:nvSpPr>
-          <p:cNvPr id="49" name="Прямоугольник 48"/>
-          <p:cNvSpPr/>
-          <p:nvPr/>
-        </p:nvSpPr>
-        <p:spPr>
-          <a:xfrm>
-            <a:off x="2089626" y="809901"/>
-            <a:ext cx="1324456" cy="297004"/>
-          </a:xfrm>
-          <a:prstGeom prst="rect">
-            <a:avLst/>
-          </a:prstGeom>
-        </p:spPr>
-        <p:txBody>
-          <a:bodyPr wrap="square">
-            <a:spAutoFit/>
-          </a:bodyPr>
-          <a:lstStyle/>
-          <a:p>
-            <a:pPr indent="182880">
-              <a:lnSpc>
-                <a:spcPct val="95000"/>
-              </a:lnSpc>
-              <a:spcAft>
-                <a:spcPts val="600"/>
-              </a:spcAft>
-              <a:tabLst>
-                <a:tab pos="182880" algn="l"/>
-              </a:tabLst>
-            </a:pPr>
-            <a:r>
-              <a:rPr lang="ru-RU" sz="1400" dirty="0" smtClean="0">
-                <a:solidFill>
-                  <a:schemeClr val="accent2">
-                    <a:lumMod val="75000"/>
-                  </a:schemeClr>
-                </a:solidFill>
-                <a:latin typeface="Times New Roman" panose="02020603050405020304" pitchFamily="18" charset="0"/>
-                <a:cs typeface="Times New Roman" panose="02020603050405020304" pitchFamily="18" charset="0"/>
-              </a:rPr>
-              <a:t>160.3777</a:t>
-            </a:r>
-          </a:p>
-        </p:txBody>
-      </p:sp>
-      <p:sp>
-        <p:nvSpPr>
-          <p:cNvPr id="50" name="Прямоугольник 49"/>
-          <p:cNvSpPr/>
-          <p:nvPr/>
-        </p:nvSpPr>
-        <p:spPr>
-          <a:xfrm>
-            <a:off x="2080531" y="1127456"/>
-            <a:ext cx="1324456" cy="297004"/>
-          </a:xfrm>
-          <a:prstGeom prst="rect">
-            <a:avLst/>
-          </a:prstGeom>
-        </p:spPr>
-        <p:txBody>
-          <a:bodyPr wrap="square">
-            <a:spAutoFit/>
-          </a:bodyPr>
-          <a:lstStyle/>
-          <a:p>
-            <a:pPr indent="182880">
-              <a:lnSpc>
-                <a:spcPct val="95000"/>
-              </a:lnSpc>
-              <a:spcAft>
-                <a:spcPts val="600"/>
-              </a:spcAft>
-              <a:tabLst>
-                <a:tab pos="182880" algn="l"/>
-              </a:tabLst>
-            </a:pPr>
-            <a:r>
-              <a:rPr lang="ru-RU" sz="1400" dirty="0" smtClean="0">
-                <a:solidFill>
-                  <a:schemeClr val="accent2">
-                    <a:lumMod val="75000"/>
-                  </a:schemeClr>
-                </a:solidFill>
-                <a:latin typeface="Times New Roman" panose="02020603050405020304" pitchFamily="18" charset="0"/>
-                <a:cs typeface="Times New Roman" panose="02020603050405020304" pitchFamily="18" charset="0"/>
-              </a:rPr>
-              <a:t>159.1571</a:t>
-            </a:r>
-          </a:p>
-        </p:txBody>
-      </p:sp>
-      <p:sp>
-        <p:nvSpPr>
-          <p:cNvPr id="51" name="Прямоугольник 50"/>
-          <p:cNvSpPr/>
-          <p:nvPr/>
-        </p:nvSpPr>
-        <p:spPr>
-          <a:xfrm>
-            <a:off x="4438327" y="368690"/>
-            <a:ext cx="1324456" cy="297004"/>
-          </a:xfrm>
-          <a:prstGeom prst="rect">
-            <a:avLst/>
-          </a:prstGeom>
-        </p:spPr>
-        <p:txBody>
-          <a:bodyPr wrap="square">
-            <a:spAutoFit/>
-          </a:bodyPr>
-          <a:lstStyle/>
-          <a:p>
-            <a:pPr indent="182880">
-              <a:lnSpc>
-                <a:spcPct val="95000"/>
-              </a:lnSpc>
-              <a:spcAft>
-                <a:spcPts val="600"/>
-              </a:spcAft>
-              <a:tabLst>
-                <a:tab pos="182880" algn="l"/>
-              </a:tabLst>
-            </a:pPr>
-            <a:r>
-              <a:rPr lang="ru-RU" sz="1400" dirty="0" smtClean="0">
-                <a:solidFill>
-                  <a:schemeClr val="accent2">
-                    <a:lumMod val="75000"/>
-                  </a:schemeClr>
-                </a:solidFill>
-                <a:latin typeface="Times New Roman" panose="02020603050405020304" pitchFamily="18" charset="0"/>
-                <a:cs typeface="Times New Roman" panose="02020603050405020304" pitchFamily="18" charset="0"/>
-              </a:rPr>
-              <a:t>160.0104</a:t>
-            </a:r>
-          </a:p>
-        </p:txBody>
-      </p:sp>
-      <p:sp>
-        <p:nvSpPr>
-          <p:cNvPr id="52" name="Прямоугольник 51"/>
-          <p:cNvSpPr/>
-          <p:nvPr/>
-        </p:nvSpPr>
-        <p:spPr>
-          <a:xfrm>
-            <a:off x="4438327" y="1063029"/>
-            <a:ext cx="1324456" cy="297004"/>
-          </a:xfrm>
-          <a:prstGeom prst="rect">
-            <a:avLst/>
-          </a:prstGeom>
-        </p:spPr>
-        <p:txBody>
-          <a:bodyPr wrap="square">
-            <a:spAutoFit/>
-          </a:bodyPr>
-          <a:lstStyle/>
-          <a:p>
-            <a:pPr indent="182880">
-              <a:lnSpc>
-                <a:spcPct val="95000"/>
-              </a:lnSpc>
-              <a:spcAft>
-                <a:spcPts val="600"/>
-              </a:spcAft>
-              <a:tabLst>
-                <a:tab pos="182880" algn="l"/>
-              </a:tabLst>
-            </a:pPr>
-            <a:r>
-              <a:rPr lang="ru-RU" sz="1400" dirty="0" smtClean="0">
-                <a:solidFill>
-                  <a:schemeClr val="accent2">
-                    <a:lumMod val="75000"/>
-                  </a:schemeClr>
-                </a:solidFill>
-                <a:latin typeface="Times New Roman" panose="02020603050405020304" pitchFamily="18" charset="0"/>
-                <a:cs typeface="Times New Roman" panose="02020603050405020304" pitchFamily="18" charset="0"/>
-              </a:rPr>
-              <a:t>159.9098</a:t>
-            </a:r>
-          </a:p>
-        </p:txBody>
-      </p:sp>
-      <p:sp>
-        <p:nvSpPr>
-          <p:cNvPr id="53" name="Прямоугольник 52"/>
-          <p:cNvSpPr/>
-          <p:nvPr/>
-        </p:nvSpPr>
-        <p:spPr>
-          <a:xfrm>
-            <a:off x="2080531" y="2398574"/>
-            <a:ext cx="1324456" cy="297004"/>
-          </a:xfrm>
-          <a:prstGeom prst="rect">
-            <a:avLst/>
-          </a:prstGeom>
-        </p:spPr>
-        <p:txBody>
-          <a:bodyPr wrap="square">
-            <a:spAutoFit/>
-          </a:bodyPr>
-          <a:lstStyle/>
-          <a:p>
-            <a:pPr indent="182880">
-              <a:lnSpc>
-                <a:spcPct val="95000"/>
-              </a:lnSpc>
-              <a:spcAft>
-                <a:spcPts val="600"/>
-              </a:spcAft>
-              <a:tabLst>
-                <a:tab pos="182880" algn="l"/>
-              </a:tabLst>
-            </a:pPr>
-            <a:r>
-              <a:rPr lang="ru-RU" sz="1400" dirty="0" smtClean="0">
-                <a:solidFill>
-                  <a:schemeClr val="accent2">
-                    <a:lumMod val="75000"/>
-                  </a:schemeClr>
-                </a:solidFill>
-                <a:latin typeface="Times New Roman" panose="02020603050405020304" pitchFamily="18" charset="0"/>
-                <a:cs typeface="Times New Roman" panose="02020603050405020304" pitchFamily="18" charset="0"/>
-              </a:rPr>
-              <a:t>0.2652</a:t>
-            </a:r>
-          </a:p>
-        </p:txBody>
-      </p:sp>
-      <p:sp>
-        <p:nvSpPr>
-          <p:cNvPr id="54" name="Прямоугольник 53"/>
-          <p:cNvSpPr/>
-          <p:nvPr/>
-        </p:nvSpPr>
-        <p:spPr>
-          <a:xfrm>
-            <a:off x="2072974" y="1930288"/>
-            <a:ext cx="932323" cy="297004"/>
-          </a:xfrm>
-          <a:prstGeom prst="rect">
-            <a:avLst/>
-          </a:prstGeom>
-        </p:spPr>
-        <p:txBody>
-          <a:bodyPr wrap="square">
-            <a:spAutoFit/>
-          </a:bodyPr>
-          <a:lstStyle/>
-          <a:p>
-            <a:pPr indent="182880">
-              <a:lnSpc>
-                <a:spcPct val="95000"/>
-              </a:lnSpc>
-              <a:spcAft>
-                <a:spcPts val="600"/>
-              </a:spcAft>
-              <a:tabLst>
-                <a:tab pos="182880" algn="l"/>
-              </a:tabLst>
-            </a:pPr>
-            <a:r>
-              <a:rPr lang="ru-RU" sz="1400" dirty="0" smtClean="0">
-                <a:solidFill>
-                  <a:schemeClr val="accent2">
-                    <a:lumMod val="75000"/>
-                  </a:schemeClr>
-                </a:solidFill>
-                <a:latin typeface="Times New Roman" panose="02020603050405020304" pitchFamily="18" charset="0"/>
-                <a:cs typeface="Times New Roman" panose="02020603050405020304" pitchFamily="18" charset="0"/>
-              </a:rPr>
-              <a:t>0.5539</a:t>
-            </a:r>
-          </a:p>
-        </p:txBody>
-      </p:sp>
-      <p:cxnSp>
-        <p:nvCxnSpPr>
-          <p:cNvPr id="56" name="Прямая со стрелкой 55"/>
-          <p:cNvCxnSpPr>
-            <a:stCxn id="54" idx="1"/>
-          </p:cNvCxnSpPr>
-          <p:nvPr/>
-        </p:nvCxnSpPr>
-        <p:spPr>
-          <a:xfrm flipH="1" flipV="1">
-            <a:off x="798990" y="1850783"/>
-            <a:ext cx="1273984" cy="228007"/>
-          </a:xfrm>
-          <a:prstGeom prst="straightConnector1">
-            <a:avLst/>
-          </a:prstGeom>
-          <a:ln w="31750">
-            <a:solidFill>
-              <a:schemeClr val="accent2">
-                <a:lumMod val="75000"/>
-              </a:schemeClr>
-            </a:solidFill>
-            <a:tailEnd type="triangle"/>
-          </a:ln>
-          <a:effectLst>
-            <a:glow rad="63500">
-              <a:schemeClr val="accent1">
-                <a:satMod val="175000"/>
-                <a:alpha val="40000"/>
-              </a:schemeClr>
-            </a:glow>
-          </a:effectLst>
-        </p:spPr>
-        <p:style>
-          <a:lnRef idx="1">
-            <a:schemeClr val="accent1"/>
-          </a:lnRef>
-          <a:fillRef idx="0">
-            <a:schemeClr val="accent1"/>
-          </a:fillRef>
-          <a:effectRef idx="0">
-            <a:schemeClr val="accent1"/>
-          </a:effectRef>
-          <a:fontRef idx="minor">
-            <a:schemeClr val="tx1"/>
-          </a:fontRef>
-        </p:style>
-      </p:cxnSp>
-      <p:sp>
-        <p:nvSpPr>
-          <p:cNvPr id="62" name="Прямоугольник 61"/>
-          <p:cNvSpPr/>
-          <p:nvPr/>
-        </p:nvSpPr>
-        <p:spPr>
-          <a:xfrm>
-            <a:off x="2072975" y="3588921"/>
-            <a:ext cx="1051965" cy="297004"/>
-          </a:xfrm>
-          <a:prstGeom prst="rect">
-            <a:avLst/>
-          </a:prstGeom>
-        </p:spPr>
-        <p:txBody>
-          <a:bodyPr wrap="square">
-            <a:spAutoFit/>
-          </a:bodyPr>
-          <a:lstStyle/>
-          <a:p>
-            <a:pPr indent="182880">
-              <a:lnSpc>
-                <a:spcPct val="95000"/>
-              </a:lnSpc>
-              <a:spcAft>
-                <a:spcPts val="600"/>
-              </a:spcAft>
-              <a:tabLst>
-                <a:tab pos="182880" algn="l"/>
-              </a:tabLst>
-            </a:pPr>
-            <a:r>
-              <a:rPr lang="ru-RU" sz="1400" dirty="0" smtClean="0">
-                <a:solidFill>
-                  <a:schemeClr val="accent2">
-                    <a:lumMod val="75000"/>
-                  </a:schemeClr>
-                </a:solidFill>
-                <a:latin typeface="Times New Roman" panose="02020603050405020304" pitchFamily="18" charset="0"/>
-                <a:cs typeface="Times New Roman" panose="02020603050405020304" pitchFamily="18" charset="0"/>
-              </a:rPr>
-              <a:t>53.1982</a:t>
-            </a:r>
-          </a:p>
-        </p:txBody>
-      </p:sp>
-      <p:sp>
-        <p:nvSpPr>
-          <p:cNvPr id="63" name="Прямоугольник 62"/>
-          <p:cNvSpPr/>
-          <p:nvPr/>
-        </p:nvSpPr>
-        <p:spPr>
-          <a:xfrm>
-            <a:off x="2072974" y="4079988"/>
-            <a:ext cx="1051965" cy="297004"/>
-          </a:xfrm>
-          <a:prstGeom prst="rect">
-            <a:avLst/>
-          </a:prstGeom>
-        </p:spPr>
-        <p:txBody>
-          <a:bodyPr wrap="square">
-            <a:spAutoFit/>
-          </a:bodyPr>
-          <a:lstStyle/>
-          <a:p>
-            <a:pPr indent="182880">
-              <a:lnSpc>
-                <a:spcPct val="95000"/>
-              </a:lnSpc>
-              <a:spcAft>
-                <a:spcPts val="600"/>
-              </a:spcAft>
-              <a:tabLst>
-                <a:tab pos="182880" algn="l"/>
-              </a:tabLst>
-            </a:pPr>
-            <a:r>
-              <a:rPr lang="ru-RU" sz="1400" dirty="0" smtClean="0">
-                <a:solidFill>
-                  <a:schemeClr val="accent2">
-                    <a:lumMod val="75000"/>
-                  </a:schemeClr>
-                </a:solidFill>
-                <a:latin typeface="Times New Roman" panose="02020603050405020304" pitchFamily="18" charset="0"/>
-                <a:cs typeface="Times New Roman" panose="02020603050405020304" pitchFamily="18" charset="0"/>
-              </a:rPr>
-              <a:t>50.4799</a:t>
-            </a:r>
-          </a:p>
-        </p:txBody>
-      </p:sp>
-      <p:cxnSp>
-        <p:nvCxnSpPr>
-          <p:cNvPr id="65" name="Прямая со стрелкой 64"/>
-          <p:cNvCxnSpPr/>
-          <p:nvPr/>
-        </p:nvCxnSpPr>
-        <p:spPr>
-          <a:xfrm flipH="1">
-            <a:off x="798990" y="4243562"/>
-            <a:ext cx="1424446" cy="184666"/>
-          </a:xfrm>
-          <a:prstGeom prst="straightConnector1">
-            <a:avLst/>
-          </a:prstGeom>
-          <a:ln w="31750">
-            <a:solidFill>
-              <a:schemeClr val="accent2">
-                <a:lumMod val="75000"/>
-              </a:schemeClr>
-            </a:solidFill>
-            <a:tailEnd type="triangle"/>
-          </a:ln>
-          <a:effectLst>
-            <a:glow rad="63500">
-              <a:schemeClr val="accent1">
-                <a:satMod val="175000"/>
-                <a:alpha val="40000"/>
-              </a:schemeClr>
-            </a:glow>
-          </a:effectLst>
-        </p:spPr>
-        <p:style>
-          <a:lnRef idx="1">
-            <a:schemeClr val="accent1"/>
-          </a:lnRef>
-          <a:fillRef idx="0">
-            <a:schemeClr val="accent1"/>
-          </a:fillRef>
-          <a:effectRef idx="0">
-            <a:schemeClr val="accent1"/>
-          </a:effectRef>
-          <a:fontRef idx="minor">
-            <a:schemeClr val="tx1"/>
-          </a:fontRef>
-        </p:style>
-      </p:cxnSp>
       <p:sp>
         <p:nvSpPr>
           <p:cNvPr id="73" name="Прямоугольник 72"/>
@@ -8565,10 +9841,6 @@
               </a:rPr>
               <a:t>Попытка реализации модального регулирования</a:t>
             </a:r>
-            <a:endParaRPr lang="ru-RU" sz="3200" dirty="0" smtClean="0">
-              <a:latin typeface="Times New Roman" panose="02020603050405020304" pitchFamily="18" charset="0"/>
-              <a:cs typeface="Times New Roman" panose="02020603050405020304" pitchFamily="18" charset="0"/>
-            </a:endParaRPr>
           </a:p>
         </p:txBody>
       </p:sp>
@@ -8602,9 +9874,195 @@
           <a:chExt cx="0" cy="0"/>
         </a:xfrm>
       </p:grpSpPr>
+      <p:sp>
+        <p:nvSpPr>
+          <p:cNvPr id="5" name="Прямоугольник 4"/>
+          <p:cNvSpPr/>
+          <p:nvPr/>
+        </p:nvSpPr>
+        <p:spPr>
+          <a:xfrm>
+            <a:off x="2633135" y="414820"/>
+            <a:ext cx="7332955" cy="1027974"/>
+          </a:xfrm>
+          <a:prstGeom prst="rect">
+            <a:avLst/>
+          </a:prstGeom>
+        </p:spPr>
+        <p:txBody>
+          <a:bodyPr wrap="square">
+            <a:spAutoFit/>
+          </a:bodyPr>
+          <a:lstStyle/>
+          <a:p>
+            <a:pPr indent="182880" algn="ctr">
+              <a:lnSpc>
+                <a:spcPct val="95000"/>
+              </a:lnSpc>
+              <a:spcAft>
+                <a:spcPts val="600"/>
+              </a:spcAft>
+              <a:tabLst>
+                <a:tab pos="182880" algn="l"/>
+              </a:tabLst>
+            </a:pPr>
+            <a:r>
+              <a:rPr lang="ru-RU" sz="3200" dirty="0" smtClean="0">
+                <a:latin typeface="Times New Roman" panose="02020603050405020304" pitchFamily="18" charset="0"/>
+                <a:cs typeface="Times New Roman" panose="02020603050405020304" pitchFamily="18" charset="0"/>
+              </a:rPr>
+              <a:t>Компенсация внешнего возмущения (работа ПИ-регулятора)</a:t>
+            </a:r>
+            <a:endParaRPr lang="ru-RU" sz="3200" dirty="0" smtClean="0">
+              <a:latin typeface="Times New Roman" panose="02020603050405020304" pitchFamily="18" charset="0"/>
+              <a:cs typeface="Times New Roman" panose="02020603050405020304" pitchFamily="18" charset="0"/>
+            </a:endParaRPr>
+          </a:p>
+        </p:txBody>
+      </p:sp>
+      <p:sp>
+        <p:nvSpPr>
+          <p:cNvPr id="6" name="TextBox 5"/>
+          <p:cNvSpPr txBox="1"/>
+          <p:nvPr/>
+        </p:nvSpPr>
+        <p:spPr>
+          <a:xfrm>
+            <a:off x="5379868" y="2578834"/>
+            <a:ext cx="6695573" cy="3046988"/>
+          </a:xfrm>
+          <a:prstGeom prst="rect">
+            <a:avLst/>
+          </a:prstGeom>
+          <a:noFill/>
+        </p:spPr>
+        <p:txBody>
+          <a:bodyPr wrap="square" rtlCol="0">
+            <a:spAutoFit/>
+          </a:bodyPr>
+          <a:lstStyle/>
+          <a:p>
+            <a:r>
+              <a:rPr lang="ru-RU" sz="1600" dirty="0" smtClean="0">
+                <a:solidFill>
+                  <a:schemeClr val="accent2">
+                    <a:lumMod val="75000"/>
+                  </a:schemeClr>
+                </a:solidFill>
+                <a:latin typeface="Times New Roman" panose="02020603050405020304" pitchFamily="18" charset="0"/>
+                <a:cs typeface="Times New Roman" panose="02020603050405020304" pitchFamily="18" charset="0"/>
+              </a:rPr>
+              <a:t>Разработка адаптивного регулятора для компенсации внешнего возмущения по температуре стенок, является не целесообразна по причине абсурдности компенсации, которое может привести к ЧП.</a:t>
+            </a:r>
+            <a:br>
+              <a:rPr lang="ru-RU" sz="1600" dirty="0" smtClean="0">
+                <a:solidFill>
+                  <a:schemeClr val="accent2">
+                    <a:lumMod val="75000"/>
+                  </a:schemeClr>
+                </a:solidFill>
+                <a:latin typeface="Times New Roman" panose="02020603050405020304" pitchFamily="18" charset="0"/>
+                <a:cs typeface="Times New Roman" panose="02020603050405020304" pitchFamily="18" charset="0"/>
+              </a:rPr>
+            </a:br>
+            <a:r>
+              <a:rPr lang="ru-RU" sz="1600" dirty="0" smtClean="0">
+                <a:solidFill>
+                  <a:schemeClr val="accent2">
+                    <a:lumMod val="75000"/>
+                  </a:schemeClr>
+                </a:solidFill>
+                <a:latin typeface="Times New Roman" panose="02020603050405020304" pitchFamily="18" charset="0"/>
+                <a:cs typeface="Times New Roman" panose="02020603050405020304" pitchFamily="18" charset="0"/>
+              </a:rPr>
+              <a:t/>
+            </a:r>
+            <a:br>
+              <a:rPr lang="ru-RU" sz="1600" dirty="0" smtClean="0">
+                <a:solidFill>
+                  <a:schemeClr val="accent2">
+                    <a:lumMod val="75000"/>
+                  </a:schemeClr>
+                </a:solidFill>
+                <a:latin typeface="Times New Roman" panose="02020603050405020304" pitchFamily="18" charset="0"/>
+                <a:cs typeface="Times New Roman" panose="02020603050405020304" pitchFamily="18" charset="0"/>
+              </a:rPr>
+            </a:br>
+            <a:r>
+              <a:rPr lang="ru-RU" sz="1600" dirty="0" smtClean="0">
+                <a:solidFill>
+                  <a:schemeClr val="accent2">
+                    <a:lumMod val="75000"/>
+                  </a:schemeClr>
+                </a:solidFill>
+                <a:latin typeface="Times New Roman" panose="02020603050405020304" pitchFamily="18" charset="0"/>
+                <a:cs typeface="Times New Roman" panose="02020603050405020304" pitchFamily="18" charset="0"/>
+              </a:rPr>
+              <a:t>Если и стоит регулировать данное явление, то только в формате перевода всей системы «АВО-РК-Испаритель» в режим отключения от остальной системы.</a:t>
+            </a:r>
+            <a:br>
+              <a:rPr lang="ru-RU" sz="1600" dirty="0" smtClean="0">
+                <a:solidFill>
+                  <a:schemeClr val="accent2">
+                    <a:lumMod val="75000"/>
+                  </a:schemeClr>
+                </a:solidFill>
+                <a:latin typeface="Times New Roman" panose="02020603050405020304" pitchFamily="18" charset="0"/>
+                <a:cs typeface="Times New Roman" panose="02020603050405020304" pitchFamily="18" charset="0"/>
+              </a:rPr>
+            </a:br>
+            <a:r>
+              <a:rPr lang="ru-RU" sz="1600" dirty="0" smtClean="0">
+                <a:solidFill>
+                  <a:schemeClr val="accent2">
+                    <a:lumMod val="75000"/>
+                  </a:schemeClr>
+                </a:solidFill>
+                <a:latin typeface="Times New Roman" panose="02020603050405020304" pitchFamily="18" charset="0"/>
+                <a:cs typeface="Times New Roman" panose="02020603050405020304" pitchFamily="18" charset="0"/>
+              </a:rPr>
+              <a:t/>
+            </a:r>
+            <a:br>
+              <a:rPr lang="ru-RU" sz="1600" dirty="0" smtClean="0">
+                <a:solidFill>
+                  <a:schemeClr val="accent2">
+                    <a:lumMod val="75000"/>
+                  </a:schemeClr>
+                </a:solidFill>
+                <a:latin typeface="Times New Roman" panose="02020603050405020304" pitchFamily="18" charset="0"/>
+                <a:cs typeface="Times New Roman" panose="02020603050405020304" pitchFamily="18" charset="0"/>
+              </a:rPr>
+            </a:br>
+            <a:r>
+              <a:rPr lang="ru-RU" sz="1600" dirty="0" smtClean="0">
+                <a:solidFill>
+                  <a:schemeClr val="accent2">
+                    <a:lumMod val="75000"/>
+                  </a:schemeClr>
+                </a:solidFill>
+                <a:latin typeface="Times New Roman" panose="02020603050405020304" pitchFamily="18" charset="0"/>
+                <a:cs typeface="Times New Roman" panose="02020603050405020304" pitchFamily="18" charset="0"/>
+              </a:rPr>
+              <a:t>В связи с этим, единственными внешними возмущениями оказываемыми на систему остаются температура жидкости и концентрация влаги в жидкости в исходной смеси.</a:t>
+            </a:r>
+          </a:p>
+          <a:p>
+            <a:endParaRPr lang="ru-RU" sz="1600" dirty="0" smtClean="0">
+              <a:solidFill>
+                <a:schemeClr val="accent2">
+                  <a:lumMod val="75000"/>
+                </a:schemeClr>
+              </a:solidFill>
+              <a:latin typeface="Times New Roman" panose="02020603050405020304" pitchFamily="18" charset="0"/>
+              <a:cs typeface="Times New Roman" panose="02020603050405020304" pitchFamily="18" charset="0"/>
+            </a:endParaRPr>
+          </a:p>
+        </p:txBody>
+      </p:sp>
       <p:pic>
         <p:nvPicPr>
-          <p:cNvPr id="4" name="Рисунок 3"/>
+          <p:cNvPr id="2" name="Рисунок 1"/>
           <p:cNvPicPr>
             <a:picLocks noChangeAspect="1"/>
           </p:cNvPicPr>
@@ -8618,8 +10076,8 @@
         </p:blipFill>
         <p:spPr>
           <a:xfrm>
-            <a:off x="2259789" y="671521"/>
-            <a:ext cx="7727432" cy="3866891"/>
+            <a:off x="499138" y="2693578"/>
+            <a:ext cx="4516747" cy="1585403"/>
           </a:xfrm>
           <a:prstGeom prst="rect">
             <a:avLst/>
@@ -8628,61 +10086,74 @@
       </p:pic>
       <p:sp>
         <p:nvSpPr>
-          <p:cNvPr id="5" name="Прямоугольник 4"/>
+          <p:cNvPr id="7" name="Прямоугольник 6"/>
           <p:cNvSpPr/>
           <p:nvPr/>
         </p:nvSpPr>
         <p:spPr>
           <a:xfrm>
-            <a:off x="3813133" y="323408"/>
-            <a:ext cx="4620745" cy="560153"/>
-          </a:xfrm>
-          <a:prstGeom prst="rect">
-            <a:avLst/>
-          </a:prstGeom>
-        </p:spPr>
-        <p:txBody>
-          <a:bodyPr wrap="square">
-            <a:spAutoFit/>
-          </a:bodyPr>
-          <a:lstStyle/>
-          <a:p>
-            <a:pPr indent="182880" algn="ctr">
-              <a:lnSpc>
-                <a:spcPct val="95000"/>
-              </a:lnSpc>
-              <a:spcAft>
-                <a:spcPts val="600"/>
-              </a:spcAft>
-              <a:tabLst>
-                <a:tab pos="182880" algn="l"/>
-              </a:tabLst>
-            </a:pPr>
-            <a:r>
-              <a:rPr lang="ru-RU" sz="3200" dirty="0" smtClean="0">
-                <a:latin typeface="Times New Roman" panose="02020603050405020304" pitchFamily="18" charset="0"/>
-                <a:cs typeface="Times New Roman" panose="02020603050405020304" pitchFamily="18" charset="0"/>
-              </a:rPr>
-              <a:t>Сигнальная адаптация</a:t>
-            </a:r>
-          </a:p>
-        </p:txBody>
-      </p:sp>
-      <p:sp>
-        <p:nvSpPr>
-          <p:cNvPr id="6" name="TextBox 5"/>
-          <p:cNvSpPr txBox="1"/>
-          <p:nvPr/>
-        </p:nvSpPr>
-        <p:spPr>
-          <a:xfrm>
-            <a:off x="221943" y="4549676"/>
-            <a:ext cx="12137584" cy="2308324"/>
+            <a:off x="499137" y="2693577"/>
+            <a:ext cx="4516747" cy="1585403"/>
           </a:xfrm>
           <a:prstGeom prst="rect">
             <a:avLst/>
           </a:prstGeom>
           <a:noFill/>
+          <a:ln w="50800">
+            <a:solidFill>
+              <a:schemeClr val="accent2">
+                <a:lumMod val="75000"/>
+              </a:schemeClr>
+            </a:solidFill>
+            <a:round/>
+          </a:ln>
+        </p:spPr>
+        <p:style>
+          <a:lnRef idx="2">
+            <a:schemeClr val="accent1">
+              <a:shade val="50000"/>
+            </a:schemeClr>
+          </a:lnRef>
+          <a:fillRef idx="1">
+            <a:schemeClr val="accent1"/>
+          </a:fillRef>
+          <a:effectRef idx="0">
+            <a:schemeClr val="accent1"/>
+          </a:effectRef>
+          <a:fontRef idx="minor">
+            <a:schemeClr val="lt1"/>
+          </a:fontRef>
+        </p:style>
+        <p:txBody>
+          <a:bodyPr rtlCol="0" anchor="ctr"/>
+          <a:lstStyle/>
+          <a:p>
+            <a:pPr algn="ctr"/>
+            <a:endParaRPr lang="ru-RU">
+              <a:solidFill>
+                <a:schemeClr val="accent2">
+                  <a:lumMod val="75000"/>
+                </a:schemeClr>
+              </a:solidFill>
+            </a:endParaRPr>
+          </a:p>
+        </p:txBody>
+      </p:sp>
+      <p:sp>
+        <p:nvSpPr>
+          <p:cNvPr id="8" name="TextBox 7"/>
+          <p:cNvSpPr txBox="1"/>
+          <p:nvPr/>
+        </p:nvSpPr>
+        <p:spPr>
+          <a:xfrm>
+            <a:off x="436485" y="4278980"/>
+            <a:ext cx="4579399" cy="1077218"/>
+          </a:xfrm>
+          <a:prstGeom prst="rect">
+            <a:avLst/>
+          </a:prstGeom>
+          <a:noFill/>
         </p:spPr>
         <p:txBody>
           <a:bodyPr wrap="square" rtlCol="0">
@@ -8690,97 +10161,63 @@
           </a:bodyPr>
           <a:lstStyle/>
           <a:p>
+            <a:pPr algn="ctr"/>
             <a:r>
               <a:rPr lang="ru-RU" sz="1600" dirty="0" smtClean="0">
                 <a:solidFill>
-                  <a:schemeClr val="accent6"/>
-                </a:solidFill>
-                <a:latin typeface="Times New Roman" panose="02020603050405020304" pitchFamily="18" charset="0"/>
-                <a:cs typeface="Times New Roman" panose="02020603050405020304" pitchFamily="18" charset="0"/>
-              </a:rPr>
-              <a:t>Разработка адаптивного регулятора для компенсации внешнего возмущения по температуре стенок, является не целесообразна по причине абсурдности компенсации, которое может привести к ЧП.</a:t>
-            </a:r>
-            <a:br>
+                  <a:schemeClr val="accent2">
+                    <a:lumMod val="75000"/>
+                  </a:schemeClr>
+                </a:solidFill>
+                <a:latin typeface="Times New Roman" panose="02020603050405020304" pitchFamily="18" charset="0"/>
+                <a:cs typeface="Times New Roman" panose="02020603050405020304" pitchFamily="18" charset="0"/>
+              </a:rPr>
+              <a:t>Подача внешнего </a:t>
+            </a:r>
+            <a:r>
               <a:rPr lang="ru-RU" sz="1600" dirty="0" smtClean="0">
                 <a:solidFill>
-                  <a:schemeClr val="accent6"/>
-                </a:solidFill>
-                <a:latin typeface="Times New Roman" panose="02020603050405020304" pitchFamily="18" charset="0"/>
-                <a:cs typeface="Times New Roman" panose="02020603050405020304" pitchFamily="18" charset="0"/>
-              </a:rPr>
-            </a:br>
+                  <a:schemeClr val="accent2">
+                    <a:lumMod val="75000"/>
+                  </a:schemeClr>
+                </a:solidFill>
+                <a:latin typeface="Times New Roman" panose="02020603050405020304" pitchFamily="18" charset="0"/>
+                <a:cs typeface="Times New Roman" panose="02020603050405020304" pitchFamily="18" charset="0"/>
+              </a:rPr>
+              <a:t>возмущениями </a:t>
+            </a:r>
             <a:r>
               <a:rPr lang="ru-RU" sz="1600" dirty="0" smtClean="0">
                 <a:solidFill>
-                  <a:schemeClr val="accent6"/>
-                </a:solidFill>
-                <a:latin typeface="Times New Roman" panose="02020603050405020304" pitchFamily="18" charset="0"/>
-                <a:cs typeface="Times New Roman" panose="02020603050405020304" pitchFamily="18" charset="0"/>
-              </a:rPr>
-              <a:t/>
-            </a:r>
-            <a:br>
-              <a:rPr lang="ru-RU" sz="1600" dirty="0" smtClean="0">
-                <a:solidFill>
-                  <a:schemeClr val="accent6"/>
-                </a:solidFill>
-                <a:latin typeface="Times New Roman" panose="02020603050405020304" pitchFamily="18" charset="0"/>
-                <a:cs typeface="Times New Roman" panose="02020603050405020304" pitchFamily="18" charset="0"/>
-              </a:rPr>
-            </a:br>
-            <a:r>
-              <a:rPr lang="ru-RU" sz="1600" dirty="0" smtClean="0">
-                <a:solidFill>
-                  <a:schemeClr val="accent6"/>
-                </a:solidFill>
-                <a:latin typeface="Times New Roman" panose="02020603050405020304" pitchFamily="18" charset="0"/>
-                <a:cs typeface="Times New Roman" panose="02020603050405020304" pitchFamily="18" charset="0"/>
-              </a:rPr>
-              <a:t>Если и стоит регулировать данное явление, то только в формате перевода всей системы «АВО-РК-Испаритель» в режим отключения от остальной системы.</a:t>
-            </a:r>
-            <a:br>
-              <a:rPr lang="ru-RU" sz="1600" dirty="0" smtClean="0">
-                <a:solidFill>
-                  <a:schemeClr val="accent6"/>
-                </a:solidFill>
-                <a:latin typeface="Times New Roman" panose="02020603050405020304" pitchFamily="18" charset="0"/>
-                <a:cs typeface="Times New Roman" panose="02020603050405020304" pitchFamily="18" charset="0"/>
-              </a:rPr>
-            </a:br>
-            <a:r>
-              <a:rPr lang="ru-RU" sz="1600" dirty="0" smtClean="0">
-                <a:solidFill>
-                  <a:schemeClr val="accent6"/>
-                </a:solidFill>
-                <a:latin typeface="Times New Roman" panose="02020603050405020304" pitchFamily="18" charset="0"/>
-                <a:cs typeface="Times New Roman" panose="02020603050405020304" pitchFamily="18" charset="0"/>
-              </a:rPr>
-              <a:t/>
-            </a:r>
-            <a:br>
-              <a:rPr lang="ru-RU" sz="1600" dirty="0" smtClean="0">
-                <a:solidFill>
-                  <a:schemeClr val="accent6"/>
-                </a:solidFill>
-                <a:latin typeface="Times New Roman" panose="02020603050405020304" pitchFamily="18" charset="0"/>
-                <a:cs typeface="Times New Roman" panose="02020603050405020304" pitchFamily="18" charset="0"/>
-              </a:rPr>
-            </a:br>
-            <a:r>
-              <a:rPr lang="ru-RU" sz="1600" dirty="0" smtClean="0">
-                <a:solidFill>
-                  <a:schemeClr val="accent6"/>
-                </a:solidFill>
-                <a:latin typeface="Times New Roman" panose="02020603050405020304" pitchFamily="18" charset="0"/>
-                <a:cs typeface="Times New Roman" panose="02020603050405020304" pitchFamily="18" charset="0"/>
-              </a:rPr>
-              <a:t>В связи с этим, единственными внешними возмущениями оказываемыми на систему остаются температура жидкости и концентрация влаги в жидкости в исходной смеси.</a:t>
-            </a:r>
-          </a:p>
-          <a:p>
+                  <a:schemeClr val="accent2">
+                    <a:lumMod val="75000"/>
+                  </a:schemeClr>
+                </a:solidFill>
+                <a:latin typeface="Times New Roman" panose="02020603050405020304" pitchFamily="18" charset="0"/>
+                <a:cs typeface="Times New Roman" panose="02020603050405020304" pitchFamily="18" charset="0"/>
+              </a:rPr>
+              <a:t>по температуре жидкости (+/-10 градусов) и далее </a:t>
+            </a:r>
+            <a:r>
+              <a:rPr lang="ru-RU" sz="1600" dirty="0">
+                <a:solidFill>
+                  <a:schemeClr val="accent2">
+                    <a:lumMod val="75000"/>
+                  </a:schemeClr>
+                </a:solidFill>
+                <a:latin typeface="Times New Roman" panose="02020603050405020304" pitchFamily="18" charset="0"/>
+                <a:cs typeface="Times New Roman" panose="02020603050405020304" pitchFamily="18" charset="0"/>
+              </a:rPr>
+              <a:t>по концентрации влаги в жидкости (+/-1.5 %)</a:t>
+            </a:r>
+          </a:p>
+          <a:p>
+            <a:pPr algn="ctr"/>
             <a:endParaRPr lang="ru-RU" sz="1600" dirty="0" smtClean="0">
               <a:solidFill>
-                <a:schemeClr val="accent6"/>
+                <a:schemeClr val="accent2">
+                  <a:lumMod val="75000"/>
+                </a:schemeClr>
               </a:solidFill>
               <a:latin typeface="Times New Roman" panose="02020603050405020304" pitchFamily="18" charset="0"/>
               <a:cs typeface="Times New Roman" panose="02020603050405020304" pitchFamily="18" charset="0"/>

</xml_diff>

<commit_message>
Customising Addaptive Control block_10
</commit_message>
<xml_diff>
--- a/0_Docs_dir/3_General/Отчёт руководителям 12.07.2020.pptx
+++ b/0_Docs_dir/3_General/Отчёт руководителям 12.07.2020.pptx
@@ -4305,7 +4305,20 @@
                 <a:latin typeface="Times New Roman" panose="02020603050405020304" pitchFamily="18" charset="0"/>
                 <a:cs typeface="Times New Roman" panose="02020603050405020304" pitchFamily="18" charset="0"/>
               </a:rPr>
-              <a:t>возмущениями по температуре жидкости (+/-10 градусов</a:t>
+              <a:t>возмущениями по температуре жидкости (+/-10 </a:t>
+            </a:r>
+            <a:r>
+              <a:rPr lang="ru-RU" dirty="0">
+                <a:solidFill>
+                  <a:schemeClr val="accent2">
+                    <a:lumMod val="75000"/>
+                  </a:schemeClr>
+                </a:solidFill>
+                <a:latin typeface="Times New Roman" panose="02020603050405020304" pitchFamily="18" charset="0"/>
+                <a:cs typeface="Times New Roman" panose="02020603050405020304" pitchFamily="18" charset="0"/>
+                <a:sym typeface="Symbol" panose="05050102010706020507" pitchFamily="18" charset="2"/>
+              </a:rPr>
+              <a:t>С</a:t>
             </a:r>
             <a:r>
               <a:rPr lang="ru-RU" dirty="0" smtClean="0">
@@ -4411,15 +4424,6 @@
               </a:rPr>
               <a:t>Существенные ли эти отклонения? Мне кажется, что нет. Везде в пределах нормы. </a:t>
             </a:r>
-            <a:endParaRPr lang="ru-RU" sz="1600" dirty="0" smtClean="0">
-              <a:solidFill>
-                <a:schemeClr val="accent2">
-                  <a:lumMod val="75000"/>
-                </a:schemeClr>
-              </a:solidFill>
-              <a:latin typeface="Times New Roman" panose="02020603050405020304" pitchFamily="18" charset="0"/>
-              <a:cs typeface="Times New Roman" panose="02020603050405020304" pitchFamily="18" charset="0"/>
-            </a:endParaRPr>
           </a:p>
         </p:txBody>
       </p:sp>
@@ -4482,7 +4486,7 @@
               <a:t>  7 </a:t>
             </a:r>
             <a:r>
-              <a:rPr lang="ru-RU" sz="1400" dirty="0" smtClean="0">
+              <a:rPr lang="ru-RU" sz="1400" dirty="0">
                 <a:solidFill>
                   <a:schemeClr val="accent2">
                     <a:lumMod val="75000"/>
@@ -4492,7 +4496,7 @@
                 <a:cs typeface="Times New Roman" panose="02020603050405020304" pitchFamily="18" charset="0"/>
                 <a:sym typeface="Symbol" panose="05050102010706020507" pitchFamily="18" charset="2"/>
               </a:rPr>
-              <a:t>градусов</a:t>
+              <a:t>С</a:t>
             </a:r>
             <a:endParaRPr lang="ru-RU" sz="1400" dirty="0" smtClean="0">
               <a:solidFill>
@@ -4591,7 +4595,7 @@
               <a:t> </a:t>
             </a:r>
             <a:r>
-              <a:rPr lang="ru-RU" sz="1400" dirty="0" smtClean="0">
+              <a:rPr lang="ru-RU" sz="1400" dirty="0">
                 <a:solidFill>
                   <a:schemeClr val="accent2">
                     <a:lumMod val="75000"/>
@@ -4601,7 +4605,7 @@
                 <a:cs typeface="Times New Roman" panose="02020603050405020304" pitchFamily="18" charset="0"/>
                 <a:sym typeface="Symbol" panose="05050102010706020507" pitchFamily="18" charset="2"/>
               </a:rPr>
-              <a:t>градуса</a:t>
+              <a:t>С</a:t>
             </a:r>
             <a:endParaRPr lang="ru-RU" sz="1400" dirty="0" smtClean="0">
               <a:solidFill>
@@ -4713,7 +4717,7 @@
               <a:t> </a:t>
             </a:r>
             <a:r>
-              <a:rPr lang="ru-RU" sz="1400" dirty="0" smtClean="0">
+              <a:rPr lang="ru-RU" sz="1400" dirty="0">
                 <a:solidFill>
                   <a:schemeClr val="accent2">
                     <a:lumMod val="75000"/>
@@ -4723,7 +4727,7 @@
                 <a:cs typeface="Times New Roman" panose="02020603050405020304" pitchFamily="18" charset="0"/>
                 <a:sym typeface="Symbol" panose="05050102010706020507" pitchFamily="18" charset="2"/>
               </a:rPr>
-              <a:t>градуса</a:t>
+              <a:t>С</a:t>
             </a:r>
             <a:endParaRPr lang="ru-RU" sz="1400" dirty="0" smtClean="0">
               <a:solidFill>
@@ -4822,7 +4826,7 @@
               <a:t> </a:t>
             </a:r>
             <a:r>
-              <a:rPr lang="ru-RU" sz="1400" dirty="0" smtClean="0">
+              <a:rPr lang="ru-RU" sz="1400" dirty="0">
                 <a:solidFill>
                   <a:schemeClr val="accent2">
                     <a:lumMod val="75000"/>
@@ -4832,7 +4836,7 @@
                 <a:cs typeface="Times New Roman" panose="02020603050405020304" pitchFamily="18" charset="0"/>
                 <a:sym typeface="Symbol" panose="05050102010706020507" pitchFamily="18" charset="2"/>
               </a:rPr>
-              <a:t>градуса</a:t>
+              <a:t>%</a:t>
             </a:r>
             <a:endParaRPr lang="ru-RU" sz="1400" dirty="0" smtClean="0">
               <a:solidFill>
@@ -4915,46 +4919,7 @@
                 <a:cs typeface="Times New Roman" panose="02020603050405020304" pitchFamily="18" charset="0"/>
                 <a:sym typeface="Symbol" panose="05050102010706020507" pitchFamily="18" charset="2"/>
               </a:rPr>
-              <a:t>0</a:t>
-            </a:r>
-            <a:r>
-              <a:rPr lang="ru-RU" sz="1400" dirty="0" smtClean="0">
-                <a:solidFill>
-                  <a:schemeClr val="accent2">
-                    <a:lumMod val="75000"/>
-                  </a:schemeClr>
-                </a:solidFill>
-                <a:latin typeface="Times New Roman" panose="02020603050405020304" pitchFamily="18" charset="0"/>
-                <a:cs typeface="Times New Roman" panose="02020603050405020304" pitchFamily="18" charset="0"/>
-                <a:sym typeface="Symbol" panose="05050102010706020507" pitchFamily="18" charset="2"/>
-              </a:rPr>
-              <a:t>.03</a:t>
-            </a:r>
-            <a:r>
-              <a:rPr lang="en-US" sz="1400" dirty="0" smtClean="0">
-                <a:solidFill>
-                  <a:schemeClr val="accent2">
-                    <a:lumMod val="75000"/>
-                  </a:schemeClr>
-                </a:solidFill>
-                <a:latin typeface="Times New Roman" panose="02020603050405020304" pitchFamily="18" charset="0"/>
-                <a:cs typeface="Times New Roman" panose="02020603050405020304" pitchFamily="18" charset="0"/>
-                <a:sym typeface="Symbol" panose="05050102010706020507" pitchFamily="18" charset="2"/>
-              </a:rPr>
-              <a:t> </a:t>
-            </a:r>
-            <a:r>
-              <a:rPr lang="ru-RU" sz="1400" dirty="0" smtClean="0">
-                <a:solidFill>
-                  <a:schemeClr val="accent2">
-                    <a:lumMod val="75000"/>
-                  </a:schemeClr>
-                </a:solidFill>
-                <a:latin typeface="Times New Roman" panose="02020603050405020304" pitchFamily="18" charset="0"/>
-                <a:cs typeface="Times New Roman" panose="02020603050405020304" pitchFamily="18" charset="0"/>
-                <a:sym typeface="Symbol" panose="05050102010706020507" pitchFamily="18" charset="2"/>
-              </a:rPr>
-              <a:t>градуса</a:t>
+              <a:t>0.03 %</a:t>
             </a:r>
             <a:endParaRPr lang="ru-RU" sz="1400" dirty="0" smtClean="0">
               <a:solidFill>
@@ -5053,7 +5018,7 @@
               <a:t> </a:t>
             </a:r>
             <a:r>
-              <a:rPr lang="ru-RU" sz="1400" dirty="0" smtClean="0">
+              <a:rPr lang="ru-RU" sz="1400" dirty="0">
                 <a:solidFill>
                   <a:schemeClr val="accent2">
                     <a:lumMod val="75000"/>
@@ -5063,7 +5028,7 @@
                 <a:cs typeface="Times New Roman" panose="02020603050405020304" pitchFamily="18" charset="0"/>
                 <a:sym typeface="Symbol" panose="05050102010706020507" pitchFamily="18" charset="2"/>
               </a:rPr>
-              <a:t>градуса</a:t>
+              <a:t>%</a:t>
             </a:r>
             <a:endParaRPr lang="ru-RU" sz="1400" dirty="0" smtClean="0">
               <a:solidFill>
@@ -5162,7 +5127,7 @@
               <a:t> </a:t>
             </a:r>
             <a:r>
-              <a:rPr lang="ru-RU" sz="1400" dirty="0" smtClean="0">
+              <a:rPr lang="ru-RU" sz="1400" dirty="0">
                 <a:solidFill>
                   <a:schemeClr val="accent2">
                     <a:lumMod val="75000"/>
@@ -5172,7 +5137,7 @@
                 <a:cs typeface="Times New Roman" panose="02020603050405020304" pitchFamily="18" charset="0"/>
                 <a:sym typeface="Symbol" panose="05050102010706020507" pitchFamily="18" charset="2"/>
               </a:rPr>
-              <a:t>градуса</a:t>
+              <a:t>%</a:t>
             </a:r>
             <a:endParaRPr lang="ru-RU" sz="1400" dirty="0" smtClean="0">
               <a:solidFill>
@@ -5272,7 +5237,7 @@
         </p:nvSpPr>
         <p:spPr>
           <a:xfrm>
-            <a:off x="2470370" y="989307"/>
+            <a:off x="2282172" y="381755"/>
             <a:ext cx="3237971" cy="1144929"/>
           </a:xfrm>
           <a:prstGeom prst="rect">
@@ -5330,7 +5295,31 @@
                 <a:latin typeface="Times New Roman" panose="02020603050405020304" pitchFamily="18" charset="0"/>
                 <a:cs typeface="Times New Roman" panose="02020603050405020304" pitchFamily="18" charset="0"/>
               </a:rPr>
-              <a:t>концентрации влаги в жидкости </a:t>
+              <a:t>концентрации </a:t>
+            </a:r>
+            <a:r>
+              <a:rPr lang="ru-RU" dirty="0">
+                <a:solidFill>
+                  <a:schemeClr val="accent2">
+                    <a:lumMod val="75000"/>
+                  </a:schemeClr>
+                </a:solidFill>
+                <a:latin typeface="Times New Roman" panose="02020603050405020304" pitchFamily="18" charset="0"/>
+                <a:cs typeface="Times New Roman" panose="02020603050405020304" pitchFamily="18" charset="0"/>
+              </a:rPr>
+              <a:t>воды в </a:t>
+            </a:r>
+            <a:r>
+              <a:rPr lang="ru-RU" dirty="0" smtClean="0">
+                <a:solidFill>
+                  <a:schemeClr val="accent2">
+                    <a:lumMod val="75000"/>
+                  </a:schemeClr>
+                </a:solidFill>
+                <a:latin typeface="Times New Roman" panose="02020603050405020304" pitchFamily="18" charset="0"/>
+                <a:cs typeface="Times New Roman" panose="02020603050405020304" pitchFamily="18" charset="0"/>
+              </a:rPr>
+              <a:t>жидкости </a:t>
             </a:r>
             <a:r>
               <a:rPr lang="ru-RU" dirty="0">
@@ -5376,8 +5365,8 @@
         </p:nvSpPr>
         <p:spPr>
           <a:xfrm>
-            <a:off x="6267636" y="624508"/>
-            <a:ext cx="5515992" cy="338554"/>
+            <a:off x="6267636" y="384146"/>
+            <a:ext cx="5515992" cy="1323439"/>
           </a:xfrm>
           <a:prstGeom prst="rect">
             <a:avLst/>
@@ -5400,7 +5389,66 @@
                 <a:latin typeface="Times New Roman" panose="02020603050405020304" pitchFamily="18" charset="0"/>
                 <a:cs typeface="Times New Roman" panose="02020603050405020304" pitchFamily="18" charset="0"/>
               </a:rPr>
-              <a:t>Представленные результаты показывают, что …….</a:t>
+              <a:t>Представленные результаты показывают, что </a:t>
+            </a:r>
+            <a:r>
+              <a:rPr lang="ru-RU" sz="1600" dirty="0" smtClean="0">
+                <a:solidFill>
+                  <a:schemeClr val="accent2">
+                    <a:lumMod val="75000"/>
+                  </a:schemeClr>
+                </a:solidFill>
+                <a:latin typeface="Times New Roman" panose="02020603050405020304" pitchFamily="18" charset="0"/>
+                <a:cs typeface="Times New Roman" panose="02020603050405020304" pitchFamily="18" charset="0"/>
+              </a:rPr>
+              <a:t>влияние данного возмущения оказывает только на концентрацию воды в жидкости.</a:t>
+            </a:r>
+            <a:endParaRPr lang="ru-RU" sz="1600" dirty="0">
+              <a:solidFill>
+                <a:schemeClr val="accent2">
+                  <a:lumMod val="75000"/>
+                </a:schemeClr>
+              </a:solidFill>
+              <a:latin typeface="Times New Roman" panose="02020603050405020304" pitchFamily="18" charset="0"/>
+              <a:cs typeface="Times New Roman" panose="02020603050405020304" pitchFamily="18" charset="0"/>
+            </a:endParaRPr>
+          </a:p>
+          <a:p>
+            <a:r>
+              <a:rPr lang="ru-RU" sz="1600" dirty="0" smtClean="0">
+                <a:solidFill>
+                  <a:schemeClr val="accent2">
+                    <a:lumMod val="75000"/>
+                  </a:schemeClr>
+                </a:solidFill>
+                <a:latin typeface="Times New Roman" panose="02020603050405020304" pitchFamily="18" charset="0"/>
+                <a:cs typeface="Times New Roman" panose="02020603050405020304" pitchFamily="18" charset="0"/>
+              </a:rPr>
+              <a:t>И т.к. эта переменная не считывается, то и регулирования по этой переменной нет.  Есть ли датчик концентр. воды в </a:t>
+            </a:r>
+            <a:r>
+              <a:rPr lang="ru-RU" sz="1600" dirty="0" err="1" smtClean="0">
+                <a:solidFill>
+                  <a:schemeClr val="accent2">
+                    <a:lumMod val="75000"/>
+                  </a:schemeClr>
+                </a:solidFill>
+                <a:latin typeface="Times New Roman" panose="02020603050405020304" pitchFamily="18" charset="0"/>
+                <a:cs typeface="Times New Roman" panose="02020603050405020304" pitchFamily="18" charset="0"/>
+              </a:rPr>
+              <a:t>абс</a:t>
+            </a:r>
+            <a:r>
+              <a:rPr lang="ru-RU" sz="1600" dirty="0" smtClean="0">
+                <a:solidFill>
+                  <a:schemeClr val="accent2">
+                    <a:lumMod val="75000"/>
+                  </a:schemeClr>
+                </a:solidFill>
+                <a:latin typeface="Times New Roman" panose="02020603050405020304" pitchFamily="18" charset="0"/>
+                <a:cs typeface="Times New Roman" panose="02020603050405020304" pitchFamily="18" charset="0"/>
+              </a:rPr>
+              <a:t>.?</a:t>
             </a:r>
             <a:endParaRPr lang="ru-RU" sz="1600" dirty="0" smtClean="0">
               <a:solidFill>
@@ -5499,7 +5547,7 @@
               <a:t> </a:t>
             </a:r>
             <a:r>
-              <a:rPr lang="ru-RU" sz="1400" dirty="0" smtClean="0">
+              <a:rPr lang="ru-RU" sz="1400" dirty="0">
                 <a:solidFill>
                   <a:schemeClr val="accent2">
                     <a:lumMod val="75000"/>
@@ -5509,7 +5557,7 @@
                 <a:cs typeface="Times New Roman" panose="02020603050405020304" pitchFamily="18" charset="0"/>
                 <a:sym typeface="Symbol" panose="05050102010706020507" pitchFamily="18" charset="2"/>
               </a:rPr>
-              <a:t>градуса</a:t>
+              <a:t>С</a:t>
             </a:r>
             <a:endParaRPr lang="ru-RU" sz="1400" dirty="0" smtClean="0">
               <a:solidFill>
@@ -5608,7 +5656,7 @@
               <a:t> </a:t>
             </a:r>
             <a:r>
-              <a:rPr lang="ru-RU" sz="1400" dirty="0" smtClean="0">
+              <a:rPr lang="ru-RU" sz="1400" dirty="0">
                 <a:solidFill>
                   <a:schemeClr val="accent2">
                     <a:lumMod val="75000"/>
@@ -5618,7 +5666,7 @@
                 <a:cs typeface="Times New Roman" panose="02020603050405020304" pitchFamily="18" charset="0"/>
                 <a:sym typeface="Symbol" panose="05050102010706020507" pitchFamily="18" charset="2"/>
               </a:rPr>
-              <a:t>градуса</a:t>
+              <a:t>С</a:t>
             </a:r>
             <a:endParaRPr lang="ru-RU" sz="1400" dirty="0" smtClean="0">
               <a:solidFill>
@@ -5717,7 +5765,7 @@
               <a:t> </a:t>
             </a:r>
             <a:r>
-              <a:rPr lang="ru-RU" sz="1400" dirty="0" smtClean="0">
+              <a:rPr lang="ru-RU" sz="1400" dirty="0">
                 <a:solidFill>
                   <a:schemeClr val="accent2">
                     <a:lumMod val="75000"/>
@@ -5727,7 +5775,7 @@
                 <a:cs typeface="Times New Roman" panose="02020603050405020304" pitchFamily="18" charset="0"/>
                 <a:sym typeface="Symbol" panose="05050102010706020507" pitchFamily="18" charset="2"/>
               </a:rPr>
-              <a:t>градуса</a:t>
+              <a:t>С</a:t>
             </a:r>
             <a:endParaRPr lang="ru-RU" sz="1400" dirty="0" smtClean="0">
               <a:solidFill>
@@ -5826,7 +5874,7 @@
               <a:t> </a:t>
             </a:r>
             <a:r>
-              <a:rPr lang="ru-RU" sz="1400" dirty="0" smtClean="0">
+              <a:rPr lang="ru-RU" sz="1400" dirty="0">
                 <a:solidFill>
                   <a:schemeClr val="accent2">
                     <a:lumMod val="75000"/>
@@ -5836,7 +5884,7 @@
                 <a:cs typeface="Times New Roman" panose="02020603050405020304" pitchFamily="18" charset="0"/>
                 <a:sym typeface="Symbol" panose="05050102010706020507" pitchFamily="18" charset="2"/>
               </a:rPr>
-              <a:t>градуса</a:t>
+              <a:t>%</a:t>
             </a:r>
             <a:endParaRPr lang="ru-RU" sz="1400" dirty="0" smtClean="0">
               <a:solidFill>
@@ -5858,7 +5906,7 @@
         </p:nvSpPr>
         <p:spPr>
           <a:xfrm>
-            <a:off x="1222532" y="2374461"/>
+            <a:off x="1888358" y="1907922"/>
             <a:ext cx="1733732" cy="297004"/>
           </a:xfrm>
           <a:prstGeom prst="rect">
@@ -5896,6 +5944,19 @@
               <a:t></a:t>
             </a:r>
             <a:r>
+              <a:rPr lang="en-US" sz="1050" dirty="0" smtClean="0">
+                <a:solidFill>
+                  <a:schemeClr val="accent2">
+                    <a:lumMod val="75000"/>
+                  </a:schemeClr>
+                </a:solidFill>
+                <a:latin typeface="Times New Roman" panose="02020603050405020304" pitchFamily="18" charset="0"/>
+                <a:cs typeface="Times New Roman" panose="02020603050405020304" pitchFamily="18" charset="0"/>
+                <a:sym typeface="Symbol" panose="05050102010706020507" pitchFamily="18" charset="2"/>
+              </a:rPr>
+              <a:t>1</a:t>
+            </a:r>
+            <a:r>
               <a:rPr lang="en-US" sz="1400" dirty="0" smtClean="0">
                 <a:solidFill>
                   <a:schemeClr val="accent2">
@@ -5906,7 +5967,20 @@
                 <a:cs typeface="Times New Roman" panose="02020603050405020304" pitchFamily="18" charset="0"/>
                 <a:sym typeface="Symbol" panose="05050102010706020507" pitchFamily="18" charset="2"/>
               </a:rPr>
-              <a:t>  </a:t>
+              <a:t> </a:t>
+            </a:r>
+            <a:r>
+              <a:rPr lang="en-US" sz="1400" dirty="0" smtClean="0">
+                <a:solidFill>
+                  <a:schemeClr val="accent2">
+                    <a:lumMod val="75000"/>
+                  </a:schemeClr>
+                </a:solidFill>
+                <a:latin typeface="Times New Roman" panose="02020603050405020304" pitchFamily="18" charset="0"/>
+                <a:cs typeface="Times New Roman" panose="02020603050405020304" pitchFamily="18" charset="0"/>
+                <a:sym typeface="Symbol" panose="05050102010706020507" pitchFamily="18" charset="2"/>
+              </a:rPr>
+              <a:t> </a:t>
             </a:r>
             <a:r>
               <a:rPr lang="ru-RU" sz="1400" dirty="0" smtClean="0">
@@ -5919,10 +5993,10 @@
                 <a:cs typeface="Times New Roman" panose="02020603050405020304" pitchFamily="18" charset="0"/>
                 <a:sym typeface="Symbol" panose="05050102010706020507" pitchFamily="18" charset="2"/>
               </a:rPr>
-              <a:t>0</a:t>
-            </a:r>
-            <a:r>
-              <a:rPr lang="ru-RU" sz="1400" dirty="0" smtClean="0">
+              <a:t>0.</a:t>
+            </a:r>
+            <a:r>
+              <a:rPr lang="en-US" sz="1400" dirty="0" smtClean="0">
                 <a:solidFill>
                   <a:schemeClr val="accent2">
                     <a:lumMod val="75000"/>
@@ -5932,10 +6006,10 @@
                 <a:cs typeface="Times New Roman" panose="02020603050405020304" pitchFamily="18" charset="0"/>
                 <a:sym typeface="Symbol" panose="05050102010706020507" pitchFamily="18" charset="2"/>
               </a:rPr>
-              <a:t>.03</a:t>
-            </a:r>
-            <a:r>
-              <a:rPr lang="en-US" sz="1400" dirty="0" smtClean="0">
+              <a:t>4 </a:t>
+            </a:r>
+            <a:r>
+              <a:rPr lang="ru-RU" sz="1400" dirty="0">
                 <a:solidFill>
                   <a:schemeClr val="accent2">
                     <a:lumMod val="75000"/>
@@ -5945,20 +6019,7 @@
                 <a:cs typeface="Times New Roman" panose="02020603050405020304" pitchFamily="18" charset="0"/>
                 <a:sym typeface="Symbol" panose="05050102010706020507" pitchFamily="18" charset="2"/>
               </a:rPr>
-              <a:t> </a:t>
-            </a:r>
-            <a:r>
-              <a:rPr lang="ru-RU" sz="1400" dirty="0" smtClean="0">
-                <a:solidFill>
-                  <a:schemeClr val="accent2">
-                    <a:lumMod val="75000"/>
-                  </a:schemeClr>
-                </a:solidFill>
-                <a:latin typeface="Times New Roman" panose="02020603050405020304" pitchFamily="18" charset="0"/>
-                <a:cs typeface="Times New Roman" panose="02020603050405020304" pitchFamily="18" charset="0"/>
-                <a:sym typeface="Symbol" panose="05050102010706020507" pitchFamily="18" charset="2"/>
-              </a:rPr>
-              <a:t>градуса</a:t>
+              <a:t>%</a:t>
             </a:r>
             <a:endParaRPr lang="ru-RU" sz="1400" dirty="0" smtClean="0">
               <a:solidFill>
@@ -6057,7 +6118,7 @@
               <a:t> </a:t>
             </a:r>
             <a:r>
-              <a:rPr lang="ru-RU" sz="1400" dirty="0" smtClean="0">
+              <a:rPr lang="ru-RU" sz="1400" dirty="0">
                 <a:solidFill>
                   <a:schemeClr val="accent2">
                     <a:lumMod val="75000"/>
@@ -6067,7 +6128,7 @@
                 <a:cs typeface="Times New Roman" panose="02020603050405020304" pitchFamily="18" charset="0"/>
                 <a:sym typeface="Symbol" panose="05050102010706020507" pitchFamily="18" charset="2"/>
               </a:rPr>
-              <a:t>градуса</a:t>
+              <a:t>%</a:t>
             </a:r>
             <a:endParaRPr lang="ru-RU" sz="1400" dirty="0" smtClean="0">
               <a:solidFill>
@@ -6083,14 +6144,14 @@
       </p:sp>
       <p:sp>
         <p:nvSpPr>
-          <p:cNvPr id="18" name="Прямоугольник 17"/>
+          <p:cNvPr id="19" name="Прямоугольник 18"/>
           <p:cNvSpPr/>
           <p:nvPr/>
         </p:nvSpPr>
         <p:spPr>
           <a:xfrm>
-            <a:off x="7081791" y="2572084"/>
-            <a:ext cx="1653833" cy="297004"/>
+            <a:off x="2755224" y="2512938"/>
+            <a:ext cx="1733732" cy="297004"/>
           </a:xfrm>
           <a:prstGeom prst="rect">
             <a:avLst/>
@@ -6127,6 +6188,19 @@
               <a:t></a:t>
             </a:r>
             <a:r>
+              <a:rPr lang="en-US" sz="1050" dirty="0" smtClean="0">
+                <a:solidFill>
+                  <a:schemeClr val="accent2">
+                    <a:lumMod val="75000"/>
+                  </a:schemeClr>
+                </a:solidFill>
+                <a:latin typeface="Times New Roman" panose="02020603050405020304" pitchFamily="18" charset="0"/>
+                <a:cs typeface="Times New Roman" panose="02020603050405020304" pitchFamily="18" charset="0"/>
+                <a:sym typeface="Symbol" panose="05050102010706020507" pitchFamily="18" charset="2"/>
+              </a:rPr>
+              <a:t>2</a:t>
+            </a:r>
+            <a:r>
               <a:rPr lang="en-US" sz="1400" dirty="0" smtClean="0">
                 <a:solidFill>
                   <a:schemeClr val="accent2">
@@ -6137,7 +6211,33 @@
                 <a:cs typeface="Times New Roman" panose="02020603050405020304" pitchFamily="18" charset="0"/>
                 <a:sym typeface="Symbol" panose="05050102010706020507" pitchFamily="18" charset="2"/>
               </a:rPr>
-              <a:t>  </a:t>
+              <a:t> </a:t>
+            </a:r>
+            <a:r>
+              <a:rPr lang="en-US" sz="1400" dirty="0" smtClean="0">
+                <a:solidFill>
+                  <a:schemeClr val="accent2">
+                    <a:lumMod val="75000"/>
+                  </a:schemeClr>
+                </a:solidFill>
+                <a:latin typeface="Times New Roman" panose="02020603050405020304" pitchFamily="18" charset="0"/>
+                <a:cs typeface="Times New Roman" panose="02020603050405020304" pitchFamily="18" charset="0"/>
+                <a:sym typeface="Symbol" panose="05050102010706020507" pitchFamily="18" charset="2"/>
+              </a:rPr>
+              <a:t> </a:t>
+            </a:r>
+            <a:r>
+              <a:rPr lang="en-US" sz="1400" dirty="0">
+                <a:solidFill>
+                  <a:schemeClr val="accent2">
+                    <a:lumMod val="75000"/>
+                  </a:schemeClr>
+                </a:solidFill>
+                <a:latin typeface="Times New Roman" panose="02020603050405020304" pitchFamily="18" charset="0"/>
+                <a:cs typeface="Times New Roman" panose="02020603050405020304" pitchFamily="18" charset="0"/>
+                <a:sym typeface="Symbol" panose="05050102010706020507" pitchFamily="18" charset="2"/>
+              </a:rPr>
+              <a:t>1</a:t>
             </a:r>
             <a:r>
               <a:rPr lang="ru-RU" sz="1400" dirty="0" smtClean="0">
@@ -6150,7 +6250,7 @@
                 <a:cs typeface="Times New Roman" panose="02020603050405020304" pitchFamily="18" charset="0"/>
                 <a:sym typeface="Symbol" panose="05050102010706020507" pitchFamily="18" charset="2"/>
               </a:rPr>
-              <a:t>0.02</a:t>
+              <a:t>.</a:t>
             </a:r>
             <a:r>
               <a:rPr lang="en-US" sz="1400" dirty="0" smtClean="0">
@@ -6163,9 +6263,118 @@
                 <a:cs typeface="Times New Roman" panose="02020603050405020304" pitchFamily="18" charset="0"/>
                 <a:sym typeface="Symbol" panose="05050102010706020507" pitchFamily="18" charset="2"/>
               </a:rPr>
+              <a:t>5 </a:t>
+            </a:r>
+            <a:r>
+              <a:rPr lang="ru-RU" sz="1400" dirty="0">
+                <a:solidFill>
+                  <a:schemeClr val="accent2">
+                    <a:lumMod val="75000"/>
+                  </a:schemeClr>
+                </a:solidFill>
+                <a:latin typeface="Times New Roman" panose="02020603050405020304" pitchFamily="18" charset="0"/>
+                <a:cs typeface="Times New Roman" panose="02020603050405020304" pitchFamily="18" charset="0"/>
+                <a:sym typeface="Symbol" panose="05050102010706020507" pitchFamily="18" charset="2"/>
+              </a:rPr>
+              <a:t>%</a:t>
+            </a:r>
+            <a:endParaRPr lang="ru-RU" sz="1400" dirty="0" smtClean="0">
+              <a:solidFill>
+                <a:schemeClr val="accent2">
+                  <a:lumMod val="75000"/>
+                </a:schemeClr>
+              </a:solidFill>
+              <a:latin typeface="Times New Roman" panose="02020603050405020304" pitchFamily="18" charset="0"/>
+              <a:cs typeface="Times New Roman" panose="02020603050405020304" pitchFamily="18" charset="0"/>
+            </a:endParaRPr>
+          </a:p>
+        </p:txBody>
+      </p:sp>
+      <p:sp>
+        <p:nvSpPr>
+          <p:cNvPr id="20" name="Прямоугольник 19"/>
+          <p:cNvSpPr/>
+          <p:nvPr/>
+        </p:nvSpPr>
+        <p:spPr>
+          <a:xfrm>
+            <a:off x="7802366" y="1903167"/>
+            <a:ext cx="1733732" cy="297004"/>
+          </a:xfrm>
+          <a:prstGeom prst="rect">
+            <a:avLst/>
+          </a:prstGeom>
+        </p:spPr>
+        <p:txBody>
+          <a:bodyPr wrap="square">
+            <a:spAutoFit/>
+          </a:bodyPr>
+          <a:lstStyle/>
+          <a:p>
+            <a:pPr indent="182880">
+              <a:lnSpc>
+                <a:spcPct val="95000"/>
+              </a:lnSpc>
+              <a:spcAft>
+                <a:spcPts val="600"/>
+              </a:spcAft>
+              <a:tabLst>
+                <a:tab pos="182880" algn="l"/>
+              </a:tabLst>
+            </a:pPr>
+            <a:r>
+              <a:rPr lang="ru-RU" sz="1400" dirty="0" smtClean="0">
+                <a:solidFill>
+                  <a:schemeClr val="accent2">
+                    <a:lumMod val="75000"/>
+                  </a:schemeClr>
+                </a:solidFill>
+                <a:latin typeface="Times New Roman" panose="02020603050405020304" pitchFamily="18" charset="0"/>
+                <a:cs typeface="Times New Roman" panose="02020603050405020304" pitchFamily="18" charset="0"/>
+                <a:sym typeface="Symbol" panose="05050102010706020507" pitchFamily="18" charset="2"/>
+              </a:rPr>
+              <a:t></a:t>
+            </a:r>
+            <a:r>
+              <a:rPr lang="en-US" sz="1050" dirty="0" smtClean="0">
+                <a:solidFill>
+                  <a:schemeClr val="accent2">
+                    <a:lumMod val="75000"/>
+                  </a:schemeClr>
+                </a:solidFill>
+                <a:latin typeface="Times New Roman" panose="02020603050405020304" pitchFamily="18" charset="0"/>
+                <a:cs typeface="Times New Roman" panose="02020603050405020304" pitchFamily="18" charset="0"/>
+                <a:sym typeface="Symbol" panose="05050102010706020507" pitchFamily="18" charset="2"/>
+              </a:rPr>
+              <a:t>1</a:t>
+            </a:r>
+            <a:r>
+              <a:rPr lang="en-US" sz="1400" dirty="0" smtClean="0">
+                <a:solidFill>
+                  <a:schemeClr val="accent2">
+                    <a:lumMod val="75000"/>
+                  </a:schemeClr>
+                </a:solidFill>
+                <a:latin typeface="Times New Roman" panose="02020603050405020304" pitchFamily="18" charset="0"/>
+                <a:cs typeface="Times New Roman" panose="02020603050405020304" pitchFamily="18" charset="0"/>
+                <a:sym typeface="Symbol" panose="05050102010706020507" pitchFamily="18" charset="2"/>
+              </a:rPr>
               <a:t> </a:t>
             </a:r>
             <a:r>
+              <a:rPr lang="en-US" sz="1400" dirty="0" smtClean="0">
+                <a:solidFill>
+                  <a:schemeClr val="accent2">
+                    <a:lumMod val="75000"/>
+                  </a:schemeClr>
+                </a:solidFill>
+                <a:latin typeface="Times New Roman" panose="02020603050405020304" pitchFamily="18" charset="0"/>
+                <a:cs typeface="Times New Roman" panose="02020603050405020304" pitchFamily="18" charset="0"/>
+                <a:sym typeface="Symbol" panose="05050102010706020507" pitchFamily="18" charset="2"/>
+              </a:rPr>
+              <a:t> </a:t>
+            </a:r>
+            <a:r>
               <a:rPr lang="ru-RU" sz="1400" dirty="0" smtClean="0">
                 <a:solidFill>
                   <a:schemeClr val="accent2">
@@ -6176,9 +6385,311 @@
                 <a:cs typeface="Times New Roman" panose="02020603050405020304" pitchFamily="18" charset="0"/>
                 <a:sym typeface="Symbol" panose="05050102010706020507" pitchFamily="18" charset="2"/>
               </a:rPr>
-              <a:t>градуса</a:t>
+              <a:t>0.</a:t>
+            </a:r>
+            <a:r>
+              <a:rPr lang="en-US" sz="1400" dirty="0" smtClean="0">
+                <a:solidFill>
+                  <a:schemeClr val="accent2">
+                    <a:lumMod val="75000"/>
+                  </a:schemeClr>
+                </a:solidFill>
+                <a:latin typeface="Times New Roman" panose="02020603050405020304" pitchFamily="18" charset="0"/>
+                <a:cs typeface="Times New Roman" panose="02020603050405020304" pitchFamily="18" charset="0"/>
+                <a:sym typeface="Symbol" panose="05050102010706020507" pitchFamily="18" charset="2"/>
+              </a:rPr>
+              <a:t>4 </a:t>
+            </a:r>
+            <a:r>
+              <a:rPr lang="ru-RU" sz="1400" dirty="0">
+                <a:solidFill>
+                  <a:schemeClr val="accent2">
+                    <a:lumMod val="75000"/>
+                  </a:schemeClr>
+                </a:solidFill>
+                <a:latin typeface="Times New Roman" panose="02020603050405020304" pitchFamily="18" charset="0"/>
+                <a:cs typeface="Times New Roman" panose="02020603050405020304" pitchFamily="18" charset="0"/>
+                <a:sym typeface="Symbol" panose="05050102010706020507" pitchFamily="18" charset="2"/>
+              </a:rPr>
+              <a:t>%</a:t>
             </a:r>
             <a:endParaRPr lang="ru-RU" sz="1400" dirty="0" smtClean="0">
+              <a:solidFill>
+                <a:schemeClr val="accent2">
+                  <a:lumMod val="75000"/>
+                </a:schemeClr>
+              </a:solidFill>
+              <a:latin typeface="Times New Roman" panose="02020603050405020304" pitchFamily="18" charset="0"/>
+              <a:cs typeface="Times New Roman" panose="02020603050405020304" pitchFamily="18" charset="0"/>
+            </a:endParaRPr>
+          </a:p>
+        </p:txBody>
+      </p:sp>
+      <p:sp>
+        <p:nvSpPr>
+          <p:cNvPr id="21" name="Прямоугольник 20"/>
+          <p:cNvSpPr/>
+          <p:nvPr/>
+        </p:nvSpPr>
+        <p:spPr>
+          <a:xfrm>
+            <a:off x="9308424" y="2512938"/>
+            <a:ext cx="1733732" cy="297004"/>
+          </a:xfrm>
+          <a:prstGeom prst="rect">
+            <a:avLst/>
+          </a:prstGeom>
+        </p:spPr>
+        <p:txBody>
+          <a:bodyPr wrap="square">
+            <a:spAutoFit/>
+          </a:bodyPr>
+          <a:lstStyle/>
+          <a:p>
+            <a:pPr indent="182880">
+              <a:lnSpc>
+                <a:spcPct val="95000"/>
+              </a:lnSpc>
+              <a:spcAft>
+                <a:spcPts val="600"/>
+              </a:spcAft>
+              <a:tabLst>
+                <a:tab pos="182880" algn="l"/>
+              </a:tabLst>
+            </a:pPr>
+            <a:r>
+              <a:rPr lang="ru-RU" sz="1400" dirty="0" smtClean="0">
+                <a:solidFill>
+                  <a:schemeClr val="accent2">
+                    <a:lumMod val="75000"/>
+                  </a:schemeClr>
+                </a:solidFill>
+                <a:latin typeface="Times New Roman" panose="02020603050405020304" pitchFamily="18" charset="0"/>
+                <a:cs typeface="Times New Roman" panose="02020603050405020304" pitchFamily="18" charset="0"/>
+                <a:sym typeface="Symbol" panose="05050102010706020507" pitchFamily="18" charset="2"/>
+              </a:rPr>
+              <a:t></a:t>
+            </a:r>
+            <a:r>
+              <a:rPr lang="en-US" sz="1050" dirty="0" smtClean="0">
+                <a:solidFill>
+                  <a:schemeClr val="accent2">
+                    <a:lumMod val="75000"/>
+                  </a:schemeClr>
+                </a:solidFill>
+                <a:latin typeface="Times New Roman" panose="02020603050405020304" pitchFamily="18" charset="0"/>
+                <a:cs typeface="Times New Roman" panose="02020603050405020304" pitchFamily="18" charset="0"/>
+                <a:sym typeface="Symbol" panose="05050102010706020507" pitchFamily="18" charset="2"/>
+              </a:rPr>
+              <a:t>2</a:t>
+            </a:r>
+            <a:r>
+              <a:rPr lang="en-US" sz="1400" dirty="0" smtClean="0">
+                <a:solidFill>
+                  <a:schemeClr val="accent2">
+                    <a:lumMod val="75000"/>
+                  </a:schemeClr>
+                </a:solidFill>
+                <a:latin typeface="Times New Roman" panose="02020603050405020304" pitchFamily="18" charset="0"/>
+                <a:cs typeface="Times New Roman" panose="02020603050405020304" pitchFamily="18" charset="0"/>
+                <a:sym typeface="Symbol" panose="05050102010706020507" pitchFamily="18" charset="2"/>
+              </a:rPr>
+              <a:t> </a:t>
+            </a:r>
+            <a:r>
+              <a:rPr lang="en-US" sz="1400" dirty="0" smtClean="0">
+                <a:solidFill>
+                  <a:schemeClr val="accent2">
+                    <a:lumMod val="75000"/>
+                  </a:schemeClr>
+                </a:solidFill>
+                <a:latin typeface="Times New Roman" panose="02020603050405020304" pitchFamily="18" charset="0"/>
+                <a:cs typeface="Times New Roman" panose="02020603050405020304" pitchFamily="18" charset="0"/>
+                <a:sym typeface="Symbol" panose="05050102010706020507" pitchFamily="18" charset="2"/>
+              </a:rPr>
+              <a:t> </a:t>
+            </a:r>
+            <a:r>
+              <a:rPr lang="en-US" sz="1400" dirty="0">
+                <a:solidFill>
+                  <a:schemeClr val="accent2">
+                    <a:lumMod val="75000"/>
+                  </a:schemeClr>
+                </a:solidFill>
+                <a:latin typeface="Times New Roman" panose="02020603050405020304" pitchFamily="18" charset="0"/>
+                <a:cs typeface="Times New Roman" panose="02020603050405020304" pitchFamily="18" charset="0"/>
+                <a:sym typeface="Symbol" panose="05050102010706020507" pitchFamily="18" charset="2"/>
+              </a:rPr>
+              <a:t>1</a:t>
+            </a:r>
+            <a:r>
+              <a:rPr lang="ru-RU" sz="1400" dirty="0" smtClean="0">
+                <a:solidFill>
+                  <a:schemeClr val="accent2">
+                    <a:lumMod val="75000"/>
+                  </a:schemeClr>
+                </a:solidFill>
+                <a:latin typeface="Times New Roman" panose="02020603050405020304" pitchFamily="18" charset="0"/>
+                <a:cs typeface="Times New Roman" panose="02020603050405020304" pitchFamily="18" charset="0"/>
+                <a:sym typeface="Symbol" panose="05050102010706020507" pitchFamily="18" charset="2"/>
+              </a:rPr>
+              <a:t>.</a:t>
+            </a:r>
+            <a:r>
+              <a:rPr lang="en-US" sz="1400" dirty="0" smtClean="0">
+                <a:solidFill>
+                  <a:schemeClr val="accent2">
+                    <a:lumMod val="75000"/>
+                  </a:schemeClr>
+                </a:solidFill>
+                <a:latin typeface="Times New Roman" panose="02020603050405020304" pitchFamily="18" charset="0"/>
+                <a:cs typeface="Times New Roman" panose="02020603050405020304" pitchFamily="18" charset="0"/>
+                <a:sym typeface="Symbol" panose="05050102010706020507" pitchFamily="18" charset="2"/>
+              </a:rPr>
+              <a:t>5 </a:t>
+            </a:r>
+            <a:r>
+              <a:rPr lang="ru-RU" sz="1400" dirty="0">
+                <a:solidFill>
+                  <a:schemeClr val="accent2">
+                    <a:lumMod val="75000"/>
+                  </a:schemeClr>
+                </a:solidFill>
+                <a:latin typeface="Times New Roman" panose="02020603050405020304" pitchFamily="18" charset="0"/>
+                <a:cs typeface="Times New Roman" panose="02020603050405020304" pitchFamily="18" charset="0"/>
+                <a:sym typeface="Symbol" panose="05050102010706020507" pitchFamily="18" charset="2"/>
+              </a:rPr>
+              <a:t>%</a:t>
+            </a:r>
+            <a:endParaRPr lang="ru-RU" sz="1400" dirty="0" smtClean="0">
+              <a:solidFill>
+                <a:schemeClr val="accent2">
+                  <a:lumMod val="75000"/>
+                </a:schemeClr>
+              </a:solidFill>
+              <a:latin typeface="Times New Roman" panose="02020603050405020304" pitchFamily="18" charset="0"/>
+              <a:cs typeface="Times New Roman" panose="02020603050405020304" pitchFamily="18" charset="0"/>
+            </a:endParaRPr>
+          </a:p>
+        </p:txBody>
+      </p:sp>
+      <p:sp>
+        <p:nvSpPr>
+          <p:cNvPr id="22" name="TextBox 21"/>
+          <p:cNvSpPr txBox="1"/>
+          <p:nvPr/>
+        </p:nvSpPr>
+        <p:spPr>
+          <a:xfrm>
+            <a:off x="2632091" y="2934362"/>
+            <a:ext cx="7115590" cy="338554"/>
+          </a:xfrm>
+          <a:prstGeom prst="rect">
+            <a:avLst/>
+          </a:prstGeom>
+          <a:noFill/>
+        </p:spPr>
+        <p:txBody>
+          <a:bodyPr wrap="square" rtlCol="0">
+            <a:spAutoFit/>
+          </a:bodyPr>
+          <a:lstStyle/>
+          <a:p>
+            <a:r>
+              <a:rPr lang="ru-RU" sz="1600" dirty="0" smtClean="0">
+                <a:solidFill>
+                  <a:schemeClr val="accent2">
+                    <a:lumMod val="75000"/>
+                  </a:schemeClr>
+                </a:solidFill>
+                <a:latin typeface="Times New Roman" panose="02020603050405020304" pitchFamily="18" charset="0"/>
+                <a:cs typeface="Times New Roman" panose="02020603050405020304" pitchFamily="18" charset="0"/>
+              </a:rPr>
+              <a:t>Заметьте: ограничений на отрицательные значения в модели не заложены!</a:t>
+            </a:r>
+            <a:endParaRPr lang="ru-RU" sz="1600" dirty="0" smtClean="0">
+              <a:solidFill>
+                <a:schemeClr val="accent2">
+                  <a:lumMod val="75000"/>
+                </a:schemeClr>
+              </a:solidFill>
+              <a:latin typeface="Times New Roman" panose="02020603050405020304" pitchFamily="18" charset="0"/>
+              <a:cs typeface="Times New Roman" panose="02020603050405020304" pitchFamily="18" charset="0"/>
+            </a:endParaRPr>
+          </a:p>
+        </p:txBody>
+      </p:sp>
+      <p:sp>
+        <p:nvSpPr>
+          <p:cNvPr id="23" name="TextBox 22"/>
+          <p:cNvSpPr txBox="1"/>
+          <p:nvPr/>
+        </p:nvSpPr>
+        <p:spPr>
+          <a:xfrm>
+            <a:off x="9003256" y="3572762"/>
+            <a:ext cx="2919493" cy="830997"/>
+          </a:xfrm>
+          <a:prstGeom prst="rect">
+            <a:avLst/>
+          </a:prstGeom>
+          <a:noFill/>
+        </p:spPr>
+        <p:txBody>
+          <a:bodyPr wrap="square" rtlCol="0">
+            <a:spAutoFit/>
+          </a:bodyPr>
+          <a:lstStyle/>
+          <a:p>
+            <a:r>
+              <a:rPr lang="ru-RU" sz="1600" dirty="0" smtClean="0">
+                <a:solidFill>
+                  <a:schemeClr val="accent2">
+                    <a:lumMod val="75000"/>
+                  </a:schemeClr>
+                </a:solidFill>
+                <a:latin typeface="Times New Roman" panose="02020603050405020304" pitchFamily="18" charset="0"/>
+                <a:cs typeface="Times New Roman" panose="02020603050405020304" pitchFamily="18" charset="0"/>
+              </a:rPr>
+              <a:t>Есть ли смысл разрабатывать дополнительный регулятор по </a:t>
+            </a:r>
+            <a:r>
+              <a:rPr lang="ru-RU" sz="1600" dirty="0">
+                <a:solidFill>
+                  <a:schemeClr val="accent2">
+                    <a:lumMod val="75000"/>
+                  </a:schemeClr>
+                </a:solidFill>
+                <a:latin typeface="Times New Roman" panose="02020603050405020304" pitchFamily="18" charset="0"/>
+                <a:cs typeface="Times New Roman" panose="02020603050405020304" pitchFamily="18" charset="0"/>
+              </a:rPr>
+              <a:t>концентр. воды в </a:t>
+            </a:r>
+            <a:r>
+              <a:rPr lang="ru-RU" sz="1600" dirty="0" err="1" smtClean="0">
+                <a:solidFill>
+                  <a:schemeClr val="accent2">
+                    <a:lumMod val="75000"/>
+                  </a:schemeClr>
+                </a:solidFill>
+                <a:latin typeface="Times New Roman" panose="02020603050405020304" pitchFamily="18" charset="0"/>
+                <a:cs typeface="Times New Roman" panose="02020603050405020304" pitchFamily="18" charset="0"/>
+              </a:rPr>
+              <a:t>абс</a:t>
+            </a:r>
+            <a:r>
+              <a:rPr lang="ru-RU" sz="1600" dirty="0" smtClean="0">
+                <a:solidFill>
+                  <a:schemeClr val="accent2">
+                    <a:lumMod val="75000"/>
+                  </a:schemeClr>
+                </a:solidFill>
+                <a:latin typeface="Times New Roman" panose="02020603050405020304" pitchFamily="18" charset="0"/>
+                <a:cs typeface="Times New Roman" panose="02020603050405020304" pitchFamily="18" charset="0"/>
+              </a:rPr>
+              <a:t>.?</a:t>
+            </a:r>
+            <a:endParaRPr lang="ru-RU" sz="1600" dirty="0" smtClean="0">
               <a:solidFill>
                 <a:schemeClr val="accent2">
                   <a:lumMod val="75000"/>
@@ -6228,7 +6739,7 @@
         </p:nvSpPr>
         <p:spPr>
           <a:xfrm>
-            <a:off x="772357" y="414820"/>
+            <a:off x="772357" y="778462"/>
             <a:ext cx="11132598" cy="2040559"/>
           </a:xfrm>
           <a:prstGeom prst="rect">
@@ -6279,9 +6790,104 @@
               </a:rPr>
               <a:t>(работа ПИ-регулятора)</a:t>
             </a:r>
-            <a:endParaRPr lang="ru-RU" sz="3200" dirty="0" smtClean="0">
+          </a:p>
+        </p:txBody>
+      </p:sp>
+      <p:sp>
+        <p:nvSpPr>
+          <p:cNvPr id="3" name="Прямоугольник 2"/>
+          <p:cNvSpPr/>
+          <p:nvPr/>
+        </p:nvSpPr>
+        <p:spPr>
+          <a:xfrm>
+            <a:off x="772357" y="193221"/>
+            <a:ext cx="11132598" cy="443198"/>
+          </a:xfrm>
+          <a:prstGeom prst="rect">
+            <a:avLst/>
+          </a:prstGeom>
+        </p:spPr>
+        <p:txBody>
+          <a:bodyPr wrap="square">
+            <a:spAutoFit/>
+          </a:bodyPr>
+          <a:lstStyle/>
+          <a:p>
+            <a:pPr indent="182880" algn="ctr">
+              <a:lnSpc>
+                <a:spcPct val="95000"/>
+              </a:lnSpc>
+              <a:spcAft>
+                <a:spcPts val="600"/>
+              </a:spcAft>
+              <a:tabLst>
+                <a:tab pos="182880" algn="l"/>
+              </a:tabLst>
+            </a:pPr>
+            <a:r>
+              <a:rPr lang="ru-RU" sz="2400" dirty="0" smtClean="0">
+                <a:solidFill>
+                  <a:schemeClr val="accent6"/>
+                </a:solidFill>
+                <a:latin typeface="Times New Roman" panose="02020603050405020304" pitchFamily="18" charset="0"/>
+                <a:cs typeface="Times New Roman" panose="02020603050405020304" pitchFamily="18" charset="0"/>
+              </a:rPr>
+              <a:t>Всё тот же вопрос: адаптивный регулятор нужен этой системе или нет?</a:t>
+            </a:r>
+            <a:endParaRPr lang="ru-RU" sz="2400" dirty="0" smtClean="0">
+              <a:solidFill>
+                <a:schemeClr val="accent6"/>
+              </a:solidFill>
               <a:latin typeface="Times New Roman" panose="02020603050405020304" pitchFamily="18" charset="0"/>
               <a:cs typeface="Times New Roman" panose="02020603050405020304" pitchFamily="18" charset="0"/>
+            </a:endParaRPr>
+          </a:p>
+        </p:txBody>
+      </p:sp>
+      <p:sp>
+        <p:nvSpPr>
+          <p:cNvPr id="4" name="Стрелка вниз 3"/>
+          <p:cNvSpPr/>
+          <p:nvPr/>
+        </p:nvSpPr>
+        <p:spPr>
+          <a:xfrm>
+            <a:off x="6134469" y="636419"/>
+            <a:ext cx="408373" cy="284086"/>
+          </a:xfrm>
+          <a:prstGeom prst="downArrow">
+            <a:avLst/>
+          </a:prstGeom>
+          <a:solidFill>
+            <a:schemeClr val="accent6"/>
+          </a:solidFill>
+        </p:spPr>
+        <p:style>
+          <a:lnRef idx="2">
+            <a:schemeClr val="accent1">
+              <a:shade val="50000"/>
+            </a:schemeClr>
+          </a:lnRef>
+          <a:fillRef idx="1">
+            <a:schemeClr val="accent1"/>
+          </a:fillRef>
+          <a:effectRef idx="0">
+            <a:schemeClr val="accent1"/>
+          </a:effectRef>
+          <a:fontRef idx="minor">
+            <a:schemeClr val="lt1"/>
+          </a:fontRef>
+        </p:style>
+        <p:txBody>
+          <a:bodyPr rtlCol="0" anchor="ctr"/>
+          <a:lstStyle/>
+          <a:p>
+            <a:pPr algn="ctr"/>
+            <a:endParaRPr lang="ru-RU">
+              <a:solidFill>
+                <a:schemeClr val="accent6"/>
+              </a:solidFill>
             </a:endParaRPr>
           </a:p>
         </p:txBody>
@@ -6316,69 +6922,16 @@
           <a:chExt cx="0" cy="0"/>
         </a:xfrm>
       </p:grpSpPr>
-      <p:pic>
-        <p:nvPicPr>
-          <p:cNvPr id="2" name="Рисунок 1"/>
-          <p:cNvPicPr>
-            <a:picLocks noChangeAspect="1"/>
-          </p:cNvPicPr>
-          <p:nvPr/>
-        </p:nvPicPr>
-        <p:blipFill rotWithShape="1">
-          <a:blip r:embed="rId3"/>
-          <a:srcRect b="453"/>
-          <a:stretch/>
-        </p:blipFill>
-        <p:spPr>
-          <a:xfrm>
-            <a:off x="175237" y="0"/>
-            <a:ext cx="5745525" cy="6826928"/>
-          </a:xfrm>
-          <a:prstGeom prst="rect">
-            <a:avLst/>
-          </a:prstGeom>
-        </p:spPr>
-      </p:pic>
-      <p:pic>
-        <p:nvPicPr>
-          <p:cNvPr id="3" name="Рисунок 2"/>
-          <p:cNvPicPr>
-            <a:picLocks noChangeAspect="1"/>
-          </p:cNvPicPr>
-          <p:nvPr/>
-        </p:nvPicPr>
-        <p:blipFill>
-          <a:blip r:embed="rId4">
-            <a:extLst>
-              <a:ext uri="{28A0092B-C50C-407E-A947-70E740481C1C}">
-                <a14:useLocalDpi xmlns:a14="http://schemas.microsoft.com/office/drawing/2010/main" val="0"/>
-              </a:ext>
-            </a:extLst>
-          </a:blip>
-          <a:stretch>
-            <a:fillRect/>
-          </a:stretch>
-        </p:blipFill>
-        <p:spPr>
-          <a:xfrm>
-            <a:off x="6439692" y="0"/>
-            <a:ext cx="5752308" cy="6858000"/>
-          </a:xfrm>
-          <a:prstGeom prst="rect">
-            <a:avLst/>
-          </a:prstGeom>
-        </p:spPr>
-      </p:pic>
-      <p:sp>
-        <p:nvSpPr>
-          <p:cNvPr id="26" name="Прямоугольник 25"/>
+      <p:sp>
+        <p:nvSpPr>
+          <p:cNvPr id="12" name="Прямоугольник 11"/>
           <p:cNvSpPr/>
           <p:nvPr/>
         </p:nvSpPr>
         <p:spPr>
           <a:xfrm>
-            <a:off x="1133804" y="1093059"/>
-            <a:ext cx="3012068" cy="1261884"/>
+            <a:off x="0" y="732331"/>
+            <a:ext cx="5805996" cy="5681555"/>
           </a:xfrm>
           <a:prstGeom prst="rect">
             <a:avLst/>
@@ -6402,53 +6955,522 @@
               </a:tabLst>
             </a:pPr>
             <a:r>
-              <a:rPr lang="ru-RU" sz="1600" dirty="0" smtClean="0">
-                <a:solidFill>
-                  <a:schemeClr val="accent2">
-                    <a:lumMod val="75000"/>
-                  </a:schemeClr>
-                </a:solidFill>
-                <a:latin typeface="Times New Roman" panose="02020603050405020304" pitchFamily="18" charset="0"/>
-                <a:cs typeface="Times New Roman" panose="02020603050405020304" pitchFamily="18" charset="0"/>
-              </a:rPr>
-              <a:t>Возмущение в установившемся режиме по температуре стенок испарителя.</a:t>
-            </a:r>
-            <a:br>
-              <a:rPr lang="ru-RU" sz="1600" dirty="0" smtClean="0">
-                <a:solidFill>
-                  <a:schemeClr val="accent2">
-                    <a:lumMod val="75000"/>
-                  </a:schemeClr>
-                </a:solidFill>
-                <a:latin typeface="Times New Roman" panose="02020603050405020304" pitchFamily="18" charset="0"/>
-                <a:cs typeface="Times New Roman" panose="02020603050405020304" pitchFamily="18" charset="0"/>
-              </a:rPr>
-            </a:br>
-            <a:r>
-              <a:rPr lang="ru-RU" sz="1600" dirty="0" smtClean="0">
-                <a:solidFill>
-                  <a:schemeClr val="accent2">
-                    <a:lumMod val="75000"/>
-                  </a:schemeClr>
-                </a:solidFill>
-                <a:latin typeface="Times New Roman" panose="02020603050405020304" pitchFamily="18" charset="0"/>
-                <a:cs typeface="Times New Roman" panose="02020603050405020304" pitchFamily="18" charset="0"/>
-              </a:rPr>
-              <a:t>Отработка ПИ-регулятора без сигнальной адаптации.</a:t>
-            </a:r>
-          </a:p>
-        </p:txBody>
-      </p:sp>
-      <p:sp>
-        <p:nvSpPr>
-          <p:cNvPr id="45" name="Прямоугольник 44"/>
+              <a:rPr lang="ru-RU" sz="3200" dirty="0">
+                <a:solidFill>
+                  <a:schemeClr val="accent2">
+                    <a:lumMod val="75000"/>
+                  </a:schemeClr>
+                </a:solidFill>
+                <a:latin typeface="Times New Roman" panose="02020603050405020304" pitchFamily="18" charset="0"/>
+                <a:cs typeface="Times New Roman" panose="02020603050405020304" pitchFamily="18" charset="0"/>
+              </a:rPr>
+              <a:t>С</a:t>
+            </a:r>
+            <a:r>
+              <a:rPr lang="ru-RU" sz="3200" dirty="0" smtClean="0">
+                <a:solidFill>
+                  <a:schemeClr val="accent2">
+                    <a:lumMod val="75000"/>
+                  </a:schemeClr>
+                </a:solidFill>
+                <a:latin typeface="Times New Roman" panose="02020603050405020304" pitchFamily="18" charset="0"/>
+                <a:cs typeface="Times New Roman" panose="02020603050405020304" pitchFamily="18" charset="0"/>
+              </a:rPr>
+              <a:t>писок глобальных вопросов:</a:t>
+            </a:r>
+          </a:p>
+          <a:p>
+            <a:pPr marL="514350" indent="-514350">
+              <a:lnSpc>
+                <a:spcPct val="95000"/>
+              </a:lnSpc>
+              <a:spcAft>
+                <a:spcPts val="600"/>
+              </a:spcAft>
+              <a:buFont typeface="+mj-lt"/>
+              <a:buAutoNum type="arabicPeriod"/>
+              <a:tabLst>
+                <a:tab pos="182880" algn="l"/>
+              </a:tabLst>
+            </a:pPr>
+            <a:r>
+              <a:rPr lang="ru-RU" dirty="0" smtClean="0">
+                <a:solidFill>
+                  <a:schemeClr val="accent2">
+                    <a:lumMod val="75000"/>
+                  </a:schemeClr>
+                </a:solidFill>
+                <a:latin typeface="Times New Roman" panose="02020603050405020304" pitchFamily="18" charset="0"/>
+                <a:cs typeface="Times New Roman" panose="02020603050405020304" pitchFamily="18" charset="0"/>
+              </a:rPr>
+              <a:t>Нужен ли регулятор </a:t>
+            </a:r>
+            <a:r>
+              <a:rPr lang="ru-RU" dirty="0">
+                <a:solidFill>
+                  <a:schemeClr val="accent2">
+                    <a:lumMod val="75000"/>
+                  </a:schemeClr>
+                </a:solidFill>
+                <a:latin typeface="Times New Roman" panose="02020603050405020304" pitchFamily="18" charset="0"/>
+                <a:cs typeface="Times New Roman" panose="02020603050405020304" pitchFamily="18" charset="0"/>
+              </a:rPr>
+              <a:t>не по одной пространственной точки, а по всем четырём, </a:t>
+            </a:r>
+            <a:r>
+              <a:rPr lang="ru-RU" dirty="0" smtClean="0">
+                <a:solidFill>
+                  <a:schemeClr val="accent2">
+                    <a:lumMod val="75000"/>
+                  </a:schemeClr>
+                </a:solidFill>
+                <a:latin typeface="Times New Roman" panose="02020603050405020304" pitchFamily="18" charset="0"/>
+                <a:cs typeface="Times New Roman" panose="02020603050405020304" pitchFamily="18" charset="0"/>
+              </a:rPr>
+              <a:t>для создания более плавного регулирования?</a:t>
+            </a:r>
+          </a:p>
+          <a:p>
+            <a:pPr marL="514350" indent="-514350">
+              <a:lnSpc>
+                <a:spcPct val="95000"/>
+              </a:lnSpc>
+              <a:spcAft>
+                <a:spcPts val="600"/>
+              </a:spcAft>
+              <a:buFont typeface="+mj-lt"/>
+              <a:buAutoNum type="arabicPeriod"/>
+              <a:tabLst>
+                <a:tab pos="182880" algn="l"/>
+              </a:tabLst>
+            </a:pPr>
+            <a:r>
+              <a:rPr lang="ru-RU" dirty="0" smtClean="0">
+                <a:solidFill>
+                  <a:schemeClr val="accent2">
+                    <a:lumMod val="75000"/>
+                  </a:schemeClr>
+                </a:solidFill>
+                <a:latin typeface="Times New Roman" panose="02020603050405020304" pitchFamily="18" charset="0"/>
+                <a:cs typeface="Times New Roman" panose="02020603050405020304" pitchFamily="18" charset="0"/>
+              </a:rPr>
+              <a:t>Может ли </a:t>
+            </a:r>
+            <a:r>
+              <a:rPr lang="ru-RU" dirty="0">
+                <a:solidFill>
+                  <a:schemeClr val="accent2">
+                    <a:lumMod val="75000"/>
+                  </a:schemeClr>
+                </a:solidFill>
+                <a:latin typeface="Times New Roman" panose="02020603050405020304" pitchFamily="18" charset="0"/>
+                <a:cs typeface="Times New Roman" panose="02020603050405020304" pitchFamily="18" charset="0"/>
+              </a:rPr>
+              <a:t>скорость потока жидкости исходной смеси </a:t>
+            </a:r>
+            <a:r>
+              <a:rPr lang="ru-RU" dirty="0" smtClean="0">
+                <a:solidFill>
+                  <a:schemeClr val="accent2">
+                    <a:lumMod val="75000"/>
+                  </a:schemeClr>
+                </a:solidFill>
+                <a:latin typeface="Times New Roman" panose="02020603050405020304" pitchFamily="18" charset="0"/>
+                <a:cs typeface="Times New Roman" panose="02020603050405020304" pitchFamily="18" charset="0"/>
+              </a:rPr>
+              <a:t>быть </a:t>
+            </a:r>
+            <a:r>
+              <a:rPr lang="ru-RU" dirty="0">
+                <a:solidFill>
+                  <a:schemeClr val="accent2">
+                    <a:lumMod val="75000"/>
+                  </a:schemeClr>
+                </a:solidFill>
+                <a:latin typeface="Times New Roman" panose="02020603050405020304" pitchFamily="18" charset="0"/>
+                <a:cs typeface="Times New Roman" panose="02020603050405020304" pitchFamily="18" charset="0"/>
+              </a:rPr>
+              <a:t>внешним </a:t>
+            </a:r>
+            <a:r>
+              <a:rPr lang="ru-RU" dirty="0" smtClean="0">
+                <a:solidFill>
+                  <a:schemeClr val="accent2">
+                    <a:lumMod val="75000"/>
+                  </a:schemeClr>
+                </a:solidFill>
+                <a:latin typeface="Times New Roman" panose="02020603050405020304" pitchFamily="18" charset="0"/>
+                <a:cs typeface="Times New Roman" panose="02020603050405020304" pitchFamily="18" charset="0"/>
+              </a:rPr>
+              <a:t>возмущением для этой системы?</a:t>
+            </a:r>
+          </a:p>
+          <a:p>
+            <a:pPr marL="514350" indent="-514350">
+              <a:lnSpc>
+                <a:spcPct val="95000"/>
+              </a:lnSpc>
+              <a:spcAft>
+                <a:spcPts val="600"/>
+              </a:spcAft>
+              <a:buFont typeface="+mj-lt"/>
+              <a:buAutoNum type="arabicPeriod"/>
+              <a:tabLst>
+                <a:tab pos="182880" algn="l"/>
+              </a:tabLst>
+            </a:pPr>
+            <a:r>
+              <a:rPr lang="ru-RU" dirty="0">
+                <a:solidFill>
+                  <a:schemeClr val="accent2">
+                    <a:lumMod val="75000"/>
+                  </a:schemeClr>
+                </a:solidFill>
+                <a:latin typeface="Times New Roman" panose="02020603050405020304" pitchFamily="18" charset="0"/>
+                <a:cs typeface="Times New Roman" panose="02020603050405020304" pitchFamily="18" charset="0"/>
+              </a:rPr>
+              <a:t>Есть ли смысл разрабатывать дополнительный регулятор по концентр. воды в </a:t>
+            </a:r>
+            <a:r>
+              <a:rPr lang="ru-RU" dirty="0" err="1">
+                <a:solidFill>
+                  <a:schemeClr val="accent2">
+                    <a:lumMod val="75000"/>
+                  </a:schemeClr>
+                </a:solidFill>
+                <a:latin typeface="Times New Roman" panose="02020603050405020304" pitchFamily="18" charset="0"/>
+                <a:cs typeface="Times New Roman" panose="02020603050405020304" pitchFamily="18" charset="0"/>
+              </a:rPr>
+              <a:t>абс</a:t>
+            </a:r>
+            <a:r>
+              <a:rPr lang="ru-RU" dirty="0" smtClean="0">
+                <a:solidFill>
+                  <a:schemeClr val="accent2">
+                    <a:lumMod val="75000"/>
+                  </a:schemeClr>
+                </a:solidFill>
+                <a:latin typeface="Times New Roman" panose="02020603050405020304" pitchFamily="18" charset="0"/>
+                <a:cs typeface="Times New Roman" panose="02020603050405020304" pitchFamily="18" charset="0"/>
+              </a:rPr>
+              <a:t>.?</a:t>
+            </a:r>
+          </a:p>
+          <a:p>
+            <a:pPr marL="514350" indent="-514350">
+              <a:lnSpc>
+                <a:spcPct val="95000"/>
+              </a:lnSpc>
+              <a:spcAft>
+                <a:spcPts val="600"/>
+              </a:spcAft>
+              <a:buFont typeface="+mj-lt"/>
+              <a:buAutoNum type="arabicPeriod"/>
+              <a:tabLst>
+                <a:tab pos="182880" algn="l"/>
+              </a:tabLst>
+            </a:pPr>
+            <a:r>
+              <a:rPr lang="ru-RU" dirty="0" smtClean="0">
+                <a:solidFill>
+                  <a:schemeClr val="accent2">
+                    <a:lumMod val="75000"/>
+                  </a:schemeClr>
+                </a:solidFill>
+                <a:latin typeface="Times New Roman" panose="02020603050405020304" pitchFamily="18" charset="0"/>
+                <a:cs typeface="Times New Roman" panose="02020603050405020304" pitchFamily="18" charset="0"/>
+              </a:rPr>
+              <a:t>Кстати, получается, что в испарителе у нас должно быть не просто 4 пространственные точки для 6 уравнений, а 4 пространственные точки для 4 уравнений (</a:t>
+            </a:r>
+            <a:r>
+              <a:rPr lang="ru-RU" dirty="0" err="1" smtClean="0">
+                <a:solidFill>
+                  <a:schemeClr val="accent2">
+                    <a:lumMod val="75000"/>
+                  </a:schemeClr>
+                </a:solidFill>
+                <a:latin typeface="Times New Roman" panose="02020603050405020304" pitchFamily="18" charset="0"/>
+                <a:cs typeface="Times New Roman" panose="02020603050405020304" pitchFamily="18" charset="0"/>
+              </a:rPr>
+              <a:t>Сжид</a:t>
+            </a:r>
+            <a:r>
+              <a:rPr lang="ru-RU" dirty="0" smtClean="0">
+                <a:solidFill>
+                  <a:schemeClr val="accent2">
+                    <a:lumMod val="75000"/>
+                  </a:schemeClr>
+                </a:solidFill>
+                <a:latin typeface="Times New Roman" panose="02020603050405020304" pitchFamily="18" charset="0"/>
+                <a:cs typeface="Times New Roman" panose="02020603050405020304" pitchFamily="18" charset="0"/>
+              </a:rPr>
+              <a:t>, </a:t>
+            </a:r>
+            <a:r>
+              <a:rPr lang="ru-RU" dirty="0" err="1" smtClean="0">
+                <a:solidFill>
+                  <a:schemeClr val="accent2">
+                    <a:lumMod val="75000"/>
+                  </a:schemeClr>
+                </a:solidFill>
+                <a:latin typeface="Times New Roman" panose="02020603050405020304" pitchFamily="18" charset="0"/>
+                <a:cs typeface="Times New Roman" panose="02020603050405020304" pitchFamily="18" charset="0"/>
+              </a:rPr>
+              <a:t>Тжид</a:t>
+            </a:r>
+            <a:r>
+              <a:rPr lang="ru-RU" dirty="0" smtClean="0">
+                <a:solidFill>
+                  <a:schemeClr val="accent2">
+                    <a:lumMod val="75000"/>
+                  </a:schemeClr>
+                </a:solidFill>
+                <a:latin typeface="Times New Roman" panose="02020603050405020304" pitchFamily="18" charset="0"/>
+                <a:cs typeface="Times New Roman" panose="02020603050405020304" pitchFamily="18" charset="0"/>
+              </a:rPr>
+              <a:t>, </a:t>
+            </a:r>
+            <a:r>
+              <a:rPr lang="ru-RU" dirty="0" err="1" smtClean="0">
+                <a:solidFill>
+                  <a:schemeClr val="accent2">
+                    <a:lumMod val="75000"/>
+                  </a:schemeClr>
+                </a:solidFill>
+                <a:latin typeface="Times New Roman" panose="02020603050405020304" pitchFamily="18" charset="0"/>
+                <a:cs typeface="Times New Roman" panose="02020603050405020304" pitchFamily="18" charset="0"/>
+              </a:rPr>
+              <a:t>Тст</a:t>
+            </a:r>
+            <a:r>
+              <a:rPr lang="ru-RU" dirty="0" smtClean="0">
+                <a:solidFill>
+                  <a:schemeClr val="accent2">
+                    <a:lumMod val="75000"/>
+                  </a:schemeClr>
+                </a:solidFill>
+                <a:latin typeface="Times New Roman" panose="02020603050405020304" pitchFamily="18" charset="0"/>
+                <a:cs typeface="Times New Roman" panose="02020603050405020304" pitchFamily="18" charset="0"/>
+              </a:rPr>
+              <a:t>, </a:t>
+            </a:r>
+            <a:r>
+              <a:rPr lang="ru-RU" dirty="0" err="1" smtClean="0">
+                <a:solidFill>
+                  <a:schemeClr val="accent2">
+                    <a:lumMod val="75000"/>
+                  </a:schemeClr>
+                </a:solidFill>
+                <a:latin typeface="Times New Roman" panose="02020603050405020304" pitchFamily="18" charset="0"/>
+                <a:cs typeface="Times New Roman" panose="02020603050405020304" pitchFamily="18" charset="0"/>
+              </a:rPr>
+              <a:t>Тдг</a:t>
+            </a:r>
+            <a:r>
+              <a:rPr lang="ru-RU" dirty="0" smtClean="0">
+                <a:solidFill>
+                  <a:schemeClr val="accent2">
+                    <a:lumMod val="75000"/>
+                  </a:schemeClr>
+                </a:solidFill>
+                <a:latin typeface="Times New Roman" panose="02020603050405020304" pitchFamily="18" charset="0"/>
+                <a:cs typeface="Times New Roman" panose="02020603050405020304" pitchFamily="18" charset="0"/>
+              </a:rPr>
+              <a:t>) и 2 </a:t>
+            </a:r>
+            <a:r>
+              <a:rPr lang="ru-RU" dirty="0">
+                <a:solidFill>
+                  <a:schemeClr val="accent2">
+                    <a:lumMod val="75000"/>
+                  </a:schemeClr>
+                </a:solidFill>
+                <a:latin typeface="Times New Roman" panose="02020603050405020304" pitchFamily="18" charset="0"/>
+                <a:cs typeface="Times New Roman" panose="02020603050405020304" pitchFamily="18" charset="0"/>
+              </a:rPr>
+              <a:t>пространственные точки для </a:t>
+            </a:r>
+            <a:r>
+              <a:rPr lang="ru-RU" dirty="0" smtClean="0">
+                <a:solidFill>
+                  <a:schemeClr val="accent2">
+                    <a:lumMod val="75000"/>
+                  </a:schemeClr>
+                </a:solidFill>
+                <a:latin typeface="Times New Roman" panose="02020603050405020304" pitchFamily="18" charset="0"/>
+                <a:cs typeface="Times New Roman" panose="02020603050405020304" pitchFamily="18" charset="0"/>
+              </a:rPr>
+              <a:t>2 </a:t>
+            </a:r>
+            <a:r>
+              <a:rPr lang="ru-RU" dirty="0">
+                <a:solidFill>
+                  <a:schemeClr val="accent2">
+                    <a:lumMod val="75000"/>
+                  </a:schemeClr>
+                </a:solidFill>
+                <a:latin typeface="Times New Roman" panose="02020603050405020304" pitchFamily="18" charset="0"/>
+                <a:cs typeface="Times New Roman" panose="02020603050405020304" pitchFamily="18" charset="0"/>
+              </a:rPr>
+              <a:t>уравнений (</a:t>
+            </a:r>
+            <a:r>
+              <a:rPr lang="ru-RU" dirty="0" err="1" smtClean="0">
+                <a:solidFill>
+                  <a:schemeClr val="accent2">
+                    <a:lumMod val="75000"/>
+                  </a:schemeClr>
+                </a:solidFill>
+                <a:latin typeface="Times New Roman" panose="02020603050405020304" pitchFamily="18" charset="0"/>
+                <a:cs typeface="Times New Roman" panose="02020603050405020304" pitchFamily="18" charset="0"/>
+              </a:rPr>
+              <a:t>Спар</a:t>
+            </a:r>
+            <a:r>
+              <a:rPr lang="ru-RU" dirty="0" smtClean="0">
+                <a:solidFill>
+                  <a:schemeClr val="accent2">
+                    <a:lumMod val="75000"/>
+                  </a:schemeClr>
+                </a:solidFill>
+                <a:latin typeface="Times New Roman" panose="02020603050405020304" pitchFamily="18" charset="0"/>
+                <a:cs typeface="Times New Roman" panose="02020603050405020304" pitchFamily="18" charset="0"/>
+              </a:rPr>
+              <a:t>, </a:t>
+            </a:r>
+            <a:r>
+              <a:rPr lang="ru-RU" dirty="0" err="1" smtClean="0">
+                <a:solidFill>
+                  <a:schemeClr val="accent2">
+                    <a:lumMod val="75000"/>
+                  </a:schemeClr>
+                </a:solidFill>
+                <a:latin typeface="Times New Roman" panose="02020603050405020304" pitchFamily="18" charset="0"/>
+                <a:cs typeface="Times New Roman" panose="02020603050405020304" pitchFamily="18" charset="0"/>
+              </a:rPr>
+              <a:t>Тпар</a:t>
+            </a:r>
+            <a:r>
+              <a:rPr lang="ru-RU" dirty="0" smtClean="0">
+                <a:solidFill>
+                  <a:schemeClr val="accent2">
+                    <a:lumMod val="75000"/>
+                  </a:schemeClr>
+                </a:solidFill>
+                <a:latin typeface="Times New Roman" panose="02020603050405020304" pitchFamily="18" charset="0"/>
+                <a:cs typeface="Times New Roman" panose="02020603050405020304" pitchFamily="18" charset="0"/>
+              </a:rPr>
+              <a:t>), находящиеся чуть выше (это сколько? и надо ли это учитывать? и где?) уровня жидкости, в </a:t>
+            </a:r>
+            <a:r>
+              <a:rPr lang="ru-RU" dirty="0" err="1" smtClean="0">
+                <a:solidFill>
+                  <a:schemeClr val="accent2">
+                    <a:lumMod val="75000"/>
+                  </a:schemeClr>
+                </a:solidFill>
+                <a:latin typeface="Times New Roman" panose="02020603050405020304" pitchFamily="18" charset="0"/>
+                <a:cs typeface="Times New Roman" panose="02020603050405020304" pitchFamily="18" charset="0"/>
+              </a:rPr>
+              <a:t>эвопорциальном</a:t>
+            </a:r>
+            <a:r>
+              <a:rPr lang="ru-RU" dirty="0" smtClean="0">
+                <a:solidFill>
+                  <a:schemeClr val="accent2">
+                    <a:lumMod val="75000"/>
+                  </a:schemeClr>
+                </a:solidFill>
+                <a:latin typeface="Times New Roman" panose="02020603050405020304" pitchFamily="18" charset="0"/>
+                <a:cs typeface="Times New Roman" panose="02020603050405020304" pitchFamily="18" charset="0"/>
+              </a:rPr>
+              <a:t> пространстве.</a:t>
+            </a:r>
+          </a:p>
+          <a:p>
+            <a:pPr marL="514350" indent="-514350">
+              <a:lnSpc>
+                <a:spcPct val="95000"/>
+              </a:lnSpc>
+              <a:spcAft>
+                <a:spcPts val="600"/>
+              </a:spcAft>
+              <a:buFont typeface="+mj-lt"/>
+              <a:buAutoNum type="arabicPeriod"/>
+              <a:tabLst>
+                <a:tab pos="182880" algn="l"/>
+              </a:tabLst>
+            </a:pPr>
+            <a:r>
+              <a:rPr lang="ru-RU" dirty="0">
+                <a:solidFill>
+                  <a:schemeClr val="accent2">
+                    <a:lumMod val="75000"/>
+                  </a:schemeClr>
+                </a:solidFill>
+                <a:latin typeface="Times New Roman" panose="02020603050405020304" pitchFamily="18" charset="0"/>
+                <a:cs typeface="Times New Roman" panose="02020603050405020304" pitchFamily="18" charset="0"/>
+              </a:rPr>
+              <a:t>Может использовать законы адаптации именно для ПОДСТРОЙКИ </a:t>
+            </a:r>
+            <a:r>
+              <a:rPr lang="ru-RU" dirty="0" err="1">
+                <a:solidFill>
+                  <a:schemeClr val="accent2">
+                    <a:lumMod val="75000"/>
+                  </a:schemeClr>
+                </a:solidFill>
+                <a:latin typeface="Times New Roman" panose="02020603050405020304" pitchFamily="18" charset="0"/>
+                <a:cs typeface="Times New Roman" panose="02020603050405020304" pitchFamily="18" charset="0"/>
+              </a:rPr>
+              <a:t>коэф</a:t>
+            </a:r>
+            <a:r>
+              <a:rPr lang="ru-RU" dirty="0">
+                <a:solidFill>
+                  <a:schemeClr val="accent2">
+                    <a:lumMod val="75000"/>
+                  </a:schemeClr>
+                </a:solidFill>
+                <a:latin typeface="Times New Roman" panose="02020603050405020304" pitchFamily="18" charset="0"/>
+                <a:cs typeface="Times New Roman" panose="02020603050405020304" pitchFamily="18" charset="0"/>
+              </a:rPr>
+              <a:t>. </a:t>
+            </a:r>
+            <a:r>
+              <a:rPr lang="ru-RU" dirty="0" smtClean="0">
+                <a:solidFill>
+                  <a:schemeClr val="accent2">
+                    <a:lumMod val="75000"/>
+                  </a:schemeClr>
+                </a:solidFill>
+                <a:latin typeface="Times New Roman" panose="02020603050405020304" pitchFamily="18" charset="0"/>
+                <a:cs typeface="Times New Roman" panose="02020603050405020304" pitchFamily="18" charset="0"/>
+              </a:rPr>
+              <a:t>ПИД-регулятора?</a:t>
+            </a:r>
+            <a:endParaRPr lang="ru-RU" dirty="0">
+              <a:solidFill>
+                <a:schemeClr val="accent2">
+                  <a:lumMod val="75000"/>
+                </a:schemeClr>
+              </a:solidFill>
+              <a:latin typeface="Times New Roman" panose="02020603050405020304" pitchFamily="18" charset="0"/>
+              <a:cs typeface="Times New Roman" panose="02020603050405020304" pitchFamily="18" charset="0"/>
+            </a:endParaRPr>
+          </a:p>
+        </p:txBody>
+      </p:sp>
+      <p:sp>
+        <p:nvSpPr>
+          <p:cNvPr id="7" name="Прямоугольник 6"/>
           <p:cNvSpPr/>
           <p:nvPr/>
         </p:nvSpPr>
         <p:spPr>
           <a:xfrm>
-            <a:off x="645202" y="5115985"/>
-            <a:ext cx="3071615" cy="911019"/>
+            <a:off x="6167603" y="740799"/>
+            <a:ext cx="5852762" cy="4892108"/>
           </a:xfrm>
           <a:prstGeom prst="rect">
             <a:avLst/>
@@ -6460,7 +7482,7 @@
           </a:bodyPr>
           <a:lstStyle/>
           <a:p>
-            <a:pPr indent="182880" algn="ctr">
+            <a:pPr>
               <a:lnSpc>
                 <a:spcPct val="95000"/>
               </a:lnSpc>
@@ -6472,195 +7494,418 @@
               </a:tabLst>
             </a:pPr>
             <a:r>
-              <a:rPr lang="ru-RU" sz="1400" dirty="0" smtClean="0">
-                <a:solidFill>
-                  <a:schemeClr val="accent2">
-                    <a:lumMod val="75000"/>
-                  </a:schemeClr>
-                </a:solidFill>
-                <a:latin typeface="Times New Roman" panose="02020603050405020304" pitchFamily="18" charset="0"/>
-                <a:cs typeface="Times New Roman" panose="02020603050405020304" pitchFamily="18" charset="0"/>
-              </a:rPr>
-              <a:t>Если бы был регулятор не по одной пространственной точки, а по всем четырём, то скорее всего регулирование было бы </a:t>
-            </a:r>
-            <a:r>
-              <a:rPr lang="ru-RU" sz="1400" dirty="0" err="1" smtClean="0">
-                <a:solidFill>
-                  <a:schemeClr val="accent2">
-                    <a:lumMod val="75000"/>
-                  </a:schemeClr>
-                </a:solidFill>
-                <a:latin typeface="Times New Roman" panose="02020603050405020304" pitchFamily="18" charset="0"/>
-                <a:cs typeface="Times New Roman" panose="02020603050405020304" pitchFamily="18" charset="0"/>
-              </a:rPr>
-              <a:t>плавнее</a:t>
-            </a:r>
-            <a:r>
-              <a:rPr lang="ru-RU" sz="1400" dirty="0" smtClean="0">
-                <a:solidFill>
-                  <a:schemeClr val="accent2">
-                    <a:lumMod val="75000"/>
-                  </a:schemeClr>
-                </a:solidFill>
-                <a:latin typeface="Times New Roman" panose="02020603050405020304" pitchFamily="18" charset="0"/>
-                <a:cs typeface="Times New Roman" panose="02020603050405020304" pitchFamily="18" charset="0"/>
-              </a:rPr>
-              <a:t>...</a:t>
-            </a:r>
-          </a:p>
-        </p:txBody>
-      </p:sp>
-      <p:sp>
-        <p:nvSpPr>
-          <p:cNvPr id="47" name="Прямоугольник 46"/>
-          <p:cNvSpPr/>
-          <p:nvPr/>
-        </p:nvSpPr>
-        <p:spPr>
-          <a:xfrm>
-            <a:off x="10149316" y="3748130"/>
-            <a:ext cx="2042684" cy="2190460"/>
-          </a:xfrm>
-          <a:prstGeom prst="rect">
-            <a:avLst/>
-          </a:prstGeom>
-        </p:spPr>
-        <p:txBody>
-          <a:bodyPr wrap="square">
-            <a:spAutoFit/>
-          </a:bodyPr>
-          <a:lstStyle/>
-          <a:p>
-            <a:pPr indent="182880" algn="ctr">
+              <a:rPr lang="ru-RU" sz="3200" dirty="0" smtClean="0">
+                <a:solidFill>
+                  <a:schemeClr val="accent2">
+                    <a:lumMod val="75000"/>
+                  </a:schemeClr>
+                </a:solidFill>
+                <a:latin typeface="Times New Roman" panose="02020603050405020304" pitchFamily="18" charset="0"/>
+                <a:cs typeface="Times New Roman" panose="02020603050405020304" pitchFamily="18" charset="0"/>
+              </a:rPr>
+              <a:t>Задачи:</a:t>
+            </a:r>
+          </a:p>
+          <a:p>
+            <a:pPr marL="342900" indent="-342900">
               <a:lnSpc>
                 <a:spcPct val="95000"/>
               </a:lnSpc>
               <a:spcAft>
                 <a:spcPts val="600"/>
               </a:spcAft>
+              <a:buFont typeface="+mj-lt"/>
+              <a:buAutoNum type="arabicPeriod"/>
               <a:tabLst>
                 <a:tab pos="182880" algn="l"/>
               </a:tabLst>
             </a:pPr>
             <a:r>
-              <a:rPr lang="ru-RU" sz="1400" dirty="0" smtClean="0">
-                <a:solidFill>
-                  <a:schemeClr val="accent2">
-                    <a:lumMod val="75000"/>
-                  </a:schemeClr>
-                </a:solidFill>
-                <a:latin typeface="Times New Roman" panose="02020603050405020304" pitchFamily="18" charset="0"/>
-                <a:cs typeface="Times New Roman" panose="02020603050405020304" pitchFamily="18" charset="0"/>
-              </a:rPr>
-              <a:t>Обычно газовые горелки (бутановые) имеют температуру горения газов от 800 до 2000 градусов. Отсюда вопрос: почему система явно настроена на </a:t>
-            </a:r>
-            <a:r>
-              <a:rPr lang="ru-RU" sz="1400" dirty="0">
-                <a:solidFill>
-                  <a:schemeClr val="accent2">
-                    <a:lumMod val="75000"/>
-                  </a:schemeClr>
-                </a:solidFill>
-                <a:latin typeface="Times New Roman" panose="02020603050405020304" pitchFamily="18" charset="0"/>
-                <a:cs typeface="Times New Roman" panose="02020603050405020304" pitchFamily="18" charset="0"/>
-              </a:rPr>
-              <a:t>температуру горения газов </a:t>
-            </a:r>
-            <a:r>
-              <a:rPr lang="ru-RU" sz="1400" dirty="0" smtClean="0">
-                <a:solidFill>
-                  <a:schemeClr val="accent2">
-                    <a:lumMod val="75000"/>
-                  </a:schemeClr>
-                </a:solidFill>
-                <a:latin typeface="Times New Roman" panose="02020603050405020304" pitchFamily="18" charset="0"/>
-                <a:cs typeface="Times New Roman" panose="02020603050405020304" pitchFamily="18" charset="0"/>
-              </a:rPr>
-              <a:t>не больше 550 градусов? </a:t>
-            </a:r>
-          </a:p>
-        </p:txBody>
-      </p:sp>
-      <p:sp>
-        <p:nvSpPr>
-          <p:cNvPr id="73" name="Прямоугольник 72"/>
-          <p:cNvSpPr/>
-          <p:nvPr/>
-        </p:nvSpPr>
-        <p:spPr>
-          <a:xfrm>
-            <a:off x="7398998" y="3637118"/>
-            <a:ext cx="2789051" cy="1934376"/>
-          </a:xfrm>
-          <a:prstGeom prst="rect">
-            <a:avLst/>
-          </a:prstGeom>
-        </p:spPr>
-        <p:txBody>
-          <a:bodyPr wrap="square">
-            <a:spAutoFit/>
-          </a:bodyPr>
-          <a:lstStyle/>
-          <a:p>
-            <a:pPr indent="182880" algn="ctr">
+              <a:rPr lang="ru-RU" dirty="0" smtClean="0">
+                <a:solidFill>
+                  <a:schemeClr val="accent2">
+                    <a:lumMod val="75000"/>
+                  </a:schemeClr>
+                </a:solidFill>
+                <a:latin typeface="Times New Roman" panose="02020603050405020304" pitchFamily="18" charset="0"/>
+                <a:cs typeface="Times New Roman" panose="02020603050405020304" pitchFamily="18" charset="0"/>
+              </a:rPr>
+              <a:t>Необходимо </a:t>
+            </a:r>
+            <a:r>
+              <a:rPr lang="ru-RU" dirty="0">
+                <a:solidFill>
+                  <a:schemeClr val="accent2">
+                    <a:lumMod val="75000"/>
+                  </a:schemeClr>
+                </a:solidFill>
+                <a:latin typeface="Times New Roman" panose="02020603050405020304" pitchFamily="18" charset="0"/>
+                <a:cs typeface="Times New Roman" panose="02020603050405020304" pitchFamily="18" charset="0"/>
+              </a:rPr>
+              <a:t>ДОРЕАЛИЗОВАТЬ </a:t>
+            </a:r>
+            <a:r>
+              <a:rPr lang="ru-RU" dirty="0" err="1">
+                <a:solidFill>
+                  <a:schemeClr val="accent2">
+                    <a:lumMod val="75000"/>
+                  </a:schemeClr>
+                </a:solidFill>
+                <a:latin typeface="Times New Roman" panose="02020603050405020304" pitchFamily="18" charset="0"/>
+                <a:cs typeface="Times New Roman" panose="02020603050405020304" pitchFamily="18" charset="0"/>
+              </a:rPr>
+              <a:t>физичность</a:t>
+            </a:r>
+            <a:r>
+              <a:rPr lang="ru-RU" dirty="0">
+                <a:solidFill>
+                  <a:schemeClr val="accent2">
+                    <a:lumMod val="75000"/>
+                  </a:schemeClr>
+                </a:solidFill>
+                <a:latin typeface="Times New Roman" panose="02020603050405020304" pitchFamily="18" charset="0"/>
+                <a:cs typeface="Times New Roman" panose="02020603050405020304" pitchFamily="18" charset="0"/>
+              </a:rPr>
+              <a:t> нарастания температуры дымовых газов, ведь поддерживать температуру дымовых газов в 40 градусов НЕВОЗМОЖНО (ведь так</a:t>
+            </a:r>
+            <a:r>
+              <a:rPr lang="ru-RU" dirty="0" smtClean="0">
+                <a:solidFill>
+                  <a:schemeClr val="accent2">
+                    <a:lumMod val="75000"/>
+                  </a:schemeClr>
+                </a:solidFill>
+                <a:latin typeface="Times New Roman" panose="02020603050405020304" pitchFamily="18" charset="0"/>
+                <a:cs typeface="Times New Roman" panose="02020603050405020304" pitchFamily="18" charset="0"/>
+              </a:rPr>
+              <a:t>?).</a:t>
+            </a:r>
+          </a:p>
+          <a:p>
+            <a:pPr marL="342900" indent="-342900">
               <a:lnSpc>
                 <a:spcPct val="95000"/>
               </a:lnSpc>
               <a:spcAft>
                 <a:spcPts val="600"/>
               </a:spcAft>
+              <a:buFont typeface="+mj-lt"/>
+              <a:buAutoNum type="arabicPeriod"/>
               <a:tabLst>
                 <a:tab pos="182880" algn="l"/>
               </a:tabLst>
             </a:pPr>
             <a:r>
-              <a:rPr lang="ru-RU" sz="1400" dirty="0">
-                <a:solidFill>
-                  <a:schemeClr val="accent2">
-                    <a:lumMod val="75000"/>
-                  </a:schemeClr>
-                </a:solidFill>
-                <a:latin typeface="Times New Roman" panose="02020603050405020304" pitchFamily="18" charset="0"/>
-                <a:cs typeface="Times New Roman" panose="02020603050405020304" pitchFamily="18" charset="0"/>
-              </a:rPr>
-              <a:t>Р</a:t>
-            </a:r>
-            <a:r>
-              <a:rPr lang="ru-RU" sz="1400" dirty="0" smtClean="0">
-                <a:solidFill>
-                  <a:schemeClr val="accent2">
-                    <a:lumMod val="75000"/>
-                  </a:schemeClr>
-                </a:solidFill>
-                <a:latin typeface="Times New Roman" panose="02020603050405020304" pitchFamily="18" charset="0"/>
-                <a:cs typeface="Times New Roman" panose="02020603050405020304" pitchFamily="18" charset="0"/>
-              </a:rPr>
-              <a:t>егулятор отработал возмущение, но т.к. изменились «свойства» системы, то «теперь» нормальная температура дымовых газов равна 40 градусам, что достаточно </a:t>
-            </a:r>
-            <a:r>
-              <a:rPr lang="ru-RU" sz="1400" dirty="0" err="1" smtClean="0">
-                <a:solidFill>
-                  <a:schemeClr val="accent2">
-                    <a:lumMod val="75000"/>
-                  </a:schemeClr>
-                </a:solidFill>
-                <a:latin typeface="Times New Roman" panose="02020603050405020304" pitchFamily="18" charset="0"/>
-                <a:cs typeface="Times New Roman" panose="02020603050405020304" pitchFamily="18" charset="0"/>
-              </a:rPr>
-              <a:t>нефизично</a:t>
-            </a:r>
-            <a:r>
-              <a:rPr lang="ru-RU" sz="1400" dirty="0" smtClean="0">
-                <a:solidFill>
-                  <a:schemeClr val="accent2">
-                    <a:lumMod val="75000"/>
-                  </a:schemeClr>
-                </a:solidFill>
-                <a:latin typeface="Times New Roman" panose="02020603050405020304" pitchFamily="18" charset="0"/>
-                <a:cs typeface="Times New Roman" panose="02020603050405020304" pitchFamily="18" charset="0"/>
-              </a:rPr>
-              <a:t>, ведь даже температура огня от спички равна 350 градусам.</a:t>
-            </a:r>
+              <a:rPr lang="ru-RU" dirty="0" smtClean="0">
+                <a:solidFill>
+                  <a:schemeClr val="accent2">
+                    <a:lumMod val="75000"/>
+                  </a:schemeClr>
+                </a:solidFill>
+                <a:latin typeface="Times New Roman" panose="02020603050405020304" pitchFamily="18" charset="0"/>
+                <a:cs typeface="Times New Roman" panose="02020603050405020304" pitchFamily="18" charset="0"/>
+              </a:rPr>
+              <a:t>Подробно описать попытку </a:t>
+            </a:r>
+            <a:r>
+              <a:rPr lang="ru-RU" dirty="0">
+                <a:solidFill>
+                  <a:schemeClr val="accent2">
+                    <a:lumMod val="75000"/>
+                  </a:schemeClr>
+                </a:solidFill>
+                <a:latin typeface="Times New Roman" panose="02020603050405020304" pitchFamily="18" charset="0"/>
+                <a:cs typeface="Times New Roman" panose="02020603050405020304" pitchFamily="18" charset="0"/>
+              </a:rPr>
+              <a:t>реализации модального </a:t>
+            </a:r>
+            <a:r>
+              <a:rPr lang="ru-RU" dirty="0" smtClean="0">
+                <a:solidFill>
+                  <a:schemeClr val="accent2">
+                    <a:lumMod val="75000"/>
+                  </a:schemeClr>
+                </a:solidFill>
+                <a:latin typeface="Times New Roman" panose="02020603050405020304" pitchFamily="18" charset="0"/>
+                <a:cs typeface="Times New Roman" panose="02020603050405020304" pitchFamily="18" charset="0"/>
+              </a:rPr>
+              <a:t>регулятора.</a:t>
+            </a:r>
+          </a:p>
+          <a:p>
+            <a:pPr marL="342900" indent="-342900">
+              <a:lnSpc>
+                <a:spcPct val="95000"/>
+              </a:lnSpc>
+              <a:spcAft>
+                <a:spcPts val="600"/>
+              </a:spcAft>
+              <a:buFont typeface="+mj-lt"/>
+              <a:buAutoNum type="arabicPeriod"/>
+              <a:tabLst>
+                <a:tab pos="182880" algn="l"/>
+              </a:tabLst>
+            </a:pPr>
+            <a:r>
+              <a:rPr lang="ru-RU" dirty="0" smtClean="0">
+                <a:solidFill>
+                  <a:schemeClr val="accent2">
+                    <a:lumMod val="75000"/>
+                  </a:schemeClr>
+                </a:solidFill>
+                <a:latin typeface="Times New Roman" panose="02020603050405020304" pitchFamily="18" charset="0"/>
+                <a:cs typeface="Times New Roman" panose="02020603050405020304" pitchFamily="18" charset="0"/>
+              </a:rPr>
+              <a:t>Посмотреть как отрабатывает (</a:t>
+            </a:r>
+            <a:r>
+              <a:rPr lang="ru-RU" dirty="0">
+                <a:solidFill>
+                  <a:schemeClr val="accent2">
+                    <a:lumMod val="75000"/>
+                  </a:schemeClr>
+                </a:solidFill>
+                <a:latin typeface="Times New Roman" panose="02020603050405020304" pitchFamily="18" charset="0"/>
+                <a:cs typeface="Times New Roman" panose="02020603050405020304" pitchFamily="18" charset="0"/>
+              </a:rPr>
+              <a:t>к</a:t>
+            </a:r>
+            <a:r>
+              <a:rPr lang="ru-RU" dirty="0" smtClean="0">
+                <a:solidFill>
+                  <a:schemeClr val="accent2">
+                    <a:lumMod val="75000"/>
+                  </a:schemeClr>
+                </a:solidFill>
+                <a:latin typeface="Times New Roman" panose="02020603050405020304" pitchFamily="18" charset="0"/>
+                <a:cs typeface="Times New Roman" panose="02020603050405020304" pitchFamily="18" charset="0"/>
+              </a:rPr>
+              <a:t>омпенсирует) текущий ПИ-регулятор при параметрической </a:t>
+            </a:r>
+            <a:r>
+              <a:rPr lang="ru-RU" dirty="0">
+                <a:solidFill>
+                  <a:schemeClr val="accent2">
+                    <a:lumMod val="75000"/>
+                  </a:schemeClr>
+                </a:solidFill>
+                <a:latin typeface="Times New Roman" panose="02020603050405020304" pitchFamily="18" charset="0"/>
+                <a:cs typeface="Times New Roman" panose="02020603050405020304" pitchFamily="18" charset="0"/>
+              </a:rPr>
+              <a:t>неопределённости </a:t>
+            </a:r>
+            <a:r>
+              <a:rPr lang="ru-RU" dirty="0" smtClean="0">
+                <a:solidFill>
+                  <a:schemeClr val="accent2">
+                    <a:lumMod val="75000"/>
+                  </a:schemeClr>
+                </a:solidFill>
+                <a:latin typeface="Times New Roman" panose="02020603050405020304" pitchFamily="18" charset="0"/>
+                <a:cs typeface="Times New Roman" panose="02020603050405020304" pitchFamily="18" charset="0"/>
+              </a:rPr>
+              <a:t>(изменение </a:t>
+            </a:r>
+            <a:r>
+              <a:rPr lang="ru-RU" dirty="0">
+                <a:solidFill>
+                  <a:schemeClr val="accent2">
+                    <a:lumMod val="75000"/>
+                  </a:schemeClr>
+                </a:solidFill>
+                <a:latin typeface="Times New Roman" panose="02020603050405020304" pitchFamily="18" charset="0"/>
+                <a:cs typeface="Times New Roman" panose="02020603050405020304" pitchFamily="18" charset="0"/>
+              </a:rPr>
+              <a:t>рабочего </a:t>
+            </a:r>
+            <a:r>
+              <a:rPr lang="ru-RU" dirty="0" smtClean="0">
+                <a:solidFill>
+                  <a:schemeClr val="accent2">
+                    <a:lumMod val="75000"/>
+                  </a:schemeClr>
+                </a:solidFill>
+                <a:latin typeface="Times New Roman" panose="02020603050405020304" pitchFamily="18" charset="0"/>
+                <a:cs typeface="Times New Roman" panose="02020603050405020304" pitchFamily="18" charset="0"/>
+              </a:rPr>
+              <a:t>и атмосферного </a:t>
+            </a:r>
+            <a:r>
+              <a:rPr lang="ru-RU" dirty="0">
+                <a:solidFill>
+                  <a:schemeClr val="accent2">
+                    <a:lumMod val="75000"/>
+                  </a:schemeClr>
+                </a:solidFill>
+                <a:latin typeface="Times New Roman" panose="02020603050405020304" pitchFamily="18" charset="0"/>
+                <a:cs typeface="Times New Roman" panose="02020603050405020304" pitchFamily="18" charset="0"/>
+              </a:rPr>
+              <a:t>давления</a:t>
+            </a:r>
+            <a:r>
+              <a:rPr lang="ru-RU" dirty="0" smtClean="0">
+                <a:solidFill>
+                  <a:schemeClr val="accent2">
+                    <a:lumMod val="75000"/>
+                  </a:schemeClr>
+                </a:solidFill>
+                <a:latin typeface="Times New Roman" panose="02020603050405020304" pitchFamily="18" charset="0"/>
+                <a:cs typeface="Times New Roman" panose="02020603050405020304" pitchFamily="18" charset="0"/>
+              </a:rPr>
+              <a:t>).</a:t>
+            </a:r>
+          </a:p>
+          <a:p>
+            <a:pPr marL="342900" indent="-342900">
+              <a:lnSpc>
+                <a:spcPct val="95000"/>
+              </a:lnSpc>
+              <a:spcAft>
+                <a:spcPts val="600"/>
+              </a:spcAft>
+              <a:buFont typeface="+mj-lt"/>
+              <a:buAutoNum type="arabicPeriod"/>
+              <a:tabLst>
+                <a:tab pos="182880" algn="l"/>
+              </a:tabLst>
+            </a:pPr>
+            <a:r>
+              <a:rPr lang="ru-RU" dirty="0" smtClean="0">
+                <a:solidFill>
+                  <a:schemeClr val="accent2">
+                    <a:lumMod val="75000"/>
+                  </a:schemeClr>
+                </a:solidFill>
+                <a:latin typeface="Times New Roman" panose="02020603050405020304" pitchFamily="18" charset="0"/>
+                <a:cs typeface="Times New Roman" panose="02020603050405020304" pitchFamily="18" charset="0"/>
+              </a:rPr>
+              <a:t>Ответить себе на вопрос нужен ли этой </a:t>
+            </a:r>
+            <a:r>
+              <a:rPr lang="ru-RU" dirty="0">
+                <a:solidFill>
+                  <a:schemeClr val="accent2">
+                    <a:lumMod val="75000"/>
+                  </a:schemeClr>
+                </a:solidFill>
+                <a:latin typeface="Times New Roman" panose="02020603050405020304" pitchFamily="18" charset="0"/>
+                <a:cs typeface="Times New Roman" panose="02020603050405020304" pitchFamily="18" charset="0"/>
+              </a:rPr>
+              <a:t>системе адаптивный </a:t>
+            </a:r>
+            <a:r>
+              <a:rPr lang="ru-RU" dirty="0" smtClean="0">
+                <a:solidFill>
+                  <a:schemeClr val="accent2">
+                    <a:lumMod val="75000"/>
+                  </a:schemeClr>
+                </a:solidFill>
+                <a:latin typeface="Times New Roman" panose="02020603050405020304" pitchFamily="18" charset="0"/>
+                <a:cs typeface="Times New Roman" panose="02020603050405020304" pitchFamily="18" charset="0"/>
+              </a:rPr>
+              <a:t>регулятор (как сигнальная адаптация).</a:t>
+            </a:r>
+          </a:p>
+          <a:p>
+            <a:pPr marL="342900" indent="-342900">
+              <a:lnSpc>
+                <a:spcPct val="95000"/>
+              </a:lnSpc>
+              <a:spcAft>
+                <a:spcPts val="600"/>
+              </a:spcAft>
+              <a:buFont typeface="+mj-lt"/>
+              <a:buAutoNum type="arabicPeriod"/>
+              <a:tabLst>
+                <a:tab pos="182880" algn="l"/>
+              </a:tabLst>
+            </a:pPr>
+            <a:r>
+              <a:rPr lang="ru-RU" dirty="0" smtClean="0">
+                <a:solidFill>
+                  <a:schemeClr val="accent2">
+                    <a:lumMod val="75000"/>
+                  </a:schemeClr>
+                </a:solidFill>
+                <a:latin typeface="Times New Roman" panose="02020603050405020304" pitchFamily="18" charset="0"/>
+                <a:cs typeface="Times New Roman" panose="02020603050405020304" pitchFamily="18" charset="0"/>
+              </a:rPr>
+              <a:t>Проверка на чувствительность (реагирования) системы к управляющему воздействию (разомкнуть систему).</a:t>
+            </a:r>
+          </a:p>
+        </p:txBody>
+      </p:sp>
+      <p:sp>
+        <p:nvSpPr>
+          <p:cNvPr id="8" name="Прямоугольник 7"/>
+          <p:cNvSpPr/>
+          <p:nvPr/>
+        </p:nvSpPr>
+        <p:spPr>
+          <a:xfrm>
+            <a:off x="5180980" y="147556"/>
+            <a:ext cx="2196435" cy="584775"/>
+          </a:xfrm>
+          <a:prstGeom prst="rect">
+            <a:avLst/>
+          </a:prstGeom>
+        </p:spPr>
+        <p:txBody>
+          <a:bodyPr wrap="none">
+            <a:spAutoFit/>
+          </a:bodyPr>
+          <a:lstStyle/>
+          <a:p>
+            <a:r>
+              <a:rPr lang="ru-RU" sz="3200" dirty="0">
+                <a:solidFill>
+                  <a:schemeClr val="accent2">
+                    <a:lumMod val="75000"/>
+                  </a:schemeClr>
+                </a:solidFill>
+                <a:latin typeface="Times New Roman" panose="02020603050405020304" pitchFamily="18" charset="0"/>
+                <a:cs typeface="Times New Roman" panose="02020603050405020304" pitchFamily="18" charset="0"/>
+              </a:rPr>
+              <a:t>Ещё </a:t>
+            </a:r>
+            <a:r>
+              <a:rPr lang="ru-RU" sz="3200" dirty="0" smtClean="0">
+                <a:solidFill>
+                  <a:schemeClr val="accent2">
+                    <a:lumMod val="75000"/>
+                  </a:schemeClr>
+                </a:solidFill>
+                <a:latin typeface="Times New Roman" panose="02020603050405020304" pitchFamily="18" charset="0"/>
+                <a:cs typeface="Times New Roman" panose="02020603050405020304" pitchFamily="18" charset="0"/>
+              </a:rPr>
+              <a:t>раз </a:t>
+            </a:r>
+            <a:r>
+              <a:rPr lang="ru-RU" sz="3200" dirty="0" smtClean="0">
+                <a:solidFill>
+                  <a:schemeClr val="accent2">
+                    <a:lumMod val="75000"/>
+                  </a:schemeClr>
+                </a:solidFill>
+                <a:latin typeface="Times New Roman" panose="02020603050405020304" pitchFamily="18" charset="0"/>
+                <a:cs typeface="Times New Roman" panose="02020603050405020304" pitchFamily="18" charset="0"/>
+                <a:sym typeface="Symbol" panose="05050102010706020507" pitchFamily="18" charset="2"/>
+              </a:rPr>
+              <a:t></a:t>
+            </a:r>
+            <a:r>
+              <a:rPr lang="ru-RU" sz="3200" dirty="0" smtClean="0">
+                <a:solidFill>
+                  <a:schemeClr val="accent2">
+                    <a:lumMod val="75000"/>
+                  </a:schemeClr>
+                </a:solidFill>
+                <a:latin typeface="Times New Roman" panose="02020603050405020304" pitchFamily="18" charset="0"/>
+                <a:cs typeface="Times New Roman" panose="02020603050405020304" pitchFamily="18" charset="0"/>
+              </a:rPr>
+              <a:t> </a:t>
+            </a:r>
+            <a:endParaRPr lang="ru-RU" sz="3200" dirty="0"/>
           </a:p>
         </p:txBody>
       </p:sp>
@@ -7682,8 +8927,8 @@
         </p:nvSpPr>
         <p:spPr>
           <a:xfrm>
-            <a:off x="9298965" y="4058910"/>
-            <a:ext cx="2893035" cy="338554"/>
+            <a:off x="9762421" y="3605551"/>
+            <a:ext cx="2471639" cy="338554"/>
           </a:xfrm>
           <a:prstGeom prst="rect">
             <a:avLst/>
@@ -7715,7 +8960,27 @@
                 <a:latin typeface="Times New Roman" panose="02020603050405020304" pitchFamily="18" charset="0"/>
                 <a:cs typeface="Times New Roman" panose="02020603050405020304" pitchFamily="18" charset="0"/>
               </a:rPr>
-              <a:t>. концентрации влаги в паре</a:t>
+              <a:t>. </a:t>
+            </a:r>
+            <a:r>
+              <a:rPr lang="ru-RU" sz="1600" dirty="0" smtClean="0">
+                <a:solidFill>
+                  <a:schemeClr val="accent6"/>
+                </a:solidFill>
+                <a:latin typeface="Times New Roman" panose="02020603050405020304" pitchFamily="18" charset="0"/>
+                <a:cs typeface="Times New Roman" panose="02020603050405020304" pitchFamily="18" charset="0"/>
+              </a:rPr>
+              <a:t>концентр. воды </a:t>
+            </a:r>
+            <a:r>
+              <a:rPr lang="ru-RU" sz="1600" dirty="0" smtClean="0">
+                <a:solidFill>
+                  <a:schemeClr val="accent6"/>
+                </a:solidFill>
+                <a:latin typeface="Times New Roman" panose="02020603050405020304" pitchFamily="18" charset="0"/>
+                <a:cs typeface="Times New Roman" panose="02020603050405020304" pitchFamily="18" charset="0"/>
+              </a:rPr>
+              <a:t>в паре</a:t>
             </a:r>
             <a:endParaRPr lang="ru-RU" sz="1600" dirty="0">
               <a:solidFill>
@@ -7945,6 +9210,141 @@
           </a:p>
         </p:txBody>
       </p:sp>
+      <p:sp>
+        <p:nvSpPr>
+          <p:cNvPr id="2" name="Прямоугольник 1"/>
+          <p:cNvSpPr/>
+          <p:nvPr/>
+        </p:nvSpPr>
+        <p:spPr>
+          <a:xfrm>
+            <a:off x="9813415" y="3904689"/>
+            <a:ext cx="2420645" cy="1200329"/>
+          </a:xfrm>
+          <a:prstGeom prst="rect">
+            <a:avLst/>
+          </a:prstGeom>
+        </p:spPr>
+        <p:txBody>
+          <a:bodyPr wrap="square">
+            <a:spAutoFit/>
+          </a:bodyPr>
+          <a:lstStyle/>
+          <a:p>
+            <a:r>
+              <a:rPr lang="ru-RU" dirty="0">
+                <a:solidFill>
+                  <a:schemeClr val="accent2">
+                    <a:lumMod val="75000"/>
+                  </a:schemeClr>
+                </a:solidFill>
+                <a:latin typeface="Times New Roman" panose="02020603050405020304" pitchFamily="18" charset="0"/>
+                <a:cs typeface="Times New Roman" panose="02020603050405020304" pitchFamily="18" charset="0"/>
+              </a:rPr>
+              <a:t>Кстати, </a:t>
+            </a:r>
+            <a:r>
+              <a:rPr lang="ru-RU" dirty="0" smtClean="0">
+                <a:solidFill>
+                  <a:schemeClr val="accent2">
+                    <a:lumMod val="75000"/>
+                  </a:schemeClr>
+                </a:solidFill>
+                <a:latin typeface="Times New Roman" panose="02020603050405020304" pitchFamily="18" charset="0"/>
+                <a:cs typeface="Times New Roman" panose="02020603050405020304" pitchFamily="18" charset="0"/>
+              </a:rPr>
+              <a:t>такое значение для </a:t>
+            </a:r>
+            <a:r>
+              <a:rPr lang="ru-RU" dirty="0">
+                <a:solidFill>
+                  <a:schemeClr val="accent2">
+                    <a:lumMod val="75000"/>
+                  </a:schemeClr>
+                </a:solidFill>
+                <a:latin typeface="Times New Roman" panose="02020603050405020304" pitchFamily="18" charset="0"/>
+                <a:cs typeface="Times New Roman" panose="02020603050405020304" pitchFamily="18" charset="0"/>
+              </a:rPr>
+              <a:t>концентрации воды в </a:t>
+            </a:r>
+            <a:r>
+              <a:rPr lang="ru-RU" dirty="0" smtClean="0">
+                <a:solidFill>
+                  <a:schemeClr val="accent2">
+                    <a:lumMod val="75000"/>
+                  </a:schemeClr>
+                </a:solidFill>
+                <a:latin typeface="Times New Roman" panose="02020603050405020304" pitchFamily="18" charset="0"/>
+                <a:cs typeface="Times New Roman" panose="02020603050405020304" pitchFamily="18" charset="0"/>
+              </a:rPr>
+              <a:t>паре точно адекватное?</a:t>
+            </a:r>
+            <a:endParaRPr lang="ru-RU" dirty="0">
+              <a:solidFill>
+                <a:schemeClr val="accent2">
+                  <a:lumMod val="75000"/>
+                </a:schemeClr>
+              </a:solidFill>
+              <a:latin typeface="Times New Roman" panose="02020603050405020304" pitchFamily="18" charset="0"/>
+              <a:cs typeface="Times New Roman" panose="02020603050405020304" pitchFamily="18" charset="0"/>
+            </a:endParaRPr>
+          </a:p>
+        </p:txBody>
+      </p:sp>
+      <p:pic>
+        <p:nvPicPr>
+          <p:cNvPr id="1026" name="Рисунок 1"/>
+          <p:cNvPicPr>
+            <a:picLocks noChangeAspect="1" noChangeArrowheads="1"/>
+          </p:cNvPicPr>
+          <p:nvPr/>
+        </p:nvPicPr>
+        <p:blipFill>
+          <a:blip r:embed="rId4" cstate="print">
+            <a:extLst>
+              <a:ext uri="{28A0092B-C50C-407E-A947-70E740481C1C}">
+                <a14:useLocalDpi xmlns:a14="http://schemas.microsoft.com/office/drawing/2010/main" val="0"/>
+              </a:ext>
+            </a:extLst>
+          </a:blip>
+          <a:srcRect/>
+          <a:stretch>
+            <a:fillRect/>
+          </a:stretch>
+        </p:blipFill>
+        <p:spPr bwMode="auto">
+          <a:xfrm>
+            <a:off x="8979470" y="5602"/>
+            <a:ext cx="3212530" cy="3089177"/>
+          </a:xfrm>
+          <a:prstGeom prst="rect">
+            <a:avLst/>
+          </a:prstGeom>
+          <a:noFill/>
+          <a:ln>
+            <a:noFill/>
+          </a:ln>
+          <a:extLst>
+            <a:ext uri="{909E8E84-426E-40DD-AFC4-6F175D3DCCD1}">
+              <a14:hiddenFill xmlns:a14="http://schemas.microsoft.com/office/drawing/2010/main">
+                <a:solidFill>
+                  <a:srgbClr val="FFFFFF"/>
+                </a:solidFill>
+              </a14:hiddenFill>
+            </a:ext>
+            <a:ext uri="{91240B29-F687-4F45-9708-019B960494DF}">
+              <a14:hiddenLine xmlns:a14="http://schemas.microsoft.com/office/drawing/2010/main" w="9525">
+                <a:solidFill>
+                  <a:srgbClr val="000000"/>
+                </a:solidFill>
+                <a:miter lim="800000"/>
+                <a:headEnd/>
+                <a:tailEnd/>
+              </a14:hiddenLine>
+            </a:ext>
+          </a:extLst>
+        </p:spPr>
+      </p:pic>
     </p:spTree>
     <p:extLst>
       <p:ext uri="{BB962C8B-B14F-4D97-AF65-F5344CB8AC3E}">
@@ -9388,7 +10788,7 @@
         </p:blipFill>
         <p:spPr>
           <a:xfrm>
-            <a:off x="1505725" y="1304557"/>
+            <a:off x="1505725" y="1023261"/>
             <a:ext cx="8920137" cy="2264267"/>
           </a:xfrm>
           <a:prstGeom prst="rect">
@@ -9404,8 +10804,8 @@
         </p:nvSpPr>
         <p:spPr>
           <a:xfrm>
-            <a:off x="2538812" y="3998697"/>
-            <a:ext cx="7822462" cy="1077218"/>
+            <a:off x="306170" y="3213866"/>
+            <a:ext cx="4204207" cy="1569660"/>
           </a:xfrm>
           <a:prstGeom prst="rect">
             <a:avLst/>
@@ -9413,7 +10813,7 @@
           <a:noFill/>
         </p:spPr>
         <p:txBody>
-          <a:bodyPr wrap="none" rtlCol="0">
+          <a:bodyPr wrap="square" rtlCol="0">
             <a:spAutoFit/>
           </a:bodyPr>
           <a:lstStyle/>
@@ -9547,6 +10947,442 @@
               <a:solidFill>
                 <a:schemeClr val="accent6"/>
               </a:solidFill>
+              <a:latin typeface="Times New Roman" panose="02020603050405020304" pitchFamily="18" charset="0"/>
+              <a:cs typeface="Times New Roman" panose="02020603050405020304" pitchFamily="18" charset="0"/>
+            </a:endParaRPr>
+          </a:p>
+        </p:txBody>
+      </p:sp>
+      <p:sp>
+        <p:nvSpPr>
+          <p:cNvPr id="6" name="Прямоугольник 5"/>
+          <p:cNvSpPr/>
+          <p:nvPr/>
+        </p:nvSpPr>
+        <p:spPr>
+          <a:xfrm>
+            <a:off x="6764785" y="3213979"/>
+            <a:ext cx="5427215" cy="3140860"/>
+          </a:xfrm>
+          <a:prstGeom prst="rect">
+            <a:avLst/>
+          </a:prstGeom>
+        </p:spPr>
+        <p:txBody>
+          <a:bodyPr wrap="square">
+            <a:spAutoFit/>
+          </a:bodyPr>
+          <a:lstStyle/>
+          <a:p>
+            <a:pPr indent="182880">
+              <a:lnSpc>
+                <a:spcPct val="95000"/>
+              </a:lnSpc>
+              <a:spcAft>
+                <a:spcPts val="600"/>
+              </a:spcAft>
+              <a:tabLst>
+                <a:tab pos="182880" algn="l"/>
+              </a:tabLst>
+            </a:pPr>
+            <a:r>
+              <a:rPr lang="ru-RU" dirty="0" smtClean="0">
+                <a:solidFill>
+                  <a:schemeClr val="accent2">
+                    <a:lumMod val="75000"/>
+                  </a:schemeClr>
+                </a:solidFill>
+                <a:latin typeface="Times New Roman" panose="02020603050405020304" pitchFamily="18" charset="0"/>
+                <a:cs typeface="Times New Roman" panose="02020603050405020304" pitchFamily="18" charset="0"/>
+              </a:rPr>
+              <a:t>Вопросы</a:t>
+            </a:r>
+            <a:r>
+              <a:rPr lang="en-US" dirty="0" smtClean="0">
+                <a:solidFill>
+                  <a:schemeClr val="accent2">
+                    <a:lumMod val="75000"/>
+                  </a:schemeClr>
+                </a:solidFill>
+                <a:latin typeface="Times New Roman" panose="02020603050405020304" pitchFamily="18" charset="0"/>
+                <a:cs typeface="Times New Roman" panose="02020603050405020304" pitchFamily="18" charset="0"/>
+              </a:rPr>
+              <a:t>/</a:t>
+            </a:r>
+            <a:r>
+              <a:rPr lang="ru-RU" dirty="0" smtClean="0">
+                <a:solidFill>
+                  <a:schemeClr val="accent2">
+                    <a:lumMod val="75000"/>
+                  </a:schemeClr>
+                </a:solidFill>
+                <a:latin typeface="Times New Roman" panose="02020603050405020304" pitchFamily="18" charset="0"/>
+                <a:cs typeface="Times New Roman" panose="02020603050405020304" pitchFamily="18" charset="0"/>
+              </a:rPr>
+              <a:t>Заметки:</a:t>
+            </a:r>
+          </a:p>
+          <a:p>
+            <a:pPr marL="285750" indent="-285750">
+              <a:lnSpc>
+                <a:spcPct val="95000"/>
+              </a:lnSpc>
+              <a:spcAft>
+                <a:spcPts val="600"/>
+              </a:spcAft>
+              <a:buFont typeface="Arial" panose="020B0604020202020204" pitchFamily="34" charset="0"/>
+              <a:buChar char="•"/>
+              <a:tabLst>
+                <a:tab pos="182880" algn="l"/>
+              </a:tabLst>
+            </a:pPr>
+            <a:r>
+              <a:rPr lang="ru-RU" dirty="0" smtClean="0">
+                <a:solidFill>
+                  <a:schemeClr val="accent2">
+                    <a:lumMod val="75000"/>
+                  </a:schemeClr>
+                </a:solidFill>
+                <a:latin typeface="Times New Roman" panose="02020603050405020304" pitchFamily="18" charset="0"/>
+                <a:cs typeface="Times New Roman" panose="02020603050405020304" pitchFamily="18" charset="0"/>
+              </a:rPr>
+              <a:t>Обычно </a:t>
+            </a:r>
+            <a:r>
+              <a:rPr lang="ru-RU" dirty="0" smtClean="0">
+                <a:solidFill>
+                  <a:schemeClr val="accent2">
+                    <a:lumMod val="75000"/>
+                  </a:schemeClr>
+                </a:solidFill>
+                <a:latin typeface="Times New Roman" panose="02020603050405020304" pitchFamily="18" charset="0"/>
+                <a:cs typeface="Times New Roman" panose="02020603050405020304" pitchFamily="18" charset="0"/>
+              </a:rPr>
+              <a:t>газовые горелки (бутановые) имеют температуру горения газов от 800 до 2000 градусов. Отсюда вопрос: почему система явно настроена на </a:t>
+            </a:r>
+            <a:r>
+              <a:rPr lang="ru-RU" dirty="0">
+                <a:solidFill>
+                  <a:schemeClr val="accent2">
+                    <a:lumMod val="75000"/>
+                  </a:schemeClr>
+                </a:solidFill>
+                <a:latin typeface="Times New Roman" panose="02020603050405020304" pitchFamily="18" charset="0"/>
+                <a:cs typeface="Times New Roman" panose="02020603050405020304" pitchFamily="18" charset="0"/>
+              </a:rPr>
+              <a:t>температуру горения газов </a:t>
+            </a:r>
+            <a:r>
+              <a:rPr lang="ru-RU" dirty="0" smtClean="0">
+                <a:solidFill>
+                  <a:schemeClr val="accent2">
+                    <a:lumMod val="75000"/>
+                  </a:schemeClr>
+                </a:solidFill>
+                <a:latin typeface="Times New Roman" panose="02020603050405020304" pitchFamily="18" charset="0"/>
+                <a:cs typeface="Times New Roman" panose="02020603050405020304" pitchFamily="18" charset="0"/>
+              </a:rPr>
+              <a:t>не больше 550 градусов? </a:t>
+            </a:r>
+            <a:r>
+              <a:rPr lang="ru-RU" dirty="0">
+                <a:solidFill>
+                  <a:schemeClr val="accent2">
+                    <a:lumMod val="75000"/>
+                  </a:schemeClr>
+                </a:solidFill>
+                <a:latin typeface="Times New Roman" panose="02020603050405020304" pitchFamily="18" charset="0"/>
+                <a:cs typeface="Times New Roman" panose="02020603050405020304" pitchFamily="18" charset="0"/>
+              </a:rPr>
+              <a:t>(Кстати, </a:t>
+            </a:r>
+            <a:r>
+              <a:rPr lang="ru-RU" dirty="0" smtClean="0">
+                <a:solidFill>
+                  <a:schemeClr val="accent2">
+                    <a:lumMod val="75000"/>
+                  </a:schemeClr>
+                </a:solidFill>
+                <a:latin typeface="Times New Roman" panose="02020603050405020304" pitchFamily="18" charset="0"/>
+                <a:cs typeface="Times New Roman" panose="02020603050405020304" pitchFamily="18" charset="0"/>
+              </a:rPr>
+              <a:t>даже </a:t>
+            </a:r>
+            <a:r>
+              <a:rPr lang="ru-RU" dirty="0">
+                <a:solidFill>
+                  <a:schemeClr val="accent2">
+                    <a:lumMod val="75000"/>
+                  </a:schemeClr>
+                </a:solidFill>
+                <a:latin typeface="Times New Roman" panose="02020603050405020304" pitchFamily="18" charset="0"/>
+                <a:cs typeface="Times New Roman" panose="02020603050405020304" pitchFamily="18" charset="0"/>
+              </a:rPr>
+              <a:t>температура огня от спички равна 350 </a:t>
+            </a:r>
+            <a:r>
+              <a:rPr lang="ru-RU" dirty="0" smtClean="0">
+                <a:solidFill>
+                  <a:schemeClr val="accent2">
+                    <a:lumMod val="75000"/>
+                  </a:schemeClr>
+                </a:solidFill>
+                <a:latin typeface="Times New Roman" panose="02020603050405020304" pitchFamily="18" charset="0"/>
+                <a:cs typeface="Times New Roman" panose="02020603050405020304" pitchFamily="18" charset="0"/>
+              </a:rPr>
+              <a:t>градусам</a:t>
+            </a:r>
+            <a:r>
+              <a:rPr lang="ru-RU" dirty="0" smtClean="0">
+                <a:solidFill>
+                  <a:schemeClr val="accent2">
+                    <a:lumMod val="75000"/>
+                  </a:schemeClr>
+                </a:solidFill>
+                <a:latin typeface="Times New Roman" panose="02020603050405020304" pitchFamily="18" charset="0"/>
+                <a:cs typeface="Times New Roman" panose="02020603050405020304" pitchFamily="18" charset="0"/>
+              </a:rPr>
+              <a:t>)</a:t>
+            </a:r>
+          </a:p>
+          <a:p>
+            <a:pPr marL="285750" indent="-285750">
+              <a:lnSpc>
+                <a:spcPct val="95000"/>
+              </a:lnSpc>
+              <a:spcAft>
+                <a:spcPts val="600"/>
+              </a:spcAft>
+              <a:buFont typeface="Arial" panose="020B0604020202020204" pitchFamily="34" charset="0"/>
+              <a:buChar char="•"/>
+              <a:tabLst>
+                <a:tab pos="182880" algn="l"/>
+              </a:tabLst>
+            </a:pPr>
+            <a:r>
+              <a:rPr lang="ru-RU" dirty="0" smtClean="0">
+                <a:solidFill>
+                  <a:schemeClr val="accent2">
+                    <a:lumMod val="75000"/>
+                  </a:schemeClr>
+                </a:solidFill>
+                <a:latin typeface="Times New Roman" panose="02020603050405020304" pitchFamily="18" charset="0"/>
+                <a:cs typeface="Times New Roman" panose="02020603050405020304" pitchFamily="18" charset="0"/>
+              </a:rPr>
+              <a:t>Необходимо ДОРЕАЛИЗОВАТЬ </a:t>
+            </a:r>
+            <a:r>
+              <a:rPr lang="ru-RU" dirty="0" err="1" smtClean="0">
+                <a:solidFill>
+                  <a:schemeClr val="accent2">
+                    <a:lumMod val="75000"/>
+                  </a:schemeClr>
+                </a:solidFill>
+                <a:latin typeface="Times New Roman" panose="02020603050405020304" pitchFamily="18" charset="0"/>
+                <a:cs typeface="Times New Roman" panose="02020603050405020304" pitchFamily="18" charset="0"/>
+              </a:rPr>
+              <a:t>физичность</a:t>
+            </a:r>
+            <a:r>
+              <a:rPr lang="ru-RU" dirty="0" smtClean="0">
+                <a:solidFill>
+                  <a:schemeClr val="accent2">
+                    <a:lumMod val="75000"/>
+                  </a:schemeClr>
+                </a:solidFill>
+                <a:latin typeface="Times New Roman" panose="02020603050405020304" pitchFamily="18" charset="0"/>
+                <a:cs typeface="Times New Roman" panose="02020603050405020304" pitchFamily="18" charset="0"/>
+              </a:rPr>
+              <a:t> нарастания температуры </a:t>
+            </a:r>
+            <a:r>
+              <a:rPr lang="ru-RU" dirty="0">
+                <a:solidFill>
+                  <a:schemeClr val="accent2">
+                    <a:lumMod val="75000"/>
+                  </a:schemeClr>
+                </a:solidFill>
+                <a:latin typeface="Times New Roman" panose="02020603050405020304" pitchFamily="18" charset="0"/>
+                <a:cs typeface="Times New Roman" panose="02020603050405020304" pitchFamily="18" charset="0"/>
+              </a:rPr>
+              <a:t>дымовых </a:t>
+            </a:r>
+            <a:r>
+              <a:rPr lang="ru-RU" dirty="0" smtClean="0">
+                <a:solidFill>
+                  <a:schemeClr val="accent2">
+                    <a:lumMod val="75000"/>
+                  </a:schemeClr>
+                </a:solidFill>
+                <a:latin typeface="Times New Roman" panose="02020603050405020304" pitchFamily="18" charset="0"/>
+                <a:cs typeface="Times New Roman" panose="02020603050405020304" pitchFamily="18" charset="0"/>
+              </a:rPr>
+              <a:t>газов, ведь поддерживать температуру </a:t>
+            </a:r>
+            <a:r>
+              <a:rPr lang="ru-RU" dirty="0">
+                <a:solidFill>
+                  <a:schemeClr val="accent2">
+                    <a:lumMod val="75000"/>
+                  </a:schemeClr>
+                </a:solidFill>
+                <a:latin typeface="Times New Roman" panose="02020603050405020304" pitchFamily="18" charset="0"/>
+                <a:cs typeface="Times New Roman" panose="02020603050405020304" pitchFamily="18" charset="0"/>
+              </a:rPr>
+              <a:t>дымовых газов </a:t>
+            </a:r>
+            <a:r>
+              <a:rPr lang="ru-RU" dirty="0" smtClean="0">
+                <a:solidFill>
+                  <a:schemeClr val="accent2">
+                    <a:lumMod val="75000"/>
+                  </a:schemeClr>
+                </a:solidFill>
+                <a:latin typeface="Times New Roman" panose="02020603050405020304" pitchFamily="18" charset="0"/>
+                <a:cs typeface="Times New Roman" panose="02020603050405020304" pitchFamily="18" charset="0"/>
+              </a:rPr>
+              <a:t>в </a:t>
+            </a:r>
+            <a:r>
+              <a:rPr lang="ru-RU" dirty="0">
+                <a:solidFill>
+                  <a:schemeClr val="accent2">
+                    <a:lumMod val="75000"/>
+                  </a:schemeClr>
+                </a:solidFill>
+                <a:latin typeface="Times New Roman" panose="02020603050405020304" pitchFamily="18" charset="0"/>
+                <a:cs typeface="Times New Roman" panose="02020603050405020304" pitchFamily="18" charset="0"/>
+              </a:rPr>
+              <a:t>40 </a:t>
+            </a:r>
+            <a:r>
+              <a:rPr lang="ru-RU" dirty="0" smtClean="0">
+                <a:solidFill>
+                  <a:schemeClr val="accent2">
+                    <a:lumMod val="75000"/>
+                  </a:schemeClr>
+                </a:solidFill>
+                <a:latin typeface="Times New Roman" panose="02020603050405020304" pitchFamily="18" charset="0"/>
+                <a:cs typeface="Times New Roman" panose="02020603050405020304" pitchFamily="18" charset="0"/>
+              </a:rPr>
+              <a:t>градусов НЕВОЗМОЖНО (ведь так?).</a:t>
+            </a:r>
+            <a:endParaRPr lang="ru-RU" dirty="0" smtClean="0">
+              <a:solidFill>
+                <a:schemeClr val="accent2">
+                  <a:lumMod val="75000"/>
+                </a:schemeClr>
+              </a:solidFill>
+              <a:latin typeface="Times New Roman" panose="02020603050405020304" pitchFamily="18" charset="0"/>
+              <a:cs typeface="Times New Roman" panose="02020603050405020304" pitchFamily="18" charset="0"/>
+            </a:endParaRPr>
+          </a:p>
+        </p:txBody>
+      </p:sp>
+      <p:pic>
+        <p:nvPicPr>
+          <p:cNvPr id="8" name="Рисунок 7"/>
+          <p:cNvPicPr>
+            <a:picLocks noChangeAspect="1"/>
+          </p:cNvPicPr>
+          <p:nvPr/>
+        </p:nvPicPr>
+        <p:blipFill rotWithShape="1">
+          <a:blip r:embed="rId3"/>
+          <a:srcRect l="10807" t="11000" r="7027" b="13683"/>
+          <a:stretch/>
+        </p:blipFill>
+        <p:spPr>
+          <a:xfrm>
+            <a:off x="4500980" y="4008279"/>
+            <a:ext cx="2192784" cy="1550495"/>
+          </a:xfrm>
+          <a:prstGeom prst="rect">
+            <a:avLst/>
+          </a:prstGeom>
+        </p:spPr>
+      </p:pic>
+      <p:sp>
+        <p:nvSpPr>
+          <p:cNvPr id="9" name="TextBox 8"/>
+          <p:cNvSpPr txBox="1"/>
+          <p:nvPr/>
+        </p:nvSpPr>
+        <p:spPr>
+          <a:xfrm>
+            <a:off x="4912208" y="5196501"/>
+            <a:ext cx="685164" cy="307777"/>
+          </a:xfrm>
+          <a:prstGeom prst="rect">
+            <a:avLst/>
+          </a:prstGeom>
+          <a:noFill/>
+        </p:spPr>
+        <p:txBody>
+          <a:bodyPr wrap="square" rtlCol="0">
+            <a:spAutoFit/>
+          </a:bodyPr>
+          <a:lstStyle/>
+          <a:p>
+            <a:r>
+              <a:rPr lang="ru-RU" sz="1400" dirty="0" smtClean="0">
+                <a:latin typeface="Times New Roman" panose="02020603050405020304" pitchFamily="18" charset="0"/>
+                <a:cs typeface="Times New Roman" panose="02020603050405020304" pitchFamily="18" charset="0"/>
+              </a:rPr>
+              <a:t>800 </a:t>
+            </a:r>
+            <a:r>
+              <a:rPr lang="ru-RU" sz="1400" dirty="0" smtClean="0">
+                <a:latin typeface="Times New Roman" panose="02020603050405020304" pitchFamily="18" charset="0"/>
+                <a:cs typeface="Times New Roman" panose="02020603050405020304" pitchFamily="18" charset="0"/>
+                <a:sym typeface="Symbol" panose="05050102010706020507" pitchFamily="18" charset="2"/>
+              </a:rPr>
+              <a:t>С</a:t>
+            </a:r>
+            <a:endParaRPr lang="ru-RU" sz="1400" dirty="0" smtClean="0">
+              <a:latin typeface="Times New Roman" panose="02020603050405020304" pitchFamily="18" charset="0"/>
+              <a:cs typeface="Times New Roman" panose="02020603050405020304" pitchFamily="18" charset="0"/>
+            </a:endParaRPr>
+          </a:p>
+        </p:txBody>
+      </p:sp>
+      <p:sp>
+        <p:nvSpPr>
+          <p:cNvPr id="10" name="Прямоугольник 9"/>
+          <p:cNvSpPr/>
+          <p:nvPr/>
+        </p:nvSpPr>
+        <p:spPr>
+          <a:xfrm>
+            <a:off x="5597372" y="4008279"/>
+            <a:ext cx="780983" cy="307777"/>
+          </a:xfrm>
+          <a:prstGeom prst="rect">
+            <a:avLst/>
+          </a:prstGeom>
+        </p:spPr>
+        <p:txBody>
+          <a:bodyPr wrap="none">
+            <a:spAutoFit/>
+          </a:bodyPr>
+          <a:lstStyle/>
+          <a:p>
+            <a:r>
+              <a:rPr lang="ru-RU" sz="1400" dirty="0" smtClean="0">
+                <a:latin typeface="Times New Roman" panose="02020603050405020304" pitchFamily="18" charset="0"/>
+                <a:cs typeface="Times New Roman" panose="02020603050405020304" pitchFamily="18" charset="0"/>
+              </a:rPr>
+              <a:t>2000 </a:t>
+            </a:r>
+            <a:r>
+              <a:rPr lang="ru-RU" sz="1400" dirty="0">
+                <a:latin typeface="Times New Roman" panose="02020603050405020304" pitchFamily="18" charset="0"/>
+                <a:cs typeface="Times New Roman" panose="02020603050405020304" pitchFamily="18" charset="0"/>
+                <a:sym typeface="Symbol" panose="05050102010706020507" pitchFamily="18" charset="2"/>
+              </a:rPr>
+              <a:t>С</a:t>
+            </a:r>
+            <a:endParaRPr lang="ru-RU" sz="1400" dirty="0">
               <a:latin typeface="Times New Roman" panose="02020603050405020304" pitchFamily="18" charset="0"/>
               <a:cs typeface="Times New Roman" panose="02020603050405020304" pitchFamily="18" charset="0"/>
             </a:endParaRPr>
@@ -9765,6 +11601,77 @@
           </a:prstGeom>
         </p:spPr>
       </p:pic>
+      <p:sp>
+        <p:nvSpPr>
+          <p:cNvPr id="4" name="Прямоугольник 3"/>
+          <p:cNvSpPr/>
+          <p:nvPr/>
+        </p:nvSpPr>
+        <p:spPr>
+          <a:xfrm>
+            <a:off x="7827237" y="1298588"/>
+            <a:ext cx="3900165" cy="1144929"/>
+          </a:xfrm>
+          <a:prstGeom prst="rect">
+            <a:avLst/>
+          </a:prstGeom>
+        </p:spPr>
+        <p:txBody>
+          <a:bodyPr wrap="square">
+            <a:spAutoFit/>
+          </a:bodyPr>
+          <a:lstStyle/>
+          <a:p>
+            <a:pPr indent="182880" algn="ctr">
+              <a:lnSpc>
+                <a:spcPct val="95000"/>
+              </a:lnSpc>
+              <a:spcAft>
+                <a:spcPts val="600"/>
+              </a:spcAft>
+              <a:tabLst>
+                <a:tab pos="182880" algn="l"/>
+              </a:tabLst>
+            </a:pPr>
+            <a:r>
+              <a:rPr lang="ru-RU" dirty="0" smtClean="0">
+                <a:solidFill>
+                  <a:schemeClr val="accent2">
+                    <a:lumMod val="75000"/>
+                  </a:schemeClr>
+                </a:solidFill>
+                <a:latin typeface="Times New Roman" panose="02020603050405020304" pitchFamily="18" charset="0"/>
+                <a:cs typeface="Times New Roman" panose="02020603050405020304" pitchFamily="18" charset="0"/>
+              </a:rPr>
+              <a:t>Если бы был регулятор не по одной пространственной точки, а по всем четырём, то скорее всего регулирование было бы </a:t>
+            </a:r>
+            <a:r>
+              <a:rPr lang="ru-RU" dirty="0" err="1" smtClean="0">
+                <a:solidFill>
+                  <a:schemeClr val="accent2">
+                    <a:lumMod val="75000"/>
+                  </a:schemeClr>
+                </a:solidFill>
+                <a:latin typeface="Times New Roman" panose="02020603050405020304" pitchFamily="18" charset="0"/>
+                <a:cs typeface="Times New Roman" panose="02020603050405020304" pitchFamily="18" charset="0"/>
+              </a:rPr>
+              <a:t>плавнее</a:t>
+            </a:r>
+            <a:r>
+              <a:rPr lang="ru-RU" dirty="0" smtClean="0">
+                <a:solidFill>
+                  <a:schemeClr val="accent2">
+                    <a:lumMod val="75000"/>
+                  </a:schemeClr>
+                </a:solidFill>
+                <a:latin typeface="Times New Roman" panose="02020603050405020304" pitchFamily="18" charset="0"/>
+                <a:cs typeface="Times New Roman" panose="02020603050405020304" pitchFamily="18" charset="0"/>
+              </a:rPr>
+              <a:t>...</a:t>
+            </a:r>
+          </a:p>
+        </p:txBody>
+      </p:sp>
     </p:spTree>
     <p:extLst>
       <p:ext uri="{BB962C8B-B14F-4D97-AF65-F5344CB8AC3E}">
@@ -9913,10 +11820,6 @@
               </a:rPr>
               <a:t>Компенсация внешнего возмущения (работа ПИ-регулятора)</a:t>
             </a:r>
-            <a:endParaRPr lang="ru-RU" sz="3200" dirty="0" smtClean="0">
-              <a:latin typeface="Times New Roman" panose="02020603050405020304" pitchFamily="18" charset="0"/>
-              <a:cs typeface="Times New Roman" panose="02020603050405020304" pitchFamily="18" charset="0"/>
-            </a:endParaRPr>
           </a:p>
         </p:txBody>
       </p:sp>
@@ -10148,7 +12051,7 @@
         <p:spPr>
           <a:xfrm>
             <a:off x="436485" y="4278980"/>
-            <a:ext cx="4579399" cy="1077218"/>
+            <a:ext cx="4579399" cy="830997"/>
           </a:xfrm>
           <a:prstGeom prst="rect">
             <a:avLst/>
@@ -10172,7 +12075,7 @@
                 <a:latin typeface="Times New Roman" panose="02020603050405020304" pitchFamily="18" charset="0"/>
                 <a:cs typeface="Times New Roman" panose="02020603050405020304" pitchFamily="18" charset="0"/>
               </a:rPr>
-              <a:t>Подача внешнего </a:t>
+              <a:t>Подача внешнего возмущениями по температуре жидкости (+/-</a:t>
             </a:r>
             <a:r>
               <a:rPr lang="ru-RU" sz="1600" dirty="0" smtClean="0">
@@ -10184,7 +12087,7 @@
                 <a:latin typeface="Times New Roman" panose="02020603050405020304" pitchFamily="18" charset="0"/>
                 <a:cs typeface="Times New Roman" panose="02020603050405020304" pitchFamily="18" charset="0"/>
               </a:rPr>
-              <a:t>возмущениями </a:t>
+              <a:t>10 </a:t>
             </a:r>
             <a:r>
               <a:rPr lang="ru-RU" sz="1600" dirty="0" smtClean="0">
@@ -10195,8 +12098,33 @@
                 </a:solidFill>
                 <a:latin typeface="Times New Roman" panose="02020603050405020304" pitchFamily="18" charset="0"/>
                 <a:cs typeface="Times New Roman" panose="02020603050405020304" pitchFamily="18" charset="0"/>
-              </a:rPr>
-              <a:t>по температуре жидкости (+/-10 градусов) и далее </a:t>
+                <a:sym typeface="Symbol" panose="05050102010706020507" pitchFamily="18" charset="2"/>
+              </a:rPr>
+              <a:t>С</a:t>
+            </a:r>
+            <a:r>
+              <a:rPr lang="ru-RU" sz="1600" dirty="0" smtClean="0">
+                <a:solidFill>
+                  <a:schemeClr val="accent2">
+                    <a:lumMod val="75000"/>
+                  </a:schemeClr>
+                </a:solidFill>
+                <a:latin typeface="Times New Roman" panose="02020603050405020304" pitchFamily="18" charset="0"/>
+                <a:cs typeface="Times New Roman" panose="02020603050405020304" pitchFamily="18" charset="0"/>
+              </a:rPr>
+              <a:t>) </a:t>
+            </a:r>
+            <a:r>
+              <a:rPr lang="ru-RU" sz="1600" dirty="0" smtClean="0">
+                <a:solidFill>
+                  <a:schemeClr val="accent2">
+                    <a:lumMod val="75000"/>
+                  </a:schemeClr>
+                </a:solidFill>
+                <a:latin typeface="Times New Roman" panose="02020603050405020304" pitchFamily="18" charset="0"/>
+                <a:cs typeface="Times New Roman" panose="02020603050405020304" pitchFamily="18" charset="0"/>
+              </a:rPr>
+              <a:t>и далее </a:t>
             </a:r>
             <a:r>
               <a:rPr lang="ru-RU" sz="1600" dirty="0">
@@ -10208,16 +12136,111 @@
                 <a:latin typeface="Times New Roman" panose="02020603050405020304" pitchFamily="18" charset="0"/>
                 <a:cs typeface="Times New Roman" panose="02020603050405020304" pitchFamily="18" charset="0"/>
               </a:rPr>
-              <a:t>по концентрации влаги в жидкости (+/-1.5 %)</a:t>
-            </a:r>
-          </a:p>
-          <a:p>
-            <a:pPr algn="ctr"/>
+              <a:t>по концентрации </a:t>
+            </a:r>
+            <a:r>
+              <a:rPr lang="ru-RU" sz="1600" dirty="0">
+                <a:solidFill>
+                  <a:schemeClr val="accent2">
+                    <a:lumMod val="75000"/>
+                  </a:schemeClr>
+                </a:solidFill>
+                <a:latin typeface="Times New Roman" panose="02020603050405020304" pitchFamily="18" charset="0"/>
+                <a:cs typeface="Times New Roman" panose="02020603050405020304" pitchFamily="18" charset="0"/>
+              </a:rPr>
+              <a:t>воды в </a:t>
+            </a:r>
+            <a:r>
+              <a:rPr lang="ru-RU" sz="1600" dirty="0">
+                <a:solidFill>
+                  <a:schemeClr val="accent2">
+                    <a:lumMod val="75000"/>
+                  </a:schemeClr>
+                </a:solidFill>
+                <a:latin typeface="Times New Roman" panose="02020603050405020304" pitchFamily="18" charset="0"/>
+                <a:cs typeface="Times New Roman" panose="02020603050405020304" pitchFamily="18" charset="0"/>
+              </a:rPr>
+              <a:t>жидкости (+/-1.5 </a:t>
+            </a:r>
+            <a:r>
+              <a:rPr lang="ru-RU" sz="1600" dirty="0" smtClean="0">
+                <a:solidFill>
+                  <a:schemeClr val="accent2">
+                    <a:lumMod val="75000"/>
+                  </a:schemeClr>
+                </a:solidFill>
+                <a:latin typeface="Times New Roman" panose="02020603050405020304" pitchFamily="18" charset="0"/>
+                <a:cs typeface="Times New Roman" panose="02020603050405020304" pitchFamily="18" charset="0"/>
+              </a:rPr>
+              <a:t>%)</a:t>
+            </a:r>
             <a:endParaRPr lang="ru-RU" sz="1600" dirty="0" smtClean="0">
               <a:solidFill>
                 <a:schemeClr val="accent2">
                   <a:lumMod val="75000"/>
                 </a:schemeClr>
+              </a:solidFill>
+              <a:latin typeface="Times New Roman" panose="02020603050405020304" pitchFamily="18" charset="0"/>
+              <a:cs typeface="Times New Roman" panose="02020603050405020304" pitchFamily="18" charset="0"/>
+            </a:endParaRPr>
+          </a:p>
+        </p:txBody>
+      </p:sp>
+      <p:sp>
+        <p:nvSpPr>
+          <p:cNvPr id="9" name="TextBox 8"/>
+          <p:cNvSpPr txBox="1"/>
+          <p:nvPr/>
+        </p:nvSpPr>
+        <p:spPr>
+          <a:xfrm>
+            <a:off x="5379868" y="5487823"/>
+            <a:ext cx="4579399" cy="830997"/>
+          </a:xfrm>
+          <a:prstGeom prst="rect">
+            <a:avLst/>
+          </a:prstGeom>
+          <a:noFill/>
+        </p:spPr>
+        <p:txBody>
+          <a:bodyPr wrap="square" rtlCol="0">
+            <a:spAutoFit/>
+          </a:bodyPr>
+          <a:lstStyle/>
+          <a:p>
+            <a:r>
+              <a:rPr lang="ru-RU" sz="1600" dirty="0" smtClean="0">
+                <a:solidFill>
+                  <a:srgbClr val="FF0000"/>
+                </a:solidFill>
+                <a:latin typeface="Times New Roman" panose="02020603050405020304" pitchFamily="18" charset="0"/>
+                <a:cs typeface="Times New Roman" panose="02020603050405020304" pitchFamily="18" charset="0"/>
+              </a:rPr>
+              <a:t>Кстати, а может скорость потока жидкости исходной смеси может </a:t>
+            </a:r>
+            <a:r>
+              <a:rPr lang="ru-RU" sz="1600" dirty="0">
+                <a:solidFill>
+                  <a:srgbClr val="FF0000"/>
+                </a:solidFill>
+                <a:latin typeface="Times New Roman" panose="02020603050405020304" pitchFamily="18" charset="0"/>
+                <a:cs typeface="Times New Roman" panose="02020603050405020304" pitchFamily="18" charset="0"/>
+              </a:rPr>
+              <a:t>быть </a:t>
+            </a:r>
+            <a:r>
+              <a:rPr lang="ru-RU" sz="1600" dirty="0" smtClean="0">
+                <a:solidFill>
+                  <a:srgbClr val="FF0000"/>
+                </a:solidFill>
+                <a:latin typeface="Times New Roman" panose="02020603050405020304" pitchFamily="18" charset="0"/>
+                <a:cs typeface="Times New Roman" panose="02020603050405020304" pitchFamily="18" charset="0"/>
+              </a:rPr>
+              <a:t>внешним возмущением?</a:t>
+            </a:r>
+            <a:endParaRPr lang="ru-RU" sz="1600" dirty="0" smtClean="0">
+              <a:solidFill>
+                <a:srgbClr val="FF0000"/>
               </a:solidFill>
               <a:latin typeface="Times New Roman" panose="02020603050405020304" pitchFamily="18" charset="0"/>
               <a:cs typeface="Times New Roman" panose="02020603050405020304" pitchFamily="18" charset="0"/>

</xml_diff>